<commit_message>
Added a switch to disable the speedup that occurs when you score a point
</commit_message>
<xml_diff>
--- a/usage_guide.pptx
+++ b/usage_guide.pptx
@@ -9,7 +9,7 @@
     <p:sldId id="257" r:id="rId5"/>
   </p:sldIdLst>
   <p:sldSz cx="12192000" cy="6858000"/>
-  <p:notesSz cx="6858000" cy="9144000"/>
+  <p:notesSz cx="7010400" cy="9296400"/>
   <p:defaultTextStyle>
     <a:defPPr>
       <a:defRPr lang="en-US"/>
@@ -105,7 +105,177 @@
       </a:defRPr>
     </a:lvl9pPr>
   </p:defaultTextStyle>
+  <p:extLst>
+    <p:ext uri="{EFAFB233-063F-42B5-8137-9DF3F51BA10A}">
+      <p15:sldGuideLst xmlns:p15="http://schemas.microsoft.com/office/powerpoint/2012/main"/>
+    </p:ext>
+  </p:extLst>
 </p:presentation>
+</file>
+
+<file path=ppt/revisionInfo.xml><?xml version="1.0" encoding="utf-8"?>
+<p1510:revInfo xmlns:a="http://schemas.openxmlformats.org/drawingml/2006/main" xmlns:r="http://schemas.openxmlformats.org/officeDocument/2006/relationships" xmlns:p1510="http://schemas.microsoft.com/office/powerpoint/2015/10/main">
+  <p1510:revLst>
+    <p1510:client id="{4D0BF372-0143-4AE8-8B76-AB608A7C8084}" v="23" dt="2024-11-11T13:29:29.439"/>
+  </p1510:revLst>
+</p1510:revInfo>
+</file>
+
+<file path=ppt/changesInfos/changesInfo1.xml><?xml version="1.0" encoding="utf-8"?>
+<pc:chgInfo xmlns:a="http://schemas.openxmlformats.org/drawingml/2006/main" xmlns:r="http://schemas.openxmlformats.org/officeDocument/2006/relationships" xmlns:ac="http://schemas.microsoft.com/office/drawing/2013/main/command" xmlns:pc="http://schemas.microsoft.com/office/powerpoint/2013/main/command">
+  <pc:docChgLst>
+    <pc:chgData name="Pethick, Matthew" userId="47b0bdf2-08b5-49f1-a741-b2d87ec64f81" providerId="ADAL" clId="{4D0BF372-0143-4AE8-8B76-AB608A7C8084}"/>
+    <pc:docChg chg="undo custSel modSld">
+      <pc:chgData name="Pethick, Matthew" userId="47b0bdf2-08b5-49f1-a741-b2d87ec64f81" providerId="ADAL" clId="{4D0BF372-0143-4AE8-8B76-AB608A7C8084}" dt="2024-11-11T13:29:43.721" v="179" actId="12789"/>
+      <pc:docMkLst>
+        <pc:docMk/>
+      </pc:docMkLst>
+      <pc:sldChg chg="addSp delSp modSp mod">
+        <pc:chgData name="Pethick, Matthew" userId="47b0bdf2-08b5-49f1-a741-b2d87ec64f81" providerId="ADAL" clId="{4D0BF372-0143-4AE8-8B76-AB608A7C8084}" dt="2024-11-11T13:29:43.721" v="179" actId="12789"/>
+        <pc:sldMkLst>
+          <pc:docMk/>
+          <pc:sldMk cId="3712660401" sldId="257"/>
+        </pc:sldMkLst>
+        <pc:spChg chg="add del mod">
+          <ac:chgData name="Pethick, Matthew" userId="47b0bdf2-08b5-49f1-a741-b2d87ec64f81" providerId="ADAL" clId="{4D0BF372-0143-4AE8-8B76-AB608A7C8084}" dt="2024-11-11T13:06:06.357" v="102" actId="478"/>
+          <ac:spMkLst>
+            <pc:docMk/>
+            <pc:sldMk cId="3712660401" sldId="257"/>
+            <ac:spMk id="6" creationId="{BC1AFFD5-B2A8-CC9A-FE21-29B166D0C46D}"/>
+          </ac:spMkLst>
+        </pc:spChg>
+        <pc:spChg chg="add mod">
+          <ac:chgData name="Pethick, Matthew" userId="47b0bdf2-08b5-49f1-a741-b2d87ec64f81" providerId="ADAL" clId="{4D0BF372-0143-4AE8-8B76-AB608A7C8084}" dt="2024-11-11T13:14:56.195" v="135" actId="1035"/>
+          <ac:spMkLst>
+            <pc:docMk/>
+            <pc:sldMk cId="3712660401" sldId="257"/>
+            <ac:spMk id="7" creationId="{5A8ED71B-2C2A-05C8-E066-18E9A9AC05B9}"/>
+          </ac:spMkLst>
+        </pc:spChg>
+        <pc:spChg chg="add mod">
+          <ac:chgData name="Pethick, Matthew" userId="47b0bdf2-08b5-49f1-a741-b2d87ec64f81" providerId="ADAL" clId="{4D0BF372-0143-4AE8-8B76-AB608A7C8084}" dt="2024-11-11T13:29:29.439" v="177" actId="571"/>
+          <ac:spMkLst>
+            <pc:docMk/>
+            <pc:sldMk cId="3712660401" sldId="257"/>
+            <ac:spMk id="13" creationId="{007A81E1-BE80-8BB8-5F0F-6AC3B154DACF}"/>
+          </ac:spMkLst>
+        </pc:spChg>
+        <pc:spChg chg="mod">
+          <ac:chgData name="Pethick, Matthew" userId="47b0bdf2-08b5-49f1-a741-b2d87ec64f81" providerId="ADAL" clId="{4D0BF372-0143-4AE8-8B76-AB608A7C8084}" dt="2024-11-11T13:10:59.657" v="134" actId="20577"/>
+          <ac:spMkLst>
+            <pc:docMk/>
+            <pc:sldMk cId="3712660401" sldId="257"/>
+            <ac:spMk id="37" creationId="{E4A8F66B-7D32-4301-7B2E-222716E02861}"/>
+          </ac:spMkLst>
+        </pc:spChg>
+        <pc:spChg chg="mod ord">
+          <ac:chgData name="Pethick, Matthew" userId="47b0bdf2-08b5-49f1-a741-b2d87ec64f81" providerId="ADAL" clId="{4D0BF372-0143-4AE8-8B76-AB608A7C8084}" dt="2024-11-11T13:29:43.721" v="179" actId="12789"/>
+          <ac:spMkLst>
+            <pc:docMk/>
+            <pc:sldMk cId="3712660401" sldId="257"/>
+            <ac:spMk id="43" creationId="{62C57809-9881-2022-3565-9B7E6AF5C9B8}"/>
+          </ac:spMkLst>
+        </pc:spChg>
+        <pc:spChg chg="mod">
+          <ac:chgData name="Pethick, Matthew" userId="47b0bdf2-08b5-49f1-a741-b2d87ec64f81" providerId="ADAL" clId="{4D0BF372-0143-4AE8-8B76-AB608A7C8084}" dt="2024-11-11T13:06:20.067" v="112" actId="1038"/>
+          <ac:spMkLst>
+            <pc:docMk/>
+            <pc:sldMk cId="3712660401" sldId="257"/>
+            <ac:spMk id="56" creationId="{2C6DCEAB-90A7-F576-D7C2-5BA683AA77DC}"/>
+          </ac:spMkLst>
+        </pc:spChg>
+        <pc:grpChg chg="add mod">
+          <ac:chgData name="Pethick, Matthew" userId="47b0bdf2-08b5-49f1-a741-b2d87ec64f81" providerId="ADAL" clId="{4D0BF372-0143-4AE8-8B76-AB608A7C8084}" dt="2024-11-11T13:29:43.721" v="179" actId="12789"/>
+          <ac:grpSpMkLst>
+            <pc:docMk/>
+            <pc:sldMk cId="3712660401" sldId="257"/>
+            <ac:grpSpMk id="2" creationId="{21846AE4-D3AE-861F-A126-5904222E38C2}"/>
+          </ac:grpSpMkLst>
+        </pc:grpChg>
+        <pc:grpChg chg="mod">
+          <ac:chgData name="Pethick, Matthew" userId="47b0bdf2-08b5-49f1-a741-b2d87ec64f81" providerId="ADAL" clId="{4D0BF372-0143-4AE8-8B76-AB608A7C8084}" dt="2024-11-11T13:27:49.462" v="143" actId="164"/>
+          <ac:grpSpMkLst>
+            <pc:docMk/>
+            <pc:sldMk cId="3712660401" sldId="257"/>
+            <ac:grpSpMk id="44" creationId="{546BF22A-4081-4065-6382-5535B88F18B3}"/>
+          </ac:grpSpMkLst>
+        </pc:grpChg>
+        <pc:grpChg chg="mod">
+          <ac:chgData name="Pethick, Matthew" userId="47b0bdf2-08b5-49f1-a741-b2d87ec64f81" providerId="ADAL" clId="{4D0BF372-0143-4AE8-8B76-AB608A7C8084}" dt="2024-11-11T13:27:49.462" v="143" actId="164"/>
+          <ac:grpSpMkLst>
+            <pc:docMk/>
+            <pc:sldMk cId="3712660401" sldId="257"/>
+            <ac:grpSpMk id="47" creationId="{51E95FE4-C20B-3942-CFB0-E2EAF0C67BAF}"/>
+          </ac:grpSpMkLst>
+        </pc:grpChg>
+        <pc:grpChg chg="mod">
+          <ac:chgData name="Pethick, Matthew" userId="47b0bdf2-08b5-49f1-a741-b2d87ec64f81" providerId="ADAL" clId="{4D0BF372-0143-4AE8-8B76-AB608A7C8084}" dt="2024-11-11T13:27:49.462" v="143" actId="164"/>
+          <ac:grpSpMkLst>
+            <pc:docMk/>
+            <pc:sldMk cId="3712660401" sldId="257"/>
+            <ac:grpSpMk id="50" creationId="{B67CD042-4161-6A57-4273-D5825E61A143}"/>
+          </ac:grpSpMkLst>
+        </pc:grpChg>
+        <pc:grpChg chg="mod">
+          <ac:chgData name="Pethick, Matthew" userId="47b0bdf2-08b5-49f1-a741-b2d87ec64f81" providerId="ADAL" clId="{4D0BF372-0143-4AE8-8B76-AB608A7C8084}" dt="2024-11-11T13:27:49.462" v="143" actId="164"/>
+          <ac:grpSpMkLst>
+            <pc:docMk/>
+            <pc:sldMk cId="3712660401" sldId="257"/>
+            <ac:grpSpMk id="53" creationId="{9BE2784E-2B14-97F2-C676-6AA58F7B9EAB}"/>
+          </ac:grpSpMkLst>
+        </pc:grpChg>
+        <pc:picChg chg="mod">
+          <ac:chgData name="Pethick, Matthew" userId="47b0bdf2-08b5-49f1-a741-b2d87ec64f81" providerId="ADAL" clId="{4D0BF372-0143-4AE8-8B76-AB608A7C8084}" dt="2024-11-11T13:28:29.286" v="167" actId="1037"/>
+          <ac:picMkLst>
+            <pc:docMk/>
+            <pc:sldMk cId="3712660401" sldId="257"/>
+            <ac:picMk id="32" creationId="{1C567C94-DF8C-B444-7B7C-E8C4FCC25C8B}"/>
+          </ac:picMkLst>
+        </pc:picChg>
+        <pc:cxnChg chg="add mod">
+          <ac:chgData name="Pethick, Matthew" userId="47b0bdf2-08b5-49f1-a741-b2d87ec64f81" providerId="ADAL" clId="{4D0BF372-0143-4AE8-8B76-AB608A7C8084}" dt="2024-11-11T13:15:56.485" v="137" actId="208"/>
+          <ac:cxnSpMkLst>
+            <pc:docMk/>
+            <pc:sldMk cId="3712660401" sldId="257"/>
+            <ac:cxnSpMk id="8" creationId="{207D279B-ACFD-FB8A-02B4-C5E220D621D3}"/>
+          </ac:cxnSpMkLst>
+        </pc:cxnChg>
+        <pc:cxnChg chg="mod">
+          <ac:chgData name="Pethick, Matthew" userId="47b0bdf2-08b5-49f1-a741-b2d87ec64f81" providerId="ADAL" clId="{4D0BF372-0143-4AE8-8B76-AB608A7C8084}" dt="2024-11-11T13:28:42.882" v="168" actId="14100"/>
+          <ac:cxnSpMkLst>
+            <pc:docMk/>
+            <pc:sldMk cId="3712660401" sldId="257"/>
+            <ac:cxnSpMk id="35" creationId="{03399DFA-1B81-D2AB-DCCB-91B413D68FDD}"/>
+          </ac:cxnSpMkLst>
+        </pc:cxnChg>
+        <pc:cxnChg chg="mod">
+          <ac:chgData name="Pethick, Matthew" userId="47b0bdf2-08b5-49f1-a741-b2d87ec64f81" providerId="ADAL" clId="{4D0BF372-0143-4AE8-8B76-AB608A7C8084}" dt="2024-11-11T13:07:23.673" v="128" actId="14100"/>
+          <ac:cxnSpMkLst>
+            <pc:docMk/>
+            <pc:sldMk cId="3712660401" sldId="257"/>
+            <ac:cxnSpMk id="39" creationId="{7A271D3B-60A6-AE68-DD18-916178C23E31}"/>
+          </ac:cxnSpMkLst>
+        </pc:cxnChg>
+        <pc:cxnChg chg="mod">
+          <ac:chgData name="Pethick, Matthew" userId="47b0bdf2-08b5-49f1-a741-b2d87ec64f81" providerId="ADAL" clId="{4D0BF372-0143-4AE8-8B76-AB608A7C8084}" dt="2024-11-11T13:28:50.358" v="169" actId="14100"/>
+          <ac:cxnSpMkLst>
+            <pc:docMk/>
+            <pc:sldMk cId="3712660401" sldId="257"/>
+            <ac:cxnSpMk id="42" creationId="{3242EC64-5BB9-EF3E-A8A6-495DBA59D873}"/>
+          </ac:cxnSpMkLst>
+        </pc:cxnChg>
+        <pc:cxnChg chg="mod">
+          <ac:chgData name="Pethick, Matthew" userId="47b0bdf2-08b5-49f1-a741-b2d87ec64f81" providerId="ADAL" clId="{4D0BF372-0143-4AE8-8B76-AB608A7C8084}" dt="2024-11-11T13:29:43.721" v="179" actId="12789"/>
+          <ac:cxnSpMkLst>
+            <pc:docMk/>
+            <pc:sldMk cId="3712660401" sldId="257"/>
+            <ac:cxnSpMk id="58" creationId="{108DB30E-207D-964A-5CCE-64B4479EB74C}"/>
+          </ac:cxnSpMkLst>
+        </pc:cxnChg>
+      </pc:sldChg>
+    </pc:docChg>
+  </pc:docChgLst>
+</pc:chgInfo>
 </file>
 
 <file path=ppt/slideLayouts/slideLayout1.xml><?xml version="1.0" encoding="utf-8"?>
@@ -920,7 +1090,7 @@
         <p:fade/>
       </p:transition>
     </mc:Choice>
-    <mc:Fallback xmlns:p15="http://schemas.microsoft.com/office/powerpoint/2012/main" xmlns:a14="http://schemas.microsoft.com/office/drawing/2010/main" xmlns:a16="http://schemas.microsoft.com/office/drawing/2014/main" xmlns="">
+    <mc:Fallback xmlns="" xmlns:a16="http://schemas.microsoft.com/office/drawing/2014/main" xmlns:a14="http://schemas.microsoft.com/office/drawing/2010/main" xmlns:p15="http://schemas.microsoft.com/office/powerpoint/2012/main">
       <p:transition spd="med">
         <p:fade/>
       </p:transition>
@@ -1170,7 +1340,7 @@
         <p:fade/>
       </p:transition>
     </mc:Choice>
-    <mc:Fallback xmlns:a16="http://schemas.microsoft.com/office/drawing/2014/main" xmlns:a14="http://schemas.microsoft.com/office/drawing/2010/main" xmlns:p15="http://schemas.microsoft.com/office/powerpoint/2012/main" xmlns="">
+    <mc:Fallback xmlns="" xmlns:p15="http://schemas.microsoft.com/office/powerpoint/2012/main" xmlns:a14="http://schemas.microsoft.com/office/drawing/2010/main" xmlns:a16="http://schemas.microsoft.com/office/drawing/2014/main">
       <p:transition spd="med">
         <p:fade/>
       </p:transition>
@@ -15231,7 +15401,7 @@
         <p:fade/>
       </p:transition>
     </mc:Choice>
-    <mc:Fallback xmlns:p15="http://schemas.microsoft.com/office/powerpoint/2012/main" xmlns:a14="http://schemas.microsoft.com/office/drawing/2010/main" xmlns:a16="http://schemas.microsoft.com/office/drawing/2014/main" xmlns="">
+    <mc:Fallback xmlns="" xmlns:a16="http://schemas.microsoft.com/office/drawing/2014/main" xmlns:a14="http://schemas.microsoft.com/office/drawing/2010/main" xmlns:p15="http://schemas.microsoft.com/office/powerpoint/2012/main">
       <p:transition spd="med">
         <p:fade/>
       </p:transition>
@@ -20837,7 +21007,7 @@
         </p:blipFill>
         <p:spPr bwMode="auto">
           <a:xfrm>
-            <a:off x="6466599" y="765978"/>
+            <a:off x="6472065" y="771787"/>
             <a:ext cx="4762500" cy="3571875"/>
           </a:xfrm>
           <a:prstGeom prst="rect">
@@ -20940,7 +21110,7 @@
         <p:spPr>
           <a:xfrm flipH="1" flipV="1">
             <a:off x="10665261" y="3899591"/>
-            <a:ext cx="261686" cy="2079249"/>
+            <a:ext cx="261686" cy="2044869"/>
           </a:xfrm>
           <a:prstGeom prst="line">
             <a:avLst/>
@@ -20959,6 +21129,90 @@
       </p:cxnSp>
       <p:sp>
         <p:nvSpPr>
+          <p:cNvPr id="43" name="Rectangle 42">
+            <a:extLst>
+              <a:ext uri="{FF2B5EF4-FFF2-40B4-BE49-F238E27FC236}">
+                <a16:creationId xmlns:a16="http://schemas.microsoft.com/office/drawing/2014/main" id="{62C57809-9881-2022-3565-9B7E6AF5C9B8}"/>
+              </a:ext>
+            </a:extLst>
+          </p:cNvPr>
+          <p:cNvSpPr/>
+          <p:nvPr/>
+        </p:nvSpPr>
+        <p:spPr bwMode="auto">
+          <a:xfrm>
+            <a:off x="6436519" y="4790998"/>
+            <a:ext cx="4490428" cy="1153462"/>
+          </a:xfrm>
+          <a:prstGeom prst="rect">
+            <a:avLst/>
+          </a:prstGeom>
+          <a:solidFill>
+            <a:srgbClr val="FFFFFF"/>
+          </a:solidFill>
+          <a:ln w="38100" cap="flat" cmpd="sng" algn="ctr">
+            <a:solidFill>
+              <a:srgbClr val="ED1C24"/>
+            </a:solidFill>
+            <a:prstDash val="solid"/>
+            <a:headEnd type="none" w="med" len="med"/>
+            <a:tailEnd type="none" w="med" len="med"/>
+          </a:ln>
+          <a:effectLst/>
+        </p:spPr>
+        <p:txBody>
+          <a:bodyPr rot="0" spcFirstLastPara="0" vertOverflow="overflow" horzOverflow="overflow" vert="horz" wrap="square" lIns="182880" tIns="146304" rIns="182880" bIns="146304" numCol="1" spcCol="0" rtlCol="0" fromWordArt="0" anchor="t" anchorCtr="0" forceAA="0" compatLnSpc="1">
+            <a:prstTxWarp prst="textNoShape">
+              <a:avLst/>
+            </a:prstTxWarp>
+            <a:noAutofit/>
+          </a:bodyPr>
+          <a:lstStyle/>
+          <a:p>
+            <a:pPr marL="0" marR="0" lvl="0" indent="0" defTabSz="932472" eaLnBrk="1" fontAlgn="base" latinLnBrk="0" hangingPunct="1">
+              <a:lnSpc>
+                <a:spcPct val="100000"/>
+              </a:lnSpc>
+              <a:spcBef>
+                <a:spcPct val="0"/>
+              </a:spcBef>
+              <a:spcAft>
+                <a:spcPct val="0"/>
+              </a:spcAft>
+              <a:buClrTx/>
+              <a:buSzTx/>
+              <a:buFontTx/>
+              <a:buNone/>
+              <a:tabLst/>
+              <a:defRPr/>
+            </a:pPr>
+            <a:endParaRPr kumimoji="0" lang="en-GB" sz="1800" b="0" i="0" u="none" strike="noStrike" kern="0" cap="none" spc="0" normalizeH="0" baseline="0" noProof="0" dirty="0" err="1">
+              <a:ln>
+                <a:noFill/>
+              </a:ln>
+              <a:gradFill>
+                <a:gsLst>
+                  <a:gs pos="0">
+                    <a:srgbClr val="FFFFFF"/>
+                  </a:gs>
+                  <a:gs pos="100000">
+                    <a:srgbClr val="FFFFFF"/>
+                  </a:gs>
+                </a:gsLst>
+                <a:lin ang="5400000" scaled="0"/>
+              </a:gradFill>
+              <a:effectLst/>
+              <a:uLnTx/>
+              <a:uFillTx/>
+              <a:latin typeface="Klavika Regular"/>
+              <a:ea typeface="Segoe UI" pitchFamily="34" charset="0"/>
+              <a:cs typeface="Segoe UI" pitchFamily="34" charset="0"/>
+            </a:endParaRPr>
+          </a:p>
+        </p:txBody>
+      </p:sp>
+      <p:sp>
+        <p:nvSpPr>
           <p:cNvPr id="36" name="Title 1">
             <a:extLst>
               <a:ext uri="{FF2B5EF4-FFF2-40B4-BE49-F238E27FC236}">
@@ -21026,7 +21280,7 @@
               <a:defRPr/>
             </a:pPr>
             <a:r>
-              <a:rPr kumimoji="0" lang="en-GB" sz="4800" b="1" i="0" u="none" strike="noStrike" kern="1200" cap="none" spc="0" normalizeH="0" baseline="0" noProof="0">
+              <a:rPr kumimoji="0" lang="en-GB" sz="4800" b="1" i="0" u="none" strike="noStrike" kern="1200" cap="none" spc="0" normalizeH="0" baseline="0" noProof="0" dirty="0" err="1">
                 <a:ln w="3175">
                   <a:noFill/>
                 </a:ln>
@@ -21040,22 +21294,25 @@
                 <a:ea typeface="+mn-ea"/>
                 <a:cs typeface="Segoe UI" pitchFamily="34" charset="0"/>
               </a:rPr>
-              <a:t>snake_game on FPGA</a:t>
-            </a:r>
-            <a:endParaRPr kumimoji="0" lang="en-GB" sz="4800" b="1" i="0" u="none" strike="noStrike" kern="1200" cap="none" spc="0" normalizeH="0" baseline="0" noProof="0" dirty="0">
-              <a:ln w="3175">
-                <a:noFill/>
-              </a:ln>
-              <a:solidFill>
-                <a:srgbClr val="000000"/>
-              </a:solidFill>
-              <a:effectLst/>
-              <a:uLnTx/>
-              <a:uFillTx/>
-              <a:latin typeface="Klavika Light"/>
-              <a:ea typeface="+mn-ea"/>
-              <a:cs typeface="Segoe UI" pitchFamily="34" charset="0"/>
-            </a:endParaRPr>
+              <a:t>snake_game</a:t>
+            </a:r>
+            <a:r>
+              <a:rPr kumimoji="0" lang="en-GB" sz="4800" b="1" i="0" u="none" strike="noStrike" kern="1200" cap="none" spc="0" normalizeH="0" baseline="0" noProof="0" dirty="0">
+                <a:ln w="3175">
+                  <a:noFill/>
+                </a:ln>
+                <a:solidFill>
+                  <a:srgbClr val="000000"/>
+                </a:solidFill>
+                <a:effectLst/>
+                <a:uLnTx/>
+                <a:uFillTx/>
+                <a:latin typeface="Klavika Light"/>
+                <a:ea typeface="+mn-ea"/>
+                <a:cs typeface="Segoe UI" pitchFamily="34" charset="0"/>
+              </a:rPr>
+              <a:t> on FPGA</a:t>
+            </a:r>
           </a:p>
         </p:txBody>
       </p:sp>
@@ -21299,7 +21556,7 @@
               <a:defRPr/>
             </a:pPr>
             <a:r>
-              <a:rPr kumimoji="0" lang="en-US" sz="2400" b="0" i="0" u="none" strike="noStrike" kern="1200" cap="none" spc="0" normalizeH="0" baseline="0" noProof="0">
+              <a:rPr kumimoji="0" lang="en-US" sz="2400" b="0" i="0" u="none" strike="noStrike" kern="1200" cap="none" spc="0" normalizeH="0" baseline="0" noProof="0" dirty="0">
                 <a:ln>
                   <a:noFill/>
                 </a:ln>
@@ -21337,7 +21594,7 @@
               <a:defRPr/>
             </a:pPr>
             <a:r>
-              <a:rPr kumimoji="0" lang="en-US" sz="2400" b="0" i="0" u="none" strike="noStrike" kern="1200" cap="none" spc="0" normalizeH="0" baseline="0" noProof="0">
+              <a:rPr kumimoji="0" lang="en-US" sz="2400" b="0" i="0" u="none" strike="noStrike" kern="1200" cap="none" spc="0" normalizeH="0" baseline="0" noProof="0" dirty="0">
                 <a:ln>
                   <a:noFill/>
                 </a:ln>
@@ -21352,6 +21609,31 @@
                 <a:cs typeface="Segoe UI" panose="020B0502040204020203" pitchFamily="34" charset="0"/>
               </a:rPr>
               <a:t>Get to 10 points to win! </a:t>
+            </a:r>
+          </a:p>
+          <a:p>
+            <a:pPr>
+              <a:buClr>
+                <a:srgbClr val="636466"/>
+              </a:buClr>
+              <a:defRPr/>
+            </a:pPr>
+            <a:r>
+              <a:rPr kumimoji="0" lang="en-US" sz="2400" b="0" i="0" u="none" strike="noStrike" kern="1200" cap="none" spc="0" normalizeH="0" baseline="0" noProof="0" dirty="0">
+                <a:ln>
+                  <a:noFill/>
+                </a:ln>
+                <a:solidFill>
+                  <a:srgbClr val="000000"/>
+                </a:solidFill>
+                <a:effectLst/>
+                <a:uLnTx/>
+                <a:uFillTx/>
+                <a:latin typeface="Klavika Regular"/>
+                <a:ea typeface="+mn-ea"/>
+                <a:cs typeface="Segoe UI" panose="020B0502040204020203" pitchFamily="34" charset="0"/>
+              </a:rPr>
+              <a:t>Every time you score a point the snake becomes faster. This increase can be turned off using this switch.</a:t>
             </a:r>
           </a:p>
           <a:p>
@@ -21375,7 +21657,7 @@
               <a:defRPr/>
             </a:pPr>
             <a:r>
-              <a:rPr kumimoji="0" lang="en-US" sz="2400" b="0" i="0" u="none" strike="noStrike" kern="1200" cap="none" spc="0" normalizeH="0" baseline="0" noProof="0">
+              <a:rPr kumimoji="0" lang="en-US" sz="2400" b="0" i="0" u="none" strike="noStrike" kern="1200" cap="none" spc="0" normalizeH="0" baseline="0" noProof="0" dirty="0">
                 <a:ln>
                   <a:noFill/>
                 </a:ln>
@@ -21413,7 +21695,7 @@
               <a:defRPr/>
             </a:pPr>
             <a:r>
-              <a:rPr kumimoji="0" lang="en-US" sz="2400" b="0" i="0" u="none" strike="noStrike" kern="1200" cap="none" spc="0" normalizeH="0" baseline="0" noProof="0">
+              <a:rPr kumimoji="0" lang="en-US" sz="2400" b="0" i="0" u="none" strike="noStrike" kern="1200" cap="none" spc="0" normalizeH="0" baseline="0" noProof="0" dirty="0">
                 <a:ln>
                   <a:noFill/>
                 </a:ln>
@@ -21427,7 +21709,7 @@
                 <a:ea typeface="+mn-ea"/>
                 <a:cs typeface="Segoe UI" panose="020B0502040204020203" pitchFamily="34" charset="0"/>
               </a:rPr>
-              <a:t>Every time you score a point the snake becomes faster</a:t>
+              <a:t>You lose if you touch an edge or eat part of yourself</a:t>
             </a:r>
           </a:p>
           <a:p>
@@ -21451,7 +21733,7 @@
               <a:defRPr/>
             </a:pPr>
             <a:r>
-              <a:rPr kumimoji="0" lang="en-US" sz="2400" b="0" i="0" u="none" strike="noStrike" kern="1200" cap="none" spc="0" normalizeH="0" baseline="0" noProof="0">
+              <a:rPr kumimoji="0" lang="en-US" sz="2400" b="0" i="0" u="none" strike="noStrike" kern="1200" cap="none" spc="0" normalizeH="0" baseline="0" noProof="0" dirty="0">
                 <a:ln>
                   <a:noFill/>
                 </a:ln>
@@ -21465,7 +21747,7 @@
                 <a:ea typeface="+mn-ea"/>
                 <a:cs typeface="Segoe UI" panose="020B0502040204020203" pitchFamily="34" charset="0"/>
               </a:rPr>
-              <a:t>You lose if you touch an edge or eat part of yourself</a:t>
+              <a:t>Use the reset switch to start over in the event of a win or lose screen</a:t>
             </a:r>
           </a:p>
           <a:p>
@@ -21489,45 +21771,7 @@
               <a:defRPr/>
             </a:pPr>
             <a:r>
-              <a:rPr kumimoji="0" lang="en-US" sz="2400" b="0" i="0" u="none" strike="noStrike" kern="1200" cap="none" spc="0" normalizeH="0" baseline="0" noProof="0">
-                <a:ln>
-                  <a:noFill/>
-                </a:ln>
-                <a:solidFill>
-                  <a:srgbClr val="000000"/>
-                </a:solidFill>
-                <a:effectLst/>
-                <a:uLnTx/>
-                <a:uFillTx/>
-                <a:latin typeface="Klavika Regular"/>
-                <a:ea typeface="+mn-ea"/>
-                <a:cs typeface="Segoe UI" panose="020B0502040204020203" pitchFamily="34" charset="0"/>
-              </a:rPr>
-              <a:t>Use the reset switch to start over in the event of a win or lose screen</a:t>
-            </a:r>
-          </a:p>
-          <a:p>
-            <a:pPr marL="228600" marR="0" lvl="0" indent="-228600" algn="l" defTabSz="932742" rtl="0" eaLnBrk="1" fontAlgn="auto" latinLnBrk="0" hangingPunct="1">
-              <a:lnSpc>
-                <a:spcPct val="100000"/>
-              </a:lnSpc>
-              <a:spcBef>
-                <a:spcPts val="600"/>
-              </a:spcBef>
-              <a:spcAft>
-                <a:spcPts val="0"/>
-              </a:spcAft>
-              <a:buClr>
-                <a:srgbClr val="636466"/>
-              </a:buClr>
-              <a:buSzPct val="90000"/>
-              <a:buFont typeface="Arial" panose="020B0604020202020204" pitchFamily="34" charset="0"/>
-              <a:buChar char="•"/>
-              <a:tabLst/>
-              <a:defRPr/>
-            </a:pPr>
-            <a:r>
-              <a:rPr kumimoji="0" lang="en-US" sz="2400" b="0" i="0" u="none" strike="noStrike" kern="1200" cap="none" spc="0" normalizeH="0" baseline="0" noProof="0">
+              <a:rPr kumimoji="0" lang="en-US" sz="2400" b="0" i="0" u="none" strike="noStrike" kern="1200" cap="none" spc="0" normalizeH="0" baseline="0" noProof="0" dirty="0">
                 <a:ln>
                   <a:noFill/>
                 </a:ln>
@@ -21543,20 +21787,6 @@
               </a:rPr>
               <a:t>The directions the press buttons control are shown to the right</a:t>
             </a:r>
-            <a:endParaRPr kumimoji="0" lang="en-US" sz="2400" b="0" i="0" u="none" strike="noStrike" kern="1200" cap="none" spc="0" normalizeH="0" baseline="0" noProof="0" dirty="0">
-              <a:ln>
-                <a:noFill/>
-              </a:ln>
-              <a:solidFill>
-                <a:srgbClr val="000000"/>
-              </a:solidFill>
-              <a:effectLst/>
-              <a:uLnTx/>
-              <a:uFillTx/>
-              <a:latin typeface="Klavika Regular"/>
-              <a:ea typeface="+mn-ea"/>
-              <a:cs typeface="Segoe UI" panose="020B0502040204020203" pitchFamily="34" charset="0"/>
-            </a:endParaRPr>
           </a:p>
         </p:txBody>
       </p:sp>
@@ -21659,8 +21889,8 @@
         </p:nvCxnSpPr>
         <p:spPr>
           <a:xfrm>
-            <a:off x="4886666" y="2490537"/>
-            <a:ext cx="2418669" cy="1308554"/>
+            <a:off x="5005598" y="3667372"/>
+            <a:ext cx="2299737" cy="131719"/>
           </a:xfrm>
           <a:prstGeom prst="straightConnector1">
             <a:avLst/>
@@ -21811,8 +22041,8 @@
         </p:nvCxnSpPr>
         <p:spPr>
           <a:xfrm flipV="1">
-            <a:off x="4886666" y="3916746"/>
-            <a:ext cx="4387023" cy="1022217"/>
+            <a:off x="5397500" y="3916746"/>
+            <a:ext cx="3907939" cy="994136"/>
           </a:xfrm>
           <a:prstGeom prst="straightConnector1">
             <a:avLst/>
@@ -21829,96 +22059,12 @@
           <a:effectLst/>
         </p:spPr>
       </p:cxnSp>
-      <p:sp>
-        <p:nvSpPr>
-          <p:cNvPr id="43" name="Rectangle 42">
-            <a:extLst>
-              <a:ext uri="{FF2B5EF4-FFF2-40B4-BE49-F238E27FC236}">
-                <a16:creationId xmlns:a16="http://schemas.microsoft.com/office/drawing/2014/main" id="{62C57809-9881-2022-3565-9B7E6AF5C9B8}"/>
-              </a:ext>
-            </a:extLst>
-          </p:cNvPr>
-          <p:cNvSpPr/>
-          <p:nvPr/>
-        </p:nvSpPr>
-        <p:spPr bwMode="auto">
-          <a:xfrm>
-            <a:off x="6436519" y="4775409"/>
-            <a:ext cx="4500186" cy="1203431"/>
-          </a:xfrm>
-          <a:prstGeom prst="rect">
-            <a:avLst/>
-          </a:prstGeom>
-          <a:solidFill>
-            <a:srgbClr val="FFFFFF"/>
-          </a:solidFill>
-          <a:ln w="38100" cap="flat" cmpd="sng" algn="ctr">
-            <a:solidFill>
-              <a:srgbClr val="ED1C24"/>
-            </a:solidFill>
-            <a:prstDash val="solid"/>
-            <a:headEnd type="none" w="med" len="med"/>
-            <a:tailEnd type="none" w="med" len="med"/>
-          </a:ln>
-          <a:effectLst/>
-        </p:spPr>
-        <p:txBody>
-          <a:bodyPr rot="0" spcFirstLastPara="0" vertOverflow="overflow" horzOverflow="overflow" vert="horz" wrap="square" lIns="182880" tIns="146304" rIns="182880" bIns="146304" numCol="1" spcCol="0" rtlCol="0" fromWordArt="0" anchor="t" anchorCtr="0" forceAA="0" compatLnSpc="1">
-            <a:prstTxWarp prst="textNoShape">
-              <a:avLst/>
-            </a:prstTxWarp>
-            <a:noAutofit/>
-          </a:bodyPr>
-          <a:lstStyle/>
-          <a:p>
-            <a:pPr marL="0" marR="0" lvl="0" indent="0" defTabSz="932472" eaLnBrk="1" fontAlgn="base" latinLnBrk="0" hangingPunct="1">
-              <a:lnSpc>
-                <a:spcPct val="100000"/>
-              </a:lnSpc>
-              <a:spcBef>
-                <a:spcPct val="0"/>
-              </a:spcBef>
-              <a:spcAft>
-                <a:spcPct val="0"/>
-              </a:spcAft>
-              <a:buClrTx/>
-              <a:buSzTx/>
-              <a:buFontTx/>
-              <a:buNone/>
-              <a:tabLst/>
-              <a:defRPr/>
-            </a:pPr>
-            <a:endParaRPr kumimoji="0" lang="en-GB" sz="1800" b="0" i="0" u="none" strike="noStrike" kern="0" cap="none" spc="0" normalizeH="0" baseline="0" noProof="0" dirty="0" err="1">
-              <a:ln>
-                <a:noFill/>
-              </a:ln>
-              <a:gradFill>
-                <a:gsLst>
-                  <a:gs pos="0">
-                    <a:srgbClr val="FFFFFF"/>
-                  </a:gs>
-                  <a:gs pos="100000">
-                    <a:srgbClr val="FFFFFF"/>
-                  </a:gs>
-                </a:gsLst>
-                <a:lin ang="5400000" scaled="0"/>
-              </a:gradFill>
-              <a:effectLst/>
-              <a:uLnTx/>
-              <a:uFillTx/>
-              <a:latin typeface="Klavika Regular"/>
-              <a:ea typeface="Segoe UI" pitchFamily="34" charset="0"/>
-              <a:cs typeface="Segoe UI" pitchFamily="34" charset="0"/>
-            </a:endParaRPr>
-          </a:p>
-        </p:txBody>
-      </p:sp>
       <p:grpSp>
         <p:nvGrpSpPr>
-          <p:cNvPr id="44" name="Group 43">
-            <a:extLst>
-              <a:ext uri="{FF2B5EF4-FFF2-40B4-BE49-F238E27FC236}">
-                <a16:creationId xmlns:a16="http://schemas.microsoft.com/office/drawing/2014/main" id="{546BF22A-4081-4065-6382-5535B88F18B3}"/>
+          <p:cNvPr id="2" name="Group 1">
+            <a:extLst>
+              <a:ext uri="{FF2B5EF4-FFF2-40B4-BE49-F238E27FC236}">
+                <a16:creationId xmlns:a16="http://schemas.microsoft.com/office/drawing/2014/main" id="{21846AE4-D3AE-861F-A126-5904222E38C2}"/>
               </a:ext>
             </a:extLst>
           </p:cNvPr>
@@ -21927,547 +22073,568 @@
         </p:nvGrpSpPr>
         <p:grpSpPr>
           <a:xfrm>
-            <a:off x="8769159" y="4892484"/>
-            <a:ext cx="914401" cy="914401"/>
-            <a:chOff x="6777933" y="4956926"/>
-            <a:chExt cx="914401" cy="914401"/>
+            <a:off x="6585302" y="4899884"/>
+            <a:ext cx="4192862" cy="935690"/>
+            <a:chOff x="6617512" y="4892483"/>
+            <a:chExt cx="4192862" cy="935690"/>
           </a:xfrm>
         </p:grpSpPr>
-        <p:pic>
-          <p:nvPicPr>
-            <p:cNvPr id="45" name="Graphic 44" descr="Chevron arrows with solid fill">
+        <p:grpSp>
+          <p:nvGrpSpPr>
+            <p:cNvPr id="44" name="Group 43">
               <a:extLst>
                 <a:ext uri="{FF2B5EF4-FFF2-40B4-BE49-F238E27FC236}">
-                  <a16:creationId xmlns:a16="http://schemas.microsoft.com/office/drawing/2014/main" id="{344C4812-2A2B-ED0A-AC3B-C872CD74A474}"/>
+                  <a16:creationId xmlns:a16="http://schemas.microsoft.com/office/drawing/2014/main" id="{546BF22A-4081-4065-6382-5535B88F18B3}"/>
                 </a:ext>
               </a:extLst>
             </p:cNvPr>
-            <p:cNvPicPr>
-              <a:picLocks noChangeAspect="1"/>
-            </p:cNvPicPr>
+            <p:cNvGrpSpPr/>
             <p:nvPr/>
-          </p:nvPicPr>
-          <p:blipFill>
-            <a:blip r:embed="rId3">
-              <a:extLst>
-                <a:ext uri="{96DAC541-7B7A-43D3-8B79-37D633B846F1}">
-                  <asvg:svgBlip xmlns:asvg="http://schemas.microsoft.com/office/drawing/2016/SVG/main" r:embed="rId4"/>
-                </a:ext>
-              </a:extLst>
-            </a:blip>
-            <a:stretch>
-              <a:fillRect/>
-            </a:stretch>
-          </p:blipFill>
-          <p:spPr>
-            <a:xfrm rot="10800000">
-              <a:off x="6777934" y="4956926"/>
-              <a:ext cx="914400" cy="914400"/>
+          </p:nvGrpSpPr>
+          <p:grpSpPr>
+            <a:xfrm>
+              <a:off x="8769159" y="4892484"/>
+              <a:ext cx="914401" cy="914401"/>
+              <a:chOff x="6777933" y="4956926"/>
+              <a:chExt cx="914401" cy="914401"/>
             </a:xfrm>
-            <a:prstGeom prst="rect">
-              <a:avLst/>
-            </a:prstGeom>
-          </p:spPr>
-        </p:pic>
-        <p:sp>
-          <p:nvSpPr>
-            <p:cNvPr id="46" name="Rectangle 45">
+          </p:grpSpPr>
+          <p:pic>
+            <p:nvPicPr>
+              <p:cNvPr id="45" name="Graphic 44" descr="Chevron arrows with solid fill">
+                <a:extLst>
+                  <a:ext uri="{FF2B5EF4-FFF2-40B4-BE49-F238E27FC236}">
+                    <a16:creationId xmlns:a16="http://schemas.microsoft.com/office/drawing/2014/main" id="{344C4812-2A2B-ED0A-AC3B-C872CD74A474}"/>
+                  </a:ext>
+                </a:extLst>
+              </p:cNvPr>
+              <p:cNvPicPr>
+                <a:picLocks noChangeAspect="1"/>
+              </p:cNvPicPr>
+              <p:nvPr/>
+            </p:nvPicPr>
+            <p:blipFill>
+              <a:blip r:embed="rId3">
+                <a:extLst>
+                  <a:ext uri="{96DAC541-7B7A-43D3-8B79-37D633B846F1}">
+                    <asvg:svgBlip xmlns:asvg="http://schemas.microsoft.com/office/drawing/2016/SVG/main" r:embed="rId4"/>
+                  </a:ext>
+                </a:extLst>
+              </a:blip>
+              <a:stretch>
+                <a:fillRect/>
+              </a:stretch>
+            </p:blipFill>
+            <p:spPr>
+              <a:xfrm rot="10800000">
+                <a:off x="6777934" y="4956926"/>
+                <a:ext cx="914400" cy="914400"/>
+              </a:xfrm>
+              <a:prstGeom prst="rect">
+                <a:avLst/>
+              </a:prstGeom>
+            </p:spPr>
+          </p:pic>
+          <p:sp>
+            <p:nvSpPr>
+              <p:cNvPr id="46" name="Rectangle 45">
+                <a:extLst>
+                  <a:ext uri="{FF2B5EF4-FFF2-40B4-BE49-F238E27FC236}">
+                    <a16:creationId xmlns:a16="http://schemas.microsoft.com/office/drawing/2014/main" id="{3F561B45-DDC4-EBAA-A5CF-8FC6140B0D80}"/>
+                  </a:ext>
+                </a:extLst>
+              </p:cNvPr>
+              <p:cNvSpPr/>
+              <p:nvPr/>
+            </p:nvSpPr>
+            <p:spPr bwMode="auto">
+              <a:xfrm>
+                <a:off x="6777933" y="4956926"/>
+                <a:ext cx="914401" cy="914401"/>
+              </a:xfrm>
+              <a:prstGeom prst="rect">
+                <a:avLst/>
+              </a:prstGeom>
+              <a:noFill/>
+              <a:ln w="38100" cap="flat" cmpd="sng" algn="ctr">
+                <a:solidFill>
+                  <a:srgbClr val="000000"/>
+                </a:solidFill>
+                <a:prstDash val="solid"/>
+                <a:headEnd type="none" w="med" len="med"/>
+                <a:tailEnd type="none" w="med" len="med"/>
+              </a:ln>
+              <a:effectLst/>
+            </p:spPr>
+            <p:txBody>
+              <a:bodyPr rot="0" spcFirstLastPara="0" vertOverflow="overflow" horzOverflow="overflow" vert="horz" wrap="square" lIns="182880" tIns="146304" rIns="182880" bIns="146304" numCol="1" spcCol="0" rtlCol="0" fromWordArt="0" anchor="t" anchorCtr="0" forceAA="0" compatLnSpc="1">
+                <a:prstTxWarp prst="textNoShape">
+                  <a:avLst/>
+                </a:prstTxWarp>
+                <a:noAutofit/>
+              </a:bodyPr>
+              <a:lstStyle/>
+              <a:p>
+                <a:pPr marL="0" marR="0" lvl="0" indent="0" defTabSz="932472" eaLnBrk="1" fontAlgn="base" latinLnBrk="0" hangingPunct="1">
+                  <a:lnSpc>
+                    <a:spcPct val="100000"/>
+                  </a:lnSpc>
+                  <a:spcBef>
+                    <a:spcPct val="0"/>
+                  </a:spcBef>
+                  <a:spcAft>
+                    <a:spcPct val="0"/>
+                  </a:spcAft>
+                  <a:buClrTx/>
+                  <a:buSzTx/>
+                  <a:buFontTx/>
+                  <a:buNone/>
+                  <a:tabLst/>
+                  <a:defRPr/>
+                </a:pPr>
+                <a:endParaRPr kumimoji="0" lang="en-GB" sz="1800" b="0" i="0" u="none" strike="noStrike" kern="0" cap="none" spc="0" normalizeH="0" baseline="0" noProof="0" dirty="0" err="1">
+                  <a:ln>
+                    <a:noFill/>
+                  </a:ln>
+                  <a:gradFill>
+                    <a:gsLst>
+                      <a:gs pos="0">
+                        <a:srgbClr val="FFFFFF"/>
+                      </a:gs>
+                      <a:gs pos="100000">
+                        <a:srgbClr val="FFFFFF"/>
+                      </a:gs>
+                    </a:gsLst>
+                    <a:lin ang="5400000" scaled="0"/>
+                  </a:gradFill>
+                  <a:effectLst/>
+                  <a:uLnTx/>
+                  <a:uFillTx/>
+                  <a:latin typeface="Klavika Regular"/>
+                  <a:ea typeface="Segoe UI" pitchFamily="34" charset="0"/>
+                  <a:cs typeface="Segoe UI" pitchFamily="34" charset="0"/>
+                </a:endParaRPr>
+              </a:p>
+            </p:txBody>
+          </p:sp>
+        </p:grpSp>
+        <p:grpSp>
+          <p:nvGrpSpPr>
+            <p:cNvPr id="47" name="Group 46">
               <a:extLst>
                 <a:ext uri="{FF2B5EF4-FFF2-40B4-BE49-F238E27FC236}">
-                  <a16:creationId xmlns:a16="http://schemas.microsoft.com/office/drawing/2014/main" id="{3F561B45-DDC4-EBAA-A5CF-8FC6140B0D80}"/>
+                  <a16:creationId xmlns:a16="http://schemas.microsoft.com/office/drawing/2014/main" id="{51E95FE4-C20B-3942-CFB0-E2EAF0C67BAF}"/>
                 </a:ext>
               </a:extLst>
             </p:cNvPr>
-            <p:cNvSpPr/>
+            <p:cNvGrpSpPr/>
             <p:nvPr/>
-          </p:nvSpPr>
-          <p:spPr bwMode="auto">
-            <a:xfrm>
-              <a:off x="6777933" y="4956926"/>
+          </p:nvGrpSpPr>
+          <p:grpSpPr>
+            <a:xfrm rot="5400000">
+              <a:off x="6617512" y="4913772"/>
               <a:ext cx="914401" cy="914401"/>
+              <a:chOff x="6777933" y="4956926"/>
+              <a:chExt cx="914401" cy="914401"/>
             </a:xfrm>
-            <a:prstGeom prst="rect">
-              <a:avLst/>
-            </a:prstGeom>
-            <a:noFill/>
-            <a:ln w="38100" cap="flat" cmpd="sng" algn="ctr">
-              <a:solidFill>
-                <a:srgbClr val="000000"/>
-              </a:solidFill>
-              <a:prstDash val="solid"/>
-              <a:headEnd type="none" w="med" len="med"/>
-              <a:tailEnd type="none" w="med" len="med"/>
-            </a:ln>
-            <a:effectLst/>
-          </p:spPr>
-          <p:txBody>
-            <a:bodyPr rot="0" spcFirstLastPara="0" vertOverflow="overflow" horzOverflow="overflow" vert="horz" wrap="square" lIns="182880" tIns="146304" rIns="182880" bIns="146304" numCol="1" spcCol="0" rtlCol="0" fromWordArt="0" anchor="t" anchorCtr="0" forceAA="0" compatLnSpc="1">
-              <a:prstTxWarp prst="textNoShape">
+          </p:grpSpPr>
+          <p:pic>
+            <p:nvPicPr>
+              <p:cNvPr id="48" name="Graphic 47" descr="Chevron arrows with solid fill">
+                <a:extLst>
+                  <a:ext uri="{FF2B5EF4-FFF2-40B4-BE49-F238E27FC236}">
+                    <a16:creationId xmlns:a16="http://schemas.microsoft.com/office/drawing/2014/main" id="{C1EE30DF-602B-3401-E725-365F60A65909}"/>
+                  </a:ext>
+                </a:extLst>
+              </p:cNvPr>
+              <p:cNvPicPr>
+                <a:picLocks noChangeAspect="1"/>
+              </p:cNvPicPr>
+              <p:nvPr/>
+            </p:nvPicPr>
+            <p:blipFill>
+              <a:blip r:embed="rId3">
+                <a:extLst>
+                  <a:ext uri="{96DAC541-7B7A-43D3-8B79-37D633B846F1}">
+                    <asvg:svgBlip xmlns:asvg="http://schemas.microsoft.com/office/drawing/2016/SVG/main" r:embed="rId4"/>
+                  </a:ext>
+                </a:extLst>
+              </a:blip>
+              <a:stretch>
+                <a:fillRect/>
+              </a:stretch>
+            </p:blipFill>
+            <p:spPr>
+              <a:xfrm rot="10800000">
+                <a:off x="6777934" y="4956926"/>
+                <a:ext cx="914400" cy="914400"/>
+              </a:xfrm>
+              <a:prstGeom prst="rect">
                 <a:avLst/>
-              </a:prstTxWarp>
-              <a:noAutofit/>
-            </a:bodyPr>
-            <a:lstStyle/>
-            <a:p>
-              <a:pPr marL="0" marR="0" lvl="0" indent="0" defTabSz="932472" eaLnBrk="1" fontAlgn="base" latinLnBrk="0" hangingPunct="1">
-                <a:lnSpc>
-                  <a:spcPct val="100000"/>
-                </a:lnSpc>
-                <a:spcBef>
-                  <a:spcPct val="0"/>
-                </a:spcBef>
-                <a:spcAft>
-                  <a:spcPct val="0"/>
-                </a:spcAft>
-                <a:buClrTx/>
-                <a:buSzTx/>
-                <a:buFontTx/>
-                <a:buNone/>
-                <a:tabLst/>
-                <a:defRPr/>
-              </a:pPr>
-              <a:endParaRPr kumimoji="0" lang="en-GB" sz="1800" b="0" i="0" u="none" strike="noStrike" kern="0" cap="none" spc="0" normalizeH="0" baseline="0" noProof="0" dirty="0" err="1">
-                <a:ln>
-                  <a:noFill/>
-                </a:ln>
-                <a:gradFill>
-                  <a:gsLst>
-                    <a:gs pos="0">
-                      <a:srgbClr val="FFFFFF"/>
-                    </a:gs>
-                    <a:gs pos="100000">
-                      <a:srgbClr val="FFFFFF"/>
-                    </a:gs>
-                  </a:gsLst>
-                  <a:lin ang="5400000" scaled="0"/>
-                </a:gradFill>
-                <a:effectLst/>
-                <a:uLnTx/>
-                <a:uFillTx/>
-                <a:latin typeface="Klavika Regular"/>
-                <a:ea typeface="Segoe UI" pitchFamily="34" charset="0"/>
-                <a:cs typeface="Segoe UI" pitchFamily="34" charset="0"/>
-              </a:endParaRPr>
-            </a:p>
-          </p:txBody>
-        </p:sp>
-      </p:grpSp>
-      <p:grpSp>
-        <p:nvGrpSpPr>
-          <p:cNvPr id="47" name="Group 46">
-            <a:extLst>
-              <a:ext uri="{FF2B5EF4-FFF2-40B4-BE49-F238E27FC236}">
-                <a16:creationId xmlns:a16="http://schemas.microsoft.com/office/drawing/2014/main" id="{51E95FE4-C20B-3942-CFB0-E2EAF0C67BAF}"/>
-              </a:ext>
-            </a:extLst>
-          </p:cNvPr>
-          <p:cNvGrpSpPr/>
-          <p:nvPr/>
-        </p:nvGrpSpPr>
-        <p:grpSpPr>
-          <a:xfrm rot="5400000">
-            <a:off x="6617512" y="4913772"/>
-            <a:ext cx="914401" cy="914401"/>
-            <a:chOff x="6777933" y="4956926"/>
-            <a:chExt cx="914401" cy="914401"/>
-          </a:xfrm>
-        </p:grpSpPr>
-        <p:pic>
-          <p:nvPicPr>
-            <p:cNvPr id="48" name="Graphic 47" descr="Chevron arrows with solid fill">
+              </a:prstGeom>
+            </p:spPr>
+          </p:pic>
+          <p:sp>
+            <p:nvSpPr>
+              <p:cNvPr id="49" name="Rectangle 48">
+                <a:extLst>
+                  <a:ext uri="{FF2B5EF4-FFF2-40B4-BE49-F238E27FC236}">
+                    <a16:creationId xmlns:a16="http://schemas.microsoft.com/office/drawing/2014/main" id="{FC9308D8-8F86-BF97-28D5-0949C54AEF03}"/>
+                  </a:ext>
+                </a:extLst>
+              </p:cNvPr>
+              <p:cNvSpPr/>
+              <p:nvPr/>
+            </p:nvSpPr>
+            <p:spPr bwMode="auto">
+              <a:xfrm>
+                <a:off x="6777933" y="4956926"/>
+                <a:ext cx="914401" cy="914401"/>
+              </a:xfrm>
+              <a:prstGeom prst="rect">
+                <a:avLst/>
+              </a:prstGeom>
+              <a:noFill/>
+              <a:ln w="38100" cap="flat" cmpd="sng" algn="ctr">
+                <a:solidFill>
+                  <a:srgbClr val="000000"/>
+                </a:solidFill>
+                <a:prstDash val="solid"/>
+                <a:headEnd type="none" w="med" len="med"/>
+                <a:tailEnd type="none" w="med" len="med"/>
+              </a:ln>
+              <a:effectLst/>
+            </p:spPr>
+            <p:txBody>
+              <a:bodyPr rot="0" spcFirstLastPara="0" vertOverflow="overflow" horzOverflow="overflow" vert="horz" wrap="square" lIns="182880" tIns="146304" rIns="182880" bIns="146304" numCol="1" spcCol="0" rtlCol="0" fromWordArt="0" anchor="t" anchorCtr="0" forceAA="0" compatLnSpc="1">
+                <a:prstTxWarp prst="textNoShape">
+                  <a:avLst/>
+                </a:prstTxWarp>
+                <a:noAutofit/>
+              </a:bodyPr>
+              <a:lstStyle/>
+              <a:p>
+                <a:pPr marL="0" marR="0" lvl="0" indent="0" defTabSz="932472" eaLnBrk="1" fontAlgn="base" latinLnBrk="0" hangingPunct="1">
+                  <a:lnSpc>
+                    <a:spcPct val="100000"/>
+                  </a:lnSpc>
+                  <a:spcBef>
+                    <a:spcPct val="0"/>
+                  </a:spcBef>
+                  <a:spcAft>
+                    <a:spcPct val="0"/>
+                  </a:spcAft>
+                  <a:buClrTx/>
+                  <a:buSzTx/>
+                  <a:buFontTx/>
+                  <a:buNone/>
+                  <a:tabLst/>
+                  <a:defRPr/>
+                </a:pPr>
+                <a:endParaRPr kumimoji="0" lang="en-GB" sz="1800" b="0" i="0" u="none" strike="noStrike" kern="0" cap="none" spc="0" normalizeH="0" baseline="0" noProof="0" dirty="0" err="1">
+                  <a:ln>
+                    <a:noFill/>
+                  </a:ln>
+                  <a:gradFill>
+                    <a:gsLst>
+                      <a:gs pos="0">
+                        <a:srgbClr val="FFFFFF"/>
+                      </a:gs>
+                      <a:gs pos="100000">
+                        <a:srgbClr val="FFFFFF"/>
+                      </a:gs>
+                    </a:gsLst>
+                    <a:lin ang="5400000" scaled="0"/>
+                  </a:gradFill>
+                  <a:effectLst/>
+                  <a:uLnTx/>
+                  <a:uFillTx/>
+                  <a:latin typeface="Klavika Regular"/>
+                  <a:ea typeface="Segoe UI" pitchFamily="34" charset="0"/>
+                  <a:cs typeface="Segoe UI" pitchFamily="34" charset="0"/>
+                </a:endParaRPr>
+              </a:p>
+            </p:txBody>
+          </p:sp>
+        </p:grpSp>
+        <p:grpSp>
+          <p:nvGrpSpPr>
+            <p:cNvPr id="50" name="Group 49">
               <a:extLst>
                 <a:ext uri="{FF2B5EF4-FFF2-40B4-BE49-F238E27FC236}">
-                  <a16:creationId xmlns:a16="http://schemas.microsoft.com/office/drawing/2014/main" id="{C1EE30DF-602B-3401-E725-365F60A65909}"/>
+                  <a16:creationId xmlns:a16="http://schemas.microsoft.com/office/drawing/2014/main" id="{B67CD042-4161-6A57-4273-D5825E61A143}"/>
                 </a:ext>
               </a:extLst>
             </p:cNvPr>
-            <p:cNvPicPr>
-              <a:picLocks noChangeAspect="1"/>
-            </p:cNvPicPr>
+            <p:cNvGrpSpPr/>
             <p:nvPr/>
-          </p:nvPicPr>
-          <p:blipFill>
-            <a:blip r:embed="rId3">
-              <a:extLst>
-                <a:ext uri="{96DAC541-7B7A-43D3-8B79-37D633B846F1}">
-                  <asvg:svgBlip xmlns:asvg="http://schemas.microsoft.com/office/drawing/2016/SVG/main" r:embed="rId4"/>
-                </a:ext>
-              </a:extLst>
-            </a:blip>
-            <a:stretch>
-              <a:fillRect/>
-            </a:stretch>
-          </p:blipFill>
-          <p:spPr>
-            <a:xfrm rot="10800000">
-              <a:off x="6777934" y="4956926"/>
-              <a:ext cx="914400" cy="914400"/>
+          </p:nvGrpSpPr>
+          <p:grpSpPr>
+            <a:xfrm rot="16200000">
+              <a:off x="7693335" y="4913772"/>
+              <a:ext cx="914401" cy="914401"/>
+              <a:chOff x="6777933" y="4956926"/>
+              <a:chExt cx="914401" cy="914401"/>
             </a:xfrm>
-            <a:prstGeom prst="rect">
-              <a:avLst/>
-            </a:prstGeom>
-          </p:spPr>
-        </p:pic>
-        <p:sp>
-          <p:nvSpPr>
-            <p:cNvPr id="49" name="Rectangle 48">
+          </p:grpSpPr>
+          <p:pic>
+            <p:nvPicPr>
+              <p:cNvPr id="51" name="Graphic 50" descr="Chevron arrows with solid fill">
+                <a:extLst>
+                  <a:ext uri="{FF2B5EF4-FFF2-40B4-BE49-F238E27FC236}">
+                    <a16:creationId xmlns:a16="http://schemas.microsoft.com/office/drawing/2014/main" id="{8801D0D2-0A17-7F94-2FD5-AFA8F2819CA8}"/>
+                  </a:ext>
+                </a:extLst>
+              </p:cNvPr>
+              <p:cNvPicPr>
+                <a:picLocks noChangeAspect="1"/>
+              </p:cNvPicPr>
+              <p:nvPr/>
+            </p:nvPicPr>
+            <p:blipFill>
+              <a:blip r:embed="rId3">
+                <a:extLst>
+                  <a:ext uri="{96DAC541-7B7A-43D3-8B79-37D633B846F1}">
+                    <asvg:svgBlip xmlns:asvg="http://schemas.microsoft.com/office/drawing/2016/SVG/main" r:embed="rId4"/>
+                  </a:ext>
+                </a:extLst>
+              </a:blip>
+              <a:stretch>
+                <a:fillRect/>
+              </a:stretch>
+            </p:blipFill>
+            <p:spPr>
+              <a:xfrm rot="10800000">
+                <a:off x="6777934" y="4956926"/>
+                <a:ext cx="914400" cy="914400"/>
+              </a:xfrm>
+              <a:prstGeom prst="rect">
+                <a:avLst/>
+              </a:prstGeom>
+            </p:spPr>
+          </p:pic>
+          <p:sp>
+            <p:nvSpPr>
+              <p:cNvPr id="52" name="Rectangle 51">
+                <a:extLst>
+                  <a:ext uri="{FF2B5EF4-FFF2-40B4-BE49-F238E27FC236}">
+                    <a16:creationId xmlns:a16="http://schemas.microsoft.com/office/drawing/2014/main" id="{AF714858-A000-C8DD-BB0A-7199A5C1737A}"/>
+                  </a:ext>
+                </a:extLst>
+              </p:cNvPr>
+              <p:cNvSpPr/>
+              <p:nvPr/>
+            </p:nvSpPr>
+            <p:spPr bwMode="auto">
+              <a:xfrm>
+                <a:off x="6777933" y="4956926"/>
+                <a:ext cx="914401" cy="914401"/>
+              </a:xfrm>
+              <a:prstGeom prst="rect">
+                <a:avLst/>
+              </a:prstGeom>
+              <a:noFill/>
+              <a:ln w="38100" cap="flat" cmpd="sng" algn="ctr">
+                <a:solidFill>
+                  <a:srgbClr val="000000"/>
+                </a:solidFill>
+                <a:prstDash val="solid"/>
+                <a:headEnd type="none" w="med" len="med"/>
+                <a:tailEnd type="none" w="med" len="med"/>
+              </a:ln>
+              <a:effectLst/>
+            </p:spPr>
+            <p:txBody>
+              <a:bodyPr rot="0" spcFirstLastPara="0" vertOverflow="overflow" horzOverflow="overflow" vert="horz" wrap="square" lIns="182880" tIns="146304" rIns="182880" bIns="146304" numCol="1" spcCol="0" rtlCol="0" fromWordArt="0" anchor="t" anchorCtr="0" forceAA="0" compatLnSpc="1">
+                <a:prstTxWarp prst="textNoShape">
+                  <a:avLst/>
+                </a:prstTxWarp>
+                <a:noAutofit/>
+              </a:bodyPr>
+              <a:lstStyle/>
+              <a:p>
+                <a:pPr marL="0" marR="0" lvl="0" indent="0" defTabSz="932472" eaLnBrk="1" fontAlgn="base" latinLnBrk="0" hangingPunct="1">
+                  <a:lnSpc>
+                    <a:spcPct val="100000"/>
+                  </a:lnSpc>
+                  <a:spcBef>
+                    <a:spcPct val="0"/>
+                  </a:spcBef>
+                  <a:spcAft>
+                    <a:spcPct val="0"/>
+                  </a:spcAft>
+                  <a:buClrTx/>
+                  <a:buSzTx/>
+                  <a:buFontTx/>
+                  <a:buNone/>
+                  <a:tabLst/>
+                  <a:defRPr/>
+                </a:pPr>
+                <a:endParaRPr kumimoji="0" lang="en-GB" sz="1800" b="0" i="0" u="none" strike="noStrike" kern="0" cap="none" spc="0" normalizeH="0" baseline="0" noProof="0" dirty="0" err="1">
+                  <a:ln>
+                    <a:noFill/>
+                  </a:ln>
+                  <a:gradFill>
+                    <a:gsLst>
+                      <a:gs pos="0">
+                        <a:srgbClr val="FFFFFF"/>
+                      </a:gs>
+                      <a:gs pos="100000">
+                        <a:srgbClr val="FFFFFF"/>
+                      </a:gs>
+                    </a:gsLst>
+                    <a:lin ang="5400000" scaled="0"/>
+                  </a:gradFill>
+                  <a:effectLst/>
+                  <a:uLnTx/>
+                  <a:uFillTx/>
+                  <a:latin typeface="Klavika Regular"/>
+                  <a:ea typeface="Segoe UI" pitchFamily="34" charset="0"/>
+                  <a:cs typeface="Segoe UI" pitchFamily="34" charset="0"/>
+                </a:endParaRPr>
+              </a:p>
+            </p:txBody>
+          </p:sp>
+        </p:grpSp>
+        <p:grpSp>
+          <p:nvGrpSpPr>
+            <p:cNvPr id="53" name="Group 52">
               <a:extLst>
                 <a:ext uri="{FF2B5EF4-FFF2-40B4-BE49-F238E27FC236}">
-                  <a16:creationId xmlns:a16="http://schemas.microsoft.com/office/drawing/2014/main" id="{FC9308D8-8F86-BF97-28D5-0949C54AEF03}"/>
+                  <a16:creationId xmlns:a16="http://schemas.microsoft.com/office/drawing/2014/main" id="{9BE2784E-2B14-97F2-C676-6AA58F7B9EAB}"/>
                 </a:ext>
               </a:extLst>
             </p:cNvPr>
-            <p:cNvSpPr/>
+            <p:cNvGrpSpPr/>
             <p:nvPr/>
-          </p:nvSpPr>
-          <p:spPr bwMode="auto">
-            <a:xfrm>
-              <a:off x="6777933" y="4956926"/>
+          </p:nvGrpSpPr>
+          <p:grpSpPr>
+            <a:xfrm rot="10800000">
+              <a:off x="9895973" y="4892483"/>
               <a:ext cx="914401" cy="914401"/>
+              <a:chOff x="6777933" y="4956926"/>
+              <a:chExt cx="914401" cy="914401"/>
             </a:xfrm>
-            <a:prstGeom prst="rect">
-              <a:avLst/>
-            </a:prstGeom>
-            <a:noFill/>
-            <a:ln w="38100" cap="flat" cmpd="sng" algn="ctr">
-              <a:solidFill>
-                <a:srgbClr val="000000"/>
-              </a:solidFill>
-              <a:prstDash val="solid"/>
-              <a:headEnd type="none" w="med" len="med"/>
-              <a:tailEnd type="none" w="med" len="med"/>
-            </a:ln>
-            <a:effectLst/>
-          </p:spPr>
-          <p:txBody>
-            <a:bodyPr rot="0" spcFirstLastPara="0" vertOverflow="overflow" horzOverflow="overflow" vert="horz" wrap="square" lIns="182880" tIns="146304" rIns="182880" bIns="146304" numCol="1" spcCol="0" rtlCol="0" fromWordArt="0" anchor="t" anchorCtr="0" forceAA="0" compatLnSpc="1">
-              <a:prstTxWarp prst="textNoShape">
+          </p:grpSpPr>
+          <p:pic>
+            <p:nvPicPr>
+              <p:cNvPr id="54" name="Graphic 53" descr="Chevron arrows with solid fill">
+                <a:extLst>
+                  <a:ext uri="{FF2B5EF4-FFF2-40B4-BE49-F238E27FC236}">
+                    <a16:creationId xmlns:a16="http://schemas.microsoft.com/office/drawing/2014/main" id="{61F4F918-83BE-9F7F-E3A4-72BB965029EC}"/>
+                  </a:ext>
+                </a:extLst>
+              </p:cNvPr>
+              <p:cNvPicPr>
+                <a:picLocks noChangeAspect="1"/>
+              </p:cNvPicPr>
+              <p:nvPr/>
+            </p:nvPicPr>
+            <p:blipFill>
+              <a:blip r:embed="rId3">
+                <a:extLst>
+                  <a:ext uri="{96DAC541-7B7A-43D3-8B79-37D633B846F1}">
+                    <asvg:svgBlip xmlns:asvg="http://schemas.microsoft.com/office/drawing/2016/SVG/main" r:embed="rId4"/>
+                  </a:ext>
+                </a:extLst>
+              </a:blip>
+              <a:stretch>
+                <a:fillRect/>
+              </a:stretch>
+            </p:blipFill>
+            <p:spPr>
+              <a:xfrm rot="10800000">
+                <a:off x="6777934" y="4956926"/>
+                <a:ext cx="914400" cy="914400"/>
+              </a:xfrm>
+              <a:prstGeom prst="rect">
                 <a:avLst/>
-              </a:prstTxWarp>
-              <a:noAutofit/>
-            </a:bodyPr>
-            <a:lstStyle/>
-            <a:p>
-              <a:pPr marL="0" marR="0" lvl="0" indent="0" defTabSz="932472" eaLnBrk="1" fontAlgn="base" latinLnBrk="0" hangingPunct="1">
-                <a:lnSpc>
-                  <a:spcPct val="100000"/>
-                </a:lnSpc>
-                <a:spcBef>
-                  <a:spcPct val="0"/>
-                </a:spcBef>
-                <a:spcAft>
-                  <a:spcPct val="0"/>
-                </a:spcAft>
-                <a:buClrTx/>
-                <a:buSzTx/>
-                <a:buFontTx/>
-                <a:buNone/>
-                <a:tabLst/>
-                <a:defRPr/>
-              </a:pPr>
-              <a:endParaRPr kumimoji="0" lang="en-GB" sz="1800" b="0" i="0" u="none" strike="noStrike" kern="0" cap="none" spc="0" normalizeH="0" baseline="0" noProof="0" dirty="0" err="1">
-                <a:ln>
-                  <a:noFill/>
-                </a:ln>
-                <a:gradFill>
-                  <a:gsLst>
-                    <a:gs pos="0">
-                      <a:srgbClr val="FFFFFF"/>
-                    </a:gs>
-                    <a:gs pos="100000">
-                      <a:srgbClr val="FFFFFF"/>
-                    </a:gs>
-                  </a:gsLst>
-                  <a:lin ang="5400000" scaled="0"/>
-                </a:gradFill>
-                <a:effectLst/>
-                <a:uLnTx/>
-                <a:uFillTx/>
-                <a:latin typeface="Klavika Regular"/>
-                <a:ea typeface="Segoe UI" pitchFamily="34" charset="0"/>
-                <a:cs typeface="Segoe UI" pitchFamily="34" charset="0"/>
-              </a:endParaRPr>
-            </a:p>
-          </p:txBody>
-        </p:sp>
-      </p:grpSp>
-      <p:grpSp>
-        <p:nvGrpSpPr>
-          <p:cNvPr id="50" name="Group 49">
-            <a:extLst>
-              <a:ext uri="{FF2B5EF4-FFF2-40B4-BE49-F238E27FC236}">
-                <a16:creationId xmlns:a16="http://schemas.microsoft.com/office/drawing/2014/main" id="{B67CD042-4161-6A57-4273-D5825E61A143}"/>
-              </a:ext>
-            </a:extLst>
-          </p:cNvPr>
-          <p:cNvGrpSpPr/>
-          <p:nvPr/>
-        </p:nvGrpSpPr>
-        <p:grpSpPr>
-          <a:xfrm rot="16200000">
-            <a:off x="7693335" y="4913772"/>
-            <a:ext cx="914401" cy="914401"/>
-            <a:chOff x="6777933" y="4956926"/>
-            <a:chExt cx="914401" cy="914401"/>
-          </a:xfrm>
-        </p:grpSpPr>
-        <p:pic>
-          <p:nvPicPr>
-            <p:cNvPr id="51" name="Graphic 50" descr="Chevron arrows with solid fill">
-              <a:extLst>
-                <a:ext uri="{FF2B5EF4-FFF2-40B4-BE49-F238E27FC236}">
-                  <a16:creationId xmlns:a16="http://schemas.microsoft.com/office/drawing/2014/main" id="{8801D0D2-0A17-7F94-2FD5-AFA8F2819CA8}"/>
-                </a:ext>
-              </a:extLst>
-            </p:cNvPr>
-            <p:cNvPicPr>
-              <a:picLocks noChangeAspect="1"/>
-            </p:cNvPicPr>
-            <p:nvPr/>
-          </p:nvPicPr>
-          <p:blipFill>
-            <a:blip r:embed="rId3">
-              <a:extLst>
-                <a:ext uri="{96DAC541-7B7A-43D3-8B79-37D633B846F1}">
-                  <asvg:svgBlip xmlns:asvg="http://schemas.microsoft.com/office/drawing/2016/SVG/main" r:embed="rId4"/>
-                </a:ext>
-              </a:extLst>
-            </a:blip>
-            <a:stretch>
-              <a:fillRect/>
-            </a:stretch>
-          </p:blipFill>
-          <p:spPr>
-            <a:xfrm rot="10800000">
-              <a:off x="6777934" y="4956926"/>
-              <a:ext cx="914400" cy="914400"/>
-            </a:xfrm>
-            <a:prstGeom prst="rect">
-              <a:avLst/>
-            </a:prstGeom>
-          </p:spPr>
-        </p:pic>
-        <p:sp>
-          <p:nvSpPr>
-            <p:cNvPr id="52" name="Rectangle 51">
-              <a:extLst>
-                <a:ext uri="{FF2B5EF4-FFF2-40B4-BE49-F238E27FC236}">
-                  <a16:creationId xmlns:a16="http://schemas.microsoft.com/office/drawing/2014/main" id="{AF714858-A000-C8DD-BB0A-7199A5C1737A}"/>
-                </a:ext>
-              </a:extLst>
-            </p:cNvPr>
-            <p:cNvSpPr/>
-            <p:nvPr/>
-          </p:nvSpPr>
-          <p:spPr bwMode="auto">
-            <a:xfrm>
-              <a:off x="6777933" y="4956926"/>
-              <a:ext cx="914401" cy="914401"/>
-            </a:xfrm>
-            <a:prstGeom prst="rect">
-              <a:avLst/>
-            </a:prstGeom>
-            <a:noFill/>
-            <a:ln w="38100" cap="flat" cmpd="sng" algn="ctr">
-              <a:solidFill>
-                <a:srgbClr val="000000"/>
-              </a:solidFill>
-              <a:prstDash val="solid"/>
-              <a:headEnd type="none" w="med" len="med"/>
-              <a:tailEnd type="none" w="med" len="med"/>
-            </a:ln>
-            <a:effectLst/>
-          </p:spPr>
-          <p:txBody>
-            <a:bodyPr rot="0" spcFirstLastPara="0" vertOverflow="overflow" horzOverflow="overflow" vert="horz" wrap="square" lIns="182880" tIns="146304" rIns="182880" bIns="146304" numCol="1" spcCol="0" rtlCol="0" fromWordArt="0" anchor="t" anchorCtr="0" forceAA="0" compatLnSpc="1">
-              <a:prstTxWarp prst="textNoShape">
+              </a:prstGeom>
+            </p:spPr>
+          </p:pic>
+          <p:sp>
+            <p:nvSpPr>
+              <p:cNvPr id="55" name="Rectangle 54">
+                <a:extLst>
+                  <a:ext uri="{FF2B5EF4-FFF2-40B4-BE49-F238E27FC236}">
+                    <a16:creationId xmlns:a16="http://schemas.microsoft.com/office/drawing/2014/main" id="{A202DF25-930B-343F-4056-1898C0B9B7F5}"/>
+                  </a:ext>
+                </a:extLst>
+              </p:cNvPr>
+              <p:cNvSpPr/>
+              <p:nvPr/>
+            </p:nvSpPr>
+            <p:spPr bwMode="auto">
+              <a:xfrm>
+                <a:off x="6777933" y="4956926"/>
+                <a:ext cx="914401" cy="914401"/>
+              </a:xfrm>
+              <a:prstGeom prst="rect">
                 <a:avLst/>
-              </a:prstTxWarp>
-              <a:noAutofit/>
-            </a:bodyPr>
-            <a:lstStyle/>
-            <a:p>
-              <a:pPr marL="0" marR="0" lvl="0" indent="0" defTabSz="932472" eaLnBrk="1" fontAlgn="base" latinLnBrk="0" hangingPunct="1">
-                <a:lnSpc>
-                  <a:spcPct val="100000"/>
-                </a:lnSpc>
-                <a:spcBef>
-                  <a:spcPct val="0"/>
-                </a:spcBef>
-                <a:spcAft>
-                  <a:spcPct val="0"/>
-                </a:spcAft>
-                <a:buClrTx/>
-                <a:buSzTx/>
-                <a:buFontTx/>
-                <a:buNone/>
-                <a:tabLst/>
-                <a:defRPr/>
-              </a:pPr>
-              <a:endParaRPr kumimoji="0" lang="en-GB" sz="1800" b="0" i="0" u="none" strike="noStrike" kern="0" cap="none" spc="0" normalizeH="0" baseline="0" noProof="0" dirty="0" err="1">
-                <a:ln>
-                  <a:noFill/>
-                </a:ln>
-                <a:gradFill>
-                  <a:gsLst>
-                    <a:gs pos="0">
-                      <a:srgbClr val="FFFFFF"/>
-                    </a:gs>
-                    <a:gs pos="100000">
-                      <a:srgbClr val="FFFFFF"/>
-                    </a:gs>
-                  </a:gsLst>
-                  <a:lin ang="5400000" scaled="0"/>
-                </a:gradFill>
-                <a:effectLst/>
-                <a:uLnTx/>
-                <a:uFillTx/>
-                <a:latin typeface="Klavika Regular"/>
-                <a:ea typeface="Segoe UI" pitchFamily="34" charset="0"/>
-                <a:cs typeface="Segoe UI" pitchFamily="34" charset="0"/>
-              </a:endParaRPr>
-            </a:p>
-          </p:txBody>
-        </p:sp>
-      </p:grpSp>
-      <p:grpSp>
-        <p:nvGrpSpPr>
-          <p:cNvPr id="53" name="Group 52">
-            <a:extLst>
-              <a:ext uri="{FF2B5EF4-FFF2-40B4-BE49-F238E27FC236}">
-                <a16:creationId xmlns:a16="http://schemas.microsoft.com/office/drawing/2014/main" id="{9BE2784E-2B14-97F2-C676-6AA58F7B9EAB}"/>
-              </a:ext>
-            </a:extLst>
-          </p:cNvPr>
-          <p:cNvGrpSpPr/>
-          <p:nvPr/>
-        </p:nvGrpSpPr>
-        <p:grpSpPr>
-          <a:xfrm rot="10800000">
-            <a:off x="9895973" y="4892483"/>
-            <a:ext cx="914401" cy="914401"/>
-            <a:chOff x="6777933" y="4956926"/>
-            <a:chExt cx="914401" cy="914401"/>
-          </a:xfrm>
-        </p:grpSpPr>
-        <p:pic>
-          <p:nvPicPr>
-            <p:cNvPr id="54" name="Graphic 53" descr="Chevron arrows with solid fill">
-              <a:extLst>
-                <a:ext uri="{FF2B5EF4-FFF2-40B4-BE49-F238E27FC236}">
-                  <a16:creationId xmlns:a16="http://schemas.microsoft.com/office/drawing/2014/main" id="{61F4F918-83BE-9F7F-E3A4-72BB965029EC}"/>
-                </a:ext>
-              </a:extLst>
-            </p:cNvPr>
-            <p:cNvPicPr>
-              <a:picLocks noChangeAspect="1"/>
-            </p:cNvPicPr>
-            <p:nvPr/>
-          </p:nvPicPr>
-          <p:blipFill>
-            <a:blip r:embed="rId3">
-              <a:extLst>
-                <a:ext uri="{96DAC541-7B7A-43D3-8B79-37D633B846F1}">
-                  <asvg:svgBlip xmlns:asvg="http://schemas.microsoft.com/office/drawing/2016/SVG/main" r:embed="rId4"/>
-                </a:ext>
-              </a:extLst>
-            </a:blip>
-            <a:stretch>
-              <a:fillRect/>
-            </a:stretch>
-          </p:blipFill>
-          <p:spPr>
-            <a:xfrm rot="10800000">
-              <a:off x="6777934" y="4956926"/>
-              <a:ext cx="914400" cy="914400"/>
-            </a:xfrm>
-            <a:prstGeom prst="rect">
-              <a:avLst/>
-            </a:prstGeom>
-          </p:spPr>
-        </p:pic>
-        <p:sp>
-          <p:nvSpPr>
-            <p:cNvPr id="55" name="Rectangle 54">
-              <a:extLst>
-                <a:ext uri="{FF2B5EF4-FFF2-40B4-BE49-F238E27FC236}">
-                  <a16:creationId xmlns:a16="http://schemas.microsoft.com/office/drawing/2014/main" id="{A202DF25-930B-343F-4056-1898C0B9B7F5}"/>
-                </a:ext>
-              </a:extLst>
-            </p:cNvPr>
-            <p:cNvSpPr/>
-            <p:nvPr/>
-          </p:nvSpPr>
-          <p:spPr bwMode="auto">
-            <a:xfrm>
-              <a:off x="6777933" y="4956926"/>
-              <a:ext cx="914401" cy="914401"/>
-            </a:xfrm>
-            <a:prstGeom prst="rect">
-              <a:avLst/>
-            </a:prstGeom>
-            <a:noFill/>
-            <a:ln w="38100" cap="flat" cmpd="sng" algn="ctr">
-              <a:solidFill>
-                <a:srgbClr val="000000"/>
-              </a:solidFill>
-              <a:prstDash val="solid"/>
-              <a:headEnd type="none" w="med" len="med"/>
-              <a:tailEnd type="none" w="med" len="med"/>
-            </a:ln>
-            <a:effectLst/>
-          </p:spPr>
-          <p:txBody>
-            <a:bodyPr rot="0" spcFirstLastPara="0" vertOverflow="overflow" horzOverflow="overflow" vert="horz" wrap="square" lIns="182880" tIns="146304" rIns="182880" bIns="146304" numCol="1" spcCol="0" rtlCol="0" fromWordArt="0" anchor="t" anchorCtr="0" forceAA="0" compatLnSpc="1">
-              <a:prstTxWarp prst="textNoShape">
-                <a:avLst/>
-              </a:prstTxWarp>
-              <a:noAutofit/>
-            </a:bodyPr>
-            <a:lstStyle/>
-            <a:p>
-              <a:pPr marL="0" marR="0" lvl="0" indent="0" defTabSz="932472" eaLnBrk="1" fontAlgn="base" latinLnBrk="0" hangingPunct="1">
-                <a:lnSpc>
-                  <a:spcPct val="100000"/>
-                </a:lnSpc>
-                <a:spcBef>
-                  <a:spcPct val="0"/>
-                </a:spcBef>
-                <a:spcAft>
-                  <a:spcPct val="0"/>
-                </a:spcAft>
-                <a:buClrTx/>
-                <a:buSzTx/>
-                <a:buFontTx/>
-                <a:buNone/>
-                <a:tabLst/>
-                <a:defRPr/>
-              </a:pPr>
-              <a:endParaRPr kumimoji="0" lang="en-GB" sz="1800" b="0" i="0" u="none" strike="noStrike" kern="0" cap="none" spc="0" normalizeH="0" baseline="0" noProof="0" dirty="0" err="1">
-                <a:ln>
-                  <a:noFill/>
-                </a:ln>
-                <a:gradFill>
-                  <a:gsLst>
-                    <a:gs pos="0">
-                      <a:srgbClr val="FFFFFF"/>
-                    </a:gs>
-                    <a:gs pos="100000">
-                      <a:srgbClr val="FFFFFF"/>
-                    </a:gs>
-                  </a:gsLst>
-                  <a:lin ang="5400000" scaled="0"/>
-                </a:gradFill>
-                <a:effectLst/>
-                <a:uLnTx/>
-                <a:uFillTx/>
-                <a:latin typeface="Klavika Regular"/>
-                <a:ea typeface="Segoe UI" pitchFamily="34" charset="0"/>
-                <a:cs typeface="Segoe UI" pitchFamily="34" charset="0"/>
-              </a:endParaRPr>
-            </a:p>
-          </p:txBody>
-        </p:sp>
+              </a:prstGeom>
+              <a:noFill/>
+              <a:ln w="38100" cap="flat" cmpd="sng" algn="ctr">
+                <a:solidFill>
+                  <a:srgbClr val="000000"/>
+                </a:solidFill>
+                <a:prstDash val="solid"/>
+                <a:headEnd type="none" w="med" len="med"/>
+                <a:tailEnd type="none" w="med" len="med"/>
+              </a:ln>
+              <a:effectLst/>
+            </p:spPr>
+            <p:txBody>
+              <a:bodyPr rot="0" spcFirstLastPara="0" vertOverflow="overflow" horzOverflow="overflow" vert="horz" wrap="square" lIns="182880" tIns="146304" rIns="182880" bIns="146304" numCol="1" spcCol="0" rtlCol="0" fromWordArt="0" anchor="t" anchorCtr="0" forceAA="0" compatLnSpc="1">
+                <a:prstTxWarp prst="textNoShape">
+                  <a:avLst/>
+                </a:prstTxWarp>
+                <a:noAutofit/>
+              </a:bodyPr>
+              <a:lstStyle/>
+              <a:p>
+                <a:pPr marL="0" marR="0" lvl="0" indent="0" defTabSz="932472" eaLnBrk="1" fontAlgn="base" latinLnBrk="0" hangingPunct="1">
+                  <a:lnSpc>
+                    <a:spcPct val="100000"/>
+                  </a:lnSpc>
+                  <a:spcBef>
+                    <a:spcPct val="0"/>
+                  </a:spcBef>
+                  <a:spcAft>
+                    <a:spcPct val="0"/>
+                  </a:spcAft>
+                  <a:buClrTx/>
+                  <a:buSzTx/>
+                  <a:buFontTx/>
+                  <a:buNone/>
+                  <a:tabLst/>
+                  <a:defRPr/>
+                </a:pPr>
+                <a:endParaRPr kumimoji="0" lang="en-GB" sz="1800" b="0" i="0" u="none" strike="noStrike" kern="0" cap="none" spc="0" normalizeH="0" baseline="0" noProof="0" dirty="0" err="1">
+                  <a:ln>
+                    <a:noFill/>
+                  </a:ln>
+                  <a:gradFill>
+                    <a:gsLst>
+                      <a:gs pos="0">
+                        <a:srgbClr val="FFFFFF"/>
+                      </a:gs>
+                      <a:gs pos="100000">
+                        <a:srgbClr val="FFFFFF"/>
+                      </a:gs>
+                    </a:gsLst>
+                    <a:lin ang="5400000" scaled="0"/>
+                  </a:gradFill>
+                  <a:effectLst/>
+                  <a:uLnTx/>
+                  <a:uFillTx/>
+                  <a:latin typeface="Klavika Regular"/>
+                  <a:ea typeface="Segoe UI" pitchFamily="34" charset="0"/>
+                  <a:cs typeface="Segoe UI" pitchFamily="34" charset="0"/>
+                </a:endParaRPr>
+              </a:p>
+            </p:txBody>
+          </p:sp>
+        </p:grpSp>
       </p:grpSp>
       <p:sp>
         <p:nvSpPr>
@@ -22483,7 +22650,7 @@
         </p:nvSpPr>
         <p:spPr bwMode="auto">
           <a:xfrm>
-            <a:off x="9126650" y="3399911"/>
+            <a:off x="9158400" y="3399911"/>
             <a:ext cx="294077" cy="516835"/>
           </a:xfrm>
           <a:prstGeom prst="rect">
@@ -22600,8 +22767,8 @@
         </p:nvCxnSpPr>
         <p:spPr>
           <a:xfrm flipV="1">
-            <a:off x="4640920" y="5377125"/>
-            <a:ext cx="1795599" cy="370536"/>
+            <a:off x="4908833" y="5367729"/>
+            <a:ext cx="1527686" cy="357547"/>
           </a:xfrm>
           <a:prstGeom prst="straightConnector1">
             <a:avLst/>
@@ -22610,6 +22777,123 @@
           <a:ln w="12700" cap="flat" cmpd="sng" algn="ctr">
             <a:solidFill>
               <a:srgbClr val="ED1C24"/>
+            </a:solidFill>
+            <a:prstDash val="solid"/>
+            <a:headEnd type="none" w="lg" len="med"/>
+            <a:tailEnd type="triangle"/>
+          </a:ln>
+          <a:effectLst/>
+        </p:spPr>
+      </p:cxnSp>
+      <p:sp>
+        <p:nvSpPr>
+          <p:cNvPr id="7" name="Rectangle 6">
+            <a:extLst>
+              <a:ext uri="{FF2B5EF4-FFF2-40B4-BE49-F238E27FC236}">
+                <a16:creationId xmlns:a16="http://schemas.microsoft.com/office/drawing/2014/main" id="{5A8ED71B-2C2A-05C8-E066-18E9A9AC05B9}"/>
+              </a:ext>
+            </a:extLst>
+          </p:cNvPr>
+          <p:cNvSpPr/>
+          <p:nvPr/>
+        </p:nvSpPr>
+        <p:spPr bwMode="auto">
+          <a:xfrm>
+            <a:off x="8824246" y="3397849"/>
+            <a:ext cx="294077" cy="516835"/>
+          </a:xfrm>
+          <a:prstGeom prst="rect">
+            <a:avLst/>
+          </a:prstGeom>
+          <a:noFill/>
+          <a:ln w="38100" cap="flat" cmpd="sng" algn="ctr">
+            <a:solidFill>
+              <a:srgbClr val="00B0F0"/>
+            </a:solidFill>
+            <a:prstDash val="solid"/>
+            <a:headEnd type="none" w="med" len="med"/>
+            <a:tailEnd type="none" w="med" len="med"/>
+          </a:ln>
+          <a:effectLst/>
+        </p:spPr>
+        <p:txBody>
+          <a:bodyPr rot="0" spcFirstLastPara="0" vertOverflow="overflow" horzOverflow="overflow" vert="horz" wrap="square" lIns="182880" tIns="146304" rIns="182880" bIns="146304" numCol="1" spcCol="0" rtlCol="0" fromWordArt="0" anchor="t" anchorCtr="0" forceAA="0" compatLnSpc="1">
+            <a:prstTxWarp prst="textNoShape">
+              <a:avLst/>
+            </a:prstTxWarp>
+            <a:noAutofit/>
+          </a:bodyPr>
+          <a:lstStyle/>
+          <a:p>
+            <a:pPr marL="0" marR="0" lvl="0" indent="0" defTabSz="932472" eaLnBrk="1" fontAlgn="base" latinLnBrk="0" hangingPunct="1">
+              <a:lnSpc>
+                <a:spcPct val="100000"/>
+              </a:lnSpc>
+              <a:spcBef>
+                <a:spcPct val="0"/>
+              </a:spcBef>
+              <a:spcAft>
+                <a:spcPct val="0"/>
+              </a:spcAft>
+              <a:buClrTx/>
+              <a:buSzTx/>
+              <a:buFontTx/>
+              <a:buNone/>
+              <a:tabLst/>
+              <a:defRPr/>
+            </a:pPr>
+            <a:endParaRPr kumimoji="0" lang="en-GB" sz="1800" b="0" i="0" u="none" strike="noStrike" kern="0" cap="none" spc="0" normalizeH="0" baseline="0" noProof="0" dirty="0" err="1">
+              <a:ln>
+                <a:noFill/>
+              </a:ln>
+              <a:gradFill>
+                <a:gsLst>
+                  <a:gs pos="0">
+                    <a:srgbClr val="FFFFFF"/>
+                  </a:gs>
+                  <a:gs pos="100000">
+                    <a:srgbClr val="FFFFFF"/>
+                  </a:gs>
+                </a:gsLst>
+                <a:lin ang="5400000" scaled="0"/>
+              </a:gradFill>
+              <a:effectLst/>
+              <a:uLnTx/>
+              <a:uFillTx/>
+              <a:latin typeface="Klavika Regular"/>
+              <a:ea typeface="Segoe UI" pitchFamily="34" charset="0"/>
+              <a:cs typeface="Segoe UI" pitchFamily="34" charset="0"/>
+            </a:endParaRPr>
+          </a:p>
+        </p:txBody>
+      </p:sp>
+      <p:cxnSp>
+        <p:nvCxnSpPr>
+          <p:cNvPr id="8" name="Straight Arrow Connector 7">
+            <a:extLst>
+              <a:ext uri="{FF2B5EF4-FFF2-40B4-BE49-F238E27FC236}">
+                <a16:creationId xmlns:a16="http://schemas.microsoft.com/office/drawing/2014/main" id="{207D279B-ACFD-FB8A-02B4-C5E220D621D3}"/>
+              </a:ext>
+            </a:extLst>
+          </p:cNvPr>
+          <p:cNvCxnSpPr>
+            <a:cxnSpLocks/>
+            <a:endCxn id="7" idx="1"/>
+          </p:cNvCxnSpPr>
+          <p:nvPr/>
+        </p:nvCxnSpPr>
+        <p:spPr>
+          <a:xfrm>
+            <a:off x="5253610" y="3250735"/>
+            <a:ext cx="3570636" cy="405532"/>
+          </a:xfrm>
+          <a:prstGeom prst="straightConnector1">
+            <a:avLst/>
+          </a:prstGeom>
+          <a:noFill/>
+          <a:ln w="12700" cap="flat" cmpd="sng" algn="ctr">
+            <a:solidFill>
+              <a:srgbClr val="00B0F0"/>
             </a:solidFill>
             <a:prstDash val="solid"/>
             <a:headEnd type="none" w="lg" len="med"/>
@@ -23234,21 +23518,21 @@
 </file>
 
 <file path=customXml/item1.xml><?xml version="1.0" encoding="utf-8"?>
+<TemplafySlideTemplateConfiguration><![CDATA[{"slideVersion":1,"isValidatorEnabled":false,"isLocked":false,"elementsMetadata":[],"slideId":"637629098472101399","enableDocumentContentUpdater":true,"version":"2.0"}]]></TemplafySlideTemplateConfiguration>
+</file>
+
+<file path=customXml/item2.xml><?xml version="1.0" encoding="utf-8"?>
 <TemplafySlideFormConfiguration><![CDATA[{"formFields":[],"formDataEntries":[]}]]></TemplafySlideFormConfiguration>
 </file>
 
-<file path=customXml/item2.xml><?xml version="1.0" encoding="utf-8"?>
-<TemplafySlideTemplateConfiguration><![CDATA[{"slideVersion":1,"isValidatorEnabled":false,"isLocked":false,"elementsMetadata":[],"slideId":"637629098472101399","enableDocumentContentUpdater":true,"version":"2.0"}]]></TemplafySlideTemplateConfiguration>
-</file>
-
 <file path=customXml/itemProps1.xml><?xml version="1.0" encoding="utf-8"?>
-<ds:datastoreItem xmlns:ds="http://schemas.openxmlformats.org/officeDocument/2006/customXml" ds:itemID="{E4185C24-1447-4288-BCBB-7ABBF03479A8}">
+<ds:datastoreItem xmlns:ds="http://schemas.openxmlformats.org/officeDocument/2006/customXml" ds:itemID="{3A7B4B56-D0D2-4135-A66A-EEF2C62C4256}">
   <ds:schemaRefs/>
 </ds:datastoreItem>
 </file>
 
 <file path=customXml/itemProps2.xml><?xml version="1.0" encoding="utf-8"?>
-<ds:datastoreItem xmlns:ds="http://schemas.openxmlformats.org/officeDocument/2006/customXml" ds:itemID="{3A7B4B56-D0D2-4135-A66A-EEF2C62C4256}">
+<ds:datastoreItem xmlns:ds="http://schemas.openxmlformats.org/officeDocument/2006/customXml" ds:itemID="{E4185C24-1447-4288-BCBB-7ABBF03479A8}">
   <ds:schemaRefs/>
 </ds:datastoreItem>
 </file>

</xml_diff>

<commit_message>
Update usage guide to include boolean board
</commit_message>
<xml_diff>
--- a/usage_guide.pptx
+++ b/usage_guide.pptx
@@ -6,7 +6,10 @@
     <p:sldMasterId id="2147483660" r:id="rId4"/>
   </p:sldMasterIdLst>
   <p:sldIdLst>
-    <p:sldId id="257" r:id="rId5"/>
+    <p:sldId id="259" r:id="rId5"/>
+    <p:sldId id="257" r:id="rId6"/>
+    <p:sldId id="260" r:id="rId7"/>
+    <p:sldId id="258" r:id="rId8"/>
   </p:sldIdLst>
   <p:sldSz cx="12192000" cy="6858000"/>
   <p:notesSz cx="7010400" cy="9296400"/>
@@ -116,13 +119,464 @@
 <file path=ppt/revisionInfo.xml><?xml version="1.0" encoding="utf-8"?>
 <p1510:revInfo xmlns:a="http://schemas.openxmlformats.org/drawingml/2006/main" xmlns:r="http://schemas.openxmlformats.org/officeDocument/2006/relationships" xmlns:p1510="http://schemas.microsoft.com/office/powerpoint/2015/10/main">
   <p1510:revLst>
-    <p1510:client id="{4D0BF372-0143-4AE8-8B76-AB608A7C8084}" v="23" dt="2024-11-11T13:29:29.439"/>
+    <p1510:client id="{0767353F-D086-4090-8BF5-095E245E8D59}" v="5" dt="2025-01-07T14:57:11.128"/>
   </p1510:revLst>
 </p1510:revInfo>
 </file>
 
 <file path=ppt/changesInfos/changesInfo1.xml><?xml version="1.0" encoding="utf-8"?>
 <pc:chgInfo xmlns:a="http://schemas.openxmlformats.org/drawingml/2006/main" xmlns:r="http://schemas.openxmlformats.org/officeDocument/2006/relationships" xmlns:ac="http://schemas.microsoft.com/office/drawing/2013/main/command" xmlns:pc="http://schemas.microsoft.com/office/powerpoint/2013/main/command">
+  <pc:docChgLst>
+    <pc:chgData name="Pethick, Matthew" userId="47b0bdf2-08b5-49f1-a741-b2d87ec64f81" providerId="ADAL" clId="{0767353F-D086-4090-8BF5-095E245E8D59}"/>
+    <pc:docChg chg="undo custSel addSld delSld modSld sldOrd">
+      <pc:chgData name="Pethick, Matthew" userId="47b0bdf2-08b5-49f1-a741-b2d87ec64f81" providerId="ADAL" clId="{0767353F-D086-4090-8BF5-095E245E8D59}" dt="2025-01-07T14:57:14.295" v="242" actId="20577"/>
+      <pc:docMkLst>
+        <pc:docMk/>
+      </pc:docMkLst>
+      <pc:sldChg chg="modSp mod">
+        <pc:chgData name="Pethick, Matthew" userId="47b0bdf2-08b5-49f1-a741-b2d87ec64f81" providerId="ADAL" clId="{0767353F-D086-4090-8BF5-095E245E8D59}" dt="2025-01-07T14:56:41.035" v="209" actId="20577"/>
+        <pc:sldMkLst>
+          <pc:docMk/>
+          <pc:sldMk cId="3712660401" sldId="257"/>
+        </pc:sldMkLst>
+        <pc:spChg chg="mod">
+          <ac:chgData name="Pethick, Matthew" userId="47b0bdf2-08b5-49f1-a741-b2d87ec64f81" providerId="ADAL" clId="{0767353F-D086-4090-8BF5-095E245E8D59}" dt="2025-01-07T14:56:41.035" v="209" actId="20577"/>
+          <ac:spMkLst>
+            <pc:docMk/>
+            <pc:sldMk cId="3712660401" sldId="257"/>
+            <ac:spMk id="36" creationId="{7259F6E7-063D-267D-0FAE-2484F4A2B1D0}"/>
+          </ac:spMkLst>
+        </pc:spChg>
+        <pc:spChg chg="mod">
+          <ac:chgData name="Pethick, Matthew" userId="47b0bdf2-08b5-49f1-a741-b2d87ec64f81" providerId="ADAL" clId="{0767353F-D086-4090-8BF5-095E245E8D59}" dt="2025-01-07T14:53:14.321" v="180" actId="20577"/>
+          <ac:spMkLst>
+            <pc:docMk/>
+            <pc:sldMk cId="3712660401" sldId="257"/>
+            <ac:spMk id="37" creationId="{E4A8F66B-7D32-4301-7B2E-222716E02861}"/>
+          </ac:spMkLst>
+        </pc:spChg>
+      </pc:sldChg>
+      <pc:sldChg chg="addSp delSp modSp add mod">
+        <pc:chgData name="Pethick, Matthew" userId="47b0bdf2-08b5-49f1-a741-b2d87ec64f81" providerId="ADAL" clId="{0767353F-D086-4090-8BF5-095E245E8D59}" dt="2025-01-07T14:53:38.047" v="192" actId="14100"/>
+        <pc:sldMkLst>
+          <pc:docMk/>
+          <pc:sldMk cId="3565139277" sldId="258"/>
+        </pc:sldMkLst>
+        <pc:spChg chg="add del mod">
+          <ac:chgData name="Pethick, Matthew" userId="47b0bdf2-08b5-49f1-a741-b2d87ec64f81" providerId="ADAL" clId="{0767353F-D086-4090-8BF5-095E245E8D59}" dt="2025-01-07T14:47:11.022" v="11" actId="478"/>
+          <ac:spMkLst>
+            <pc:docMk/>
+            <pc:sldMk cId="3565139277" sldId="258"/>
+            <ac:spMk id="4" creationId="{538A09E5-1F38-8DD5-F494-8F16BE0C0E12}"/>
+          </ac:spMkLst>
+        </pc:spChg>
+        <pc:spChg chg="mod">
+          <ac:chgData name="Pethick, Matthew" userId="47b0bdf2-08b5-49f1-a741-b2d87ec64f81" providerId="ADAL" clId="{0767353F-D086-4090-8BF5-095E245E8D59}" dt="2025-01-07T14:52:38.639" v="172" actId="1037"/>
+          <ac:spMkLst>
+            <pc:docMk/>
+            <pc:sldMk cId="3565139277" sldId="258"/>
+            <ac:spMk id="7" creationId="{91C9BF3F-4AE4-5E22-A03B-91B299537081}"/>
+          </ac:spMkLst>
+        </pc:spChg>
+        <pc:spChg chg="mod">
+          <ac:chgData name="Pethick, Matthew" userId="47b0bdf2-08b5-49f1-a741-b2d87ec64f81" providerId="ADAL" clId="{0767353F-D086-4090-8BF5-095E245E8D59}" dt="2025-01-07T14:47:08.704" v="8" actId="571"/>
+          <ac:spMkLst>
+            <pc:docMk/>
+            <pc:sldMk cId="3565139277" sldId="258"/>
+            <ac:spMk id="13" creationId="{4A6BBDD9-EC92-5EF3-653D-70C190A12D26}"/>
+          </ac:spMkLst>
+        </pc:spChg>
+        <pc:spChg chg="mod">
+          <ac:chgData name="Pethick, Matthew" userId="47b0bdf2-08b5-49f1-a741-b2d87ec64f81" providerId="ADAL" clId="{0767353F-D086-4090-8BF5-095E245E8D59}" dt="2025-01-07T14:47:08.704" v="8" actId="571"/>
+          <ac:spMkLst>
+            <pc:docMk/>
+            <pc:sldMk cId="3565139277" sldId="258"/>
+            <ac:spMk id="15" creationId="{FA703751-81D7-4AF6-073C-AA7D5D20BF0B}"/>
+          </ac:spMkLst>
+        </pc:spChg>
+        <pc:spChg chg="mod">
+          <ac:chgData name="Pethick, Matthew" userId="47b0bdf2-08b5-49f1-a741-b2d87ec64f81" providerId="ADAL" clId="{0767353F-D086-4090-8BF5-095E245E8D59}" dt="2025-01-07T14:47:08.704" v="8" actId="571"/>
+          <ac:spMkLst>
+            <pc:docMk/>
+            <pc:sldMk cId="3565139277" sldId="258"/>
+            <ac:spMk id="17" creationId="{6C694B02-9187-0039-5F82-07A7D9957AC9}"/>
+          </ac:spMkLst>
+        </pc:spChg>
+        <pc:spChg chg="mod">
+          <ac:chgData name="Pethick, Matthew" userId="47b0bdf2-08b5-49f1-a741-b2d87ec64f81" providerId="ADAL" clId="{0767353F-D086-4090-8BF5-095E245E8D59}" dt="2025-01-07T14:47:08.704" v="8" actId="571"/>
+          <ac:spMkLst>
+            <pc:docMk/>
+            <pc:sldMk cId="3565139277" sldId="258"/>
+            <ac:spMk id="19" creationId="{F986D39F-D28E-3EA5-F84F-55AE39B7B9C4}"/>
+          </ac:spMkLst>
+        </pc:spChg>
+        <pc:spChg chg="mod">
+          <ac:chgData name="Pethick, Matthew" userId="47b0bdf2-08b5-49f1-a741-b2d87ec64f81" providerId="ADAL" clId="{0767353F-D086-4090-8BF5-095E245E8D59}" dt="2025-01-07T14:53:34.433" v="191" actId="20577"/>
+          <ac:spMkLst>
+            <pc:docMk/>
+            <pc:sldMk cId="3565139277" sldId="258"/>
+            <ac:spMk id="37" creationId="{B4D723F2-646B-8B8D-2E70-A890904CA69F}"/>
+          </ac:spMkLst>
+        </pc:spChg>
+        <pc:spChg chg="mod">
+          <ac:chgData name="Pethick, Matthew" userId="47b0bdf2-08b5-49f1-a741-b2d87ec64f81" providerId="ADAL" clId="{0767353F-D086-4090-8BF5-095E245E8D59}" dt="2025-01-07T14:52:09.046" v="158" actId="14100"/>
+          <ac:spMkLst>
+            <pc:docMk/>
+            <pc:sldMk cId="3565139277" sldId="258"/>
+            <ac:spMk id="38" creationId="{37EE9CA3-AB6E-3823-8AF1-37F15DC79CA9}"/>
+          </ac:spMkLst>
+        </pc:spChg>
+        <pc:spChg chg="mod">
+          <ac:chgData name="Pethick, Matthew" userId="47b0bdf2-08b5-49f1-a741-b2d87ec64f81" providerId="ADAL" clId="{0767353F-D086-4090-8BF5-095E245E8D59}" dt="2025-01-07T14:49:38.555" v="95" actId="14100"/>
+          <ac:spMkLst>
+            <pc:docMk/>
+            <pc:sldMk cId="3565139277" sldId="258"/>
+            <ac:spMk id="40" creationId="{8174FD0D-E5C9-9E87-1FE4-C8E94357998A}"/>
+          </ac:spMkLst>
+        </pc:spChg>
+        <pc:spChg chg="mod ord">
+          <ac:chgData name="Pethick, Matthew" userId="47b0bdf2-08b5-49f1-a741-b2d87ec64f81" providerId="ADAL" clId="{0767353F-D086-4090-8BF5-095E245E8D59}" dt="2025-01-07T14:51:01.679" v="121" actId="1076"/>
+          <ac:spMkLst>
+            <pc:docMk/>
+            <pc:sldMk cId="3565139277" sldId="258"/>
+            <ac:spMk id="43" creationId="{E0698CBD-B051-EBE0-F112-823091F7D199}"/>
+          </ac:spMkLst>
+        </pc:spChg>
+        <pc:spChg chg="mod">
+          <ac:chgData name="Pethick, Matthew" userId="47b0bdf2-08b5-49f1-a741-b2d87ec64f81" providerId="ADAL" clId="{0767353F-D086-4090-8BF5-095E245E8D59}" dt="2025-01-07T14:47:31.046" v="16" actId="165"/>
+          <ac:spMkLst>
+            <pc:docMk/>
+            <pc:sldMk cId="3565139277" sldId="258"/>
+            <ac:spMk id="46" creationId="{3396E3D8-74CF-3A30-4D1B-4A8EE929845D}"/>
+          </ac:spMkLst>
+        </pc:spChg>
+        <pc:spChg chg="mod">
+          <ac:chgData name="Pethick, Matthew" userId="47b0bdf2-08b5-49f1-a741-b2d87ec64f81" providerId="ADAL" clId="{0767353F-D086-4090-8BF5-095E245E8D59}" dt="2025-01-07T14:47:31.046" v="16" actId="165"/>
+          <ac:spMkLst>
+            <pc:docMk/>
+            <pc:sldMk cId="3565139277" sldId="258"/>
+            <ac:spMk id="49" creationId="{CF09A75B-0B2E-4CB8-BA27-266F31B6D117}"/>
+          </ac:spMkLst>
+        </pc:spChg>
+        <pc:spChg chg="mod">
+          <ac:chgData name="Pethick, Matthew" userId="47b0bdf2-08b5-49f1-a741-b2d87ec64f81" providerId="ADAL" clId="{0767353F-D086-4090-8BF5-095E245E8D59}" dt="2025-01-07T14:47:31.046" v="16" actId="165"/>
+          <ac:spMkLst>
+            <pc:docMk/>
+            <pc:sldMk cId="3565139277" sldId="258"/>
+            <ac:spMk id="52" creationId="{F46CFD71-9D80-F149-9027-477A62B182CD}"/>
+          </ac:spMkLst>
+        </pc:spChg>
+        <pc:spChg chg="mod">
+          <ac:chgData name="Pethick, Matthew" userId="47b0bdf2-08b5-49f1-a741-b2d87ec64f81" providerId="ADAL" clId="{0767353F-D086-4090-8BF5-095E245E8D59}" dt="2025-01-07T14:47:31.046" v="16" actId="165"/>
+          <ac:spMkLst>
+            <pc:docMk/>
+            <pc:sldMk cId="3565139277" sldId="258"/>
+            <ac:spMk id="55" creationId="{02FE0D61-A0BA-F3C4-C35B-32AD4B48F1BE}"/>
+          </ac:spMkLst>
+        </pc:spChg>
+        <pc:spChg chg="mod">
+          <ac:chgData name="Pethick, Matthew" userId="47b0bdf2-08b5-49f1-a741-b2d87ec64f81" providerId="ADAL" clId="{0767353F-D086-4090-8BF5-095E245E8D59}" dt="2025-01-07T14:52:32.927" v="170" actId="1037"/>
+          <ac:spMkLst>
+            <pc:docMk/>
+            <pc:sldMk cId="3565139277" sldId="258"/>
+            <ac:spMk id="56" creationId="{16497FAE-3D70-E4C6-A0A0-338EFE9D585D}"/>
+          </ac:spMkLst>
+        </pc:spChg>
+        <pc:grpChg chg="del mod">
+          <ac:chgData name="Pethick, Matthew" userId="47b0bdf2-08b5-49f1-a741-b2d87ec64f81" providerId="ADAL" clId="{0767353F-D086-4090-8BF5-095E245E8D59}" dt="2025-01-07T14:47:31.046" v="16" actId="165"/>
+          <ac:grpSpMkLst>
+            <pc:docMk/>
+            <pc:sldMk cId="3565139277" sldId="258"/>
+            <ac:grpSpMk id="2" creationId="{9A8BF762-96E7-E4ED-A165-8B06F924ECA4}"/>
+          </ac:grpSpMkLst>
+        </pc:grpChg>
+        <pc:grpChg chg="add del mod">
+          <ac:chgData name="Pethick, Matthew" userId="47b0bdf2-08b5-49f1-a741-b2d87ec64f81" providerId="ADAL" clId="{0767353F-D086-4090-8BF5-095E245E8D59}" dt="2025-01-07T14:47:11.022" v="11" actId="478"/>
+          <ac:grpSpMkLst>
+            <pc:docMk/>
+            <pc:sldMk cId="3565139277" sldId="258"/>
+            <ac:grpSpMk id="5" creationId="{12C2C34A-562C-0AD7-87FF-06D8BEDF3BEE}"/>
+          </ac:grpSpMkLst>
+        </pc:grpChg>
+        <pc:grpChg chg="mod">
+          <ac:chgData name="Pethick, Matthew" userId="47b0bdf2-08b5-49f1-a741-b2d87ec64f81" providerId="ADAL" clId="{0767353F-D086-4090-8BF5-095E245E8D59}" dt="2025-01-07T14:47:08.704" v="8" actId="571"/>
+          <ac:grpSpMkLst>
+            <pc:docMk/>
+            <pc:sldMk cId="3565139277" sldId="258"/>
+            <ac:grpSpMk id="6" creationId="{D0CFD027-BDE4-C1C4-6E37-CEC036D4E213}"/>
+          </ac:grpSpMkLst>
+        </pc:grpChg>
+        <pc:grpChg chg="mod">
+          <ac:chgData name="Pethick, Matthew" userId="47b0bdf2-08b5-49f1-a741-b2d87ec64f81" providerId="ADAL" clId="{0767353F-D086-4090-8BF5-095E245E8D59}" dt="2025-01-07T14:47:08.704" v="8" actId="571"/>
+          <ac:grpSpMkLst>
+            <pc:docMk/>
+            <pc:sldMk cId="3565139277" sldId="258"/>
+            <ac:grpSpMk id="9" creationId="{F31F7C04-A58E-1E32-8538-1F6D979E0A71}"/>
+          </ac:grpSpMkLst>
+        </pc:grpChg>
+        <pc:grpChg chg="mod">
+          <ac:chgData name="Pethick, Matthew" userId="47b0bdf2-08b5-49f1-a741-b2d87ec64f81" providerId="ADAL" clId="{0767353F-D086-4090-8BF5-095E245E8D59}" dt="2025-01-07T14:47:08.704" v="8" actId="571"/>
+          <ac:grpSpMkLst>
+            <pc:docMk/>
+            <pc:sldMk cId="3565139277" sldId="258"/>
+            <ac:grpSpMk id="10" creationId="{CF088A08-BA06-05C1-C89E-BBA875C6CC53}"/>
+          </ac:grpSpMkLst>
+        </pc:grpChg>
+        <pc:grpChg chg="mod">
+          <ac:chgData name="Pethick, Matthew" userId="47b0bdf2-08b5-49f1-a741-b2d87ec64f81" providerId="ADAL" clId="{0767353F-D086-4090-8BF5-095E245E8D59}" dt="2025-01-07T14:47:08.704" v="8" actId="571"/>
+          <ac:grpSpMkLst>
+            <pc:docMk/>
+            <pc:sldMk cId="3565139277" sldId="258"/>
+            <ac:grpSpMk id="11" creationId="{8DDEA01F-AEB1-9044-BA4E-2663319B06CE}"/>
+          </ac:grpSpMkLst>
+        </pc:grpChg>
+        <pc:grpChg chg="add mod">
+          <ac:chgData name="Pethick, Matthew" userId="47b0bdf2-08b5-49f1-a741-b2d87ec64f81" providerId="ADAL" clId="{0767353F-D086-4090-8BF5-095E245E8D59}" dt="2025-01-07T14:51:01.679" v="121" actId="1076"/>
+          <ac:grpSpMkLst>
+            <pc:docMk/>
+            <pc:sldMk cId="3565139277" sldId="258"/>
+            <ac:grpSpMk id="20" creationId="{3B537977-9098-E75E-BD8C-DC9CF847D02B}"/>
+          </ac:grpSpMkLst>
+        </pc:grpChg>
+        <pc:grpChg chg="mod topLvl">
+          <ac:chgData name="Pethick, Matthew" userId="47b0bdf2-08b5-49f1-a741-b2d87ec64f81" providerId="ADAL" clId="{0767353F-D086-4090-8BF5-095E245E8D59}" dt="2025-01-07T14:48:26.335" v="77" actId="164"/>
+          <ac:grpSpMkLst>
+            <pc:docMk/>
+            <pc:sldMk cId="3565139277" sldId="258"/>
+            <ac:grpSpMk id="44" creationId="{B2AD6D59-245E-B876-74A9-E9DC099F9372}"/>
+          </ac:grpSpMkLst>
+        </pc:grpChg>
+        <pc:grpChg chg="mod topLvl">
+          <ac:chgData name="Pethick, Matthew" userId="47b0bdf2-08b5-49f1-a741-b2d87ec64f81" providerId="ADAL" clId="{0767353F-D086-4090-8BF5-095E245E8D59}" dt="2025-01-07T14:48:26.335" v="77" actId="164"/>
+          <ac:grpSpMkLst>
+            <pc:docMk/>
+            <pc:sldMk cId="3565139277" sldId="258"/>
+            <ac:grpSpMk id="47" creationId="{6A969915-7478-54A0-E9E0-9FE2FB0BBA64}"/>
+          </ac:grpSpMkLst>
+        </pc:grpChg>
+        <pc:grpChg chg="mod topLvl">
+          <ac:chgData name="Pethick, Matthew" userId="47b0bdf2-08b5-49f1-a741-b2d87ec64f81" providerId="ADAL" clId="{0767353F-D086-4090-8BF5-095E245E8D59}" dt="2025-01-07T14:48:26.335" v="77" actId="164"/>
+          <ac:grpSpMkLst>
+            <pc:docMk/>
+            <pc:sldMk cId="3565139277" sldId="258"/>
+            <ac:grpSpMk id="50" creationId="{01F48E2A-7915-9C25-24B2-54FBF30B9761}"/>
+          </ac:grpSpMkLst>
+        </pc:grpChg>
+        <pc:grpChg chg="mod topLvl">
+          <ac:chgData name="Pethick, Matthew" userId="47b0bdf2-08b5-49f1-a741-b2d87ec64f81" providerId="ADAL" clId="{0767353F-D086-4090-8BF5-095E245E8D59}" dt="2025-01-07T14:48:26.335" v="77" actId="164"/>
+          <ac:grpSpMkLst>
+            <pc:docMk/>
+            <pc:sldMk cId="3565139277" sldId="258"/>
+            <ac:grpSpMk id="53" creationId="{6C376AA3-0B85-4412-8805-8C39C523C35C}"/>
+          </ac:grpSpMkLst>
+        </pc:grpChg>
+        <pc:picChg chg="mod">
+          <ac:chgData name="Pethick, Matthew" userId="47b0bdf2-08b5-49f1-a741-b2d87ec64f81" providerId="ADAL" clId="{0767353F-D086-4090-8BF5-095E245E8D59}" dt="2025-01-07T14:47:08.704" v="8" actId="571"/>
+          <ac:picMkLst>
+            <pc:docMk/>
+            <pc:sldMk cId="3565139277" sldId="258"/>
+            <ac:picMk id="12" creationId="{B69B3811-ED48-1EFD-7270-F817495ADC58}"/>
+          </ac:picMkLst>
+        </pc:picChg>
+        <pc:picChg chg="mod">
+          <ac:chgData name="Pethick, Matthew" userId="47b0bdf2-08b5-49f1-a741-b2d87ec64f81" providerId="ADAL" clId="{0767353F-D086-4090-8BF5-095E245E8D59}" dt="2025-01-07T14:47:08.704" v="8" actId="571"/>
+          <ac:picMkLst>
+            <pc:docMk/>
+            <pc:sldMk cId="3565139277" sldId="258"/>
+            <ac:picMk id="14" creationId="{805A7C92-F37A-0D83-B40E-9E1C75BCE389}"/>
+          </ac:picMkLst>
+        </pc:picChg>
+        <pc:picChg chg="mod">
+          <ac:chgData name="Pethick, Matthew" userId="47b0bdf2-08b5-49f1-a741-b2d87ec64f81" providerId="ADAL" clId="{0767353F-D086-4090-8BF5-095E245E8D59}" dt="2025-01-07T14:47:08.704" v="8" actId="571"/>
+          <ac:picMkLst>
+            <pc:docMk/>
+            <pc:sldMk cId="3565139277" sldId="258"/>
+            <ac:picMk id="16" creationId="{E9D06336-6405-F2A8-8427-18D1D5E9F45A}"/>
+          </ac:picMkLst>
+        </pc:picChg>
+        <pc:picChg chg="mod">
+          <ac:chgData name="Pethick, Matthew" userId="47b0bdf2-08b5-49f1-a741-b2d87ec64f81" providerId="ADAL" clId="{0767353F-D086-4090-8BF5-095E245E8D59}" dt="2025-01-07T14:47:08.704" v="8" actId="571"/>
+          <ac:picMkLst>
+            <pc:docMk/>
+            <pc:sldMk cId="3565139277" sldId="258"/>
+            <ac:picMk id="18" creationId="{8768984F-5674-963B-EB22-B2477D4ABFAD}"/>
+          </ac:picMkLst>
+        </pc:picChg>
+        <pc:picChg chg="add mod ord">
+          <ac:chgData name="Pethick, Matthew" userId="47b0bdf2-08b5-49f1-a741-b2d87ec64f81" providerId="ADAL" clId="{0767353F-D086-4090-8BF5-095E245E8D59}" dt="2025-01-07T14:51:41.424" v="152" actId="1076"/>
+          <ac:picMkLst>
+            <pc:docMk/>
+            <pc:sldMk cId="3565139277" sldId="258"/>
+            <ac:picMk id="23" creationId="{E8C38A18-587B-A7EC-E025-338F70FC0BB8}"/>
+          </ac:picMkLst>
+        </pc:picChg>
+        <pc:picChg chg="del">
+          <ac:chgData name="Pethick, Matthew" userId="47b0bdf2-08b5-49f1-a741-b2d87ec64f81" providerId="ADAL" clId="{0767353F-D086-4090-8BF5-095E245E8D59}" dt="2025-01-07T14:48:46.250" v="84" actId="478"/>
+          <ac:picMkLst>
+            <pc:docMk/>
+            <pc:sldMk cId="3565139277" sldId="258"/>
+            <ac:picMk id="32" creationId="{15FAA72B-A7EF-FD30-73F3-9F1857EE3CDF}"/>
+          </ac:picMkLst>
+        </pc:picChg>
+        <pc:picChg chg="mod">
+          <ac:chgData name="Pethick, Matthew" userId="47b0bdf2-08b5-49f1-a741-b2d87ec64f81" providerId="ADAL" clId="{0767353F-D086-4090-8BF5-095E245E8D59}" dt="2025-01-07T14:47:31.046" v="16" actId="165"/>
+          <ac:picMkLst>
+            <pc:docMk/>
+            <pc:sldMk cId="3565139277" sldId="258"/>
+            <ac:picMk id="45" creationId="{646DEA11-8BFC-6D40-2259-6E8A3DE0C0D7}"/>
+          </ac:picMkLst>
+        </pc:picChg>
+        <pc:picChg chg="mod">
+          <ac:chgData name="Pethick, Matthew" userId="47b0bdf2-08b5-49f1-a741-b2d87ec64f81" providerId="ADAL" clId="{0767353F-D086-4090-8BF5-095E245E8D59}" dt="2025-01-07T14:47:31.046" v="16" actId="165"/>
+          <ac:picMkLst>
+            <pc:docMk/>
+            <pc:sldMk cId="3565139277" sldId="258"/>
+            <ac:picMk id="48" creationId="{B3CCA50F-FEAA-D281-AB00-569587D8B939}"/>
+          </ac:picMkLst>
+        </pc:picChg>
+        <pc:picChg chg="mod">
+          <ac:chgData name="Pethick, Matthew" userId="47b0bdf2-08b5-49f1-a741-b2d87ec64f81" providerId="ADAL" clId="{0767353F-D086-4090-8BF5-095E245E8D59}" dt="2025-01-07T14:47:31.046" v="16" actId="165"/>
+          <ac:picMkLst>
+            <pc:docMk/>
+            <pc:sldMk cId="3565139277" sldId="258"/>
+            <ac:picMk id="51" creationId="{861AE186-B702-3549-4640-6BEE0485FBDA}"/>
+          </ac:picMkLst>
+        </pc:picChg>
+        <pc:picChg chg="mod">
+          <ac:chgData name="Pethick, Matthew" userId="47b0bdf2-08b5-49f1-a741-b2d87ec64f81" providerId="ADAL" clId="{0767353F-D086-4090-8BF5-095E245E8D59}" dt="2025-01-07T14:47:31.046" v="16" actId="165"/>
+          <ac:picMkLst>
+            <pc:docMk/>
+            <pc:sldMk cId="3565139277" sldId="258"/>
+            <ac:picMk id="54" creationId="{EA350AA1-2BEE-B634-6648-B414D723F374}"/>
+          </ac:picMkLst>
+        </pc:picChg>
+        <pc:cxnChg chg="mod">
+          <ac:chgData name="Pethick, Matthew" userId="47b0bdf2-08b5-49f1-a741-b2d87ec64f81" providerId="ADAL" clId="{0767353F-D086-4090-8BF5-095E245E8D59}" dt="2025-01-07T14:52:55.277" v="175" actId="14100"/>
+          <ac:cxnSpMkLst>
+            <pc:docMk/>
+            <pc:sldMk cId="3565139277" sldId="258"/>
+            <ac:cxnSpMk id="8" creationId="{638D73AF-69BC-455F-6463-13DF92E22A2D}"/>
+          </ac:cxnSpMkLst>
+        </pc:cxnChg>
+        <pc:cxnChg chg="mod">
+          <ac:chgData name="Pethick, Matthew" userId="47b0bdf2-08b5-49f1-a741-b2d87ec64f81" providerId="ADAL" clId="{0767353F-D086-4090-8BF5-095E245E8D59}" dt="2025-01-07T14:51:04.783" v="122" actId="14100"/>
+          <ac:cxnSpMkLst>
+            <pc:docMk/>
+            <pc:sldMk cId="3565139277" sldId="258"/>
+            <ac:cxnSpMk id="33" creationId="{E909D445-4F3E-D225-9E67-261728F594CF}"/>
+          </ac:cxnSpMkLst>
+        </pc:cxnChg>
+        <pc:cxnChg chg="mod">
+          <ac:chgData name="Pethick, Matthew" userId="47b0bdf2-08b5-49f1-a741-b2d87ec64f81" providerId="ADAL" clId="{0767353F-D086-4090-8BF5-095E245E8D59}" dt="2025-01-07T14:51:07.797" v="123" actId="14100"/>
+          <ac:cxnSpMkLst>
+            <pc:docMk/>
+            <pc:sldMk cId="3565139277" sldId="258"/>
+            <ac:cxnSpMk id="34" creationId="{6C777204-C710-BF18-235E-767E64798DC2}"/>
+          </ac:cxnSpMkLst>
+        </pc:cxnChg>
+        <pc:cxnChg chg="mod">
+          <ac:chgData name="Pethick, Matthew" userId="47b0bdf2-08b5-49f1-a741-b2d87ec64f81" providerId="ADAL" clId="{0767353F-D086-4090-8BF5-095E245E8D59}" dt="2025-01-07T14:51:13.436" v="125" actId="14100"/>
+          <ac:cxnSpMkLst>
+            <pc:docMk/>
+            <pc:sldMk cId="3565139277" sldId="258"/>
+            <ac:cxnSpMk id="35" creationId="{419F3888-7F57-F752-7FEF-4760145DC7F0}"/>
+          </ac:cxnSpMkLst>
+        </pc:cxnChg>
+        <pc:cxnChg chg="mod">
+          <ac:chgData name="Pethick, Matthew" userId="47b0bdf2-08b5-49f1-a741-b2d87ec64f81" providerId="ADAL" clId="{0767353F-D086-4090-8BF5-095E245E8D59}" dt="2025-01-07T14:53:38.047" v="192" actId="14100"/>
+          <ac:cxnSpMkLst>
+            <pc:docMk/>
+            <pc:sldMk cId="3565139277" sldId="258"/>
+            <ac:cxnSpMk id="39" creationId="{E5C55A6C-32D1-A12E-C2F6-7F7027B36251}"/>
+          </ac:cxnSpMkLst>
+        </pc:cxnChg>
+        <pc:cxnChg chg="mod">
+          <ac:chgData name="Pethick, Matthew" userId="47b0bdf2-08b5-49f1-a741-b2d87ec64f81" providerId="ADAL" clId="{0767353F-D086-4090-8BF5-095E245E8D59}" dt="2025-01-07T14:49:30.003" v="92" actId="14100"/>
+          <ac:cxnSpMkLst>
+            <pc:docMk/>
+            <pc:sldMk cId="3565139277" sldId="258"/>
+            <ac:cxnSpMk id="41" creationId="{21EFB058-F53E-0771-F1E2-DFA85ABEC78E}"/>
+          </ac:cxnSpMkLst>
+        </pc:cxnChg>
+        <pc:cxnChg chg="mod">
+          <ac:chgData name="Pethick, Matthew" userId="47b0bdf2-08b5-49f1-a741-b2d87ec64f81" providerId="ADAL" clId="{0767353F-D086-4090-8BF5-095E245E8D59}" dt="2025-01-07T14:52:32.927" v="170" actId="1037"/>
+          <ac:cxnSpMkLst>
+            <pc:docMk/>
+            <pc:sldMk cId="3565139277" sldId="258"/>
+            <ac:cxnSpMk id="42" creationId="{24A06D2E-9D0C-7355-1360-A4591E903CC8}"/>
+          </ac:cxnSpMkLst>
+        </pc:cxnChg>
+        <pc:cxnChg chg="mod">
+          <ac:chgData name="Pethick, Matthew" userId="47b0bdf2-08b5-49f1-a741-b2d87ec64f81" providerId="ADAL" clId="{0767353F-D086-4090-8BF5-095E245E8D59}" dt="2025-01-07T14:51:10.167" v="124" actId="14100"/>
+          <ac:cxnSpMkLst>
+            <pc:docMk/>
+            <pc:sldMk cId="3565139277" sldId="258"/>
+            <ac:cxnSpMk id="57" creationId="{57FC2AB1-DF34-5B77-C0A4-1D19EE6A677D}"/>
+          </ac:cxnSpMkLst>
+        </pc:cxnChg>
+        <pc:cxnChg chg="mod">
+          <ac:chgData name="Pethick, Matthew" userId="47b0bdf2-08b5-49f1-a741-b2d87ec64f81" providerId="ADAL" clId="{0767353F-D086-4090-8BF5-095E245E8D59}" dt="2025-01-07T14:51:16.235" v="126" actId="14100"/>
+          <ac:cxnSpMkLst>
+            <pc:docMk/>
+            <pc:sldMk cId="3565139277" sldId="258"/>
+            <ac:cxnSpMk id="58" creationId="{8483273F-2441-A393-FD61-31FECC7C634B}"/>
+          </ac:cxnSpMkLst>
+        </pc:cxnChg>
+      </pc:sldChg>
+      <pc:sldChg chg="new del">
+        <pc:chgData name="Pethick, Matthew" userId="47b0bdf2-08b5-49f1-a741-b2d87ec64f81" providerId="ADAL" clId="{0767353F-D086-4090-8BF5-095E245E8D59}" dt="2025-01-07T14:56:52.963" v="213" actId="47"/>
+        <pc:sldMkLst>
+          <pc:docMk/>
+          <pc:sldMk cId="1988458874" sldId="259"/>
+        </pc:sldMkLst>
+      </pc:sldChg>
+      <pc:sldChg chg="new del">
+        <pc:chgData name="Pethick, Matthew" userId="47b0bdf2-08b5-49f1-a741-b2d87ec64f81" providerId="ADAL" clId="{0767353F-D086-4090-8BF5-095E245E8D59}" dt="2025-01-07T14:56:48.890" v="211" actId="47"/>
+        <pc:sldMkLst>
+          <pc:docMk/>
+          <pc:sldMk cId="2909520080" sldId="259"/>
+        </pc:sldMkLst>
+      </pc:sldChg>
+      <pc:sldChg chg="delSp modSp new mod ord">
+        <pc:chgData name="Pethick, Matthew" userId="47b0bdf2-08b5-49f1-a741-b2d87ec64f81" providerId="ADAL" clId="{0767353F-D086-4090-8BF5-095E245E8D59}" dt="2025-01-07T14:57:04.711" v="235" actId="20577"/>
+        <pc:sldMkLst>
+          <pc:docMk/>
+          <pc:sldMk cId="4287347625" sldId="259"/>
+        </pc:sldMkLst>
+        <pc:spChg chg="mod">
+          <ac:chgData name="Pethick, Matthew" userId="47b0bdf2-08b5-49f1-a741-b2d87ec64f81" providerId="ADAL" clId="{0767353F-D086-4090-8BF5-095E245E8D59}" dt="2025-01-07T14:57:04.711" v="235" actId="20577"/>
+          <ac:spMkLst>
+            <pc:docMk/>
+            <pc:sldMk cId="4287347625" sldId="259"/>
+            <ac:spMk id="2" creationId="{2461966D-2631-C743-A140-7B0C74837A21}"/>
+          </ac:spMkLst>
+        </pc:spChg>
+        <pc:spChg chg="del">
+          <ac:chgData name="Pethick, Matthew" userId="47b0bdf2-08b5-49f1-a741-b2d87ec64f81" providerId="ADAL" clId="{0767353F-D086-4090-8BF5-095E245E8D59}" dt="2025-01-07T14:57:02.965" v="229" actId="478"/>
+          <ac:spMkLst>
+            <pc:docMk/>
+            <pc:sldMk cId="4287347625" sldId="259"/>
+            <ac:spMk id="3" creationId="{EC9E90FF-9272-9CFB-7D0B-7BFAA43732CF}"/>
+          </ac:spMkLst>
+        </pc:spChg>
+      </pc:sldChg>
+      <pc:sldChg chg="modSp mod">
+        <pc:chgData name="Pethick, Matthew" userId="47b0bdf2-08b5-49f1-a741-b2d87ec64f81" providerId="ADAL" clId="{0767353F-D086-4090-8BF5-095E245E8D59}" dt="2025-01-07T14:57:14.295" v="242" actId="20577"/>
+        <pc:sldMkLst>
+          <pc:docMk/>
+          <pc:sldMk cId="1555941035" sldId="260"/>
+        </pc:sldMkLst>
+        <pc:spChg chg="mod">
+          <ac:chgData name="Pethick, Matthew" userId="47b0bdf2-08b5-49f1-a741-b2d87ec64f81" providerId="ADAL" clId="{0767353F-D086-4090-8BF5-095E245E8D59}" dt="2025-01-07T14:57:14.295" v="242" actId="20577"/>
+          <ac:spMkLst>
+            <pc:docMk/>
+            <pc:sldMk cId="1555941035" sldId="260"/>
+            <ac:spMk id="2" creationId="{98B7F00E-C702-812A-6860-649B07CE9FFB}"/>
+          </ac:spMkLst>
+        </pc:spChg>
+      </pc:sldChg>
+    </pc:docChg>
+  </pc:docChgLst>
   <pc:docChgLst>
     <pc:chgData name="Pethick, Matthew" userId="47b0bdf2-08b5-49f1-a741-b2d87ec64f81" providerId="ADAL" clId="{4D0BF372-0143-4AE8-8B76-AB608A7C8084}"/>
     <pc:docChg chg="undo custSel modSld">
@@ -427,7 +881,7 @@
           <a:p>
             <a:fld id="{A7E04868-8344-4E8E-8E08-E924FD30BED3}" type="datetimeFigureOut">
               <a:rPr lang="en-GB" smtClean="0"/>
-              <a:t>11/11/2024</a:t>
+              <a:t>07/01/2025</a:t>
             </a:fld>
             <a:endParaRPr lang="en-GB"/>
           </a:p>
@@ -627,7 +1081,7 @@
           <a:p>
             <a:fld id="{A7E04868-8344-4E8E-8E08-E924FD30BED3}" type="datetimeFigureOut">
               <a:rPr lang="en-GB" smtClean="0"/>
-              <a:t>11/11/2024</a:t>
+              <a:t>07/01/2025</a:t>
             </a:fld>
             <a:endParaRPr lang="en-GB"/>
           </a:p>
@@ -837,7 +1291,7 @@
           <a:p>
             <a:fld id="{A7E04868-8344-4E8E-8E08-E924FD30BED3}" type="datetimeFigureOut">
               <a:rPr lang="en-GB" smtClean="0"/>
-              <a:t>11/11/2024</a:t>
+              <a:t>07/01/2025</a:t>
             </a:fld>
             <a:endParaRPr lang="en-GB"/>
           </a:p>
@@ -911,6 +1365,201 @@
 </file>
 
 <file path=ppt/slideLayouts/slideLayout12.xml><?xml version="1.0" encoding="utf-8"?>
+<p:sldLayout xmlns:a="http://schemas.openxmlformats.org/drawingml/2006/main" xmlns:r="http://schemas.openxmlformats.org/officeDocument/2006/relationships" xmlns:p="http://schemas.openxmlformats.org/presentationml/2006/main" showMasterSp="0" userDrawn="1">
+  <p:cSld name="Title Slide - No Image">
+    <p:bg>
+      <p:bgPr>
+        <a:blipFill dpi="0" rotWithShape="1">
+          <a:blip r:embed="rId2">
+            <a:lum/>
+          </a:blip>
+          <a:srcRect/>
+          <a:stretch>
+            <a:fillRect/>
+          </a:stretch>
+        </a:blipFill>
+        <a:effectLst/>
+      </p:bgPr>
+    </p:bg>
+    <p:spTree>
+      <p:nvGrpSpPr>
+        <p:cNvPr id="1" name=""/>
+        <p:cNvGrpSpPr/>
+        <p:nvPr/>
+      </p:nvGrpSpPr>
+      <p:grpSpPr>
+        <a:xfrm>
+          <a:off x="0" y="0"/>
+          <a:ext cx="0" cy="0"/>
+          <a:chOff x="0" y="0"/>
+          <a:chExt cx="0" cy="0"/>
+        </a:xfrm>
+      </p:grpSpPr>
+      <p:sp>
+        <p:nvSpPr>
+          <p:cNvPr id="9" name="Title 1"/>
+          <p:cNvSpPr>
+            <a:spLocks noGrp="1"/>
+          </p:cNvSpPr>
+          <p:nvPr>
+            <p:ph type="title" hasCustomPrompt="1"/>
+          </p:nvPr>
+        </p:nvSpPr>
+        <p:spPr>
+          <a:xfrm>
+            <a:off x="5350259" y="1641215"/>
+            <a:ext cx="6244333" cy="1941576"/>
+          </a:xfrm>
+          <a:noFill/>
+        </p:spPr>
+        <p:txBody>
+          <a:bodyPr wrap="square" lIns="0" tIns="0" rIns="0" bIns="0" anchor="ctr" anchorCtr="0">
+            <a:noAutofit/>
+          </a:bodyPr>
+          <a:lstStyle>
+            <a:lvl1pPr>
+              <a:defRPr sz="4000" spc="-50" baseline="0">
+                <a:solidFill>
+                  <a:schemeClr val="tx1"/>
+                </a:solidFill>
+                <a:latin typeface="+mj-lt"/>
+                <a:cs typeface="Segoe UI" panose="020B0502040204020203" pitchFamily="34" charset="0"/>
+              </a:defRPr>
+            </a:lvl1pPr>
+          </a:lstStyle>
+          <a:p>
+            <a:r>
+              <a:rPr lang="en-US" dirty="0"/>
+              <a:t>EVENT NAME OR PRESENTATION TITLE </a:t>
+            </a:r>
+          </a:p>
+        </p:txBody>
+      </p:sp>
+      <p:sp>
+        <p:nvSpPr>
+          <p:cNvPr id="12" name="Text Placeholder 4">
+            <a:extLst>
+              <a:ext uri="{FF2B5EF4-FFF2-40B4-BE49-F238E27FC236}">
+                <a16:creationId xmlns:a16="http://schemas.microsoft.com/office/drawing/2014/main" id="{337976E5-E6CB-397E-A330-6B9BD4B1D037}"/>
+              </a:ext>
+            </a:extLst>
+          </p:cNvPr>
+          <p:cNvSpPr>
+            <a:spLocks noGrp="1"/>
+          </p:cNvSpPr>
+          <p:nvPr>
+            <p:ph type="body" sz="quarter" idx="13" hasCustomPrompt="1"/>
+          </p:nvPr>
+        </p:nvSpPr>
+        <p:spPr>
+          <a:xfrm>
+            <a:off x="5350260" y="3875650"/>
+            <a:ext cx="6244332" cy="276999"/>
+          </a:xfrm>
+          <a:noFill/>
+        </p:spPr>
+        <p:txBody>
+          <a:bodyPr wrap="square" lIns="0" tIns="0" rIns="0" bIns="0">
+            <a:spAutoFit/>
+          </a:bodyPr>
+          <a:lstStyle>
+            <a:lvl1pPr marL="0" indent="0">
+              <a:spcBef>
+                <a:spcPts val="0"/>
+              </a:spcBef>
+              <a:buNone/>
+              <a:defRPr sz="1800" b="1" spc="0" baseline="0">
+                <a:solidFill>
+                  <a:schemeClr val="tx1"/>
+                </a:solidFill>
+                <a:latin typeface="+mn-lt"/>
+                <a:cs typeface="Segoe UI" panose="020B0502040204020203" pitchFamily="34" charset="0"/>
+              </a:defRPr>
+            </a:lvl1pPr>
+          </a:lstStyle>
+          <a:p>
+            <a:pPr lvl="0"/>
+            <a:r>
+              <a:rPr lang="en-US" dirty="0"/>
+              <a:t>Speaker name or subtitle text</a:t>
+            </a:r>
+          </a:p>
+        </p:txBody>
+      </p:sp>
+      <p:pic>
+        <p:nvPicPr>
+          <p:cNvPr id="13" name="Picture 12" descr="A picture containing text, clipart&#10;&#10;Description automatically generated">
+            <a:extLst>
+              <a:ext uri="{FF2B5EF4-FFF2-40B4-BE49-F238E27FC236}">
+                <a16:creationId xmlns:a16="http://schemas.microsoft.com/office/drawing/2014/main" id="{D160F8F1-C493-D88D-26A1-8AA61020F186}"/>
+              </a:ext>
+            </a:extLst>
+          </p:cNvPr>
+          <p:cNvPicPr>
+            <a:picLocks noChangeAspect="1"/>
+          </p:cNvPicPr>
+          <p:nvPr userDrawn="1"/>
+        </p:nvPicPr>
+        <p:blipFill>
+          <a:blip r:embed="rId3">
+            <a:extLst>
+              <a:ext uri="{BEBA8EAE-BF5A-486C-A8C5-ECC9F3942E4B}">
+                <a14:imgProps xmlns:a14="http://schemas.microsoft.com/office/drawing/2010/main">
+                  <a14:imgLayer r:embed="rId4">
+                    <a14:imgEffect>
+                      <a14:brightnessContrast bright="-100000" contrast="100000"/>
+                    </a14:imgEffect>
+                  </a14:imgLayer>
+                </a14:imgProps>
+              </a:ext>
+            </a:extLst>
+          </a:blip>
+          <a:stretch>
+            <a:fillRect/>
+          </a:stretch>
+        </p:blipFill>
+        <p:spPr>
+          <a:xfrm>
+            <a:off x="9386888" y="5771788"/>
+            <a:ext cx="2359024" cy="671874"/>
+          </a:xfrm>
+          <a:prstGeom prst="rect">
+            <a:avLst/>
+          </a:prstGeom>
+        </p:spPr>
+      </p:pic>
+    </p:spTree>
+    <p:extLst>
+      <p:ext uri="{BB962C8B-B14F-4D97-AF65-F5344CB8AC3E}">
+        <p14:creationId xmlns:p14="http://schemas.microsoft.com/office/powerpoint/2010/main" val="90457002"/>
+      </p:ext>
+    </p:extLst>
+  </p:cSld>
+  <p:clrMapOvr>
+    <a:masterClrMapping/>
+  </p:clrMapOvr>
+  <mc:AlternateContent xmlns:mc="http://schemas.openxmlformats.org/markup-compatibility/2006" xmlns:p14="http://schemas.microsoft.com/office/powerpoint/2010/main">
+    <mc:Choice Requires="p14">
+      <p:transition spd="med" p14:dur="700">
+        <p:fade/>
+      </p:transition>
+    </mc:Choice>
+    <mc:Fallback xmlns:p15="http://schemas.microsoft.com/office/powerpoint/2012/main" xmlns:a14="http://schemas.microsoft.com/office/drawing/2010/main" xmlns:a16="http://schemas.microsoft.com/office/drawing/2014/main" xmlns="">
+      <p:transition spd="med">
+        <p:fade/>
+      </p:transition>
+    </mc:Fallback>
+  </mc:AlternateContent>
+  <p:hf hdr="0"/>
+  <p:extLst>
+    <p:ext uri="{DCECCB84-F9BA-43D5-87BE-67443E8EF086}">
+      <p15:sldGuideLst xmlns:p15="http://schemas.microsoft.com/office/powerpoint/2012/main"/>
+    </p:ext>
+  </p:extLst>
+</p:sldLayout>
+</file>
+
+<file path=ppt/slideLayouts/slideLayout13.xml><?xml version="1.0" encoding="utf-8"?>
 <p:sldLayout xmlns:a="http://schemas.openxmlformats.org/drawingml/2006/main" xmlns:r="http://schemas.openxmlformats.org/officeDocument/2006/relationships" xmlns:p="http://schemas.openxmlformats.org/presentationml/2006/main" showMasterSp="0" preserve="1" userDrawn="1">
   <p:cSld name="Title Slide - No Image">
     <p:bg>
@@ -1090,7 +1739,7 @@
         <p:fade/>
       </p:transition>
     </mc:Choice>
-    <mc:Fallback xmlns="" xmlns:a16="http://schemas.microsoft.com/office/drawing/2014/main" xmlns:a14="http://schemas.microsoft.com/office/drawing/2010/main" xmlns:p15="http://schemas.microsoft.com/office/powerpoint/2012/main">
+    <mc:Fallback xmlns:p15="http://schemas.microsoft.com/office/powerpoint/2012/main" xmlns:a14="http://schemas.microsoft.com/office/drawing/2010/main" xmlns:a16="http://schemas.microsoft.com/office/drawing/2014/main" xmlns="">
       <p:transition spd="med">
         <p:fade/>
       </p:transition>
@@ -1105,7 +1754,7 @@
 </p:sldLayout>
 </file>
 
-<file path=ppt/slideLayouts/slideLayout13.xml><?xml version="1.0" encoding="utf-8"?>
+<file path=ppt/slideLayouts/slideLayout14.xml><?xml version="1.0" encoding="utf-8"?>
 <p:sldLayout xmlns:a="http://schemas.openxmlformats.org/drawingml/2006/main" xmlns:r="http://schemas.openxmlformats.org/officeDocument/2006/relationships" xmlns:p="http://schemas.openxmlformats.org/presentationml/2006/main" showMasterSp="0" preserve="1" userDrawn="1">
   <p:cSld name="Title Slide with Picture">
     <p:spTree>
@@ -1340,7 +1989,7 @@
         <p:fade/>
       </p:transition>
     </mc:Choice>
-    <mc:Fallback xmlns="" xmlns:p15="http://schemas.microsoft.com/office/powerpoint/2012/main" xmlns:a14="http://schemas.microsoft.com/office/drawing/2010/main" xmlns:a16="http://schemas.microsoft.com/office/drawing/2014/main">
+    <mc:Fallback xmlns:a16="http://schemas.microsoft.com/office/drawing/2014/main" xmlns:a14="http://schemas.microsoft.com/office/drawing/2010/main" xmlns:p15="http://schemas.microsoft.com/office/powerpoint/2012/main" xmlns="">
       <p:transition spd="med">
         <p:fade/>
       </p:transition>
@@ -1360,7 +2009,7 @@
 </p:sldLayout>
 </file>
 
-<file path=ppt/slideLayouts/slideLayout14.xml><?xml version="1.0" encoding="utf-8"?>
+<file path=ppt/slideLayouts/slideLayout15.xml><?xml version="1.0" encoding="utf-8"?>
 <p:sldLayout xmlns:a="http://schemas.openxmlformats.org/drawingml/2006/main" xmlns:r="http://schemas.openxmlformats.org/officeDocument/2006/relationships" xmlns:p="http://schemas.openxmlformats.org/presentationml/2006/main" showMasterSp="0" preserve="1" userDrawn="1">
   <p:cSld name="Lockup Slide with Picture">
     <p:spTree>
@@ -1530,7 +2179,7 @@
 </p:sldLayout>
 </file>
 
-<file path=ppt/slideLayouts/slideLayout15.xml><?xml version="1.0" encoding="utf-8"?>
+<file path=ppt/slideLayouts/slideLayout16.xml><?xml version="1.0" encoding="utf-8"?>
 <p:sldLayout xmlns:a="http://schemas.openxmlformats.org/drawingml/2006/main" xmlns:r="http://schemas.openxmlformats.org/officeDocument/2006/relationships" xmlns:p="http://schemas.openxmlformats.org/presentationml/2006/main" preserve="1" userDrawn="1">
   <p:cSld name="Title and Content">
     <p:spTree>
@@ -1697,7 +2346,7 @@
 </p:sldLayout>
 </file>
 
-<file path=ppt/slideLayouts/slideLayout16.xml><?xml version="1.0" encoding="utf-8"?>
+<file path=ppt/slideLayouts/slideLayout17.xml><?xml version="1.0" encoding="utf-8"?>
 <p:sldLayout xmlns:a="http://schemas.openxmlformats.org/drawingml/2006/main" xmlns:r="http://schemas.openxmlformats.org/officeDocument/2006/relationships" xmlns:p="http://schemas.openxmlformats.org/presentationml/2006/main" preserve="1" userDrawn="1">
   <p:cSld name="Title &amp; Non-bulleted text">
     <p:spTree>
@@ -1850,7 +2499,7 @@
 </p:sldLayout>
 </file>
 
-<file path=ppt/slideLayouts/slideLayout17.xml><?xml version="1.0" encoding="utf-8"?>
+<file path=ppt/slideLayouts/slideLayout18.xml><?xml version="1.0" encoding="utf-8"?>
 <p:sldLayout xmlns:a="http://schemas.openxmlformats.org/drawingml/2006/main" xmlns:r="http://schemas.openxmlformats.org/officeDocument/2006/relationships" xmlns:p="http://schemas.openxmlformats.org/presentationml/2006/main" preserve="1" userDrawn="1">
   <p:cSld name="Two Content">
     <p:spTree>
@@ -2120,7 +2769,7 @@
 </p:sldLayout>
 </file>
 
-<file path=ppt/slideLayouts/slideLayout18.xml><?xml version="1.0" encoding="utf-8"?>
+<file path=ppt/slideLayouts/slideLayout19.xml><?xml version="1.0" encoding="utf-8"?>
 <p:sldLayout xmlns:a="http://schemas.openxmlformats.org/drawingml/2006/main" xmlns:r="http://schemas.openxmlformats.org/officeDocument/2006/relationships" xmlns:p="http://schemas.openxmlformats.org/presentationml/2006/main" preserve="1" userDrawn="1">
   <p:cSld name="Two Column Non-bulleted text">
     <p:spTree>
@@ -2380,7 +3029,207 @@
 </p:sldLayout>
 </file>
 
-<file path=ppt/slideLayouts/slideLayout19.xml><?xml version="1.0" encoding="utf-8"?>
+<file path=ppt/slideLayouts/slideLayout2.xml><?xml version="1.0" encoding="utf-8"?>
+<p:sldLayout xmlns:a="http://schemas.openxmlformats.org/drawingml/2006/main" xmlns:r="http://schemas.openxmlformats.org/officeDocument/2006/relationships" xmlns:p="http://schemas.openxmlformats.org/presentationml/2006/main" type="obj" preserve="1">
+  <p:cSld name="Title and Content">
+    <p:spTree>
+      <p:nvGrpSpPr>
+        <p:cNvPr id="1" name=""/>
+        <p:cNvGrpSpPr/>
+        <p:nvPr/>
+      </p:nvGrpSpPr>
+      <p:grpSpPr>
+        <a:xfrm>
+          <a:off x="0" y="0"/>
+          <a:ext cx="0" cy="0"/>
+          <a:chOff x="0" y="0"/>
+          <a:chExt cx="0" cy="0"/>
+        </a:xfrm>
+      </p:grpSpPr>
+      <p:sp>
+        <p:nvSpPr>
+          <p:cNvPr id="2" name="Title 1">
+            <a:extLst>
+              <a:ext uri="{FF2B5EF4-FFF2-40B4-BE49-F238E27FC236}">
+                <a16:creationId xmlns:a16="http://schemas.microsoft.com/office/drawing/2014/main" id="{DACAE891-E752-C52E-5505-382DEF7B2188}"/>
+              </a:ext>
+            </a:extLst>
+          </p:cNvPr>
+          <p:cNvSpPr>
+            <a:spLocks noGrp="1"/>
+          </p:cNvSpPr>
+          <p:nvPr>
+            <p:ph type="title"/>
+          </p:nvPr>
+        </p:nvSpPr>
+        <p:spPr/>
+        <p:txBody>
+          <a:bodyPr/>
+          <a:lstStyle/>
+          <a:p>
+            <a:r>
+              <a:rPr lang="en-US"/>
+              <a:t>Click to edit Master title style</a:t>
+            </a:r>
+            <a:endParaRPr lang="en-GB"/>
+          </a:p>
+        </p:txBody>
+      </p:sp>
+      <p:sp>
+        <p:nvSpPr>
+          <p:cNvPr id="3" name="Content Placeholder 2">
+            <a:extLst>
+              <a:ext uri="{FF2B5EF4-FFF2-40B4-BE49-F238E27FC236}">
+                <a16:creationId xmlns:a16="http://schemas.microsoft.com/office/drawing/2014/main" id="{72D6B6AF-D747-F04A-568F-7CDB035DABAE}"/>
+              </a:ext>
+            </a:extLst>
+          </p:cNvPr>
+          <p:cNvSpPr>
+            <a:spLocks noGrp="1"/>
+          </p:cNvSpPr>
+          <p:nvPr>
+            <p:ph idx="1"/>
+          </p:nvPr>
+        </p:nvSpPr>
+        <p:spPr/>
+        <p:txBody>
+          <a:bodyPr/>
+          <a:lstStyle/>
+          <a:p>
+            <a:pPr lvl="0"/>
+            <a:r>
+              <a:rPr lang="en-US"/>
+              <a:t>Click to edit Master text styles</a:t>
+            </a:r>
+          </a:p>
+          <a:p>
+            <a:pPr lvl="1"/>
+            <a:r>
+              <a:rPr lang="en-US"/>
+              <a:t>Second level</a:t>
+            </a:r>
+          </a:p>
+          <a:p>
+            <a:pPr lvl="2"/>
+            <a:r>
+              <a:rPr lang="en-US"/>
+              <a:t>Third level</a:t>
+            </a:r>
+          </a:p>
+          <a:p>
+            <a:pPr lvl="3"/>
+            <a:r>
+              <a:rPr lang="en-US"/>
+              <a:t>Fourth level</a:t>
+            </a:r>
+          </a:p>
+          <a:p>
+            <a:pPr lvl="4"/>
+            <a:r>
+              <a:rPr lang="en-US"/>
+              <a:t>Fifth level</a:t>
+            </a:r>
+            <a:endParaRPr lang="en-GB"/>
+          </a:p>
+        </p:txBody>
+      </p:sp>
+      <p:sp>
+        <p:nvSpPr>
+          <p:cNvPr id="4" name="Date Placeholder 3">
+            <a:extLst>
+              <a:ext uri="{FF2B5EF4-FFF2-40B4-BE49-F238E27FC236}">
+                <a16:creationId xmlns:a16="http://schemas.microsoft.com/office/drawing/2014/main" id="{245E604F-D9C1-0EFA-6678-2DDC0C47CBC5}"/>
+              </a:ext>
+            </a:extLst>
+          </p:cNvPr>
+          <p:cNvSpPr>
+            <a:spLocks noGrp="1"/>
+          </p:cNvSpPr>
+          <p:nvPr>
+            <p:ph type="dt" sz="half" idx="10"/>
+          </p:nvPr>
+        </p:nvSpPr>
+        <p:spPr/>
+        <p:txBody>
+          <a:bodyPr/>
+          <a:lstStyle/>
+          <a:p>
+            <a:fld id="{A7E04868-8344-4E8E-8E08-E924FD30BED3}" type="datetimeFigureOut">
+              <a:rPr lang="en-GB" smtClean="0"/>
+              <a:t>07/01/2025</a:t>
+            </a:fld>
+            <a:endParaRPr lang="en-GB"/>
+          </a:p>
+        </p:txBody>
+      </p:sp>
+      <p:sp>
+        <p:nvSpPr>
+          <p:cNvPr id="5" name="Footer Placeholder 4">
+            <a:extLst>
+              <a:ext uri="{FF2B5EF4-FFF2-40B4-BE49-F238E27FC236}">
+                <a16:creationId xmlns:a16="http://schemas.microsoft.com/office/drawing/2014/main" id="{402533B3-C9A5-4CDD-582C-A0E110EEE371}"/>
+              </a:ext>
+            </a:extLst>
+          </p:cNvPr>
+          <p:cNvSpPr>
+            <a:spLocks noGrp="1"/>
+          </p:cNvSpPr>
+          <p:nvPr>
+            <p:ph type="ftr" sz="quarter" idx="11"/>
+          </p:nvPr>
+        </p:nvSpPr>
+        <p:spPr/>
+        <p:txBody>
+          <a:bodyPr/>
+          <a:lstStyle/>
+          <a:p>
+            <a:endParaRPr lang="en-GB"/>
+          </a:p>
+        </p:txBody>
+      </p:sp>
+      <p:sp>
+        <p:nvSpPr>
+          <p:cNvPr id="6" name="Slide Number Placeholder 5">
+            <a:extLst>
+              <a:ext uri="{FF2B5EF4-FFF2-40B4-BE49-F238E27FC236}">
+                <a16:creationId xmlns:a16="http://schemas.microsoft.com/office/drawing/2014/main" id="{75F01502-4821-02E8-DD1F-237CF789533A}"/>
+              </a:ext>
+            </a:extLst>
+          </p:cNvPr>
+          <p:cNvSpPr>
+            <a:spLocks noGrp="1"/>
+          </p:cNvSpPr>
+          <p:nvPr>
+            <p:ph type="sldNum" sz="quarter" idx="12"/>
+          </p:nvPr>
+        </p:nvSpPr>
+        <p:spPr/>
+        <p:txBody>
+          <a:bodyPr/>
+          <a:lstStyle/>
+          <a:p>
+            <a:fld id="{3185417C-520E-4822-84FF-A19FC9829684}" type="slidenum">
+              <a:rPr lang="en-GB" smtClean="0"/>
+              <a:t>‹#›</a:t>
+            </a:fld>
+            <a:endParaRPr lang="en-GB"/>
+          </a:p>
+        </p:txBody>
+      </p:sp>
+    </p:spTree>
+    <p:extLst>
+      <p:ext uri="{BB962C8B-B14F-4D97-AF65-F5344CB8AC3E}">
+        <p14:creationId xmlns:p14="http://schemas.microsoft.com/office/powerpoint/2010/main" val="3120896832"/>
+      </p:ext>
+    </p:extLst>
+  </p:cSld>
+  <p:clrMapOvr>
+    <a:masterClrMapping/>
+  </p:clrMapOvr>
+</p:sldLayout>
+</file>
+
+<file path=ppt/slideLayouts/slideLayout20.xml><?xml version="1.0" encoding="utf-8"?>
 <p:sldLayout xmlns:a="http://schemas.openxmlformats.org/drawingml/2006/main" xmlns:r="http://schemas.openxmlformats.org/officeDocument/2006/relationships" xmlns:p="http://schemas.openxmlformats.org/presentationml/2006/main" preserve="1" userDrawn="1">
   <p:cSld name="Title Only">
     <p:spTree>
@@ -2563,207 +3412,7 @@
 </p:sldLayout>
 </file>
 
-<file path=ppt/slideLayouts/slideLayout2.xml><?xml version="1.0" encoding="utf-8"?>
-<p:sldLayout xmlns:a="http://schemas.openxmlformats.org/drawingml/2006/main" xmlns:r="http://schemas.openxmlformats.org/officeDocument/2006/relationships" xmlns:p="http://schemas.openxmlformats.org/presentationml/2006/main" type="obj" preserve="1">
-  <p:cSld name="Title and Content">
-    <p:spTree>
-      <p:nvGrpSpPr>
-        <p:cNvPr id="1" name=""/>
-        <p:cNvGrpSpPr/>
-        <p:nvPr/>
-      </p:nvGrpSpPr>
-      <p:grpSpPr>
-        <a:xfrm>
-          <a:off x="0" y="0"/>
-          <a:ext cx="0" cy="0"/>
-          <a:chOff x="0" y="0"/>
-          <a:chExt cx="0" cy="0"/>
-        </a:xfrm>
-      </p:grpSpPr>
-      <p:sp>
-        <p:nvSpPr>
-          <p:cNvPr id="2" name="Title 1">
-            <a:extLst>
-              <a:ext uri="{FF2B5EF4-FFF2-40B4-BE49-F238E27FC236}">
-                <a16:creationId xmlns:a16="http://schemas.microsoft.com/office/drawing/2014/main" id="{DACAE891-E752-C52E-5505-382DEF7B2188}"/>
-              </a:ext>
-            </a:extLst>
-          </p:cNvPr>
-          <p:cNvSpPr>
-            <a:spLocks noGrp="1"/>
-          </p:cNvSpPr>
-          <p:nvPr>
-            <p:ph type="title"/>
-          </p:nvPr>
-        </p:nvSpPr>
-        <p:spPr/>
-        <p:txBody>
-          <a:bodyPr/>
-          <a:lstStyle/>
-          <a:p>
-            <a:r>
-              <a:rPr lang="en-US"/>
-              <a:t>Click to edit Master title style</a:t>
-            </a:r>
-            <a:endParaRPr lang="en-GB"/>
-          </a:p>
-        </p:txBody>
-      </p:sp>
-      <p:sp>
-        <p:nvSpPr>
-          <p:cNvPr id="3" name="Content Placeholder 2">
-            <a:extLst>
-              <a:ext uri="{FF2B5EF4-FFF2-40B4-BE49-F238E27FC236}">
-                <a16:creationId xmlns:a16="http://schemas.microsoft.com/office/drawing/2014/main" id="{72D6B6AF-D747-F04A-568F-7CDB035DABAE}"/>
-              </a:ext>
-            </a:extLst>
-          </p:cNvPr>
-          <p:cNvSpPr>
-            <a:spLocks noGrp="1"/>
-          </p:cNvSpPr>
-          <p:nvPr>
-            <p:ph idx="1"/>
-          </p:nvPr>
-        </p:nvSpPr>
-        <p:spPr/>
-        <p:txBody>
-          <a:bodyPr/>
-          <a:lstStyle/>
-          <a:p>
-            <a:pPr lvl="0"/>
-            <a:r>
-              <a:rPr lang="en-US"/>
-              <a:t>Click to edit Master text styles</a:t>
-            </a:r>
-          </a:p>
-          <a:p>
-            <a:pPr lvl="1"/>
-            <a:r>
-              <a:rPr lang="en-US"/>
-              <a:t>Second level</a:t>
-            </a:r>
-          </a:p>
-          <a:p>
-            <a:pPr lvl="2"/>
-            <a:r>
-              <a:rPr lang="en-US"/>
-              <a:t>Third level</a:t>
-            </a:r>
-          </a:p>
-          <a:p>
-            <a:pPr lvl="3"/>
-            <a:r>
-              <a:rPr lang="en-US"/>
-              <a:t>Fourth level</a:t>
-            </a:r>
-          </a:p>
-          <a:p>
-            <a:pPr lvl="4"/>
-            <a:r>
-              <a:rPr lang="en-US"/>
-              <a:t>Fifth level</a:t>
-            </a:r>
-            <a:endParaRPr lang="en-GB"/>
-          </a:p>
-        </p:txBody>
-      </p:sp>
-      <p:sp>
-        <p:nvSpPr>
-          <p:cNvPr id="4" name="Date Placeholder 3">
-            <a:extLst>
-              <a:ext uri="{FF2B5EF4-FFF2-40B4-BE49-F238E27FC236}">
-                <a16:creationId xmlns:a16="http://schemas.microsoft.com/office/drawing/2014/main" id="{245E604F-D9C1-0EFA-6678-2DDC0C47CBC5}"/>
-              </a:ext>
-            </a:extLst>
-          </p:cNvPr>
-          <p:cNvSpPr>
-            <a:spLocks noGrp="1"/>
-          </p:cNvSpPr>
-          <p:nvPr>
-            <p:ph type="dt" sz="half" idx="10"/>
-          </p:nvPr>
-        </p:nvSpPr>
-        <p:spPr/>
-        <p:txBody>
-          <a:bodyPr/>
-          <a:lstStyle/>
-          <a:p>
-            <a:fld id="{A7E04868-8344-4E8E-8E08-E924FD30BED3}" type="datetimeFigureOut">
-              <a:rPr lang="en-GB" smtClean="0"/>
-              <a:t>11/11/2024</a:t>
-            </a:fld>
-            <a:endParaRPr lang="en-GB"/>
-          </a:p>
-        </p:txBody>
-      </p:sp>
-      <p:sp>
-        <p:nvSpPr>
-          <p:cNvPr id="5" name="Footer Placeholder 4">
-            <a:extLst>
-              <a:ext uri="{FF2B5EF4-FFF2-40B4-BE49-F238E27FC236}">
-                <a16:creationId xmlns:a16="http://schemas.microsoft.com/office/drawing/2014/main" id="{402533B3-C9A5-4CDD-582C-A0E110EEE371}"/>
-              </a:ext>
-            </a:extLst>
-          </p:cNvPr>
-          <p:cNvSpPr>
-            <a:spLocks noGrp="1"/>
-          </p:cNvSpPr>
-          <p:nvPr>
-            <p:ph type="ftr" sz="quarter" idx="11"/>
-          </p:nvPr>
-        </p:nvSpPr>
-        <p:spPr/>
-        <p:txBody>
-          <a:bodyPr/>
-          <a:lstStyle/>
-          <a:p>
-            <a:endParaRPr lang="en-GB"/>
-          </a:p>
-        </p:txBody>
-      </p:sp>
-      <p:sp>
-        <p:nvSpPr>
-          <p:cNvPr id="6" name="Slide Number Placeholder 5">
-            <a:extLst>
-              <a:ext uri="{FF2B5EF4-FFF2-40B4-BE49-F238E27FC236}">
-                <a16:creationId xmlns:a16="http://schemas.microsoft.com/office/drawing/2014/main" id="{75F01502-4821-02E8-DD1F-237CF789533A}"/>
-              </a:ext>
-            </a:extLst>
-          </p:cNvPr>
-          <p:cNvSpPr>
-            <a:spLocks noGrp="1"/>
-          </p:cNvSpPr>
-          <p:nvPr>
-            <p:ph type="sldNum" sz="quarter" idx="12"/>
-          </p:nvPr>
-        </p:nvSpPr>
-        <p:spPr/>
-        <p:txBody>
-          <a:bodyPr/>
-          <a:lstStyle/>
-          <a:p>
-            <a:fld id="{3185417C-520E-4822-84FF-A19FC9829684}" type="slidenum">
-              <a:rPr lang="en-GB" smtClean="0"/>
-              <a:t>‹#›</a:t>
-            </a:fld>
-            <a:endParaRPr lang="en-GB"/>
-          </a:p>
-        </p:txBody>
-      </p:sp>
-    </p:spTree>
-    <p:extLst>
-      <p:ext uri="{BB962C8B-B14F-4D97-AF65-F5344CB8AC3E}">
-        <p14:creationId xmlns:p14="http://schemas.microsoft.com/office/powerpoint/2010/main" val="3120896832"/>
-      </p:ext>
-    </p:extLst>
-  </p:cSld>
-  <p:clrMapOvr>
-    <a:masterClrMapping/>
-  </p:clrMapOvr>
-</p:sldLayout>
-</file>
-
-<file path=ppt/slideLayouts/slideLayout20.xml><?xml version="1.0" encoding="utf-8"?>
+<file path=ppt/slideLayouts/slideLayout21.xml><?xml version="1.0" encoding="utf-8"?>
 <p:sldLayout xmlns:a="http://schemas.openxmlformats.org/drawingml/2006/main" xmlns:r="http://schemas.openxmlformats.org/officeDocument/2006/relationships" xmlns:p="http://schemas.openxmlformats.org/presentationml/2006/main" showMasterSp="0" preserve="1" userDrawn="1">
   <p:cSld name="Small title - half page">
     <p:spTree>
@@ -2960,7 +3609,7 @@
 </p:sldLayout>
 </file>
 
-<file path=ppt/slideLayouts/slideLayout21.xml><?xml version="1.0" encoding="utf-8"?>
+<file path=ppt/slideLayouts/slideLayout22.xml><?xml version="1.0" encoding="utf-8"?>
 <p:sldLayout xmlns:a="http://schemas.openxmlformats.org/drawingml/2006/main" xmlns:r="http://schemas.openxmlformats.org/officeDocument/2006/relationships" xmlns:p="http://schemas.openxmlformats.org/presentationml/2006/main" preserve="1" userDrawn="1">
   <p:cSld name="1_Custom Layout">
     <p:spTree>
@@ -6982,7 +7631,7 @@
 </p:sldLayout>
 </file>
 
-<file path=ppt/slideLayouts/slideLayout22.xml><?xml version="1.0" encoding="utf-8"?>
+<file path=ppt/slideLayouts/slideLayout23.xml><?xml version="1.0" encoding="utf-8"?>
 <p:sldLayout xmlns:a="http://schemas.openxmlformats.org/drawingml/2006/main" xmlns:r="http://schemas.openxmlformats.org/officeDocument/2006/relationships" xmlns:p="http://schemas.openxmlformats.org/presentationml/2006/main" showMasterSp="0" preserve="1" userDrawn="1">
   <p:cSld name="Title with Square Picture">
     <p:spTree>
@@ -7218,7 +7867,7 @@
 </p:sldLayout>
 </file>
 
-<file path=ppt/slideLayouts/slideLayout23.xml><?xml version="1.0" encoding="utf-8"?>
+<file path=ppt/slideLayouts/slideLayout24.xml><?xml version="1.0" encoding="utf-8"?>
 <p:sldLayout xmlns:a="http://schemas.openxmlformats.org/drawingml/2006/main" xmlns:r="http://schemas.openxmlformats.org/officeDocument/2006/relationships" xmlns:p="http://schemas.openxmlformats.org/presentationml/2006/main" preserve="1" userDrawn="1">
   <p:cSld name="Product/Feature - Square Photo">
     <p:spTree>
@@ -7470,7 +8119,7 @@
 </p:sldLayout>
 </file>
 
-<file path=ppt/slideLayouts/slideLayout24.xml><?xml version="1.0" encoding="utf-8"?>
+<file path=ppt/slideLayouts/slideLayout25.xml><?xml version="1.0" encoding="utf-8"?>
 <p:sldLayout xmlns:a="http://schemas.openxmlformats.org/drawingml/2006/main" xmlns:r="http://schemas.openxmlformats.org/officeDocument/2006/relationships" xmlns:p="http://schemas.openxmlformats.org/presentationml/2006/main" showMasterSp="0" preserve="1" userDrawn="1">
   <p:cSld name="Top Horizontal Photo and Title">
     <p:spTree>
@@ -7623,7 +8272,7 @@
 </p:sldLayout>
 </file>
 
-<file path=ppt/slideLayouts/slideLayout25.xml><?xml version="1.0" encoding="utf-8"?>
+<file path=ppt/slideLayouts/slideLayout26.xml><?xml version="1.0" encoding="utf-8"?>
 <p:sldLayout xmlns:a="http://schemas.openxmlformats.org/drawingml/2006/main" xmlns:r="http://schemas.openxmlformats.org/officeDocument/2006/relationships" xmlns:p="http://schemas.openxmlformats.org/presentationml/2006/main" showMasterSp="0" preserve="1" userDrawn="1">
   <p:cSld name="Top Horizontal Photo, Lockup and Title">
     <p:spTree>
@@ -7849,7 +8498,7 @@
 </p:sldLayout>
 </file>
 
-<file path=ppt/slideLayouts/slideLayout26.xml><?xml version="1.0" encoding="utf-8"?>
+<file path=ppt/slideLayouts/slideLayout27.xml><?xml version="1.0" encoding="utf-8"?>
 <p:sldLayout xmlns:a="http://schemas.openxmlformats.org/drawingml/2006/main" xmlns:r="http://schemas.openxmlformats.org/officeDocument/2006/relationships" xmlns:p="http://schemas.openxmlformats.org/presentationml/2006/main" preserve="1" userDrawn="1">
   <p:cSld name="Bottom Horizontal Photo and Title">
     <p:spTree>
@@ -8002,7 +8651,7 @@
 </p:sldLayout>
 </file>
 
-<file path=ppt/slideLayouts/slideLayout27.xml><?xml version="1.0" encoding="utf-8"?>
+<file path=ppt/slideLayouts/slideLayout28.xml><?xml version="1.0" encoding="utf-8"?>
 <p:sldLayout xmlns:a="http://schemas.openxmlformats.org/drawingml/2006/main" xmlns:r="http://schemas.openxmlformats.org/officeDocument/2006/relationships" xmlns:p="http://schemas.openxmlformats.org/presentationml/2006/main" preserve="1" userDrawn="1">
   <p:cSld name="Two picture content">
     <p:spTree>
@@ -8319,7 +8968,7 @@
 </p:sldLayout>
 </file>
 
-<file path=ppt/slideLayouts/slideLayout28.xml><?xml version="1.0" encoding="utf-8"?>
+<file path=ppt/slideLayouts/slideLayout29.xml><?xml version="1.0" encoding="utf-8"?>
 <p:sldLayout xmlns:a="http://schemas.openxmlformats.org/drawingml/2006/main" xmlns:r="http://schemas.openxmlformats.org/officeDocument/2006/relationships" xmlns:p="http://schemas.openxmlformats.org/presentationml/2006/main" preserve="1" userDrawn="1">
   <p:cSld name="Three picture content">
     <p:spTree>
@@ -8773,7 +9422,283 @@
 </p:sldLayout>
 </file>
 
-<file path=ppt/slideLayouts/slideLayout29.xml><?xml version="1.0" encoding="utf-8"?>
+<file path=ppt/slideLayouts/slideLayout3.xml><?xml version="1.0" encoding="utf-8"?>
+<p:sldLayout xmlns:a="http://schemas.openxmlformats.org/drawingml/2006/main" xmlns:r="http://schemas.openxmlformats.org/officeDocument/2006/relationships" xmlns:p="http://schemas.openxmlformats.org/presentationml/2006/main" type="secHead" preserve="1">
+  <p:cSld name="Section Header">
+    <p:spTree>
+      <p:nvGrpSpPr>
+        <p:cNvPr id="1" name=""/>
+        <p:cNvGrpSpPr/>
+        <p:nvPr/>
+      </p:nvGrpSpPr>
+      <p:grpSpPr>
+        <a:xfrm>
+          <a:off x="0" y="0"/>
+          <a:ext cx="0" cy="0"/>
+          <a:chOff x="0" y="0"/>
+          <a:chExt cx="0" cy="0"/>
+        </a:xfrm>
+      </p:grpSpPr>
+      <p:sp>
+        <p:nvSpPr>
+          <p:cNvPr id="2" name="Title 1">
+            <a:extLst>
+              <a:ext uri="{FF2B5EF4-FFF2-40B4-BE49-F238E27FC236}">
+                <a16:creationId xmlns:a16="http://schemas.microsoft.com/office/drawing/2014/main" id="{BB18253B-04D5-54B7-D58F-8169AD2FA2CC}"/>
+              </a:ext>
+            </a:extLst>
+          </p:cNvPr>
+          <p:cNvSpPr>
+            <a:spLocks noGrp="1"/>
+          </p:cNvSpPr>
+          <p:nvPr>
+            <p:ph type="title"/>
+          </p:nvPr>
+        </p:nvSpPr>
+        <p:spPr>
+          <a:xfrm>
+            <a:off x="831850" y="1709738"/>
+            <a:ext cx="10515600" cy="2852737"/>
+          </a:xfrm>
+        </p:spPr>
+        <p:txBody>
+          <a:bodyPr anchor="b"/>
+          <a:lstStyle>
+            <a:lvl1pPr>
+              <a:defRPr sz="6000"/>
+            </a:lvl1pPr>
+          </a:lstStyle>
+          <a:p>
+            <a:r>
+              <a:rPr lang="en-US"/>
+              <a:t>Click to edit Master title style</a:t>
+            </a:r>
+            <a:endParaRPr lang="en-GB"/>
+          </a:p>
+        </p:txBody>
+      </p:sp>
+      <p:sp>
+        <p:nvSpPr>
+          <p:cNvPr id="3" name="Text Placeholder 2">
+            <a:extLst>
+              <a:ext uri="{FF2B5EF4-FFF2-40B4-BE49-F238E27FC236}">
+                <a16:creationId xmlns:a16="http://schemas.microsoft.com/office/drawing/2014/main" id="{12BEB710-8AD6-1D6E-A6B7-1F9E089A43E5}"/>
+              </a:ext>
+            </a:extLst>
+          </p:cNvPr>
+          <p:cNvSpPr>
+            <a:spLocks noGrp="1"/>
+          </p:cNvSpPr>
+          <p:nvPr>
+            <p:ph type="body" idx="1"/>
+          </p:nvPr>
+        </p:nvSpPr>
+        <p:spPr>
+          <a:xfrm>
+            <a:off x="831850" y="4589463"/>
+            <a:ext cx="10515600" cy="1500187"/>
+          </a:xfrm>
+        </p:spPr>
+        <p:txBody>
+          <a:bodyPr/>
+          <a:lstStyle>
+            <a:lvl1pPr marL="0" indent="0">
+              <a:buNone/>
+              <a:defRPr sz="2400">
+                <a:solidFill>
+                  <a:schemeClr val="tx1">
+                    <a:tint val="82000"/>
+                  </a:schemeClr>
+                </a:solidFill>
+              </a:defRPr>
+            </a:lvl1pPr>
+            <a:lvl2pPr marL="457200" indent="0">
+              <a:buNone/>
+              <a:defRPr sz="2000">
+                <a:solidFill>
+                  <a:schemeClr val="tx1">
+                    <a:tint val="82000"/>
+                  </a:schemeClr>
+                </a:solidFill>
+              </a:defRPr>
+            </a:lvl2pPr>
+            <a:lvl3pPr marL="914400" indent="0">
+              <a:buNone/>
+              <a:defRPr sz="1800">
+                <a:solidFill>
+                  <a:schemeClr val="tx1">
+                    <a:tint val="82000"/>
+                  </a:schemeClr>
+                </a:solidFill>
+              </a:defRPr>
+            </a:lvl3pPr>
+            <a:lvl4pPr marL="1371600" indent="0">
+              <a:buNone/>
+              <a:defRPr sz="1600">
+                <a:solidFill>
+                  <a:schemeClr val="tx1">
+                    <a:tint val="82000"/>
+                  </a:schemeClr>
+                </a:solidFill>
+              </a:defRPr>
+            </a:lvl4pPr>
+            <a:lvl5pPr marL="1828800" indent="0">
+              <a:buNone/>
+              <a:defRPr sz="1600">
+                <a:solidFill>
+                  <a:schemeClr val="tx1">
+                    <a:tint val="82000"/>
+                  </a:schemeClr>
+                </a:solidFill>
+              </a:defRPr>
+            </a:lvl5pPr>
+            <a:lvl6pPr marL="2286000" indent="0">
+              <a:buNone/>
+              <a:defRPr sz="1600">
+                <a:solidFill>
+                  <a:schemeClr val="tx1">
+                    <a:tint val="82000"/>
+                  </a:schemeClr>
+                </a:solidFill>
+              </a:defRPr>
+            </a:lvl6pPr>
+            <a:lvl7pPr marL="2743200" indent="0">
+              <a:buNone/>
+              <a:defRPr sz="1600">
+                <a:solidFill>
+                  <a:schemeClr val="tx1">
+                    <a:tint val="82000"/>
+                  </a:schemeClr>
+                </a:solidFill>
+              </a:defRPr>
+            </a:lvl7pPr>
+            <a:lvl8pPr marL="3200400" indent="0">
+              <a:buNone/>
+              <a:defRPr sz="1600">
+                <a:solidFill>
+                  <a:schemeClr val="tx1">
+                    <a:tint val="82000"/>
+                  </a:schemeClr>
+                </a:solidFill>
+              </a:defRPr>
+            </a:lvl8pPr>
+            <a:lvl9pPr marL="3657600" indent="0">
+              <a:buNone/>
+              <a:defRPr sz="1600">
+                <a:solidFill>
+                  <a:schemeClr val="tx1">
+                    <a:tint val="82000"/>
+                  </a:schemeClr>
+                </a:solidFill>
+              </a:defRPr>
+            </a:lvl9pPr>
+          </a:lstStyle>
+          <a:p>
+            <a:pPr lvl="0"/>
+            <a:r>
+              <a:rPr lang="en-US"/>
+              <a:t>Click to edit Master text styles</a:t>
+            </a:r>
+          </a:p>
+        </p:txBody>
+      </p:sp>
+      <p:sp>
+        <p:nvSpPr>
+          <p:cNvPr id="4" name="Date Placeholder 3">
+            <a:extLst>
+              <a:ext uri="{FF2B5EF4-FFF2-40B4-BE49-F238E27FC236}">
+                <a16:creationId xmlns:a16="http://schemas.microsoft.com/office/drawing/2014/main" id="{16B0EB75-8314-D1B7-3BAE-25BB1D4D1372}"/>
+              </a:ext>
+            </a:extLst>
+          </p:cNvPr>
+          <p:cNvSpPr>
+            <a:spLocks noGrp="1"/>
+          </p:cNvSpPr>
+          <p:nvPr>
+            <p:ph type="dt" sz="half" idx="10"/>
+          </p:nvPr>
+        </p:nvSpPr>
+        <p:spPr/>
+        <p:txBody>
+          <a:bodyPr/>
+          <a:lstStyle/>
+          <a:p>
+            <a:fld id="{A7E04868-8344-4E8E-8E08-E924FD30BED3}" type="datetimeFigureOut">
+              <a:rPr lang="en-GB" smtClean="0"/>
+              <a:t>07/01/2025</a:t>
+            </a:fld>
+            <a:endParaRPr lang="en-GB"/>
+          </a:p>
+        </p:txBody>
+      </p:sp>
+      <p:sp>
+        <p:nvSpPr>
+          <p:cNvPr id="5" name="Footer Placeholder 4">
+            <a:extLst>
+              <a:ext uri="{FF2B5EF4-FFF2-40B4-BE49-F238E27FC236}">
+                <a16:creationId xmlns:a16="http://schemas.microsoft.com/office/drawing/2014/main" id="{00366F1F-824C-53BE-E25B-BC09CA7CB7FA}"/>
+              </a:ext>
+            </a:extLst>
+          </p:cNvPr>
+          <p:cNvSpPr>
+            <a:spLocks noGrp="1"/>
+          </p:cNvSpPr>
+          <p:nvPr>
+            <p:ph type="ftr" sz="quarter" idx="11"/>
+          </p:nvPr>
+        </p:nvSpPr>
+        <p:spPr/>
+        <p:txBody>
+          <a:bodyPr/>
+          <a:lstStyle/>
+          <a:p>
+            <a:endParaRPr lang="en-GB"/>
+          </a:p>
+        </p:txBody>
+      </p:sp>
+      <p:sp>
+        <p:nvSpPr>
+          <p:cNvPr id="6" name="Slide Number Placeholder 5">
+            <a:extLst>
+              <a:ext uri="{FF2B5EF4-FFF2-40B4-BE49-F238E27FC236}">
+                <a16:creationId xmlns:a16="http://schemas.microsoft.com/office/drawing/2014/main" id="{C37D244D-3B40-E2F5-5C2B-3D1222FB870D}"/>
+              </a:ext>
+            </a:extLst>
+          </p:cNvPr>
+          <p:cNvSpPr>
+            <a:spLocks noGrp="1"/>
+          </p:cNvSpPr>
+          <p:nvPr>
+            <p:ph type="sldNum" sz="quarter" idx="12"/>
+          </p:nvPr>
+        </p:nvSpPr>
+        <p:spPr/>
+        <p:txBody>
+          <a:bodyPr/>
+          <a:lstStyle/>
+          <a:p>
+            <a:fld id="{3185417C-520E-4822-84FF-A19FC9829684}" type="slidenum">
+              <a:rPr lang="en-GB" smtClean="0"/>
+              <a:t>‹#›</a:t>
+            </a:fld>
+            <a:endParaRPr lang="en-GB"/>
+          </a:p>
+        </p:txBody>
+      </p:sp>
+    </p:spTree>
+    <p:extLst>
+      <p:ext uri="{BB962C8B-B14F-4D97-AF65-F5344CB8AC3E}">
+        <p14:creationId xmlns:p14="http://schemas.microsoft.com/office/powerpoint/2010/main" val="2933951268"/>
+      </p:ext>
+    </p:extLst>
+  </p:cSld>
+  <p:clrMapOvr>
+    <a:masterClrMapping/>
+  </p:clrMapOvr>
+</p:sldLayout>
+</file>
+
+<file path=ppt/slideLayouts/slideLayout30.xml><?xml version="1.0" encoding="utf-8"?>
 <p:sldLayout xmlns:a="http://schemas.openxmlformats.org/drawingml/2006/main" xmlns:r="http://schemas.openxmlformats.org/officeDocument/2006/relationships" xmlns:p="http://schemas.openxmlformats.org/presentationml/2006/main" preserve="1" userDrawn="1">
   <p:cSld name="Three content with headings">
     <p:spTree>
@@ -9454,283 +10379,7 @@
 </p:sldLayout>
 </file>
 
-<file path=ppt/slideLayouts/slideLayout3.xml><?xml version="1.0" encoding="utf-8"?>
-<p:sldLayout xmlns:a="http://schemas.openxmlformats.org/drawingml/2006/main" xmlns:r="http://schemas.openxmlformats.org/officeDocument/2006/relationships" xmlns:p="http://schemas.openxmlformats.org/presentationml/2006/main" type="secHead" preserve="1">
-  <p:cSld name="Section Header">
-    <p:spTree>
-      <p:nvGrpSpPr>
-        <p:cNvPr id="1" name=""/>
-        <p:cNvGrpSpPr/>
-        <p:nvPr/>
-      </p:nvGrpSpPr>
-      <p:grpSpPr>
-        <a:xfrm>
-          <a:off x="0" y="0"/>
-          <a:ext cx="0" cy="0"/>
-          <a:chOff x="0" y="0"/>
-          <a:chExt cx="0" cy="0"/>
-        </a:xfrm>
-      </p:grpSpPr>
-      <p:sp>
-        <p:nvSpPr>
-          <p:cNvPr id="2" name="Title 1">
-            <a:extLst>
-              <a:ext uri="{FF2B5EF4-FFF2-40B4-BE49-F238E27FC236}">
-                <a16:creationId xmlns:a16="http://schemas.microsoft.com/office/drawing/2014/main" id="{BB18253B-04D5-54B7-D58F-8169AD2FA2CC}"/>
-              </a:ext>
-            </a:extLst>
-          </p:cNvPr>
-          <p:cNvSpPr>
-            <a:spLocks noGrp="1"/>
-          </p:cNvSpPr>
-          <p:nvPr>
-            <p:ph type="title"/>
-          </p:nvPr>
-        </p:nvSpPr>
-        <p:spPr>
-          <a:xfrm>
-            <a:off x="831850" y="1709738"/>
-            <a:ext cx="10515600" cy="2852737"/>
-          </a:xfrm>
-        </p:spPr>
-        <p:txBody>
-          <a:bodyPr anchor="b"/>
-          <a:lstStyle>
-            <a:lvl1pPr>
-              <a:defRPr sz="6000"/>
-            </a:lvl1pPr>
-          </a:lstStyle>
-          <a:p>
-            <a:r>
-              <a:rPr lang="en-US"/>
-              <a:t>Click to edit Master title style</a:t>
-            </a:r>
-            <a:endParaRPr lang="en-GB"/>
-          </a:p>
-        </p:txBody>
-      </p:sp>
-      <p:sp>
-        <p:nvSpPr>
-          <p:cNvPr id="3" name="Text Placeholder 2">
-            <a:extLst>
-              <a:ext uri="{FF2B5EF4-FFF2-40B4-BE49-F238E27FC236}">
-                <a16:creationId xmlns:a16="http://schemas.microsoft.com/office/drawing/2014/main" id="{12BEB710-8AD6-1D6E-A6B7-1F9E089A43E5}"/>
-              </a:ext>
-            </a:extLst>
-          </p:cNvPr>
-          <p:cNvSpPr>
-            <a:spLocks noGrp="1"/>
-          </p:cNvSpPr>
-          <p:nvPr>
-            <p:ph type="body" idx="1"/>
-          </p:nvPr>
-        </p:nvSpPr>
-        <p:spPr>
-          <a:xfrm>
-            <a:off x="831850" y="4589463"/>
-            <a:ext cx="10515600" cy="1500187"/>
-          </a:xfrm>
-        </p:spPr>
-        <p:txBody>
-          <a:bodyPr/>
-          <a:lstStyle>
-            <a:lvl1pPr marL="0" indent="0">
-              <a:buNone/>
-              <a:defRPr sz="2400">
-                <a:solidFill>
-                  <a:schemeClr val="tx1">
-                    <a:tint val="82000"/>
-                  </a:schemeClr>
-                </a:solidFill>
-              </a:defRPr>
-            </a:lvl1pPr>
-            <a:lvl2pPr marL="457200" indent="0">
-              <a:buNone/>
-              <a:defRPr sz="2000">
-                <a:solidFill>
-                  <a:schemeClr val="tx1">
-                    <a:tint val="82000"/>
-                  </a:schemeClr>
-                </a:solidFill>
-              </a:defRPr>
-            </a:lvl2pPr>
-            <a:lvl3pPr marL="914400" indent="0">
-              <a:buNone/>
-              <a:defRPr sz="1800">
-                <a:solidFill>
-                  <a:schemeClr val="tx1">
-                    <a:tint val="82000"/>
-                  </a:schemeClr>
-                </a:solidFill>
-              </a:defRPr>
-            </a:lvl3pPr>
-            <a:lvl4pPr marL="1371600" indent="0">
-              <a:buNone/>
-              <a:defRPr sz="1600">
-                <a:solidFill>
-                  <a:schemeClr val="tx1">
-                    <a:tint val="82000"/>
-                  </a:schemeClr>
-                </a:solidFill>
-              </a:defRPr>
-            </a:lvl4pPr>
-            <a:lvl5pPr marL="1828800" indent="0">
-              <a:buNone/>
-              <a:defRPr sz="1600">
-                <a:solidFill>
-                  <a:schemeClr val="tx1">
-                    <a:tint val="82000"/>
-                  </a:schemeClr>
-                </a:solidFill>
-              </a:defRPr>
-            </a:lvl5pPr>
-            <a:lvl6pPr marL="2286000" indent="0">
-              <a:buNone/>
-              <a:defRPr sz="1600">
-                <a:solidFill>
-                  <a:schemeClr val="tx1">
-                    <a:tint val="82000"/>
-                  </a:schemeClr>
-                </a:solidFill>
-              </a:defRPr>
-            </a:lvl6pPr>
-            <a:lvl7pPr marL="2743200" indent="0">
-              <a:buNone/>
-              <a:defRPr sz="1600">
-                <a:solidFill>
-                  <a:schemeClr val="tx1">
-                    <a:tint val="82000"/>
-                  </a:schemeClr>
-                </a:solidFill>
-              </a:defRPr>
-            </a:lvl7pPr>
-            <a:lvl8pPr marL="3200400" indent="0">
-              <a:buNone/>
-              <a:defRPr sz="1600">
-                <a:solidFill>
-                  <a:schemeClr val="tx1">
-                    <a:tint val="82000"/>
-                  </a:schemeClr>
-                </a:solidFill>
-              </a:defRPr>
-            </a:lvl8pPr>
-            <a:lvl9pPr marL="3657600" indent="0">
-              <a:buNone/>
-              <a:defRPr sz="1600">
-                <a:solidFill>
-                  <a:schemeClr val="tx1">
-                    <a:tint val="82000"/>
-                  </a:schemeClr>
-                </a:solidFill>
-              </a:defRPr>
-            </a:lvl9pPr>
-          </a:lstStyle>
-          <a:p>
-            <a:pPr lvl="0"/>
-            <a:r>
-              <a:rPr lang="en-US"/>
-              <a:t>Click to edit Master text styles</a:t>
-            </a:r>
-          </a:p>
-        </p:txBody>
-      </p:sp>
-      <p:sp>
-        <p:nvSpPr>
-          <p:cNvPr id="4" name="Date Placeholder 3">
-            <a:extLst>
-              <a:ext uri="{FF2B5EF4-FFF2-40B4-BE49-F238E27FC236}">
-                <a16:creationId xmlns:a16="http://schemas.microsoft.com/office/drawing/2014/main" id="{16B0EB75-8314-D1B7-3BAE-25BB1D4D1372}"/>
-              </a:ext>
-            </a:extLst>
-          </p:cNvPr>
-          <p:cNvSpPr>
-            <a:spLocks noGrp="1"/>
-          </p:cNvSpPr>
-          <p:nvPr>
-            <p:ph type="dt" sz="half" idx="10"/>
-          </p:nvPr>
-        </p:nvSpPr>
-        <p:spPr/>
-        <p:txBody>
-          <a:bodyPr/>
-          <a:lstStyle/>
-          <a:p>
-            <a:fld id="{A7E04868-8344-4E8E-8E08-E924FD30BED3}" type="datetimeFigureOut">
-              <a:rPr lang="en-GB" smtClean="0"/>
-              <a:t>11/11/2024</a:t>
-            </a:fld>
-            <a:endParaRPr lang="en-GB"/>
-          </a:p>
-        </p:txBody>
-      </p:sp>
-      <p:sp>
-        <p:nvSpPr>
-          <p:cNvPr id="5" name="Footer Placeholder 4">
-            <a:extLst>
-              <a:ext uri="{FF2B5EF4-FFF2-40B4-BE49-F238E27FC236}">
-                <a16:creationId xmlns:a16="http://schemas.microsoft.com/office/drawing/2014/main" id="{00366F1F-824C-53BE-E25B-BC09CA7CB7FA}"/>
-              </a:ext>
-            </a:extLst>
-          </p:cNvPr>
-          <p:cNvSpPr>
-            <a:spLocks noGrp="1"/>
-          </p:cNvSpPr>
-          <p:nvPr>
-            <p:ph type="ftr" sz="quarter" idx="11"/>
-          </p:nvPr>
-        </p:nvSpPr>
-        <p:spPr/>
-        <p:txBody>
-          <a:bodyPr/>
-          <a:lstStyle/>
-          <a:p>
-            <a:endParaRPr lang="en-GB"/>
-          </a:p>
-        </p:txBody>
-      </p:sp>
-      <p:sp>
-        <p:nvSpPr>
-          <p:cNvPr id="6" name="Slide Number Placeholder 5">
-            <a:extLst>
-              <a:ext uri="{FF2B5EF4-FFF2-40B4-BE49-F238E27FC236}">
-                <a16:creationId xmlns:a16="http://schemas.microsoft.com/office/drawing/2014/main" id="{C37D244D-3B40-E2F5-5C2B-3D1222FB870D}"/>
-              </a:ext>
-            </a:extLst>
-          </p:cNvPr>
-          <p:cNvSpPr>
-            <a:spLocks noGrp="1"/>
-          </p:cNvSpPr>
-          <p:nvPr>
-            <p:ph type="sldNum" sz="quarter" idx="12"/>
-          </p:nvPr>
-        </p:nvSpPr>
-        <p:spPr/>
-        <p:txBody>
-          <a:bodyPr/>
-          <a:lstStyle/>
-          <a:p>
-            <a:fld id="{3185417C-520E-4822-84FF-A19FC9829684}" type="slidenum">
-              <a:rPr lang="en-GB" smtClean="0"/>
-              <a:t>‹#›</a:t>
-            </a:fld>
-            <a:endParaRPr lang="en-GB"/>
-          </a:p>
-        </p:txBody>
-      </p:sp>
-    </p:spTree>
-    <p:extLst>
-      <p:ext uri="{BB962C8B-B14F-4D97-AF65-F5344CB8AC3E}">
-        <p14:creationId xmlns:p14="http://schemas.microsoft.com/office/powerpoint/2010/main" val="2933951268"/>
-      </p:ext>
-    </p:extLst>
-  </p:cSld>
-  <p:clrMapOvr>
-    <a:masterClrMapping/>
-  </p:clrMapOvr>
-</p:sldLayout>
-</file>
-
-<file path=ppt/slideLayouts/slideLayout30.xml><?xml version="1.0" encoding="utf-8"?>
+<file path=ppt/slideLayouts/slideLayout31.xml><?xml version="1.0" encoding="utf-8"?>
 <p:sldLayout xmlns:a="http://schemas.openxmlformats.org/drawingml/2006/main" xmlns:r="http://schemas.openxmlformats.org/officeDocument/2006/relationships" xmlns:p="http://schemas.openxmlformats.org/presentationml/2006/main" preserve="1" userDrawn="1">
   <p:cSld name="Three Products">
     <p:spTree>
@@ -11294,7 +11943,7 @@
 </p:sldLayout>
 </file>
 
-<file path=ppt/slideLayouts/slideLayout31.xml><?xml version="1.0" encoding="utf-8"?>
+<file path=ppt/slideLayouts/slideLayout32.xml><?xml version="1.0" encoding="utf-8"?>
 <p:sldLayout xmlns:a="http://schemas.openxmlformats.org/drawingml/2006/main" xmlns:r="http://schemas.openxmlformats.org/officeDocument/2006/relationships" xmlns:p="http://schemas.openxmlformats.org/presentationml/2006/main" preserve="1" userDrawn="1">
   <p:cSld name="Four picture content">
     <p:spTree>
@@ -11882,7 +12531,7 @@
 </p:sldLayout>
 </file>
 
-<file path=ppt/slideLayouts/slideLayout32.xml><?xml version="1.0" encoding="utf-8"?>
+<file path=ppt/slideLayouts/slideLayout33.xml><?xml version="1.0" encoding="utf-8"?>
 <p:sldLayout xmlns:a="http://schemas.openxmlformats.org/drawingml/2006/main" xmlns:r="http://schemas.openxmlformats.org/officeDocument/2006/relationships" xmlns:p="http://schemas.openxmlformats.org/presentationml/2006/main" preserve="1" userDrawn="1">
   <p:cSld name="Scorecard">
     <p:spTree>
@@ -14599,7 +15248,7 @@
 </p:sldLayout>
 </file>
 
-<file path=ppt/slideLayouts/slideLayout33.xml><?xml version="1.0" encoding="utf-8"?>
+<file path=ppt/slideLayouts/slideLayout34.xml><?xml version="1.0" encoding="utf-8"?>
 <p:sldLayout xmlns:a="http://schemas.openxmlformats.org/drawingml/2006/main" xmlns:r="http://schemas.openxmlformats.org/officeDocument/2006/relationships" xmlns:p="http://schemas.openxmlformats.org/presentationml/2006/main" preserve="1" userDrawn="1">
   <p:cSld name="Screenshot and caption">
     <p:spTree>
@@ -14801,7 +15450,7 @@
 </p:sldLayout>
 </file>
 
-<file path=ppt/slideLayouts/slideLayout34.xml><?xml version="1.0" encoding="utf-8"?>
+<file path=ppt/slideLayouts/slideLayout35.xml><?xml version="1.0" encoding="utf-8"?>
 <p:sldLayout xmlns:a="http://schemas.openxmlformats.org/drawingml/2006/main" xmlns:r="http://schemas.openxmlformats.org/officeDocument/2006/relationships" xmlns:p="http://schemas.openxmlformats.org/presentationml/2006/main" preserve="1" userDrawn="1">
   <p:cSld name="Agenda">
     <p:spTree>
@@ -15043,7 +15692,7 @@
 </p:sldLayout>
 </file>
 
-<file path=ppt/slideLayouts/slideLayout35.xml><?xml version="1.0" encoding="utf-8"?>
+<file path=ppt/slideLayouts/slideLayout36.xml><?xml version="1.0" encoding="utf-8"?>
 <p:sldLayout xmlns:a="http://schemas.openxmlformats.org/drawingml/2006/main" xmlns:r="http://schemas.openxmlformats.org/officeDocument/2006/relationships" xmlns:p="http://schemas.openxmlformats.org/presentationml/2006/main" preserve="1" userDrawn="1">
   <p:cSld name="Title and text side by side 2">
     <p:spTree>
@@ -15214,7 +15863,7 @@
 </p:sldLayout>
 </file>
 
-<file path=ppt/slideLayouts/slideLayout36.xml><?xml version="1.0" encoding="utf-8"?>
+<file path=ppt/slideLayouts/slideLayout37.xml><?xml version="1.0" encoding="utf-8"?>
 <p:sldLayout xmlns:a="http://schemas.openxmlformats.org/drawingml/2006/main" xmlns:r="http://schemas.openxmlformats.org/officeDocument/2006/relationships" xmlns:p="http://schemas.openxmlformats.org/presentationml/2006/main" showMasterSp="0" preserve="1" userDrawn="1">
   <p:cSld name="Demo slide">
     <p:spTree>
@@ -15401,7 +16050,7 @@
         <p:fade/>
       </p:transition>
     </mc:Choice>
-    <mc:Fallback xmlns="" xmlns:a16="http://schemas.microsoft.com/office/drawing/2014/main" xmlns:a14="http://schemas.microsoft.com/office/drawing/2010/main" xmlns:p15="http://schemas.microsoft.com/office/powerpoint/2012/main">
+    <mc:Fallback xmlns:p15="http://schemas.microsoft.com/office/powerpoint/2012/main" xmlns:a14="http://schemas.microsoft.com/office/drawing/2010/main" xmlns:a16="http://schemas.microsoft.com/office/drawing/2014/main" xmlns="">
       <p:transition spd="med">
         <p:fade/>
       </p:transition>
@@ -15431,7 +16080,7 @@
 </p:sldLayout>
 </file>
 
-<file path=ppt/slideLayouts/slideLayout37.xml><?xml version="1.0" encoding="utf-8"?>
+<file path=ppt/slideLayouts/slideLayout38.xml><?xml version="1.0" encoding="utf-8"?>
 <p:sldLayout xmlns:a="http://schemas.openxmlformats.org/drawingml/2006/main" xmlns:r="http://schemas.openxmlformats.org/officeDocument/2006/relationships" xmlns:p="http://schemas.openxmlformats.org/presentationml/2006/main" showMasterSp="0" preserve="1" userDrawn="1">
   <p:cSld name="1_Demo slide">
     <p:spTree>
@@ -15692,7 +16341,7 @@
 </p:sldLayout>
 </file>
 
-<file path=ppt/slideLayouts/slideLayout38.xml><?xml version="1.0" encoding="utf-8"?>
+<file path=ppt/slideLayouts/slideLayout39.xml><?xml version="1.0" encoding="utf-8"?>
 <p:sldLayout xmlns:a="http://schemas.openxmlformats.org/drawingml/2006/main" xmlns:r="http://schemas.openxmlformats.org/officeDocument/2006/relationships" xmlns:p="http://schemas.openxmlformats.org/presentationml/2006/main" showMasterSp="0" preserve="1" userDrawn="1">
   <p:cSld name="Blank">
     <p:spTree>
@@ -15846,7 +16495,275 @@
 </p:sldLayout>
 </file>
 
-<file path=ppt/slideLayouts/slideLayout39.xml><?xml version="1.0" encoding="utf-8"?>
+<file path=ppt/slideLayouts/slideLayout4.xml><?xml version="1.0" encoding="utf-8"?>
+<p:sldLayout xmlns:a="http://schemas.openxmlformats.org/drawingml/2006/main" xmlns:r="http://schemas.openxmlformats.org/officeDocument/2006/relationships" xmlns:p="http://schemas.openxmlformats.org/presentationml/2006/main" type="twoObj" preserve="1">
+  <p:cSld name="Two Content">
+    <p:spTree>
+      <p:nvGrpSpPr>
+        <p:cNvPr id="1" name=""/>
+        <p:cNvGrpSpPr/>
+        <p:nvPr/>
+      </p:nvGrpSpPr>
+      <p:grpSpPr>
+        <a:xfrm>
+          <a:off x="0" y="0"/>
+          <a:ext cx="0" cy="0"/>
+          <a:chOff x="0" y="0"/>
+          <a:chExt cx="0" cy="0"/>
+        </a:xfrm>
+      </p:grpSpPr>
+      <p:sp>
+        <p:nvSpPr>
+          <p:cNvPr id="2" name="Title 1">
+            <a:extLst>
+              <a:ext uri="{FF2B5EF4-FFF2-40B4-BE49-F238E27FC236}">
+                <a16:creationId xmlns:a16="http://schemas.microsoft.com/office/drawing/2014/main" id="{D9D9239A-2CFE-35F5-6B7E-678C01D1CF74}"/>
+              </a:ext>
+            </a:extLst>
+          </p:cNvPr>
+          <p:cNvSpPr>
+            <a:spLocks noGrp="1"/>
+          </p:cNvSpPr>
+          <p:nvPr>
+            <p:ph type="title"/>
+          </p:nvPr>
+        </p:nvSpPr>
+        <p:spPr/>
+        <p:txBody>
+          <a:bodyPr/>
+          <a:lstStyle/>
+          <a:p>
+            <a:r>
+              <a:rPr lang="en-US"/>
+              <a:t>Click to edit Master title style</a:t>
+            </a:r>
+            <a:endParaRPr lang="en-GB"/>
+          </a:p>
+        </p:txBody>
+      </p:sp>
+      <p:sp>
+        <p:nvSpPr>
+          <p:cNvPr id="3" name="Content Placeholder 2">
+            <a:extLst>
+              <a:ext uri="{FF2B5EF4-FFF2-40B4-BE49-F238E27FC236}">
+                <a16:creationId xmlns:a16="http://schemas.microsoft.com/office/drawing/2014/main" id="{DA50A071-B6A1-92DB-8119-B19AB0B4DF98}"/>
+              </a:ext>
+            </a:extLst>
+          </p:cNvPr>
+          <p:cNvSpPr>
+            <a:spLocks noGrp="1"/>
+          </p:cNvSpPr>
+          <p:nvPr>
+            <p:ph sz="half" idx="1"/>
+          </p:nvPr>
+        </p:nvSpPr>
+        <p:spPr>
+          <a:xfrm>
+            <a:off x="838200" y="1825625"/>
+            <a:ext cx="5181600" cy="4351338"/>
+          </a:xfrm>
+        </p:spPr>
+        <p:txBody>
+          <a:bodyPr/>
+          <a:lstStyle/>
+          <a:p>
+            <a:pPr lvl="0"/>
+            <a:r>
+              <a:rPr lang="en-US"/>
+              <a:t>Click to edit Master text styles</a:t>
+            </a:r>
+          </a:p>
+          <a:p>
+            <a:pPr lvl="1"/>
+            <a:r>
+              <a:rPr lang="en-US"/>
+              <a:t>Second level</a:t>
+            </a:r>
+          </a:p>
+          <a:p>
+            <a:pPr lvl="2"/>
+            <a:r>
+              <a:rPr lang="en-US"/>
+              <a:t>Third level</a:t>
+            </a:r>
+          </a:p>
+          <a:p>
+            <a:pPr lvl="3"/>
+            <a:r>
+              <a:rPr lang="en-US"/>
+              <a:t>Fourth level</a:t>
+            </a:r>
+          </a:p>
+          <a:p>
+            <a:pPr lvl="4"/>
+            <a:r>
+              <a:rPr lang="en-US"/>
+              <a:t>Fifth level</a:t>
+            </a:r>
+            <a:endParaRPr lang="en-GB"/>
+          </a:p>
+        </p:txBody>
+      </p:sp>
+      <p:sp>
+        <p:nvSpPr>
+          <p:cNvPr id="4" name="Content Placeholder 3">
+            <a:extLst>
+              <a:ext uri="{FF2B5EF4-FFF2-40B4-BE49-F238E27FC236}">
+                <a16:creationId xmlns:a16="http://schemas.microsoft.com/office/drawing/2014/main" id="{3A6A9329-E3E5-9935-178A-1099EED8C1D2}"/>
+              </a:ext>
+            </a:extLst>
+          </p:cNvPr>
+          <p:cNvSpPr>
+            <a:spLocks noGrp="1"/>
+          </p:cNvSpPr>
+          <p:nvPr>
+            <p:ph sz="half" idx="2"/>
+          </p:nvPr>
+        </p:nvSpPr>
+        <p:spPr>
+          <a:xfrm>
+            <a:off x="6172200" y="1825625"/>
+            <a:ext cx="5181600" cy="4351338"/>
+          </a:xfrm>
+        </p:spPr>
+        <p:txBody>
+          <a:bodyPr/>
+          <a:lstStyle/>
+          <a:p>
+            <a:pPr lvl="0"/>
+            <a:r>
+              <a:rPr lang="en-US"/>
+              <a:t>Click to edit Master text styles</a:t>
+            </a:r>
+          </a:p>
+          <a:p>
+            <a:pPr lvl="1"/>
+            <a:r>
+              <a:rPr lang="en-US"/>
+              <a:t>Second level</a:t>
+            </a:r>
+          </a:p>
+          <a:p>
+            <a:pPr lvl="2"/>
+            <a:r>
+              <a:rPr lang="en-US"/>
+              <a:t>Third level</a:t>
+            </a:r>
+          </a:p>
+          <a:p>
+            <a:pPr lvl="3"/>
+            <a:r>
+              <a:rPr lang="en-US"/>
+              <a:t>Fourth level</a:t>
+            </a:r>
+          </a:p>
+          <a:p>
+            <a:pPr lvl="4"/>
+            <a:r>
+              <a:rPr lang="en-US"/>
+              <a:t>Fifth level</a:t>
+            </a:r>
+            <a:endParaRPr lang="en-GB"/>
+          </a:p>
+        </p:txBody>
+      </p:sp>
+      <p:sp>
+        <p:nvSpPr>
+          <p:cNvPr id="5" name="Date Placeholder 4">
+            <a:extLst>
+              <a:ext uri="{FF2B5EF4-FFF2-40B4-BE49-F238E27FC236}">
+                <a16:creationId xmlns:a16="http://schemas.microsoft.com/office/drawing/2014/main" id="{7AE3A90C-E140-643C-C89C-56FD9AEAD43A}"/>
+              </a:ext>
+            </a:extLst>
+          </p:cNvPr>
+          <p:cNvSpPr>
+            <a:spLocks noGrp="1"/>
+          </p:cNvSpPr>
+          <p:nvPr>
+            <p:ph type="dt" sz="half" idx="10"/>
+          </p:nvPr>
+        </p:nvSpPr>
+        <p:spPr/>
+        <p:txBody>
+          <a:bodyPr/>
+          <a:lstStyle/>
+          <a:p>
+            <a:fld id="{A7E04868-8344-4E8E-8E08-E924FD30BED3}" type="datetimeFigureOut">
+              <a:rPr lang="en-GB" smtClean="0"/>
+              <a:t>07/01/2025</a:t>
+            </a:fld>
+            <a:endParaRPr lang="en-GB"/>
+          </a:p>
+        </p:txBody>
+      </p:sp>
+      <p:sp>
+        <p:nvSpPr>
+          <p:cNvPr id="6" name="Footer Placeholder 5">
+            <a:extLst>
+              <a:ext uri="{FF2B5EF4-FFF2-40B4-BE49-F238E27FC236}">
+                <a16:creationId xmlns:a16="http://schemas.microsoft.com/office/drawing/2014/main" id="{F2724628-85AA-4B69-1271-192F954162E2}"/>
+              </a:ext>
+            </a:extLst>
+          </p:cNvPr>
+          <p:cNvSpPr>
+            <a:spLocks noGrp="1"/>
+          </p:cNvSpPr>
+          <p:nvPr>
+            <p:ph type="ftr" sz="quarter" idx="11"/>
+          </p:nvPr>
+        </p:nvSpPr>
+        <p:spPr/>
+        <p:txBody>
+          <a:bodyPr/>
+          <a:lstStyle/>
+          <a:p>
+            <a:endParaRPr lang="en-GB"/>
+          </a:p>
+        </p:txBody>
+      </p:sp>
+      <p:sp>
+        <p:nvSpPr>
+          <p:cNvPr id="7" name="Slide Number Placeholder 6">
+            <a:extLst>
+              <a:ext uri="{FF2B5EF4-FFF2-40B4-BE49-F238E27FC236}">
+                <a16:creationId xmlns:a16="http://schemas.microsoft.com/office/drawing/2014/main" id="{73C55CE7-5793-DFBE-574B-1AC6D0FAF791}"/>
+              </a:ext>
+            </a:extLst>
+          </p:cNvPr>
+          <p:cNvSpPr>
+            <a:spLocks noGrp="1"/>
+          </p:cNvSpPr>
+          <p:nvPr>
+            <p:ph type="sldNum" sz="quarter" idx="12"/>
+          </p:nvPr>
+        </p:nvSpPr>
+        <p:spPr/>
+        <p:txBody>
+          <a:bodyPr/>
+          <a:lstStyle/>
+          <a:p>
+            <a:fld id="{3185417C-520E-4822-84FF-A19FC9829684}" type="slidenum">
+              <a:rPr lang="en-GB" smtClean="0"/>
+              <a:t>‹#›</a:t>
+            </a:fld>
+            <a:endParaRPr lang="en-GB"/>
+          </a:p>
+        </p:txBody>
+      </p:sp>
+    </p:spTree>
+    <p:extLst>
+      <p:ext uri="{BB962C8B-B14F-4D97-AF65-F5344CB8AC3E}">
+        <p14:creationId xmlns:p14="http://schemas.microsoft.com/office/powerpoint/2010/main" val="4058400950"/>
+      </p:ext>
+    </p:extLst>
+  </p:cSld>
+  <p:clrMapOvr>
+    <a:masterClrMapping/>
+  </p:clrMapOvr>
+</p:sldLayout>
+</file>
+
+<file path=ppt/slideLayouts/slideLayout40.xml><?xml version="1.0" encoding="utf-8"?>
 <p:sldLayout xmlns:a="http://schemas.openxmlformats.org/drawingml/2006/main" xmlns:r="http://schemas.openxmlformats.org/officeDocument/2006/relationships" xmlns:p="http://schemas.openxmlformats.org/presentationml/2006/main" preserve="1" userDrawn="1">
   <p:cSld name="Developer Code Layout">
     <p:spTree>
@@ -16036,275 +16953,7 @@
 </p:sldLayout>
 </file>
 
-<file path=ppt/slideLayouts/slideLayout4.xml><?xml version="1.0" encoding="utf-8"?>
-<p:sldLayout xmlns:a="http://schemas.openxmlformats.org/drawingml/2006/main" xmlns:r="http://schemas.openxmlformats.org/officeDocument/2006/relationships" xmlns:p="http://schemas.openxmlformats.org/presentationml/2006/main" type="twoObj" preserve="1">
-  <p:cSld name="Two Content">
-    <p:spTree>
-      <p:nvGrpSpPr>
-        <p:cNvPr id="1" name=""/>
-        <p:cNvGrpSpPr/>
-        <p:nvPr/>
-      </p:nvGrpSpPr>
-      <p:grpSpPr>
-        <a:xfrm>
-          <a:off x="0" y="0"/>
-          <a:ext cx="0" cy="0"/>
-          <a:chOff x="0" y="0"/>
-          <a:chExt cx="0" cy="0"/>
-        </a:xfrm>
-      </p:grpSpPr>
-      <p:sp>
-        <p:nvSpPr>
-          <p:cNvPr id="2" name="Title 1">
-            <a:extLst>
-              <a:ext uri="{FF2B5EF4-FFF2-40B4-BE49-F238E27FC236}">
-                <a16:creationId xmlns:a16="http://schemas.microsoft.com/office/drawing/2014/main" id="{D9D9239A-2CFE-35F5-6B7E-678C01D1CF74}"/>
-              </a:ext>
-            </a:extLst>
-          </p:cNvPr>
-          <p:cNvSpPr>
-            <a:spLocks noGrp="1"/>
-          </p:cNvSpPr>
-          <p:nvPr>
-            <p:ph type="title"/>
-          </p:nvPr>
-        </p:nvSpPr>
-        <p:spPr/>
-        <p:txBody>
-          <a:bodyPr/>
-          <a:lstStyle/>
-          <a:p>
-            <a:r>
-              <a:rPr lang="en-US"/>
-              <a:t>Click to edit Master title style</a:t>
-            </a:r>
-            <a:endParaRPr lang="en-GB"/>
-          </a:p>
-        </p:txBody>
-      </p:sp>
-      <p:sp>
-        <p:nvSpPr>
-          <p:cNvPr id="3" name="Content Placeholder 2">
-            <a:extLst>
-              <a:ext uri="{FF2B5EF4-FFF2-40B4-BE49-F238E27FC236}">
-                <a16:creationId xmlns:a16="http://schemas.microsoft.com/office/drawing/2014/main" id="{DA50A071-B6A1-92DB-8119-B19AB0B4DF98}"/>
-              </a:ext>
-            </a:extLst>
-          </p:cNvPr>
-          <p:cNvSpPr>
-            <a:spLocks noGrp="1"/>
-          </p:cNvSpPr>
-          <p:nvPr>
-            <p:ph sz="half" idx="1"/>
-          </p:nvPr>
-        </p:nvSpPr>
-        <p:spPr>
-          <a:xfrm>
-            <a:off x="838200" y="1825625"/>
-            <a:ext cx="5181600" cy="4351338"/>
-          </a:xfrm>
-        </p:spPr>
-        <p:txBody>
-          <a:bodyPr/>
-          <a:lstStyle/>
-          <a:p>
-            <a:pPr lvl="0"/>
-            <a:r>
-              <a:rPr lang="en-US"/>
-              <a:t>Click to edit Master text styles</a:t>
-            </a:r>
-          </a:p>
-          <a:p>
-            <a:pPr lvl="1"/>
-            <a:r>
-              <a:rPr lang="en-US"/>
-              <a:t>Second level</a:t>
-            </a:r>
-          </a:p>
-          <a:p>
-            <a:pPr lvl="2"/>
-            <a:r>
-              <a:rPr lang="en-US"/>
-              <a:t>Third level</a:t>
-            </a:r>
-          </a:p>
-          <a:p>
-            <a:pPr lvl="3"/>
-            <a:r>
-              <a:rPr lang="en-US"/>
-              <a:t>Fourth level</a:t>
-            </a:r>
-          </a:p>
-          <a:p>
-            <a:pPr lvl="4"/>
-            <a:r>
-              <a:rPr lang="en-US"/>
-              <a:t>Fifth level</a:t>
-            </a:r>
-            <a:endParaRPr lang="en-GB"/>
-          </a:p>
-        </p:txBody>
-      </p:sp>
-      <p:sp>
-        <p:nvSpPr>
-          <p:cNvPr id="4" name="Content Placeholder 3">
-            <a:extLst>
-              <a:ext uri="{FF2B5EF4-FFF2-40B4-BE49-F238E27FC236}">
-                <a16:creationId xmlns:a16="http://schemas.microsoft.com/office/drawing/2014/main" id="{3A6A9329-E3E5-9935-178A-1099EED8C1D2}"/>
-              </a:ext>
-            </a:extLst>
-          </p:cNvPr>
-          <p:cNvSpPr>
-            <a:spLocks noGrp="1"/>
-          </p:cNvSpPr>
-          <p:nvPr>
-            <p:ph sz="half" idx="2"/>
-          </p:nvPr>
-        </p:nvSpPr>
-        <p:spPr>
-          <a:xfrm>
-            <a:off x="6172200" y="1825625"/>
-            <a:ext cx="5181600" cy="4351338"/>
-          </a:xfrm>
-        </p:spPr>
-        <p:txBody>
-          <a:bodyPr/>
-          <a:lstStyle/>
-          <a:p>
-            <a:pPr lvl="0"/>
-            <a:r>
-              <a:rPr lang="en-US"/>
-              <a:t>Click to edit Master text styles</a:t>
-            </a:r>
-          </a:p>
-          <a:p>
-            <a:pPr lvl="1"/>
-            <a:r>
-              <a:rPr lang="en-US"/>
-              <a:t>Second level</a:t>
-            </a:r>
-          </a:p>
-          <a:p>
-            <a:pPr lvl="2"/>
-            <a:r>
-              <a:rPr lang="en-US"/>
-              <a:t>Third level</a:t>
-            </a:r>
-          </a:p>
-          <a:p>
-            <a:pPr lvl="3"/>
-            <a:r>
-              <a:rPr lang="en-US"/>
-              <a:t>Fourth level</a:t>
-            </a:r>
-          </a:p>
-          <a:p>
-            <a:pPr lvl="4"/>
-            <a:r>
-              <a:rPr lang="en-US"/>
-              <a:t>Fifth level</a:t>
-            </a:r>
-            <a:endParaRPr lang="en-GB"/>
-          </a:p>
-        </p:txBody>
-      </p:sp>
-      <p:sp>
-        <p:nvSpPr>
-          <p:cNvPr id="5" name="Date Placeholder 4">
-            <a:extLst>
-              <a:ext uri="{FF2B5EF4-FFF2-40B4-BE49-F238E27FC236}">
-                <a16:creationId xmlns:a16="http://schemas.microsoft.com/office/drawing/2014/main" id="{7AE3A90C-E140-643C-C89C-56FD9AEAD43A}"/>
-              </a:ext>
-            </a:extLst>
-          </p:cNvPr>
-          <p:cNvSpPr>
-            <a:spLocks noGrp="1"/>
-          </p:cNvSpPr>
-          <p:nvPr>
-            <p:ph type="dt" sz="half" idx="10"/>
-          </p:nvPr>
-        </p:nvSpPr>
-        <p:spPr/>
-        <p:txBody>
-          <a:bodyPr/>
-          <a:lstStyle/>
-          <a:p>
-            <a:fld id="{A7E04868-8344-4E8E-8E08-E924FD30BED3}" type="datetimeFigureOut">
-              <a:rPr lang="en-GB" smtClean="0"/>
-              <a:t>11/11/2024</a:t>
-            </a:fld>
-            <a:endParaRPr lang="en-GB"/>
-          </a:p>
-        </p:txBody>
-      </p:sp>
-      <p:sp>
-        <p:nvSpPr>
-          <p:cNvPr id="6" name="Footer Placeholder 5">
-            <a:extLst>
-              <a:ext uri="{FF2B5EF4-FFF2-40B4-BE49-F238E27FC236}">
-                <a16:creationId xmlns:a16="http://schemas.microsoft.com/office/drawing/2014/main" id="{F2724628-85AA-4B69-1271-192F954162E2}"/>
-              </a:ext>
-            </a:extLst>
-          </p:cNvPr>
-          <p:cNvSpPr>
-            <a:spLocks noGrp="1"/>
-          </p:cNvSpPr>
-          <p:nvPr>
-            <p:ph type="ftr" sz="quarter" idx="11"/>
-          </p:nvPr>
-        </p:nvSpPr>
-        <p:spPr/>
-        <p:txBody>
-          <a:bodyPr/>
-          <a:lstStyle/>
-          <a:p>
-            <a:endParaRPr lang="en-GB"/>
-          </a:p>
-        </p:txBody>
-      </p:sp>
-      <p:sp>
-        <p:nvSpPr>
-          <p:cNvPr id="7" name="Slide Number Placeholder 6">
-            <a:extLst>
-              <a:ext uri="{FF2B5EF4-FFF2-40B4-BE49-F238E27FC236}">
-                <a16:creationId xmlns:a16="http://schemas.microsoft.com/office/drawing/2014/main" id="{73C55CE7-5793-DFBE-574B-1AC6D0FAF791}"/>
-              </a:ext>
-            </a:extLst>
-          </p:cNvPr>
-          <p:cNvSpPr>
-            <a:spLocks noGrp="1"/>
-          </p:cNvSpPr>
-          <p:nvPr>
-            <p:ph type="sldNum" sz="quarter" idx="12"/>
-          </p:nvPr>
-        </p:nvSpPr>
-        <p:spPr/>
-        <p:txBody>
-          <a:bodyPr/>
-          <a:lstStyle/>
-          <a:p>
-            <a:fld id="{3185417C-520E-4822-84FF-A19FC9829684}" type="slidenum">
-              <a:rPr lang="en-GB" smtClean="0"/>
-              <a:t>‹#›</a:t>
-            </a:fld>
-            <a:endParaRPr lang="en-GB"/>
-          </a:p>
-        </p:txBody>
-      </p:sp>
-    </p:spTree>
-    <p:extLst>
-      <p:ext uri="{BB962C8B-B14F-4D97-AF65-F5344CB8AC3E}">
-        <p14:creationId xmlns:p14="http://schemas.microsoft.com/office/powerpoint/2010/main" val="4058400950"/>
-      </p:ext>
-    </p:extLst>
-  </p:cSld>
-  <p:clrMapOvr>
-    <a:masterClrMapping/>
-  </p:clrMapOvr>
-</p:sldLayout>
-</file>
-
-<file path=ppt/slideLayouts/slideLayout40.xml><?xml version="1.0" encoding="utf-8"?>
+<file path=ppt/slideLayouts/slideLayout41.xml><?xml version="1.0" encoding="utf-8"?>
 <p:sldLayout xmlns:a="http://schemas.openxmlformats.org/drawingml/2006/main" xmlns:r="http://schemas.openxmlformats.org/officeDocument/2006/relationships" xmlns:p="http://schemas.openxmlformats.org/presentationml/2006/main" preserve="1" userDrawn="1">
   <p:cSld name="Disclaimer and Attribution">
     <p:spTree>
@@ -16460,7 +17109,7 @@
 </p:sldLayout>
 </file>
 
-<file path=ppt/slideLayouts/slideLayout41.xml><?xml version="1.0" encoding="utf-8"?>
+<file path=ppt/slideLayouts/slideLayout42.xml><?xml version="1.0" encoding="utf-8"?>
 <p:sldLayout xmlns:a="http://schemas.openxmlformats.org/drawingml/2006/main" xmlns:r="http://schemas.openxmlformats.org/officeDocument/2006/relationships" xmlns:p="http://schemas.openxmlformats.org/presentationml/2006/main" showMasterSp="0" preserve="1" userDrawn="1">
   <p:cSld name="Closing logo slide">
     <p:spTree>
@@ -16946,7 +17595,7 @@
           <a:p>
             <a:fld id="{A7E04868-8344-4E8E-8E08-E924FD30BED3}" type="datetimeFigureOut">
               <a:rPr lang="en-GB" smtClean="0"/>
-              <a:t>11/11/2024</a:t>
+              <a:t>07/01/2025</a:t>
             </a:fld>
             <a:endParaRPr lang="en-GB"/>
           </a:p>
@@ -17088,7 +17737,7 @@
           <a:p>
             <a:fld id="{A7E04868-8344-4E8E-8E08-E924FD30BED3}" type="datetimeFigureOut">
               <a:rPr lang="en-GB" smtClean="0"/>
-              <a:t>11/11/2024</a:t>
+              <a:t>07/01/2025</a:t>
             </a:fld>
             <a:endParaRPr lang="en-GB"/>
           </a:p>
@@ -17201,7 +17850,7 @@
           <a:p>
             <a:fld id="{A7E04868-8344-4E8E-8E08-E924FD30BED3}" type="datetimeFigureOut">
               <a:rPr lang="en-GB" smtClean="0"/>
-              <a:t>11/11/2024</a:t>
+              <a:t>07/01/2025</a:t>
             </a:fld>
             <a:endParaRPr lang="en-GB"/>
           </a:p>
@@ -17514,7 +18163,7 @@
           <a:p>
             <a:fld id="{A7E04868-8344-4E8E-8E08-E924FD30BED3}" type="datetimeFigureOut">
               <a:rPr lang="en-GB" smtClean="0"/>
-              <a:t>11/11/2024</a:t>
+              <a:t>07/01/2025</a:t>
             </a:fld>
             <a:endParaRPr lang="en-GB"/>
           </a:p>
@@ -17803,7 +18452,7 @@
           <a:p>
             <a:fld id="{A7E04868-8344-4E8E-8E08-E924FD30BED3}" type="datetimeFigureOut">
               <a:rPr lang="en-GB" smtClean="0"/>
-              <a:t>11/11/2024</a:t>
+              <a:t>07/01/2025</a:t>
             </a:fld>
             <a:endParaRPr lang="en-GB"/>
           </a:p>
@@ -18046,7 +18695,7 @@
           <a:p>
             <a:fld id="{A7E04868-8344-4E8E-8E08-E924FD30BED3}" type="datetimeFigureOut">
               <a:rPr lang="en-GB" smtClean="0"/>
-              <a:t>11/11/2024</a:t>
+              <a:t>07/01/2025</a:t>
             </a:fld>
             <a:endParaRPr lang="en-GB"/>
           </a:p>
@@ -18162,6 +18811,7 @@
     <p:sldLayoutId id="2147483657" r:id="rId9"/>
     <p:sldLayoutId id="2147483658" r:id="rId10"/>
     <p:sldLayoutId id="2147483659" r:id="rId11"/>
+    <p:sldLayoutId id="2147483691" r:id="rId12"/>
   </p:sldLayoutIdLst>
   <p:txStyles>
     <p:titleStyle>
@@ -20978,6 +21628,76 @@
           <a:chExt cx="0" cy="0"/>
         </a:xfrm>
       </p:grpSpPr>
+      <p:sp>
+        <p:nvSpPr>
+          <p:cNvPr id="2" name="Title 1">
+            <a:extLst>
+              <a:ext uri="{FF2B5EF4-FFF2-40B4-BE49-F238E27FC236}">
+                <a16:creationId xmlns:a16="http://schemas.microsoft.com/office/drawing/2014/main" id="{2461966D-2631-C743-A140-7B0C74837A21}"/>
+              </a:ext>
+            </a:extLst>
+          </p:cNvPr>
+          <p:cNvSpPr>
+            <a:spLocks noGrp="1"/>
+          </p:cNvSpPr>
+          <p:nvPr>
+            <p:ph type="title"/>
+          </p:nvPr>
+        </p:nvSpPr>
+        <p:spPr/>
+        <p:txBody>
+          <a:bodyPr/>
+          <a:lstStyle/>
+          <a:p>
+            <a:r>
+              <a:rPr lang="en-GB" dirty="0"/>
+              <a:t>Arty board</a:t>
+            </a:r>
+          </a:p>
+        </p:txBody>
+      </p:sp>
+    </p:spTree>
+    <p:extLst>
+      <p:ext uri="{BB962C8B-B14F-4D97-AF65-F5344CB8AC3E}">
+        <p14:creationId xmlns:p14="http://schemas.microsoft.com/office/powerpoint/2010/main" val="4287347625"/>
+      </p:ext>
+    </p:extLst>
+  </p:cSld>
+  <p:clrMapOvr>
+    <a:masterClrMapping/>
+  </p:clrMapOvr>
+  <mc:AlternateContent xmlns:mc="http://schemas.openxmlformats.org/markup-compatibility/2006" xmlns:p14="http://schemas.microsoft.com/office/powerpoint/2010/main">
+    <mc:Choice Requires="p14">
+      <p:transition spd="med" p14:dur="700">
+        <p:fade/>
+      </p:transition>
+    </mc:Choice>
+    <mc:Fallback xmlns:p15="http://schemas.microsoft.com/office/powerpoint/2012/main" xmlns:a14="http://schemas.microsoft.com/office/drawing/2010/main" xmlns:a16="http://schemas.microsoft.com/office/drawing/2014/main" xmlns="">
+      <p:transition spd="med">
+        <p:fade/>
+      </p:transition>
+    </mc:Fallback>
+  </mc:AlternateContent>
+</p:sld>
+</file>
+
+<file path=ppt/slides/slide2.xml><?xml version="1.0" encoding="utf-8"?>
+<p:sld xmlns:a="http://schemas.openxmlformats.org/drawingml/2006/main" xmlns:r="http://schemas.openxmlformats.org/officeDocument/2006/relationships" xmlns:p="http://schemas.openxmlformats.org/presentationml/2006/main">
+  <p:cSld>
+    <p:spTree>
+      <p:nvGrpSpPr>
+        <p:cNvPr id="1" name=""/>
+        <p:cNvGrpSpPr/>
+        <p:nvPr/>
+      </p:nvGrpSpPr>
+      <p:grpSpPr>
+        <a:xfrm>
+          <a:off x="0" y="0"/>
+          <a:ext cx="0" cy="0"/>
+          <a:chOff x="0" y="0"/>
+          <a:chExt cx="0" cy="0"/>
+        </a:xfrm>
+      </p:grpSpPr>
       <p:pic>
         <p:nvPicPr>
           <p:cNvPr id="32" name="Picture 2">
@@ -21671,7 +22391,7 @@
                 <a:ea typeface="+mn-ea"/>
                 <a:cs typeface="Segoe UI" panose="020B0502040204020203" pitchFamily="34" charset="0"/>
               </a:rPr>
-              <a:t>Score is shown on the RGB LEDs</a:t>
+              <a:t>Score is shown on the RGB LEDs.</a:t>
             </a:r>
           </a:p>
           <a:p>
@@ -21709,7 +22429,7 @@
                 <a:ea typeface="+mn-ea"/>
                 <a:cs typeface="Segoe UI" panose="020B0502040204020203" pitchFamily="34" charset="0"/>
               </a:rPr>
-              <a:t>You lose if you touch an edge or eat part of yourself</a:t>
+              <a:t>You lose if you touch an edge or eat part of yourself.</a:t>
             </a:r>
           </a:p>
           <a:p>
@@ -21747,7 +22467,7 @@
                 <a:ea typeface="+mn-ea"/>
                 <a:cs typeface="Segoe UI" panose="020B0502040204020203" pitchFamily="34" charset="0"/>
               </a:rPr>
-              <a:t>Use the reset switch to start over in the event of a win or lose screen</a:t>
+              <a:t>Use the reset switch to start over in the event of a win or lose screen.</a:t>
             </a:r>
           </a:p>
           <a:p>
@@ -21785,7 +22505,7 @@
                 <a:ea typeface="+mn-ea"/>
                 <a:cs typeface="Segoe UI" panose="020B0502040204020203" pitchFamily="34" charset="0"/>
               </a:rPr>
-              <a:t>The directions the press buttons control are shown to the right</a:t>
+              <a:t>The directions the press buttons control are shown to the right.</a:t>
             </a:r>
           </a:p>
         </p:txBody>
@@ -22906,6 +23626,2026 @@
     <p:extLst>
       <p:ext uri="{BB962C8B-B14F-4D97-AF65-F5344CB8AC3E}">
         <p14:creationId xmlns:p14="http://schemas.microsoft.com/office/powerpoint/2010/main" val="3712660401"/>
+      </p:ext>
+    </p:extLst>
+  </p:cSld>
+  <p:clrMapOvr>
+    <a:masterClrMapping/>
+  </p:clrMapOvr>
+</p:sld>
+</file>
+
+<file path=ppt/slides/slide3.xml><?xml version="1.0" encoding="utf-8"?>
+<p:sld xmlns:a="http://schemas.openxmlformats.org/drawingml/2006/main" xmlns:r="http://schemas.openxmlformats.org/officeDocument/2006/relationships" xmlns:p="http://schemas.openxmlformats.org/presentationml/2006/main">
+  <p:cSld>
+    <p:spTree>
+      <p:nvGrpSpPr>
+        <p:cNvPr id="1" name="">
+          <a:extLst>
+            <a:ext uri="{FF2B5EF4-FFF2-40B4-BE49-F238E27FC236}">
+              <a16:creationId xmlns:a16="http://schemas.microsoft.com/office/drawing/2014/main" id="{ED2C7062-1EE9-EBB8-4EC1-2893034A4D8D}"/>
+            </a:ext>
+          </a:extLst>
+        </p:cNvPr>
+        <p:cNvGrpSpPr/>
+        <p:nvPr/>
+      </p:nvGrpSpPr>
+      <p:grpSpPr>
+        <a:xfrm>
+          <a:off x="0" y="0"/>
+          <a:ext cx="0" cy="0"/>
+          <a:chOff x="0" y="0"/>
+          <a:chExt cx="0" cy="0"/>
+        </a:xfrm>
+      </p:grpSpPr>
+      <p:sp>
+        <p:nvSpPr>
+          <p:cNvPr id="2" name="Title 1">
+            <a:extLst>
+              <a:ext uri="{FF2B5EF4-FFF2-40B4-BE49-F238E27FC236}">
+                <a16:creationId xmlns:a16="http://schemas.microsoft.com/office/drawing/2014/main" id="{98B7F00E-C702-812A-6860-649B07CE9FFB}"/>
+              </a:ext>
+            </a:extLst>
+          </p:cNvPr>
+          <p:cNvSpPr>
+            <a:spLocks noGrp="1"/>
+          </p:cNvSpPr>
+          <p:nvPr>
+            <p:ph type="title"/>
+          </p:nvPr>
+        </p:nvSpPr>
+        <p:spPr/>
+        <p:txBody>
+          <a:bodyPr/>
+          <a:lstStyle/>
+          <a:p>
+            <a:r>
+              <a:rPr lang="en-GB" dirty="0"/>
+              <a:t>Boolean board</a:t>
+            </a:r>
+          </a:p>
+        </p:txBody>
+      </p:sp>
+    </p:spTree>
+    <p:extLst>
+      <p:ext uri="{BB962C8B-B14F-4D97-AF65-F5344CB8AC3E}">
+        <p14:creationId xmlns:p14="http://schemas.microsoft.com/office/powerpoint/2010/main" val="1555941035"/>
+      </p:ext>
+    </p:extLst>
+  </p:cSld>
+  <p:clrMapOvr>
+    <a:masterClrMapping/>
+  </p:clrMapOvr>
+  <mc:AlternateContent xmlns:mc="http://schemas.openxmlformats.org/markup-compatibility/2006" xmlns:p14="http://schemas.microsoft.com/office/powerpoint/2010/main">
+    <mc:Choice Requires="p14">
+      <p:transition spd="med" p14:dur="700">
+        <p:fade/>
+      </p:transition>
+    </mc:Choice>
+    <mc:Fallback xmlns:p15="http://schemas.microsoft.com/office/powerpoint/2012/main" xmlns:a14="http://schemas.microsoft.com/office/drawing/2010/main" xmlns:a16="http://schemas.microsoft.com/office/drawing/2014/main" xmlns="">
+      <p:transition spd="med">
+        <p:fade/>
+      </p:transition>
+    </mc:Fallback>
+  </mc:AlternateContent>
+</p:sld>
+</file>
+
+<file path=ppt/slides/slide4.xml><?xml version="1.0" encoding="utf-8"?>
+<p:sld xmlns:a="http://schemas.openxmlformats.org/drawingml/2006/main" xmlns:r="http://schemas.openxmlformats.org/officeDocument/2006/relationships" xmlns:p="http://schemas.openxmlformats.org/presentationml/2006/main">
+  <p:cSld>
+    <p:spTree>
+      <p:nvGrpSpPr>
+        <p:cNvPr id="1" name="">
+          <a:extLst>
+            <a:ext uri="{FF2B5EF4-FFF2-40B4-BE49-F238E27FC236}">
+              <a16:creationId xmlns:a16="http://schemas.microsoft.com/office/drawing/2014/main" id="{C72E501A-05C1-3DD7-CC3D-5C0D20FE4014}"/>
+            </a:ext>
+          </a:extLst>
+        </p:cNvPr>
+        <p:cNvGrpSpPr/>
+        <p:nvPr/>
+      </p:nvGrpSpPr>
+      <p:grpSpPr>
+        <a:xfrm>
+          <a:off x="0" y="0"/>
+          <a:ext cx="0" cy="0"/>
+          <a:chOff x="0" y="0"/>
+          <a:chExt cx="0" cy="0"/>
+        </a:xfrm>
+      </p:grpSpPr>
+      <p:pic>
+        <p:nvPicPr>
+          <p:cNvPr id="23" name="Picture 22">
+            <a:extLst>
+              <a:ext uri="{FF2B5EF4-FFF2-40B4-BE49-F238E27FC236}">
+                <a16:creationId xmlns:a16="http://schemas.microsoft.com/office/drawing/2014/main" id="{E8C38A18-587B-A7EC-E025-338F70FC0BB8}"/>
+              </a:ext>
+            </a:extLst>
+          </p:cNvPr>
+          <p:cNvPicPr>
+            <a:picLocks noChangeAspect="1"/>
+          </p:cNvPicPr>
+          <p:nvPr/>
+        </p:nvPicPr>
+        <p:blipFill>
+          <a:blip r:embed="rId2"/>
+          <a:stretch>
+            <a:fillRect/>
+          </a:stretch>
+        </p:blipFill>
+        <p:spPr>
+          <a:xfrm>
+            <a:off x="6376402" y="59504"/>
+            <a:ext cx="5501297" cy="4016820"/>
+          </a:xfrm>
+          <a:prstGeom prst="rect">
+            <a:avLst/>
+          </a:prstGeom>
+        </p:spPr>
+      </p:pic>
+      <p:cxnSp>
+        <p:nvCxnSpPr>
+          <p:cNvPr id="33" name="Straight Connector 32">
+            <a:extLst>
+              <a:ext uri="{FF2B5EF4-FFF2-40B4-BE49-F238E27FC236}">
+                <a16:creationId xmlns:a16="http://schemas.microsoft.com/office/drawing/2014/main" id="{E909D445-4F3E-D225-9E67-261728F594CF}"/>
+              </a:ext>
+            </a:extLst>
+          </p:cNvPr>
+          <p:cNvCxnSpPr>
+            <a:cxnSpLocks/>
+          </p:cNvCxnSpPr>
+          <p:nvPr/>
+        </p:nvCxnSpPr>
+        <p:spPr>
+          <a:xfrm flipV="1">
+            <a:off x="7810631" y="2344258"/>
+            <a:ext cx="2006469" cy="2170547"/>
+          </a:xfrm>
+          <a:prstGeom prst="line">
+            <a:avLst/>
+          </a:prstGeom>
+          <a:noFill/>
+          <a:ln w="9525" cap="flat" cmpd="sng" algn="ctr">
+            <a:solidFill>
+              <a:srgbClr val="ED1C24"/>
+            </a:solidFill>
+            <a:prstDash val="solid"/>
+            <a:headEnd type="none" w="lg" len="med"/>
+            <a:tailEnd type="none" w="lg" len="med"/>
+          </a:ln>
+          <a:effectLst/>
+        </p:spPr>
+      </p:cxnSp>
+      <p:cxnSp>
+        <p:nvCxnSpPr>
+          <p:cNvPr id="34" name="Straight Connector 33">
+            <a:extLst>
+              <a:ext uri="{FF2B5EF4-FFF2-40B4-BE49-F238E27FC236}">
+                <a16:creationId xmlns:a16="http://schemas.microsoft.com/office/drawing/2014/main" id="{6C777204-C710-BF18-235E-767E64798DC2}"/>
+              </a:ext>
+            </a:extLst>
+          </p:cNvPr>
+          <p:cNvCxnSpPr>
+            <a:cxnSpLocks/>
+          </p:cNvCxnSpPr>
+          <p:nvPr/>
+        </p:nvCxnSpPr>
+        <p:spPr>
+          <a:xfrm flipV="1">
+            <a:off x="7810631" y="3089612"/>
+            <a:ext cx="2006469" cy="3589219"/>
+          </a:xfrm>
+          <a:prstGeom prst="line">
+            <a:avLst/>
+          </a:prstGeom>
+          <a:noFill/>
+          <a:ln w="9525" cap="flat" cmpd="sng" algn="ctr">
+            <a:solidFill>
+              <a:srgbClr val="ED1C24"/>
+            </a:solidFill>
+            <a:prstDash val="solid"/>
+            <a:headEnd type="none" w="lg" len="med"/>
+            <a:tailEnd type="none" w="lg" len="med"/>
+          </a:ln>
+          <a:effectLst/>
+        </p:spPr>
+      </p:cxnSp>
+      <p:sp>
+        <p:nvSpPr>
+          <p:cNvPr id="43" name="Rectangle 42">
+            <a:extLst>
+              <a:ext uri="{FF2B5EF4-FFF2-40B4-BE49-F238E27FC236}">
+                <a16:creationId xmlns:a16="http://schemas.microsoft.com/office/drawing/2014/main" id="{E0698CBD-B051-EBE0-F112-823091F7D199}"/>
+              </a:ext>
+            </a:extLst>
+          </p:cNvPr>
+          <p:cNvSpPr/>
+          <p:nvPr/>
+        </p:nvSpPr>
+        <p:spPr bwMode="auto">
+          <a:xfrm>
+            <a:off x="7810631" y="4514807"/>
+            <a:ext cx="2822538" cy="2164024"/>
+          </a:xfrm>
+          <a:prstGeom prst="rect">
+            <a:avLst/>
+          </a:prstGeom>
+          <a:solidFill>
+            <a:srgbClr val="FFFFFF"/>
+          </a:solidFill>
+          <a:ln w="38100" cap="flat" cmpd="sng" algn="ctr">
+            <a:solidFill>
+              <a:srgbClr val="ED1C24"/>
+            </a:solidFill>
+            <a:prstDash val="solid"/>
+            <a:headEnd type="none" w="med" len="med"/>
+            <a:tailEnd type="none" w="med" len="med"/>
+          </a:ln>
+          <a:effectLst/>
+        </p:spPr>
+        <p:txBody>
+          <a:bodyPr rot="0" spcFirstLastPara="0" vertOverflow="overflow" horzOverflow="overflow" vert="horz" wrap="square" lIns="182880" tIns="146304" rIns="182880" bIns="146304" numCol="1" spcCol="0" rtlCol="0" fromWordArt="0" anchor="t" anchorCtr="0" forceAA="0" compatLnSpc="1">
+            <a:prstTxWarp prst="textNoShape">
+              <a:avLst/>
+            </a:prstTxWarp>
+            <a:noAutofit/>
+          </a:bodyPr>
+          <a:lstStyle/>
+          <a:p>
+            <a:pPr marL="0" marR="0" lvl="0" indent="0" defTabSz="932472" eaLnBrk="1" fontAlgn="base" latinLnBrk="0" hangingPunct="1">
+              <a:lnSpc>
+                <a:spcPct val="100000"/>
+              </a:lnSpc>
+              <a:spcBef>
+                <a:spcPct val="0"/>
+              </a:spcBef>
+              <a:spcAft>
+                <a:spcPct val="0"/>
+              </a:spcAft>
+              <a:buClrTx/>
+              <a:buSzTx/>
+              <a:buFontTx/>
+              <a:buNone/>
+              <a:tabLst/>
+              <a:defRPr/>
+            </a:pPr>
+            <a:endParaRPr kumimoji="0" lang="en-GB" sz="1800" b="0" i="0" u="none" strike="noStrike" kern="0" cap="none" spc="0" normalizeH="0" baseline="0" noProof="0" dirty="0" err="1">
+              <a:ln>
+                <a:noFill/>
+              </a:ln>
+              <a:gradFill>
+                <a:gsLst>
+                  <a:gs pos="0">
+                    <a:srgbClr val="FFFFFF"/>
+                  </a:gs>
+                  <a:gs pos="100000">
+                    <a:srgbClr val="FFFFFF"/>
+                  </a:gs>
+                </a:gsLst>
+                <a:lin ang="5400000" scaled="0"/>
+              </a:gradFill>
+              <a:effectLst/>
+              <a:uLnTx/>
+              <a:uFillTx/>
+              <a:latin typeface="Klavika Regular"/>
+              <a:ea typeface="Segoe UI" pitchFamily="34" charset="0"/>
+              <a:cs typeface="Segoe UI" pitchFamily="34" charset="0"/>
+            </a:endParaRPr>
+          </a:p>
+        </p:txBody>
+      </p:sp>
+      <p:cxnSp>
+        <p:nvCxnSpPr>
+          <p:cNvPr id="35" name="Straight Connector 34">
+            <a:extLst>
+              <a:ext uri="{FF2B5EF4-FFF2-40B4-BE49-F238E27FC236}">
+                <a16:creationId xmlns:a16="http://schemas.microsoft.com/office/drawing/2014/main" id="{419F3888-7F57-F752-7FEF-4760145DC7F0}"/>
+              </a:ext>
+            </a:extLst>
+          </p:cNvPr>
+          <p:cNvCxnSpPr>
+            <a:cxnSpLocks/>
+          </p:cNvCxnSpPr>
+          <p:nvPr/>
+        </p:nvCxnSpPr>
+        <p:spPr>
+          <a:xfrm flipV="1">
+            <a:off x="10633169" y="3095751"/>
+            <a:ext cx="206282" cy="3533649"/>
+          </a:xfrm>
+          <a:prstGeom prst="line">
+            <a:avLst/>
+          </a:prstGeom>
+          <a:noFill/>
+          <a:ln w="9525" cap="flat" cmpd="sng" algn="ctr">
+            <a:solidFill>
+              <a:srgbClr val="ED1C24"/>
+            </a:solidFill>
+            <a:prstDash val="solid"/>
+            <a:headEnd type="none" w="lg" len="med"/>
+            <a:tailEnd type="none" w="lg" len="med"/>
+          </a:ln>
+          <a:effectLst/>
+        </p:spPr>
+      </p:cxnSp>
+      <p:sp>
+        <p:nvSpPr>
+          <p:cNvPr id="36" name="Title 1">
+            <a:extLst>
+              <a:ext uri="{FF2B5EF4-FFF2-40B4-BE49-F238E27FC236}">
+                <a16:creationId xmlns:a16="http://schemas.microsoft.com/office/drawing/2014/main" id="{6E0869B1-1B63-F155-49F0-A3BA3FD289C6}"/>
+              </a:ext>
+            </a:extLst>
+          </p:cNvPr>
+          <p:cNvSpPr txBox="1">
+            <a:spLocks/>
+          </p:cNvSpPr>
+          <p:nvPr/>
+        </p:nvSpPr>
+        <p:spPr>
+          <a:xfrm>
+            <a:off x="588263" y="591790"/>
+            <a:ext cx="11018520" cy="738664"/>
+          </a:xfrm>
+          <a:prstGeom prst="rect">
+            <a:avLst/>
+          </a:prstGeom>
+        </p:spPr>
+        <p:txBody>
+          <a:bodyPr vert="horz" wrap="square" lIns="0" tIns="0" rIns="0" bIns="0" rtlCol="0" anchor="t">
+            <a:spAutoFit/>
+          </a:bodyPr>
+          <a:lstStyle>
+            <a:lvl1pPr algn="l" defTabSz="932742" rtl="0" eaLnBrk="1" latinLnBrk="0" hangingPunct="1">
+              <a:lnSpc>
+                <a:spcPct val="100000"/>
+              </a:lnSpc>
+              <a:spcBef>
+                <a:spcPct val="0"/>
+              </a:spcBef>
+              <a:buNone/>
+              <a:defRPr lang="en-US" sz="2800" b="1" kern="1200" cap="none" spc="0" baseline="0" dirty="0" smtClean="0">
+                <a:ln w="3175">
+                  <a:noFill/>
+                </a:ln>
+                <a:solidFill>
+                  <a:schemeClr val="tx1"/>
+                </a:solidFill>
+                <a:effectLst/>
+                <a:latin typeface="+mj-lt"/>
+                <a:ea typeface="+mn-ea"/>
+                <a:cs typeface="Segoe UI" pitchFamily="34" charset="0"/>
+              </a:defRPr>
+            </a:lvl1pPr>
+          </a:lstStyle>
+          <a:p>
+            <a:pPr marL="0" marR="0" lvl="0" indent="0" algn="l" defTabSz="932742" rtl="0" eaLnBrk="1" fontAlgn="auto" latinLnBrk="0" hangingPunct="1">
+              <a:lnSpc>
+                <a:spcPct val="100000"/>
+              </a:lnSpc>
+              <a:spcBef>
+                <a:spcPct val="0"/>
+              </a:spcBef>
+              <a:spcAft>
+                <a:spcPts val="0"/>
+              </a:spcAft>
+              <a:buClrTx/>
+              <a:buSzTx/>
+              <a:buFontTx/>
+              <a:buNone/>
+              <a:tabLst/>
+              <a:defRPr/>
+            </a:pPr>
+            <a:r>
+              <a:rPr kumimoji="0" lang="en-GB" sz="4800" b="1" i="0" u="none" strike="noStrike" kern="1200" cap="none" spc="0" normalizeH="0" baseline="0" noProof="0" dirty="0" err="1">
+                <a:ln w="3175">
+                  <a:noFill/>
+                </a:ln>
+                <a:solidFill>
+                  <a:srgbClr val="000000"/>
+                </a:solidFill>
+                <a:effectLst/>
+                <a:uLnTx/>
+                <a:uFillTx/>
+                <a:latin typeface="Klavika Light"/>
+                <a:ea typeface="+mn-ea"/>
+                <a:cs typeface="Segoe UI" pitchFamily="34" charset="0"/>
+              </a:rPr>
+              <a:t>snake_game</a:t>
+            </a:r>
+            <a:r>
+              <a:rPr kumimoji="0" lang="en-GB" sz="4800" b="1" i="0" u="none" strike="noStrike" kern="1200" cap="none" spc="0" normalizeH="0" baseline="0" noProof="0" dirty="0">
+                <a:ln w="3175">
+                  <a:noFill/>
+                </a:ln>
+                <a:solidFill>
+                  <a:srgbClr val="000000"/>
+                </a:solidFill>
+                <a:effectLst/>
+                <a:uLnTx/>
+                <a:uFillTx/>
+                <a:latin typeface="Klavika Light"/>
+                <a:ea typeface="+mn-ea"/>
+                <a:cs typeface="Segoe UI" pitchFamily="34" charset="0"/>
+              </a:rPr>
+              <a:t> on FPGA</a:t>
+            </a:r>
+          </a:p>
+        </p:txBody>
+      </p:sp>
+      <p:sp>
+        <p:nvSpPr>
+          <p:cNvPr id="37" name="Content Placeholder 2">
+            <a:extLst>
+              <a:ext uri="{FF2B5EF4-FFF2-40B4-BE49-F238E27FC236}">
+                <a16:creationId xmlns:a16="http://schemas.microsoft.com/office/drawing/2014/main" id="{B4D723F2-646B-8B8D-2E70-A890904CA69F}"/>
+              </a:ext>
+            </a:extLst>
+          </p:cNvPr>
+          <p:cNvSpPr txBox="1">
+            <a:spLocks/>
+          </p:cNvSpPr>
+          <p:nvPr/>
+        </p:nvSpPr>
+        <p:spPr>
+          <a:xfrm>
+            <a:off x="584200" y="1432111"/>
+            <a:ext cx="4944311" cy="4836927"/>
+          </a:xfrm>
+          <a:prstGeom prst="rect">
+            <a:avLst/>
+          </a:prstGeom>
+        </p:spPr>
+        <p:txBody>
+          <a:bodyPr vert="horz" wrap="square" lIns="0" tIns="0" rIns="0" bIns="0" rtlCol="0">
+            <a:noAutofit/>
+          </a:bodyPr>
+          <a:lstStyle>
+            <a:lvl1pPr marL="228600" marR="0" indent="-228600" algn="l" defTabSz="932742" rtl="0" eaLnBrk="1" fontAlgn="auto" latinLnBrk="0" hangingPunct="1">
+              <a:lnSpc>
+                <a:spcPct val="100000"/>
+              </a:lnSpc>
+              <a:spcBef>
+                <a:spcPts val="600"/>
+              </a:spcBef>
+              <a:spcAft>
+                <a:spcPts val="0"/>
+              </a:spcAft>
+              <a:buClr>
+                <a:schemeClr val="accent1"/>
+              </a:buClr>
+              <a:buSzPct val="90000"/>
+              <a:buFont typeface="Arial" panose="020B0604020202020204" pitchFamily="34" charset="0"/>
+              <a:buChar char="•"/>
+              <a:tabLst/>
+              <a:defRPr sz="1800" kern="1200" spc="0" baseline="0">
+                <a:solidFill>
+                  <a:schemeClr val="tx1"/>
+                </a:solidFill>
+                <a:latin typeface="+mn-lt"/>
+                <a:ea typeface="+mn-ea"/>
+                <a:cs typeface="Segoe UI" panose="020B0502040204020203" pitchFamily="34" charset="0"/>
+              </a:defRPr>
+            </a:lvl1pPr>
+            <a:lvl2pPr marL="457200" marR="0" indent="-228600" algn="l" defTabSz="932742" rtl="0" eaLnBrk="1" fontAlgn="auto" latinLnBrk="0" hangingPunct="1">
+              <a:lnSpc>
+                <a:spcPct val="100000"/>
+              </a:lnSpc>
+              <a:spcBef>
+                <a:spcPts val="300"/>
+              </a:spcBef>
+              <a:spcAft>
+                <a:spcPts val="0"/>
+              </a:spcAft>
+              <a:buClr>
+                <a:schemeClr val="accent1"/>
+              </a:buClr>
+              <a:buSzPct val="90000"/>
+              <a:buFont typeface="Arial" panose="020B0604020202020204" pitchFamily="34" charset="0"/>
+              <a:buChar char="•"/>
+              <a:tabLst/>
+              <a:defRPr sz="1600" kern="1200" spc="0" baseline="0">
+                <a:solidFill>
+                  <a:schemeClr val="tx1"/>
+                </a:solidFill>
+                <a:latin typeface="+mn-lt"/>
+                <a:ea typeface="+mn-ea"/>
+                <a:cs typeface="+mn-cs"/>
+              </a:defRPr>
+            </a:lvl2pPr>
+            <a:lvl3pPr marL="657225" marR="0" indent="-200025" algn="l" defTabSz="932742" rtl="0" eaLnBrk="1" fontAlgn="auto" latinLnBrk="0" hangingPunct="1">
+              <a:lnSpc>
+                <a:spcPct val="100000"/>
+              </a:lnSpc>
+              <a:spcBef>
+                <a:spcPts val="300"/>
+              </a:spcBef>
+              <a:spcAft>
+                <a:spcPts val="0"/>
+              </a:spcAft>
+              <a:buClr>
+                <a:schemeClr val="accent1"/>
+              </a:buClr>
+              <a:buSzPct val="90000"/>
+              <a:buFont typeface="Arial" panose="020B0604020202020204" pitchFamily="34" charset="0"/>
+              <a:buChar char="•"/>
+              <a:tabLst/>
+              <a:defRPr sz="1200" kern="1200" spc="0" baseline="0">
+                <a:solidFill>
+                  <a:schemeClr val="tx1"/>
+                </a:solidFill>
+                <a:latin typeface="+mn-lt"/>
+                <a:ea typeface="+mn-ea"/>
+                <a:cs typeface="+mn-cs"/>
+              </a:defRPr>
+            </a:lvl3pPr>
+            <a:lvl4pPr marL="842963" marR="0" indent="-180975" algn="l" defTabSz="932742" rtl="0" eaLnBrk="1" fontAlgn="auto" latinLnBrk="0" hangingPunct="1">
+              <a:lnSpc>
+                <a:spcPct val="100000"/>
+              </a:lnSpc>
+              <a:spcBef>
+                <a:spcPts val="300"/>
+              </a:spcBef>
+              <a:spcAft>
+                <a:spcPts val="0"/>
+              </a:spcAft>
+              <a:buClr>
+                <a:schemeClr val="accent1"/>
+              </a:buClr>
+              <a:buSzPct val="90000"/>
+              <a:buFont typeface="Arial" panose="020B0604020202020204" pitchFamily="34" charset="0"/>
+              <a:buChar char="•"/>
+              <a:tabLst/>
+              <a:defRPr sz="1100" kern="1200" spc="0" baseline="0">
+                <a:solidFill>
+                  <a:schemeClr val="tx1"/>
+                </a:solidFill>
+                <a:latin typeface="+mn-lt"/>
+                <a:ea typeface="+mn-ea"/>
+                <a:cs typeface="+mn-cs"/>
+              </a:defRPr>
+            </a:lvl4pPr>
+            <a:lvl5pPr marL="1023938" marR="0" indent="-168275" algn="l" defTabSz="932742" rtl="0" eaLnBrk="1" fontAlgn="auto" latinLnBrk="0" hangingPunct="1">
+              <a:lnSpc>
+                <a:spcPct val="100000"/>
+              </a:lnSpc>
+              <a:spcBef>
+                <a:spcPts val="300"/>
+              </a:spcBef>
+              <a:spcAft>
+                <a:spcPts val="0"/>
+              </a:spcAft>
+              <a:buClr>
+                <a:schemeClr val="accent1"/>
+              </a:buClr>
+              <a:buSzPct val="90000"/>
+              <a:buFont typeface="Arial" panose="020B0604020202020204" pitchFamily="34" charset="0"/>
+              <a:buChar char="•"/>
+              <a:tabLst/>
+              <a:defRPr sz="1100" kern="1200" spc="0" baseline="0">
+                <a:solidFill>
+                  <a:schemeClr val="tx1"/>
+                </a:solidFill>
+                <a:latin typeface="+mn-lt"/>
+                <a:ea typeface="+mn-ea"/>
+                <a:cs typeface="+mn-cs"/>
+              </a:defRPr>
+            </a:lvl5pPr>
+            <a:lvl6pPr marL="2565040" indent="-233186" algn="l" defTabSz="932742" rtl="0" eaLnBrk="1" latinLnBrk="0" hangingPunct="1">
+              <a:spcBef>
+                <a:spcPct val="20000"/>
+              </a:spcBef>
+              <a:buFont typeface="Arial" pitchFamily="34" charset="0"/>
+              <a:buChar char="•"/>
+              <a:defRPr sz="2000" kern="1200">
+                <a:solidFill>
+                  <a:schemeClr val="tx1"/>
+                </a:solidFill>
+                <a:latin typeface="+mn-lt"/>
+                <a:ea typeface="+mn-ea"/>
+                <a:cs typeface="+mn-cs"/>
+              </a:defRPr>
+            </a:lvl6pPr>
+            <a:lvl7pPr marL="3031412" indent="-233186" algn="l" defTabSz="932742" rtl="0" eaLnBrk="1" latinLnBrk="0" hangingPunct="1">
+              <a:spcBef>
+                <a:spcPct val="20000"/>
+              </a:spcBef>
+              <a:buFont typeface="Arial" pitchFamily="34" charset="0"/>
+              <a:buChar char="•"/>
+              <a:defRPr sz="2000" kern="1200">
+                <a:solidFill>
+                  <a:schemeClr val="tx1"/>
+                </a:solidFill>
+                <a:latin typeface="+mn-lt"/>
+                <a:ea typeface="+mn-ea"/>
+                <a:cs typeface="+mn-cs"/>
+              </a:defRPr>
+            </a:lvl7pPr>
+            <a:lvl8pPr marL="3497783" indent="-233186" algn="l" defTabSz="932742" rtl="0" eaLnBrk="1" latinLnBrk="0" hangingPunct="1">
+              <a:spcBef>
+                <a:spcPct val="20000"/>
+              </a:spcBef>
+              <a:buFont typeface="Arial" pitchFamily="34" charset="0"/>
+              <a:buChar char="•"/>
+              <a:defRPr sz="2000" kern="1200">
+                <a:solidFill>
+                  <a:schemeClr val="tx1"/>
+                </a:solidFill>
+                <a:latin typeface="+mn-lt"/>
+                <a:ea typeface="+mn-ea"/>
+                <a:cs typeface="+mn-cs"/>
+              </a:defRPr>
+            </a:lvl8pPr>
+            <a:lvl9pPr marL="3964155" indent="-233186" algn="l" defTabSz="932742" rtl="0" eaLnBrk="1" latinLnBrk="0" hangingPunct="1">
+              <a:spcBef>
+                <a:spcPct val="20000"/>
+              </a:spcBef>
+              <a:buFont typeface="Arial" pitchFamily="34" charset="0"/>
+              <a:buChar char="•"/>
+              <a:defRPr sz="2000" kern="1200">
+                <a:solidFill>
+                  <a:schemeClr val="tx1"/>
+                </a:solidFill>
+                <a:latin typeface="+mn-lt"/>
+                <a:ea typeface="+mn-ea"/>
+                <a:cs typeface="+mn-cs"/>
+              </a:defRPr>
+            </a:lvl9pPr>
+          </a:lstStyle>
+          <a:p>
+            <a:pPr marL="228600" marR="0" lvl="0" indent="-228600" algn="l" defTabSz="932742" rtl="0" eaLnBrk="1" fontAlgn="auto" latinLnBrk="0" hangingPunct="1">
+              <a:lnSpc>
+                <a:spcPct val="100000"/>
+              </a:lnSpc>
+              <a:spcBef>
+                <a:spcPts val="600"/>
+              </a:spcBef>
+              <a:spcAft>
+                <a:spcPts val="0"/>
+              </a:spcAft>
+              <a:buClr>
+                <a:srgbClr val="636466"/>
+              </a:buClr>
+              <a:buSzPct val="90000"/>
+              <a:buFont typeface="Arial" panose="020B0604020202020204" pitchFamily="34" charset="0"/>
+              <a:buChar char="•"/>
+              <a:tabLst/>
+              <a:defRPr/>
+            </a:pPr>
+            <a:r>
+              <a:rPr kumimoji="0" lang="en-US" sz="2400" b="0" i="0" u="none" strike="noStrike" kern="1200" cap="none" spc="0" normalizeH="0" baseline="0" noProof="0" dirty="0">
+                <a:ln>
+                  <a:noFill/>
+                </a:ln>
+                <a:solidFill>
+                  <a:srgbClr val="000000"/>
+                </a:solidFill>
+                <a:effectLst/>
+                <a:uLnTx/>
+                <a:uFillTx/>
+                <a:latin typeface="Klavika Regular"/>
+                <a:ea typeface="+mn-ea"/>
+                <a:cs typeface="Segoe UI" panose="020B0502040204020203" pitchFamily="34" charset="0"/>
+              </a:rPr>
+              <a:t>Press any direction to start playing</a:t>
+            </a:r>
+          </a:p>
+          <a:p>
+            <a:pPr marL="228600" marR="0" lvl="0" indent="-228600" algn="l" defTabSz="932742" rtl="0" eaLnBrk="1" fontAlgn="auto" latinLnBrk="0" hangingPunct="1">
+              <a:lnSpc>
+                <a:spcPct val="100000"/>
+              </a:lnSpc>
+              <a:spcBef>
+                <a:spcPts val="600"/>
+              </a:spcBef>
+              <a:spcAft>
+                <a:spcPts val="0"/>
+              </a:spcAft>
+              <a:buClr>
+                <a:srgbClr val="636466"/>
+              </a:buClr>
+              <a:buSzPct val="90000"/>
+              <a:buFont typeface="Arial" panose="020B0604020202020204" pitchFamily="34" charset="0"/>
+              <a:buChar char="•"/>
+              <a:tabLst/>
+              <a:defRPr/>
+            </a:pPr>
+            <a:r>
+              <a:rPr kumimoji="0" lang="en-US" sz="2400" b="0" i="0" u="none" strike="noStrike" kern="1200" cap="none" spc="0" normalizeH="0" baseline="0" noProof="0" dirty="0">
+                <a:ln>
+                  <a:noFill/>
+                </a:ln>
+                <a:solidFill>
+                  <a:srgbClr val="000000"/>
+                </a:solidFill>
+                <a:effectLst/>
+                <a:uLnTx/>
+                <a:uFillTx/>
+                <a:latin typeface="Klavika Regular"/>
+                <a:ea typeface="+mn-ea"/>
+                <a:cs typeface="Segoe UI" panose="020B0502040204020203" pitchFamily="34" charset="0"/>
+              </a:rPr>
+              <a:t>Get to 10 points to win! </a:t>
+            </a:r>
+          </a:p>
+          <a:p>
+            <a:pPr>
+              <a:buClr>
+                <a:srgbClr val="636466"/>
+              </a:buClr>
+              <a:defRPr/>
+            </a:pPr>
+            <a:r>
+              <a:rPr kumimoji="0" lang="en-US" sz="2400" b="0" i="0" u="none" strike="noStrike" kern="1200" cap="none" spc="0" normalizeH="0" baseline="0" noProof="0" dirty="0">
+                <a:ln>
+                  <a:noFill/>
+                </a:ln>
+                <a:solidFill>
+                  <a:srgbClr val="000000"/>
+                </a:solidFill>
+                <a:effectLst/>
+                <a:uLnTx/>
+                <a:uFillTx/>
+                <a:latin typeface="Klavika Regular"/>
+                <a:ea typeface="+mn-ea"/>
+                <a:cs typeface="Segoe UI" panose="020B0502040204020203" pitchFamily="34" charset="0"/>
+              </a:rPr>
+              <a:t>Every time you score a point the snake becomes faster. This increase can be turned off using this switch.</a:t>
+            </a:r>
+          </a:p>
+          <a:p>
+            <a:pPr marL="228600" marR="0" lvl="0" indent="-228600" algn="l" defTabSz="932742" rtl="0" eaLnBrk="1" fontAlgn="auto" latinLnBrk="0" hangingPunct="1">
+              <a:lnSpc>
+                <a:spcPct val="100000"/>
+              </a:lnSpc>
+              <a:spcBef>
+                <a:spcPts val="600"/>
+              </a:spcBef>
+              <a:spcAft>
+                <a:spcPts val="0"/>
+              </a:spcAft>
+              <a:buClr>
+                <a:srgbClr val="636466"/>
+              </a:buClr>
+              <a:buSzPct val="90000"/>
+              <a:buFont typeface="Arial" panose="020B0604020202020204" pitchFamily="34" charset="0"/>
+              <a:buChar char="•"/>
+              <a:tabLst/>
+              <a:defRPr/>
+            </a:pPr>
+            <a:r>
+              <a:rPr kumimoji="0" lang="en-US" sz="2400" b="0" i="0" u="none" strike="noStrike" kern="1200" cap="none" spc="0" normalizeH="0" baseline="0" noProof="0" dirty="0">
+                <a:ln>
+                  <a:noFill/>
+                </a:ln>
+                <a:solidFill>
+                  <a:srgbClr val="000000"/>
+                </a:solidFill>
+                <a:effectLst/>
+                <a:uLnTx/>
+                <a:uFillTx/>
+                <a:latin typeface="Klavika Regular"/>
+                <a:ea typeface="+mn-ea"/>
+                <a:cs typeface="Segoe UI" panose="020B0502040204020203" pitchFamily="34" charset="0"/>
+              </a:rPr>
+              <a:t>Score is shown on the 7-Seg displays.</a:t>
+            </a:r>
+          </a:p>
+          <a:p>
+            <a:pPr marL="228600" marR="0" lvl="0" indent="-228600" algn="l" defTabSz="932742" rtl="0" eaLnBrk="1" fontAlgn="auto" latinLnBrk="0" hangingPunct="1">
+              <a:lnSpc>
+                <a:spcPct val="100000"/>
+              </a:lnSpc>
+              <a:spcBef>
+                <a:spcPts val="600"/>
+              </a:spcBef>
+              <a:spcAft>
+                <a:spcPts val="0"/>
+              </a:spcAft>
+              <a:buClr>
+                <a:srgbClr val="636466"/>
+              </a:buClr>
+              <a:buSzPct val="90000"/>
+              <a:buFont typeface="Arial" panose="020B0604020202020204" pitchFamily="34" charset="0"/>
+              <a:buChar char="•"/>
+              <a:tabLst/>
+              <a:defRPr/>
+            </a:pPr>
+            <a:r>
+              <a:rPr kumimoji="0" lang="en-US" sz="2400" b="0" i="0" u="none" strike="noStrike" kern="1200" cap="none" spc="0" normalizeH="0" baseline="0" noProof="0" dirty="0">
+                <a:ln>
+                  <a:noFill/>
+                </a:ln>
+                <a:solidFill>
+                  <a:srgbClr val="000000"/>
+                </a:solidFill>
+                <a:effectLst/>
+                <a:uLnTx/>
+                <a:uFillTx/>
+                <a:latin typeface="Klavika Regular"/>
+                <a:ea typeface="+mn-ea"/>
+                <a:cs typeface="Segoe UI" panose="020B0502040204020203" pitchFamily="34" charset="0"/>
+              </a:rPr>
+              <a:t>You lose if you touch an edge or eat part of yourself.</a:t>
+            </a:r>
+          </a:p>
+          <a:p>
+            <a:pPr marL="228600" marR="0" lvl="0" indent="-228600" algn="l" defTabSz="932742" rtl="0" eaLnBrk="1" fontAlgn="auto" latinLnBrk="0" hangingPunct="1">
+              <a:lnSpc>
+                <a:spcPct val="100000"/>
+              </a:lnSpc>
+              <a:spcBef>
+                <a:spcPts val="600"/>
+              </a:spcBef>
+              <a:spcAft>
+                <a:spcPts val="0"/>
+              </a:spcAft>
+              <a:buClr>
+                <a:srgbClr val="636466"/>
+              </a:buClr>
+              <a:buSzPct val="90000"/>
+              <a:buFont typeface="Arial" panose="020B0604020202020204" pitchFamily="34" charset="0"/>
+              <a:buChar char="•"/>
+              <a:tabLst/>
+              <a:defRPr/>
+            </a:pPr>
+            <a:r>
+              <a:rPr kumimoji="0" lang="en-US" sz="2400" b="0" i="0" u="none" strike="noStrike" kern="1200" cap="none" spc="0" normalizeH="0" baseline="0" noProof="0" dirty="0">
+                <a:ln>
+                  <a:noFill/>
+                </a:ln>
+                <a:solidFill>
+                  <a:srgbClr val="000000"/>
+                </a:solidFill>
+                <a:effectLst/>
+                <a:uLnTx/>
+                <a:uFillTx/>
+                <a:latin typeface="Klavika Regular"/>
+                <a:ea typeface="+mn-ea"/>
+                <a:cs typeface="Segoe UI" panose="020B0502040204020203" pitchFamily="34" charset="0"/>
+              </a:rPr>
+              <a:t>Use the reset switch to start over in the event of a win or lose screen</a:t>
+            </a:r>
+          </a:p>
+          <a:p>
+            <a:pPr marL="228600" marR="0" lvl="0" indent="-228600" algn="l" defTabSz="932742" rtl="0" eaLnBrk="1" fontAlgn="auto" latinLnBrk="0" hangingPunct="1">
+              <a:lnSpc>
+                <a:spcPct val="100000"/>
+              </a:lnSpc>
+              <a:spcBef>
+                <a:spcPts val="600"/>
+              </a:spcBef>
+              <a:spcAft>
+                <a:spcPts val="0"/>
+              </a:spcAft>
+              <a:buClr>
+                <a:srgbClr val="636466"/>
+              </a:buClr>
+              <a:buSzPct val="90000"/>
+              <a:buFont typeface="Arial" panose="020B0604020202020204" pitchFamily="34" charset="0"/>
+              <a:buChar char="•"/>
+              <a:tabLst/>
+              <a:defRPr/>
+            </a:pPr>
+            <a:r>
+              <a:rPr kumimoji="0" lang="en-US" sz="2400" b="0" i="0" u="none" strike="noStrike" kern="1200" cap="none" spc="0" normalizeH="0" baseline="0" noProof="0" dirty="0">
+                <a:ln>
+                  <a:noFill/>
+                </a:ln>
+                <a:solidFill>
+                  <a:srgbClr val="000000"/>
+                </a:solidFill>
+                <a:effectLst/>
+                <a:uLnTx/>
+                <a:uFillTx/>
+                <a:latin typeface="Klavika Regular"/>
+                <a:ea typeface="+mn-ea"/>
+                <a:cs typeface="Segoe UI" panose="020B0502040204020203" pitchFamily="34" charset="0"/>
+              </a:rPr>
+              <a:t>The directions the press buttons control are shown to the right.</a:t>
+            </a:r>
+          </a:p>
+        </p:txBody>
+      </p:sp>
+      <p:sp>
+        <p:nvSpPr>
+          <p:cNvPr id="38" name="Rectangle 37">
+            <a:extLst>
+              <a:ext uri="{FF2B5EF4-FFF2-40B4-BE49-F238E27FC236}">
+                <a16:creationId xmlns:a16="http://schemas.microsoft.com/office/drawing/2014/main" id="{37EE9CA3-AB6E-3823-8AF1-37F15DC79CA9}"/>
+              </a:ext>
+            </a:extLst>
+          </p:cNvPr>
+          <p:cNvSpPr/>
+          <p:nvPr/>
+        </p:nvSpPr>
+        <p:spPr bwMode="auto">
+          <a:xfrm>
+            <a:off x="8420100" y="2653195"/>
+            <a:ext cx="1249962" cy="395951"/>
+          </a:xfrm>
+          <a:prstGeom prst="rect">
+            <a:avLst/>
+          </a:prstGeom>
+          <a:noFill/>
+          <a:ln w="38100" cap="flat" cmpd="sng" algn="ctr">
+            <a:solidFill>
+              <a:schemeClr val="accent2"/>
+            </a:solidFill>
+            <a:prstDash val="solid"/>
+            <a:headEnd type="none" w="med" len="med"/>
+            <a:tailEnd type="none" w="med" len="med"/>
+          </a:ln>
+          <a:effectLst/>
+        </p:spPr>
+        <p:txBody>
+          <a:bodyPr rot="0" spcFirstLastPara="0" vertOverflow="overflow" horzOverflow="overflow" vert="horz" wrap="square" lIns="182880" tIns="146304" rIns="182880" bIns="146304" numCol="1" spcCol="0" rtlCol="0" fromWordArt="0" anchor="t" anchorCtr="0" forceAA="0" compatLnSpc="1">
+            <a:prstTxWarp prst="textNoShape">
+              <a:avLst/>
+            </a:prstTxWarp>
+            <a:noAutofit/>
+          </a:bodyPr>
+          <a:lstStyle/>
+          <a:p>
+            <a:pPr marL="0" marR="0" lvl="0" indent="0" defTabSz="932472" eaLnBrk="1" fontAlgn="base" latinLnBrk="0" hangingPunct="1">
+              <a:lnSpc>
+                <a:spcPct val="100000"/>
+              </a:lnSpc>
+              <a:spcBef>
+                <a:spcPct val="0"/>
+              </a:spcBef>
+              <a:spcAft>
+                <a:spcPct val="0"/>
+              </a:spcAft>
+              <a:buClrTx/>
+              <a:buSzTx/>
+              <a:buFontTx/>
+              <a:buNone/>
+              <a:tabLst/>
+              <a:defRPr/>
+            </a:pPr>
+            <a:endParaRPr kumimoji="0" lang="en-GB" sz="1800" b="0" i="0" u="none" strike="noStrike" kern="0" cap="none" spc="0" normalizeH="0" baseline="0" noProof="0" dirty="0" err="1">
+              <a:ln>
+                <a:noFill/>
+              </a:ln>
+              <a:gradFill>
+                <a:gsLst>
+                  <a:gs pos="0">
+                    <a:srgbClr val="FFFFFF"/>
+                  </a:gs>
+                  <a:gs pos="100000">
+                    <a:srgbClr val="FFFFFF"/>
+                  </a:gs>
+                </a:gsLst>
+                <a:lin ang="5400000" scaled="0"/>
+              </a:gradFill>
+              <a:effectLst/>
+              <a:uLnTx/>
+              <a:uFillTx/>
+              <a:latin typeface="Klavika Regular"/>
+              <a:ea typeface="Segoe UI" pitchFamily="34" charset="0"/>
+              <a:cs typeface="Segoe UI" pitchFamily="34" charset="0"/>
+            </a:endParaRPr>
+          </a:p>
+        </p:txBody>
+      </p:sp>
+      <p:cxnSp>
+        <p:nvCxnSpPr>
+          <p:cNvPr id="39" name="Straight Arrow Connector 38">
+            <a:extLst>
+              <a:ext uri="{FF2B5EF4-FFF2-40B4-BE49-F238E27FC236}">
+                <a16:creationId xmlns:a16="http://schemas.microsoft.com/office/drawing/2014/main" id="{E5C55A6C-32D1-A12E-C2F6-7F7027B36251}"/>
+              </a:ext>
+            </a:extLst>
+          </p:cNvPr>
+          <p:cNvCxnSpPr>
+            <a:cxnSpLocks/>
+            <a:endCxn id="38" idx="1"/>
+          </p:cNvCxnSpPr>
+          <p:nvPr/>
+        </p:nvCxnSpPr>
+        <p:spPr>
+          <a:xfrm flipV="1">
+            <a:off x="5480050" y="2851171"/>
+            <a:ext cx="2940050" cy="813581"/>
+          </a:xfrm>
+          <a:prstGeom prst="straightConnector1">
+            <a:avLst/>
+          </a:prstGeom>
+          <a:noFill/>
+          <a:ln w="12700" cap="flat" cmpd="sng" algn="ctr">
+            <a:solidFill>
+              <a:schemeClr val="accent2"/>
+            </a:solidFill>
+            <a:prstDash val="solid"/>
+            <a:headEnd type="none" w="lg" len="med"/>
+            <a:tailEnd type="triangle"/>
+          </a:ln>
+          <a:effectLst/>
+        </p:spPr>
+      </p:cxnSp>
+      <p:sp>
+        <p:nvSpPr>
+          <p:cNvPr id="40" name="Rectangle 39">
+            <a:extLst>
+              <a:ext uri="{FF2B5EF4-FFF2-40B4-BE49-F238E27FC236}">
+                <a16:creationId xmlns:a16="http://schemas.microsoft.com/office/drawing/2014/main" id="{8174FD0D-E5C9-9E87-1FE4-C8E94357998A}"/>
+              </a:ext>
+            </a:extLst>
+          </p:cNvPr>
+          <p:cNvSpPr/>
+          <p:nvPr/>
+        </p:nvSpPr>
+        <p:spPr bwMode="auto">
+          <a:xfrm>
+            <a:off x="9817101" y="2357087"/>
+            <a:ext cx="1022350" cy="738664"/>
+          </a:xfrm>
+          <a:prstGeom prst="rect">
+            <a:avLst/>
+          </a:prstGeom>
+          <a:noFill/>
+          <a:ln w="38100" cap="flat" cmpd="sng" algn="ctr">
+            <a:solidFill>
+              <a:srgbClr val="ED1C24"/>
+            </a:solidFill>
+            <a:prstDash val="solid"/>
+            <a:headEnd type="none" w="med" len="med"/>
+            <a:tailEnd type="none" w="med" len="med"/>
+          </a:ln>
+          <a:effectLst/>
+        </p:spPr>
+        <p:txBody>
+          <a:bodyPr rot="0" spcFirstLastPara="0" vertOverflow="overflow" horzOverflow="overflow" vert="horz" wrap="square" lIns="182880" tIns="146304" rIns="182880" bIns="146304" numCol="1" spcCol="0" rtlCol="0" fromWordArt="0" anchor="t" anchorCtr="0" forceAA="0" compatLnSpc="1">
+            <a:prstTxWarp prst="textNoShape">
+              <a:avLst/>
+            </a:prstTxWarp>
+            <a:noAutofit/>
+          </a:bodyPr>
+          <a:lstStyle/>
+          <a:p>
+            <a:pPr marL="0" marR="0" lvl="0" indent="0" defTabSz="932472" eaLnBrk="1" fontAlgn="base" latinLnBrk="0" hangingPunct="1">
+              <a:lnSpc>
+                <a:spcPct val="100000"/>
+              </a:lnSpc>
+              <a:spcBef>
+                <a:spcPct val="0"/>
+              </a:spcBef>
+              <a:spcAft>
+                <a:spcPct val="0"/>
+              </a:spcAft>
+              <a:buClrTx/>
+              <a:buSzTx/>
+              <a:buFontTx/>
+              <a:buNone/>
+              <a:tabLst/>
+              <a:defRPr/>
+            </a:pPr>
+            <a:endParaRPr kumimoji="0" lang="en-GB" sz="1800" b="0" i="0" u="none" strike="noStrike" kern="0" cap="none" spc="0" normalizeH="0" baseline="0" noProof="0" dirty="0" err="1">
+              <a:ln>
+                <a:noFill/>
+              </a:ln>
+              <a:gradFill>
+                <a:gsLst>
+                  <a:gs pos="0">
+                    <a:srgbClr val="FFFFFF"/>
+                  </a:gs>
+                  <a:gs pos="100000">
+                    <a:srgbClr val="FFFFFF"/>
+                  </a:gs>
+                </a:gsLst>
+                <a:lin ang="5400000" scaled="0"/>
+              </a:gradFill>
+              <a:effectLst/>
+              <a:uLnTx/>
+              <a:uFillTx/>
+              <a:latin typeface="Klavika Regular"/>
+              <a:ea typeface="Segoe UI" pitchFamily="34" charset="0"/>
+              <a:cs typeface="Segoe UI" pitchFamily="34" charset="0"/>
+            </a:endParaRPr>
+          </a:p>
+        </p:txBody>
+      </p:sp>
+      <p:cxnSp>
+        <p:nvCxnSpPr>
+          <p:cNvPr id="41" name="Straight Arrow Connector 40">
+            <a:extLst>
+              <a:ext uri="{FF2B5EF4-FFF2-40B4-BE49-F238E27FC236}">
+                <a16:creationId xmlns:a16="http://schemas.microsoft.com/office/drawing/2014/main" id="{21EFB058-F53E-0771-F1E2-DFA85ABEC78E}"/>
+              </a:ext>
+            </a:extLst>
+          </p:cNvPr>
+          <p:cNvCxnSpPr>
+            <a:cxnSpLocks/>
+          </p:cNvCxnSpPr>
+          <p:nvPr/>
+        </p:nvCxnSpPr>
+        <p:spPr>
+          <a:xfrm>
+            <a:off x="5323712" y="1644127"/>
+            <a:ext cx="4493388" cy="966536"/>
+          </a:xfrm>
+          <a:prstGeom prst="straightConnector1">
+            <a:avLst/>
+          </a:prstGeom>
+          <a:noFill/>
+          <a:ln w="12700" cap="flat" cmpd="sng" algn="ctr">
+            <a:solidFill>
+              <a:srgbClr val="ED1C24"/>
+            </a:solidFill>
+            <a:prstDash val="solid"/>
+            <a:headEnd type="none" w="lg" len="med"/>
+            <a:tailEnd type="triangle"/>
+          </a:ln>
+          <a:effectLst/>
+        </p:spPr>
+      </p:cxnSp>
+      <p:cxnSp>
+        <p:nvCxnSpPr>
+          <p:cNvPr id="42" name="Straight Arrow Connector 41">
+            <a:extLst>
+              <a:ext uri="{FF2B5EF4-FFF2-40B4-BE49-F238E27FC236}">
+                <a16:creationId xmlns:a16="http://schemas.microsoft.com/office/drawing/2014/main" id="{24A06D2E-9D0C-7355-1360-A4591E903CC8}"/>
+              </a:ext>
+            </a:extLst>
+          </p:cNvPr>
+          <p:cNvCxnSpPr>
+            <a:cxnSpLocks/>
+            <a:endCxn id="56" idx="2"/>
+          </p:cNvCxnSpPr>
+          <p:nvPr/>
+        </p:nvCxnSpPr>
+        <p:spPr>
+          <a:xfrm flipV="1">
+            <a:off x="5283200" y="3936261"/>
+            <a:ext cx="5697315" cy="883389"/>
+          </a:xfrm>
+          <a:prstGeom prst="straightConnector1">
+            <a:avLst/>
+          </a:prstGeom>
+          <a:noFill/>
+          <a:ln w="12700" cap="flat" cmpd="sng" algn="ctr">
+            <a:solidFill>
+              <a:srgbClr val="00B050"/>
+            </a:solidFill>
+            <a:prstDash val="solid"/>
+            <a:headEnd type="none" w="lg" len="med"/>
+            <a:tailEnd type="triangle"/>
+          </a:ln>
+          <a:effectLst/>
+        </p:spPr>
+      </p:cxnSp>
+      <p:grpSp>
+        <p:nvGrpSpPr>
+          <p:cNvPr id="20" name="Group 19">
+            <a:extLst>
+              <a:ext uri="{FF2B5EF4-FFF2-40B4-BE49-F238E27FC236}">
+                <a16:creationId xmlns:a16="http://schemas.microsoft.com/office/drawing/2014/main" id="{3B537977-9098-E75E-BD8C-DC9CF847D02B}"/>
+              </a:ext>
+            </a:extLst>
+          </p:cNvPr>
+          <p:cNvGrpSpPr/>
+          <p:nvPr/>
+        </p:nvGrpSpPr>
+        <p:grpSpPr>
+          <a:xfrm>
+            <a:off x="8066373" y="4609516"/>
+            <a:ext cx="2362719" cy="1966410"/>
+            <a:chOff x="6581727" y="4923554"/>
+            <a:chExt cx="2362719" cy="1966410"/>
+          </a:xfrm>
+        </p:grpSpPr>
+        <p:grpSp>
+          <p:nvGrpSpPr>
+            <p:cNvPr id="44" name="Group 43">
+              <a:extLst>
+                <a:ext uri="{FF2B5EF4-FFF2-40B4-BE49-F238E27FC236}">
+                  <a16:creationId xmlns:a16="http://schemas.microsoft.com/office/drawing/2014/main" id="{B2AD6D59-245E-B876-74A9-E9DC099F9372}"/>
+                </a:ext>
+              </a:extLst>
+            </p:cNvPr>
+            <p:cNvGrpSpPr/>
+            <p:nvPr/>
+          </p:nvGrpSpPr>
+          <p:grpSpPr>
+            <a:xfrm>
+              <a:off x="8030045" y="4924229"/>
+              <a:ext cx="914401" cy="914401"/>
+              <a:chOff x="6777933" y="4956926"/>
+              <a:chExt cx="914401" cy="914401"/>
+            </a:xfrm>
+          </p:grpSpPr>
+          <p:pic>
+            <p:nvPicPr>
+              <p:cNvPr id="45" name="Graphic 44" descr="Chevron arrows with solid fill">
+                <a:extLst>
+                  <a:ext uri="{FF2B5EF4-FFF2-40B4-BE49-F238E27FC236}">
+                    <a16:creationId xmlns:a16="http://schemas.microsoft.com/office/drawing/2014/main" id="{646DEA11-8BFC-6D40-2259-6E8A3DE0C0D7}"/>
+                  </a:ext>
+                </a:extLst>
+              </p:cNvPr>
+              <p:cNvPicPr>
+                <a:picLocks noChangeAspect="1"/>
+              </p:cNvPicPr>
+              <p:nvPr/>
+            </p:nvPicPr>
+            <p:blipFill>
+              <a:blip r:embed="rId3">
+                <a:extLst>
+                  <a:ext uri="{96DAC541-7B7A-43D3-8B79-37D633B846F1}">
+                    <asvg:svgBlip xmlns:asvg="http://schemas.microsoft.com/office/drawing/2016/SVG/main" r:embed="rId4"/>
+                  </a:ext>
+                </a:extLst>
+              </a:blip>
+              <a:stretch>
+                <a:fillRect/>
+              </a:stretch>
+            </p:blipFill>
+            <p:spPr>
+              <a:xfrm rot="10800000">
+                <a:off x="6777934" y="4956926"/>
+                <a:ext cx="914400" cy="914400"/>
+              </a:xfrm>
+              <a:prstGeom prst="rect">
+                <a:avLst/>
+              </a:prstGeom>
+            </p:spPr>
+          </p:pic>
+          <p:sp>
+            <p:nvSpPr>
+              <p:cNvPr id="46" name="Rectangle 45">
+                <a:extLst>
+                  <a:ext uri="{FF2B5EF4-FFF2-40B4-BE49-F238E27FC236}">
+                    <a16:creationId xmlns:a16="http://schemas.microsoft.com/office/drawing/2014/main" id="{3396E3D8-74CF-3A30-4D1B-4A8EE929845D}"/>
+                  </a:ext>
+                </a:extLst>
+              </p:cNvPr>
+              <p:cNvSpPr/>
+              <p:nvPr/>
+            </p:nvSpPr>
+            <p:spPr bwMode="auto">
+              <a:xfrm>
+                <a:off x="6777933" y="4956926"/>
+                <a:ext cx="914401" cy="914401"/>
+              </a:xfrm>
+              <a:prstGeom prst="rect">
+                <a:avLst/>
+              </a:prstGeom>
+              <a:noFill/>
+              <a:ln w="38100" cap="flat" cmpd="sng" algn="ctr">
+                <a:solidFill>
+                  <a:srgbClr val="000000"/>
+                </a:solidFill>
+                <a:prstDash val="solid"/>
+                <a:headEnd type="none" w="med" len="med"/>
+                <a:tailEnd type="none" w="med" len="med"/>
+              </a:ln>
+              <a:effectLst/>
+            </p:spPr>
+            <p:txBody>
+              <a:bodyPr rot="0" spcFirstLastPara="0" vertOverflow="overflow" horzOverflow="overflow" vert="horz" wrap="square" lIns="182880" tIns="146304" rIns="182880" bIns="146304" numCol="1" spcCol="0" rtlCol="0" fromWordArt="0" anchor="t" anchorCtr="0" forceAA="0" compatLnSpc="1">
+                <a:prstTxWarp prst="textNoShape">
+                  <a:avLst/>
+                </a:prstTxWarp>
+                <a:noAutofit/>
+              </a:bodyPr>
+              <a:lstStyle/>
+              <a:p>
+                <a:pPr marL="0" marR="0" lvl="0" indent="0" defTabSz="932472" eaLnBrk="1" fontAlgn="base" latinLnBrk="0" hangingPunct="1">
+                  <a:lnSpc>
+                    <a:spcPct val="100000"/>
+                  </a:lnSpc>
+                  <a:spcBef>
+                    <a:spcPct val="0"/>
+                  </a:spcBef>
+                  <a:spcAft>
+                    <a:spcPct val="0"/>
+                  </a:spcAft>
+                  <a:buClrTx/>
+                  <a:buSzTx/>
+                  <a:buFontTx/>
+                  <a:buNone/>
+                  <a:tabLst/>
+                  <a:defRPr/>
+                </a:pPr>
+                <a:endParaRPr kumimoji="0" lang="en-GB" sz="1800" b="0" i="0" u="none" strike="noStrike" kern="0" cap="none" spc="0" normalizeH="0" baseline="0" noProof="0" dirty="0" err="1">
+                  <a:ln>
+                    <a:noFill/>
+                  </a:ln>
+                  <a:gradFill>
+                    <a:gsLst>
+                      <a:gs pos="0">
+                        <a:srgbClr val="FFFFFF"/>
+                      </a:gs>
+                      <a:gs pos="100000">
+                        <a:srgbClr val="FFFFFF"/>
+                      </a:gs>
+                    </a:gsLst>
+                    <a:lin ang="5400000" scaled="0"/>
+                  </a:gradFill>
+                  <a:effectLst/>
+                  <a:uLnTx/>
+                  <a:uFillTx/>
+                  <a:latin typeface="Klavika Regular"/>
+                  <a:ea typeface="Segoe UI" pitchFamily="34" charset="0"/>
+                  <a:cs typeface="Segoe UI" pitchFamily="34" charset="0"/>
+                </a:endParaRPr>
+              </a:p>
+            </p:txBody>
+          </p:sp>
+        </p:grpSp>
+        <p:grpSp>
+          <p:nvGrpSpPr>
+            <p:cNvPr id="47" name="Group 46">
+              <a:extLst>
+                <a:ext uri="{FF2B5EF4-FFF2-40B4-BE49-F238E27FC236}">
+                  <a16:creationId xmlns:a16="http://schemas.microsoft.com/office/drawing/2014/main" id="{6A969915-7478-54A0-E9E0-9FE2FB0BBA64}"/>
+                </a:ext>
+              </a:extLst>
+            </p:cNvPr>
+            <p:cNvGrpSpPr/>
+            <p:nvPr/>
+          </p:nvGrpSpPr>
+          <p:grpSpPr>
+            <a:xfrm rot="5400000">
+              <a:off x="6585302" y="4923554"/>
+              <a:ext cx="914401" cy="914401"/>
+              <a:chOff x="6777933" y="4956926"/>
+              <a:chExt cx="914401" cy="914401"/>
+            </a:xfrm>
+          </p:grpSpPr>
+          <p:pic>
+            <p:nvPicPr>
+              <p:cNvPr id="48" name="Graphic 47" descr="Chevron arrows with solid fill">
+                <a:extLst>
+                  <a:ext uri="{FF2B5EF4-FFF2-40B4-BE49-F238E27FC236}">
+                    <a16:creationId xmlns:a16="http://schemas.microsoft.com/office/drawing/2014/main" id="{B3CCA50F-FEAA-D281-AB00-569587D8B939}"/>
+                  </a:ext>
+                </a:extLst>
+              </p:cNvPr>
+              <p:cNvPicPr>
+                <a:picLocks noChangeAspect="1"/>
+              </p:cNvPicPr>
+              <p:nvPr/>
+            </p:nvPicPr>
+            <p:blipFill>
+              <a:blip r:embed="rId3">
+                <a:extLst>
+                  <a:ext uri="{96DAC541-7B7A-43D3-8B79-37D633B846F1}">
+                    <asvg:svgBlip xmlns:asvg="http://schemas.microsoft.com/office/drawing/2016/SVG/main" r:embed="rId4"/>
+                  </a:ext>
+                </a:extLst>
+              </a:blip>
+              <a:stretch>
+                <a:fillRect/>
+              </a:stretch>
+            </p:blipFill>
+            <p:spPr>
+              <a:xfrm rot="10800000">
+                <a:off x="6777934" y="4956926"/>
+                <a:ext cx="914400" cy="914400"/>
+              </a:xfrm>
+              <a:prstGeom prst="rect">
+                <a:avLst/>
+              </a:prstGeom>
+            </p:spPr>
+          </p:pic>
+          <p:sp>
+            <p:nvSpPr>
+              <p:cNvPr id="49" name="Rectangle 48">
+                <a:extLst>
+                  <a:ext uri="{FF2B5EF4-FFF2-40B4-BE49-F238E27FC236}">
+                    <a16:creationId xmlns:a16="http://schemas.microsoft.com/office/drawing/2014/main" id="{CF09A75B-0B2E-4CB8-BA27-266F31B6D117}"/>
+                  </a:ext>
+                </a:extLst>
+              </p:cNvPr>
+              <p:cNvSpPr/>
+              <p:nvPr/>
+            </p:nvSpPr>
+            <p:spPr bwMode="auto">
+              <a:xfrm>
+                <a:off x="6777933" y="4956926"/>
+                <a:ext cx="914401" cy="914401"/>
+              </a:xfrm>
+              <a:prstGeom prst="rect">
+                <a:avLst/>
+              </a:prstGeom>
+              <a:noFill/>
+              <a:ln w="38100" cap="flat" cmpd="sng" algn="ctr">
+                <a:solidFill>
+                  <a:srgbClr val="000000"/>
+                </a:solidFill>
+                <a:prstDash val="solid"/>
+                <a:headEnd type="none" w="med" len="med"/>
+                <a:tailEnd type="none" w="med" len="med"/>
+              </a:ln>
+              <a:effectLst/>
+            </p:spPr>
+            <p:txBody>
+              <a:bodyPr rot="0" spcFirstLastPara="0" vertOverflow="overflow" horzOverflow="overflow" vert="horz" wrap="square" lIns="182880" tIns="146304" rIns="182880" bIns="146304" numCol="1" spcCol="0" rtlCol="0" fromWordArt="0" anchor="t" anchorCtr="0" forceAA="0" compatLnSpc="1">
+                <a:prstTxWarp prst="textNoShape">
+                  <a:avLst/>
+                </a:prstTxWarp>
+                <a:noAutofit/>
+              </a:bodyPr>
+              <a:lstStyle/>
+              <a:p>
+                <a:pPr marL="0" marR="0" lvl="0" indent="0" defTabSz="932472" eaLnBrk="1" fontAlgn="base" latinLnBrk="0" hangingPunct="1">
+                  <a:lnSpc>
+                    <a:spcPct val="100000"/>
+                  </a:lnSpc>
+                  <a:spcBef>
+                    <a:spcPct val="0"/>
+                  </a:spcBef>
+                  <a:spcAft>
+                    <a:spcPct val="0"/>
+                  </a:spcAft>
+                  <a:buClrTx/>
+                  <a:buSzTx/>
+                  <a:buFontTx/>
+                  <a:buNone/>
+                  <a:tabLst/>
+                  <a:defRPr/>
+                </a:pPr>
+                <a:endParaRPr kumimoji="0" lang="en-GB" sz="1800" b="0" i="0" u="none" strike="noStrike" kern="0" cap="none" spc="0" normalizeH="0" baseline="0" noProof="0" dirty="0" err="1">
+                  <a:ln>
+                    <a:noFill/>
+                  </a:ln>
+                  <a:gradFill>
+                    <a:gsLst>
+                      <a:gs pos="0">
+                        <a:srgbClr val="FFFFFF"/>
+                      </a:gs>
+                      <a:gs pos="100000">
+                        <a:srgbClr val="FFFFFF"/>
+                      </a:gs>
+                    </a:gsLst>
+                    <a:lin ang="5400000" scaled="0"/>
+                  </a:gradFill>
+                  <a:effectLst/>
+                  <a:uLnTx/>
+                  <a:uFillTx/>
+                  <a:latin typeface="Klavika Regular"/>
+                  <a:ea typeface="Segoe UI" pitchFamily="34" charset="0"/>
+                  <a:cs typeface="Segoe UI" pitchFamily="34" charset="0"/>
+                </a:endParaRPr>
+              </a:p>
+            </p:txBody>
+          </p:sp>
+        </p:grpSp>
+        <p:grpSp>
+          <p:nvGrpSpPr>
+            <p:cNvPr id="50" name="Group 49">
+              <a:extLst>
+                <a:ext uri="{FF2B5EF4-FFF2-40B4-BE49-F238E27FC236}">
+                  <a16:creationId xmlns:a16="http://schemas.microsoft.com/office/drawing/2014/main" id="{01F48E2A-7915-9C25-24B2-54FBF30B9761}"/>
+                </a:ext>
+              </a:extLst>
+            </p:cNvPr>
+            <p:cNvGrpSpPr/>
+            <p:nvPr/>
+          </p:nvGrpSpPr>
+          <p:grpSpPr>
+            <a:xfrm rot="16200000">
+              <a:off x="6581727" y="5975210"/>
+              <a:ext cx="914401" cy="914401"/>
+              <a:chOff x="6777933" y="4956926"/>
+              <a:chExt cx="914401" cy="914401"/>
+            </a:xfrm>
+          </p:grpSpPr>
+          <p:pic>
+            <p:nvPicPr>
+              <p:cNvPr id="51" name="Graphic 50" descr="Chevron arrows with solid fill">
+                <a:extLst>
+                  <a:ext uri="{FF2B5EF4-FFF2-40B4-BE49-F238E27FC236}">
+                    <a16:creationId xmlns:a16="http://schemas.microsoft.com/office/drawing/2014/main" id="{861AE186-B702-3549-4640-6BEE0485FBDA}"/>
+                  </a:ext>
+                </a:extLst>
+              </p:cNvPr>
+              <p:cNvPicPr>
+                <a:picLocks noChangeAspect="1"/>
+              </p:cNvPicPr>
+              <p:nvPr/>
+            </p:nvPicPr>
+            <p:blipFill>
+              <a:blip r:embed="rId3">
+                <a:extLst>
+                  <a:ext uri="{96DAC541-7B7A-43D3-8B79-37D633B846F1}">
+                    <asvg:svgBlip xmlns:asvg="http://schemas.microsoft.com/office/drawing/2016/SVG/main" r:embed="rId4"/>
+                  </a:ext>
+                </a:extLst>
+              </a:blip>
+              <a:stretch>
+                <a:fillRect/>
+              </a:stretch>
+            </p:blipFill>
+            <p:spPr>
+              <a:xfrm rot="10800000">
+                <a:off x="6777934" y="4956926"/>
+                <a:ext cx="914400" cy="914400"/>
+              </a:xfrm>
+              <a:prstGeom prst="rect">
+                <a:avLst/>
+              </a:prstGeom>
+            </p:spPr>
+          </p:pic>
+          <p:sp>
+            <p:nvSpPr>
+              <p:cNvPr id="52" name="Rectangle 51">
+                <a:extLst>
+                  <a:ext uri="{FF2B5EF4-FFF2-40B4-BE49-F238E27FC236}">
+                    <a16:creationId xmlns:a16="http://schemas.microsoft.com/office/drawing/2014/main" id="{F46CFD71-9D80-F149-9027-477A62B182CD}"/>
+                  </a:ext>
+                </a:extLst>
+              </p:cNvPr>
+              <p:cNvSpPr/>
+              <p:nvPr/>
+            </p:nvSpPr>
+            <p:spPr bwMode="auto">
+              <a:xfrm>
+                <a:off x="6777933" y="4956926"/>
+                <a:ext cx="914401" cy="914401"/>
+              </a:xfrm>
+              <a:prstGeom prst="rect">
+                <a:avLst/>
+              </a:prstGeom>
+              <a:noFill/>
+              <a:ln w="38100" cap="flat" cmpd="sng" algn="ctr">
+                <a:solidFill>
+                  <a:srgbClr val="000000"/>
+                </a:solidFill>
+                <a:prstDash val="solid"/>
+                <a:headEnd type="none" w="med" len="med"/>
+                <a:tailEnd type="none" w="med" len="med"/>
+              </a:ln>
+              <a:effectLst/>
+            </p:spPr>
+            <p:txBody>
+              <a:bodyPr rot="0" spcFirstLastPara="0" vertOverflow="overflow" horzOverflow="overflow" vert="horz" wrap="square" lIns="182880" tIns="146304" rIns="182880" bIns="146304" numCol="1" spcCol="0" rtlCol="0" fromWordArt="0" anchor="t" anchorCtr="0" forceAA="0" compatLnSpc="1">
+                <a:prstTxWarp prst="textNoShape">
+                  <a:avLst/>
+                </a:prstTxWarp>
+                <a:noAutofit/>
+              </a:bodyPr>
+              <a:lstStyle/>
+              <a:p>
+                <a:pPr marL="0" marR="0" lvl="0" indent="0" defTabSz="932472" eaLnBrk="1" fontAlgn="base" latinLnBrk="0" hangingPunct="1">
+                  <a:lnSpc>
+                    <a:spcPct val="100000"/>
+                  </a:lnSpc>
+                  <a:spcBef>
+                    <a:spcPct val="0"/>
+                  </a:spcBef>
+                  <a:spcAft>
+                    <a:spcPct val="0"/>
+                  </a:spcAft>
+                  <a:buClrTx/>
+                  <a:buSzTx/>
+                  <a:buFontTx/>
+                  <a:buNone/>
+                  <a:tabLst/>
+                  <a:defRPr/>
+                </a:pPr>
+                <a:endParaRPr kumimoji="0" lang="en-GB" sz="1800" b="0" i="0" u="none" strike="noStrike" kern="0" cap="none" spc="0" normalizeH="0" baseline="0" noProof="0" dirty="0" err="1">
+                  <a:ln>
+                    <a:noFill/>
+                  </a:ln>
+                  <a:gradFill>
+                    <a:gsLst>
+                      <a:gs pos="0">
+                        <a:srgbClr val="FFFFFF"/>
+                      </a:gs>
+                      <a:gs pos="100000">
+                        <a:srgbClr val="FFFFFF"/>
+                      </a:gs>
+                    </a:gsLst>
+                    <a:lin ang="5400000" scaled="0"/>
+                  </a:gradFill>
+                  <a:effectLst/>
+                  <a:uLnTx/>
+                  <a:uFillTx/>
+                  <a:latin typeface="Klavika Regular"/>
+                  <a:ea typeface="Segoe UI" pitchFamily="34" charset="0"/>
+                  <a:cs typeface="Segoe UI" pitchFamily="34" charset="0"/>
+                </a:endParaRPr>
+              </a:p>
+            </p:txBody>
+          </p:sp>
+        </p:grpSp>
+        <p:grpSp>
+          <p:nvGrpSpPr>
+            <p:cNvPr id="53" name="Group 52">
+              <a:extLst>
+                <a:ext uri="{FF2B5EF4-FFF2-40B4-BE49-F238E27FC236}">
+                  <a16:creationId xmlns:a16="http://schemas.microsoft.com/office/drawing/2014/main" id="{6C376AA3-0B85-4412-8805-8C39C523C35C}"/>
+                </a:ext>
+              </a:extLst>
+            </p:cNvPr>
+            <p:cNvGrpSpPr/>
+            <p:nvPr/>
+          </p:nvGrpSpPr>
+          <p:grpSpPr>
+            <a:xfrm rot="10800000">
+              <a:off x="8030044" y="5975563"/>
+              <a:ext cx="914401" cy="914401"/>
+              <a:chOff x="6777933" y="4956926"/>
+              <a:chExt cx="914401" cy="914401"/>
+            </a:xfrm>
+          </p:grpSpPr>
+          <p:pic>
+            <p:nvPicPr>
+              <p:cNvPr id="54" name="Graphic 53" descr="Chevron arrows with solid fill">
+                <a:extLst>
+                  <a:ext uri="{FF2B5EF4-FFF2-40B4-BE49-F238E27FC236}">
+                    <a16:creationId xmlns:a16="http://schemas.microsoft.com/office/drawing/2014/main" id="{EA350AA1-2BEE-B634-6648-B414D723F374}"/>
+                  </a:ext>
+                </a:extLst>
+              </p:cNvPr>
+              <p:cNvPicPr>
+                <a:picLocks noChangeAspect="1"/>
+              </p:cNvPicPr>
+              <p:nvPr/>
+            </p:nvPicPr>
+            <p:blipFill>
+              <a:blip r:embed="rId3">
+                <a:extLst>
+                  <a:ext uri="{96DAC541-7B7A-43D3-8B79-37D633B846F1}">
+                    <asvg:svgBlip xmlns:asvg="http://schemas.microsoft.com/office/drawing/2016/SVG/main" r:embed="rId4"/>
+                  </a:ext>
+                </a:extLst>
+              </a:blip>
+              <a:stretch>
+                <a:fillRect/>
+              </a:stretch>
+            </p:blipFill>
+            <p:spPr>
+              <a:xfrm rot="10800000">
+                <a:off x="6777934" y="4956926"/>
+                <a:ext cx="914400" cy="914400"/>
+              </a:xfrm>
+              <a:prstGeom prst="rect">
+                <a:avLst/>
+              </a:prstGeom>
+            </p:spPr>
+          </p:pic>
+          <p:sp>
+            <p:nvSpPr>
+              <p:cNvPr id="55" name="Rectangle 54">
+                <a:extLst>
+                  <a:ext uri="{FF2B5EF4-FFF2-40B4-BE49-F238E27FC236}">
+                    <a16:creationId xmlns:a16="http://schemas.microsoft.com/office/drawing/2014/main" id="{02FE0D61-A0BA-F3C4-C35B-32AD4B48F1BE}"/>
+                  </a:ext>
+                </a:extLst>
+              </p:cNvPr>
+              <p:cNvSpPr/>
+              <p:nvPr/>
+            </p:nvSpPr>
+            <p:spPr bwMode="auto">
+              <a:xfrm>
+                <a:off x="6777933" y="4956926"/>
+                <a:ext cx="914401" cy="914401"/>
+              </a:xfrm>
+              <a:prstGeom prst="rect">
+                <a:avLst/>
+              </a:prstGeom>
+              <a:noFill/>
+              <a:ln w="38100" cap="flat" cmpd="sng" algn="ctr">
+                <a:solidFill>
+                  <a:srgbClr val="000000"/>
+                </a:solidFill>
+                <a:prstDash val="solid"/>
+                <a:headEnd type="none" w="med" len="med"/>
+                <a:tailEnd type="none" w="med" len="med"/>
+              </a:ln>
+              <a:effectLst/>
+            </p:spPr>
+            <p:txBody>
+              <a:bodyPr rot="0" spcFirstLastPara="0" vertOverflow="overflow" horzOverflow="overflow" vert="horz" wrap="square" lIns="182880" tIns="146304" rIns="182880" bIns="146304" numCol="1" spcCol="0" rtlCol="0" fromWordArt="0" anchor="t" anchorCtr="0" forceAA="0" compatLnSpc="1">
+                <a:prstTxWarp prst="textNoShape">
+                  <a:avLst/>
+                </a:prstTxWarp>
+                <a:noAutofit/>
+              </a:bodyPr>
+              <a:lstStyle/>
+              <a:p>
+                <a:pPr marL="0" marR="0" lvl="0" indent="0" defTabSz="932472" eaLnBrk="1" fontAlgn="base" latinLnBrk="0" hangingPunct="1">
+                  <a:lnSpc>
+                    <a:spcPct val="100000"/>
+                  </a:lnSpc>
+                  <a:spcBef>
+                    <a:spcPct val="0"/>
+                  </a:spcBef>
+                  <a:spcAft>
+                    <a:spcPct val="0"/>
+                  </a:spcAft>
+                  <a:buClrTx/>
+                  <a:buSzTx/>
+                  <a:buFontTx/>
+                  <a:buNone/>
+                  <a:tabLst/>
+                  <a:defRPr/>
+                </a:pPr>
+                <a:endParaRPr kumimoji="0" lang="en-GB" sz="1800" b="0" i="0" u="none" strike="noStrike" kern="0" cap="none" spc="0" normalizeH="0" baseline="0" noProof="0" dirty="0" err="1">
+                  <a:ln>
+                    <a:noFill/>
+                  </a:ln>
+                  <a:gradFill>
+                    <a:gsLst>
+                      <a:gs pos="0">
+                        <a:srgbClr val="FFFFFF"/>
+                      </a:gs>
+                      <a:gs pos="100000">
+                        <a:srgbClr val="FFFFFF"/>
+                      </a:gs>
+                    </a:gsLst>
+                    <a:lin ang="5400000" scaled="0"/>
+                  </a:gradFill>
+                  <a:effectLst/>
+                  <a:uLnTx/>
+                  <a:uFillTx/>
+                  <a:latin typeface="Klavika Regular"/>
+                  <a:ea typeface="Segoe UI" pitchFamily="34" charset="0"/>
+                  <a:cs typeface="Segoe UI" pitchFamily="34" charset="0"/>
+                </a:endParaRPr>
+              </a:p>
+            </p:txBody>
+          </p:sp>
+        </p:grpSp>
+      </p:grpSp>
+      <p:sp>
+        <p:nvSpPr>
+          <p:cNvPr id="56" name="Rectangle 55">
+            <a:extLst>
+              <a:ext uri="{FF2B5EF4-FFF2-40B4-BE49-F238E27FC236}">
+                <a16:creationId xmlns:a16="http://schemas.microsoft.com/office/drawing/2014/main" id="{16497FAE-3D70-E4C6-A0A0-338EFE9D585D}"/>
+              </a:ext>
+            </a:extLst>
+          </p:cNvPr>
+          <p:cNvSpPr/>
+          <p:nvPr/>
+        </p:nvSpPr>
+        <p:spPr bwMode="auto">
+          <a:xfrm>
+            <a:off x="10864851" y="3419426"/>
+            <a:ext cx="231327" cy="516835"/>
+          </a:xfrm>
+          <a:prstGeom prst="rect">
+            <a:avLst/>
+          </a:prstGeom>
+          <a:noFill/>
+          <a:ln w="38100" cap="flat" cmpd="sng" algn="ctr">
+            <a:solidFill>
+              <a:srgbClr val="00B050"/>
+            </a:solidFill>
+            <a:prstDash val="solid"/>
+            <a:headEnd type="none" w="med" len="med"/>
+            <a:tailEnd type="none" w="med" len="med"/>
+          </a:ln>
+          <a:effectLst/>
+        </p:spPr>
+        <p:txBody>
+          <a:bodyPr rot="0" spcFirstLastPara="0" vertOverflow="overflow" horzOverflow="overflow" vert="horz" wrap="square" lIns="182880" tIns="146304" rIns="182880" bIns="146304" numCol="1" spcCol="0" rtlCol="0" fromWordArt="0" anchor="t" anchorCtr="0" forceAA="0" compatLnSpc="1">
+            <a:prstTxWarp prst="textNoShape">
+              <a:avLst/>
+            </a:prstTxWarp>
+            <a:noAutofit/>
+          </a:bodyPr>
+          <a:lstStyle/>
+          <a:p>
+            <a:pPr marL="0" marR="0" lvl="0" indent="0" defTabSz="932472" eaLnBrk="1" fontAlgn="base" latinLnBrk="0" hangingPunct="1">
+              <a:lnSpc>
+                <a:spcPct val="100000"/>
+              </a:lnSpc>
+              <a:spcBef>
+                <a:spcPct val="0"/>
+              </a:spcBef>
+              <a:spcAft>
+                <a:spcPct val="0"/>
+              </a:spcAft>
+              <a:buClrTx/>
+              <a:buSzTx/>
+              <a:buFontTx/>
+              <a:buNone/>
+              <a:tabLst/>
+              <a:defRPr/>
+            </a:pPr>
+            <a:endParaRPr kumimoji="0" lang="en-GB" sz="1800" b="0" i="0" u="none" strike="noStrike" kern="0" cap="none" spc="0" normalizeH="0" baseline="0" noProof="0" dirty="0" err="1">
+              <a:ln>
+                <a:noFill/>
+              </a:ln>
+              <a:gradFill>
+                <a:gsLst>
+                  <a:gs pos="0">
+                    <a:srgbClr val="FFFFFF"/>
+                  </a:gs>
+                  <a:gs pos="100000">
+                    <a:srgbClr val="FFFFFF"/>
+                  </a:gs>
+                </a:gsLst>
+                <a:lin ang="5400000" scaled="0"/>
+              </a:gradFill>
+              <a:effectLst/>
+              <a:uLnTx/>
+              <a:uFillTx/>
+              <a:latin typeface="Klavika Regular"/>
+              <a:ea typeface="Segoe UI" pitchFamily="34" charset="0"/>
+              <a:cs typeface="Segoe UI" pitchFamily="34" charset="0"/>
+            </a:endParaRPr>
+          </a:p>
+        </p:txBody>
+      </p:sp>
+      <p:cxnSp>
+        <p:nvCxnSpPr>
+          <p:cNvPr id="57" name="Straight Connector 56">
+            <a:extLst>
+              <a:ext uri="{FF2B5EF4-FFF2-40B4-BE49-F238E27FC236}">
+                <a16:creationId xmlns:a16="http://schemas.microsoft.com/office/drawing/2014/main" id="{57FC2AB1-DF34-5B77-C0A4-1D19EE6A677D}"/>
+              </a:ext>
+            </a:extLst>
+          </p:cNvPr>
+          <p:cNvCxnSpPr>
+            <a:cxnSpLocks/>
+          </p:cNvCxnSpPr>
+          <p:nvPr/>
+        </p:nvCxnSpPr>
+        <p:spPr>
+          <a:xfrm flipV="1">
+            <a:off x="10633169" y="2357087"/>
+            <a:ext cx="206282" cy="2157718"/>
+          </a:xfrm>
+          <a:prstGeom prst="line">
+            <a:avLst/>
+          </a:prstGeom>
+          <a:noFill/>
+          <a:ln w="9525" cap="flat" cmpd="sng" algn="ctr">
+            <a:solidFill>
+              <a:srgbClr val="ED1C24"/>
+            </a:solidFill>
+            <a:prstDash val="solid"/>
+            <a:headEnd type="none" w="lg" len="med"/>
+            <a:tailEnd type="none" w="lg" len="med"/>
+          </a:ln>
+          <a:effectLst/>
+        </p:spPr>
+      </p:cxnSp>
+      <p:cxnSp>
+        <p:nvCxnSpPr>
+          <p:cNvPr id="58" name="Straight Arrow Connector 57">
+            <a:extLst>
+              <a:ext uri="{FF2B5EF4-FFF2-40B4-BE49-F238E27FC236}">
+                <a16:creationId xmlns:a16="http://schemas.microsoft.com/office/drawing/2014/main" id="{8483273F-2441-A393-FD61-31FECC7C634B}"/>
+              </a:ext>
+            </a:extLst>
+          </p:cNvPr>
+          <p:cNvCxnSpPr>
+            <a:cxnSpLocks/>
+            <a:endCxn id="43" idx="1"/>
+          </p:cNvCxnSpPr>
+          <p:nvPr/>
+        </p:nvCxnSpPr>
+        <p:spPr>
+          <a:xfrm flipV="1">
+            <a:off x="4953000" y="5596819"/>
+            <a:ext cx="2857631" cy="294709"/>
+          </a:xfrm>
+          <a:prstGeom prst="straightConnector1">
+            <a:avLst/>
+          </a:prstGeom>
+          <a:noFill/>
+          <a:ln w="12700" cap="flat" cmpd="sng" algn="ctr">
+            <a:solidFill>
+              <a:srgbClr val="ED1C24"/>
+            </a:solidFill>
+            <a:prstDash val="solid"/>
+            <a:headEnd type="none" w="lg" len="med"/>
+            <a:tailEnd type="triangle"/>
+          </a:ln>
+          <a:effectLst/>
+        </p:spPr>
+      </p:cxnSp>
+      <p:sp>
+        <p:nvSpPr>
+          <p:cNvPr id="7" name="Rectangle 6">
+            <a:extLst>
+              <a:ext uri="{FF2B5EF4-FFF2-40B4-BE49-F238E27FC236}">
+                <a16:creationId xmlns:a16="http://schemas.microsoft.com/office/drawing/2014/main" id="{91C9BF3F-4AE4-5E22-A03B-91B299537081}"/>
+              </a:ext>
+            </a:extLst>
+          </p:cNvPr>
+          <p:cNvSpPr/>
+          <p:nvPr/>
+        </p:nvSpPr>
+        <p:spPr bwMode="auto">
+          <a:xfrm>
+            <a:off x="10601419" y="3415900"/>
+            <a:ext cx="231326" cy="516835"/>
+          </a:xfrm>
+          <a:prstGeom prst="rect">
+            <a:avLst/>
+          </a:prstGeom>
+          <a:noFill/>
+          <a:ln w="38100" cap="flat" cmpd="sng" algn="ctr">
+            <a:solidFill>
+              <a:srgbClr val="00B0F0"/>
+            </a:solidFill>
+            <a:prstDash val="solid"/>
+            <a:headEnd type="none" w="med" len="med"/>
+            <a:tailEnd type="none" w="med" len="med"/>
+          </a:ln>
+          <a:effectLst/>
+        </p:spPr>
+        <p:txBody>
+          <a:bodyPr rot="0" spcFirstLastPara="0" vertOverflow="overflow" horzOverflow="overflow" vert="horz" wrap="square" lIns="182880" tIns="146304" rIns="182880" bIns="146304" numCol="1" spcCol="0" rtlCol="0" fromWordArt="0" anchor="t" anchorCtr="0" forceAA="0" compatLnSpc="1">
+            <a:prstTxWarp prst="textNoShape">
+              <a:avLst/>
+            </a:prstTxWarp>
+            <a:noAutofit/>
+          </a:bodyPr>
+          <a:lstStyle/>
+          <a:p>
+            <a:pPr marL="0" marR="0" lvl="0" indent="0" defTabSz="932472" eaLnBrk="1" fontAlgn="base" latinLnBrk="0" hangingPunct="1">
+              <a:lnSpc>
+                <a:spcPct val="100000"/>
+              </a:lnSpc>
+              <a:spcBef>
+                <a:spcPct val="0"/>
+              </a:spcBef>
+              <a:spcAft>
+                <a:spcPct val="0"/>
+              </a:spcAft>
+              <a:buClrTx/>
+              <a:buSzTx/>
+              <a:buFontTx/>
+              <a:buNone/>
+              <a:tabLst/>
+              <a:defRPr/>
+            </a:pPr>
+            <a:endParaRPr kumimoji="0" lang="en-GB" sz="1800" b="0" i="0" u="none" strike="noStrike" kern="0" cap="none" spc="0" normalizeH="0" baseline="0" noProof="0" dirty="0" err="1">
+              <a:ln>
+                <a:noFill/>
+              </a:ln>
+              <a:gradFill>
+                <a:gsLst>
+                  <a:gs pos="0">
+                    <a:srgbClr val="FFFFFF"/>
+                  </a:gs>
+                  <a:gs pos="100000">
+                    <a:srgbClr val="FFFFFF"/>
+                  </a:gs>
+                </a:gsLst>
+                <a:lin ang="5400000" scaled="0"/>
+              </a:gradFill>
+              <a:effectLst/>
+              <a:uLnTx/>
+              <a:uFillTx/>
+              <a:latin typeface="Klavika Regular"/>
+              <a:ea typeface="Segoe UI" pitchFamily="34" charset="0"/>
+              <a:cs typeface="Segoe UI" pitchFamily="34" charset="0"/>
+            </a:endParaRPr>
+          </a:p>
+        </p:txBody>
+      </p:sp>
+      <p:cxnSp>
+        <p:nvCxnSpPr>
+          <p:cNvPr id="8" name="Straight Arrow Connector 7">
+            <a:extLst>
+              <a:ext uri="{FF2B5EF4-FFF2-40B4-BE49-F238E27FC236}">
+                <a16:creationId xmlns:a16="http://schemas.microsoft.com/office/drawing/2014/main" id="{638D73AF-69BC-455F-6463-13DF92E22A2D}"/>
+              </a:ext>
+            </a:extLst>
+          </p:cNvPr>
+          <p:cNvCxnSpPr>
+            <a:cxnSpLocks/>
+            <a:endCxn id="7" idx="1"/>
+          </p:cNvCxnSpPr>
+          <p:nvPr/>
+        </p:nvCxnSpPr>
+        <p:spPr>
+          <a:xfrm>
+            <a:off x="5416550" y="2909367"/>
+            <a:ext cx="5184869" cy="764951"/>
+          </a:xfrm>
+          <a:prstGeom prst="straightConnector1">
+            <a:avLst/>
+          </a:prstGeom>
+          <a:noFill/>
+          <a:ln w="12700" cap="flat" cmpd="sng" algn="ctr">
+            <a:solidFill>
+              <a:srgbClr val="00B0F0"/>
+            </a:solidFill>
+            <a:prstDash val="solid"/>
+            <a:headEnd type="none" w="lg" len="med"/>
+            <a:tailEnd type="triangle"/>
+          </a:ln>
+          <a:effectLst/>
+        </p:spPr>
+      </p:cxnSp>
+    </p:spTree>
+    <p:extLst>
+      <p:ext uri="{BB962C8B-B14F-4D97-AF65-F5344CB8AC3E}">
+        <p14:creationId xmlns:p14="http://schemas.microsoft.com/office/powerpoint/2010/main" val="3565139277"/>
       </p:ext>
     </p:extLst>
   </p:cSld>
@@ -23518,21 +26258,21 @@
 </file>
 
 <file path=customXml/item1.xml><?xml version="1.0" encoding="utf-8"?>
+<TemplafySlideFormConfiguration><![CDATA[{"formFields":[],"formDataEntries":[]}]]></TemplafySlideFormConfiguration>
+</file>
+
+<file path=customXml/item2.xml><?xml version="1.0" encoding="utf-8"?>
 <TemplafySlideTemplateConfiguration><![CDATA[{"slideVersion":1,"isValidatorEnabled":false,"isLocked":false,"elementsMetadata":[],"slideId":"637629098472101399","enableDocumentContentUpdater":true,"version":"2.0"}]]></TemplafySlideTemplateConfiguration>
 </file>
 
-<file path=customXml/item2.xml><?xml version="1.0" encoding="utf-8"?>
-<TemplafySlideFormConfiguration><![CDATA[{"formFields":[],"formDataEntries":[]}]]></TemplafySlideFormConfiguration>
-</file>
-
 <file path=customXml/itemProps1.xml><?xml version="1.0" encoding="utf-8"?>
-<ds:datastoreItem xmlns:ds="http://schemas.openxmlformats.org/officeDocument/2006/customXml" ds:itemID="{3A7B4B56-D0D2-4135-A66A-EEF2C62C4256}">
+<ds:datastoreItem xmlns:ds="http://schemas.openxmlformats.org/officeDocument/2006/customXml" ds:itemID="{E4185C24-1447-4288-BCBB-7ABBF03479A8}">
   <ds:schemaRefs/>
 </ds:datastoreItem>
 </file>
 
 <file path=customXml/itemProps2.xml><?xml version="1.0" encoding="utf-8"?>
-<ds:datastoreItem xmlns:ds="http://schemas.openxmlformats.org/officeDocument/2006/customXml" ds:itemID="{E4185C24-1447-4288-BCBB-7ABBF03479A8}">
+<ds:datastoreItem xmlns:ds="http://schemas.openxmlformats.org/officeDocument/2006/customXml" ds:itemID="{3A7B4B56-D0D2-4135-A66A-EEF2C62C4256}">
   <ds:schemaRefs/>
 </ds:datastoreItem>
 </file>

</xml_diff>

<commit_message>
Update usage guide to include diagonal variant
</commit_message>
<xml_diff>
--- a/usage_guide.pptx
+++ b/usage_guide.pptx
@@ -10,6 +10,8 @@
     <p:sldId id="257" r:id="rId6"/>
     <p:sldId id="260" r:id="rId7"/>
     <p:sldId id="258" r:id="rId8"/>
+    <p:sldId id="261" r:id="rId9"/>
+    <p:sldId id="262" r:id="rId10"/>
   </p:sldIdLst>
   <p:sldSz cx="12192000" cy="6858000"/>
   <p:notesSz cx="7010400" cy="9296400"/>
@@ -119,7 +121,7 @@
 <file path=ppt/revisionInfo.xml><?xml version="1.0" encoding="utf-8"?>
 <p1510:revInfo xmlns:a="http://schemas.openxmlformats.org/drawingml/2006/main" xmlns:r="http://schemas.openxmlformats.org/officeDocument/2006/relationships" xmlns:p1510="http://schemas.microsoft.com/office/powerpoint/2015/10/main">
   <p1510:revLst>
-    <p1510:client id="{0767353F-D086-4090-8BF5-095E245E8D59}" v="5" dt="2025-01-07T14:57:11.128"/>
+    <p1510:client id="{0767353F-D086-4090-8BF5-095E245E8D59}" v="6" dt="2025-01-07T15:15:15.540"/>
   </p1510:revLst>
 </p1510:revInfo>
 </file>
@@ -128,604 +130,25 @@
 <pc:chgInfo xmlns:a="http://schemas.openxmlformats.org/drawingml/2006/main" xmlns:r="http://schemas.openxmlformats.org/officeDocument/2006/relationships" xmlns:ac="http://schemas.microsoft.com/office/drawing/2013/main/command" xmlns:pc="http://schemas.microsoft.com/office/powerpoint/2013/main/command">
   <pc:docChgLst>
     <pc:chgData name="Pethick, Matthew" userId="47b0bdf2-08b5-49f1-a741-b2d87ec64f81" providerId="ADAL" clId="{0767353F-D086-4090-8BF5-095E245E8D59}"/>
-    <pc:docChg chg="undo custSel addSld delSld modSld sldOrd">
-      <pc:chgData name="Pethick, Matthew" userId="47b0bdf2-08b5-49f1-a741-b2d87ec64f81" providerId="ADAL" clId="{0767353F-D086-4090-8BF5-095E245E8D59}" dt="2025-01-07T14:57:14.295" v="242" actId="20577"/>
+    <pc:docChg chg="modSld">
+      <pc:chgData name="Pethick, Matthew" userId="47b0bdf2-08b5-49f1-a741-b2d87ec64f81" providerId="ADAL" clId="{0767353F-D086-4090-8BF5-095E245E8D59}" dt="2025-01-07T16:04:41.915" v="3" actId="20577"/>
       <pc:docMkLst>
         <pc:docMk/>
       </pc:docMkLst>
       <pc:sldChg chg="modSp mod">
-        <pc:chgData name="Pethick, Matthew" userId="47b0bdf2-08b5-49f1-a741-b2d87ec64f81" providerId="ADAL" clId="{0767353F-D086-4090-8BF5-095E245E8D59}" dt="2025-01-07T14:56:41.035" v="209" actId="20577"/>
+        <pc:chgData name="Pethick, Matthew" userId="47b0bdf2-08b5-49f1-a741-b2d87ec64f81" providerId="ADAL" clId="{0767353F-D086-4090-8BF5-095E245E8D59}" dt="2025-01-07T16:04:41.915" v="3" actId="20577"/>
         <pc:sldMkLst>
           <pc:docMk/>
-          <pc:sldMk cId="3712660401" sldId="257"/>
+          <pc:sldMk cId="569035694" sldId="262"/>
         </pc:sldMkLst>
         <pc:spChg chg="mod">
-          <ac:chgData name="Pethick, Matthew" userId="47b0bdf2-08b5-49f1-a741-b2d87ec64f81" providerId="ADAL" clId="{0767353F-D086-4090-8BF5-095E245E8D59}" dt="2025-01-07T14:56:41.035" v="209" actId="20577"/>
+          <ac:chgData name="Pethick, Matthew" userId="47b0bdf2-08b5-49f1-a741-b2d87ec64f81" providerId="ADAL" clId="{0767353F-D086-4090-8BF5-095E245E8D59}" dt="2025-01-07T16:04:41.915" v="3" actId="20577"/>
           <ac:spMkLst>
             <pc:docMk/>
-            <pc:sldMk cId="3712660401" sldId="257"/>
-            <ac:spMk id="36" creationId="{7259F6E7-063D-267D-0FAE-2484F4A2B1D0}"/>
+            <pc:sldMk cId="569035694" sldId="262"/>
+            <ac:spMk id="37" creationId="{DDFF6493-A702-FB7E-7E3D-EA387DC84ED0}"/>
           </ac:spMkLst>
         </pc:spChg>
-        <pc:spChg chg="mod">
-          <ac:chgData name="Pethick, Matthew" userId="47b0bdf2-08b5-49f1-a741-b2d87ec64f81" providerId="ADAL" clId="{0767353F-D086-4090-8BF5-095E245E8D59}" dt="2025-01-07T14:53:14.321" v="180" actId="20577"/>
-          <ac:spMkLst>
-            <pc:docMk/>
-            <pc:sldMk cId="3712660401" sldId="257"/>
-            <ac:spMk id="37" creationId="{E4A8F66B-7D32-4301-7B2E-222716E02861}"/>
-          </ac:spMkLst>
-        </pc:spChg>
-      </pc:sldChg>
-      <pc:sldChg chg="addSp delSp modSp add mod">
-        <pc:chgData name="Pethick, Matthew" userId="47b0bdf2-08b5-49f1-a741-b2d87ec64f81" providerId="ADAL" clId="{0767353F-D086-4090-8BF5-095E245E8D59}" dt="2025-01-07T14:53:38.047" v="192" actId="14100"/>
-        <pc:sldMkLst>
-          <pc:docMk/>
-          <pc:sldMk cId="3565139277" sldId="258"/>
-        </pc:sldMkLst>
-        <pc:spChg chg="add del mod">
-          <ac:chgData name="Pethick, Matthew" userId="47b0bdf2-08b5-49f1-a741-b2d87ec64f81" providerId="ADAL" clId="{0767353F-D086-4090-8BF5-095E245E8D59}" dt="2025-01-07T14:47:11.022" v="11" actId="478"/>
-          <ac:spMkLst>
-            <pc:docMk/>
-            <pc:sldMk cId="3565139277" sldId="258"/>
-            <ac:spMk id="4" creationId="{538A09E5-1F38-8DD5-F494-8F16BE0C0E12}"/>
-          </ac:spMkLst>
-        </pc:spChg>
-        <pc:spChg chg="mod">
-          <ac:chgData name="Pethick, Matthew" userId="47b0bdf2-08b5-49f1-a741-b2d87ec64f81" providerId="ADAL" clId="{0767353F-D086-4090-8BF5-095E245E8D59}" dt="2025-01-07T14:52:38.639" v="172" actId="1037"/>
-          <ac:spMkLst>
-            <pc:docMk/>
-            <pc:sldMk cId="3565139277" sldId="258"/>
-            <ac:spMk id="7" creationId="{91C9BF3F-4AE4-5E22-A03B-91B299537081}"/>
-          </ac:spMkLst>
-        </pc:spChg>
-        <pc:spChg chg="mod">
-          <ac:chgData name="Pethick, Matthew" userId="47b0bdf2-08b5-49f1-a741-b2d87ec64f81" providerId="ADAL" clId="{0767353F-D086-4090-8BF5-095E245E8D59}" dt="2025-01-07T14:47:08.704" v="8" actId="571"/>
-          <ac:spMkLst>
-            <pc:docMk/>
-            <pc:sldMk cId="3565139277" sldId="258"/>
-            <ac:spMk id="13" creationId="{4A6BBDD9-EC92-5EF3-653D-70C190A12D26}"/>
-          </ac:spMkLst>
-        </pc:spChg>
-        <pc:spChg chg="mod">
-          <ac:chgData name="Pethick, Matthew" userId="47b0bdf2-08b5-49f1-a741-b2d87ec64f81" providerId="ADAL" clId="{0767353F-D086-4090-8BF5-095E245E8D59}" dt="2025-01-07T14:47:08.704" v="8" actId="571"/>
-          <ac:spMkLst>
-            <pc:docMk/>
-            <pc:sldMk cId="3565139277" sldId="258"/>
-            <ac:spMk id="15" creationId="{FA703751-81D7-4AF6-073C-AA7D5D20BF0B}"/>
-          </ac:spMkLst>
-        </pc:spChg>
-        <pc:spChg chg="mod">
-          <ac:chgData name="Pethick, Matthew" userId="47b0bdf2-08b5-49f1-a741-b2d87ec64f81" providerId="ADAL" clId="{0767353F-D086-4090-8BF5-095E245E8D59}" dt="2025-01-07T14:47:08.704" v="8" actId="571"/>
-          <ac:spMkLst>
-            <pc:docMk/>
-            <pc:sldMk cId="3565139277" sldId="258"/>
-            <ac:spMk id="17" creationId="{6C694B02-9187-0039-5F82-07A7D9957AC9}"/>
-          </ac:spMkLst>
-        </pc:spChg>
-        <pc:spChg chg="mod">
-          <ac:chgData name="Pethick, Matthew" userId="47b0bdf2-08b5-49f1-a741-b2d87ec64f81" providerId="ADAL" clId="{0767353F-D086-4090-8BF5-095E245E8D59}" dt="2025-01-07T14:47:08.704" v="8" actId="571"/>
-          <ac:spMkLst>
-            <pc:docMk/>
-            <pc:sldMk cId="3565139277" sldId="258"/>
-            <ac:spMk id="19" creationId="{F986D39F-D28E-3EA5-F84F-55AE39B7B9C4}"/>
-          </ac:spMkLst>
-        </pc:spChg>
-        <pc:spChg chg="mod">
-          <ac:chgData name="Pethick, Matthew" userId="47b0bdf2-08b5-49f1-a741-b2d87ec64f81" providerId="ADAL" clId="{0767353F-D086-4090-8BF5-095E245E8D59}" dt="2025-01-07T14:53:34.433" v="191" actId="20577"/>
-          <ac:spMkLst>
-            <pc:docMk/>
-            <pc:sldMk cId="3565139277" sldId="258"/>
-            <ac:spMk id="37" creationId="{B4D723F2-646B-8B8D-2E70-A890904CA69F}"/>
-          </ac:spMkLst>
-        </pc:spChg>
-        <pc:spChg chg="mod">
-          <ac:chgData name="Pethick, Matthew" userId="47b0bdf2-08b5-49f1-a741-b2d87ec64f81" providerId="ADAL" clId="{0767353F-D086-4090-8BF5-095E245E8D59}" dt="2025-01-07T14:52:09.046" v="158" actId="14100"/>
-          <ac:spMkLst>
-            <pc:docMk/>
-            <pc:sldMk cId="3565139277" sldId="258"/>
-            <ac:spMk id="38" creationId="{37EE9CA3-AB6E-3823-8AF1-37F15DC79CA9}"/>
-          </ac:spMkLst>
-        </pc:spChg>
-        <pc:spChg chg="mod">
-          <ac:chgData name="Pethick, Matthew" userId="47b0bdf2-08b5-49f1-a741-b2d87ec64f81" providerId="ADAL" clId="{0767353F-D086-4090-8BF5-095E245E8D59}" dt="2025-01-07T14:49:38.555" v="95" actId="14100"/>
-          <ac:spMkLst>
-            <pc:docMk/>
-            <pc:sldMk cId="3565139277" sldId="258"/>
-            <ac:spMk id="40" creationId="{8174FD0D-E5C9-9E87-1FE4-C8E94357998A}"/>
-          </ac:spMkLst>
-        </pc:spChg>
-        <pc:spChg chg="mod ord">
-          <ac:chgData name="Pethick, Matthew" userId="47b0bdf2-08b5-49f1-a741-b2d87ec64f81" providerId="ADAL" clId="{0767353F-D086-4090-8BF5-095E245E8D59}" dt="2025-01-07T14:51:01.679" v="121" actId="1076"/>
-          <ac:spMkLst>
-            <pc:docMk/>
-            <pc:sldMk cId="3565139277" sldId="258"/>
-            <ac:spMk id="43" creationId="{E0698CBD-B051-EBE0-F112-823091F7D199}"/>
-          </ac:spMkLst>
-        </pc:spChg>
-        <pc:spChg chg="mod">
-          <ac:chgData name="Pethick, Matthew" userId="47b0bdf2-08b5-49f1-a741-b2d87ec64f81" providerId="ADAL" clId="{0767353F-D086-4090-8BF5-095E245E8D59}" dt="2025-01-07T14:47:31.046" v="16" actId="165"/>
-          <ac:spMkLst>
-            <pc:docMk/>
-            <pc:sldMk cId="3565139277" sldId="258"/>
-            <ac:spMk id="46" creationId="{3396E3D8-74CF-3A30-4D1B-4A8EE929845D}"/>
-          </ac:spMkLst>
-        </pc:spChg>
-        <pc:spChg chg="mod">
-          <ac:chgData name="Pethick, Matthew" userId="47b0bdf2-08b5-49f1-a741-b2d87ec64f81" providerId="ADAL" clId="{0767353F-D086-4090-8BF5-095E245E8D59}" dt="2025-01-07T14:47:31.046" v="16" actId="165"/>
-          <ac:spMkLst>
-            <pc:docMk/>
-            <pc:sldMk cId="3565139277" sldId="258"/>
-            <ac:spMk id="49" creationId="{CF09A75B-0B2E-4CB8-BA27-266F31B6D117}"/>
-          </ac:spMkLst>
-        </pc:spChg>
-        <pc:spChg chg="mod">
-          <ac:chgData name="Pethick, Matthew" userId="47b0bdf2-08b5-49f1-a741-b2d87ec64f81" providerId="ADAL" clId="{0767353F-D086-4090-8BF5-095E245E8D59}" dt="2025-01-07T14:47:31.046" v="16" actId="165"/>
-          <ac:spMkLst>
-            <pc:docMk/>
-            <pc:sldMk cId="3565139277" sldId="258"/>
-            <ac:spMk id="52" creationId="{F46CFD71-9D80-F149-9027-477A62B182CD}"/>
-          </ac:spMkLst>
-        </pc:spChg>
-        <pc:spChg chg="mod">
-          <ac:chgData name="Pethick, Matthew" userId="47b0bdf2-08b5-49f1-a741-b2d87ec64f81" providerId="ADAL" clId="{0767353F-D086-4090-8BF5-095E245E8D59}" dt="2025-01-07T14:47:31.046" v="16" actId="165"/>
-          <ac:spMkLst>
-            <pc:docMk/>
-            <pc:sldMk cId="3565139277" sldId="258"/>
-            <ac:spMk id="55" creationId="{02FE0D61-A0BA-F3C4-C35B-32AD4B48F1BE}"/>
-          </ac:spMkLst>
-        </pc:spChg>
-        <pc:spChg chg="mod">
-          <ac:chgData name="Pethick, Matthew" userId="47b0bdf2-08b5-49f1-a741-b2d87ec64f81" providerId="ADAL" clId="{0767353F-D086-4090-8BF5-095E245E8D59}" dt="2025-01-07T14:52:32.927" v="170" actId="1037"/>
-          <ac:spMkLst>
-            <pc:docMk/>
-            <pc:sldMk cId="3565139277" sldId="258"/>
-            <ac:spMk id="56" creationId="{16497FAE-3D70-E4C6-A0A0-338EFE9D585D}"/>
-          </ac:spMkLst>
-        </pc:spChg>
-        <pc:grpChg chg="del mod">
-          <ac:chgData name="Pethick, Matthew" userId="47b0bdf2-08b5-49f1-a741-b2d87ec64f81" providerId="ADAL" clId="{0767353F-D086-4090-8BF5-095E245E8D59}" dt="2025-01-07T14:47:31.046" v="16" actId="165"/>
-          <ac:grpSpMkLst>
-            <pc:docMk/>
-            <pc:sldMk cId="3565139277" sldId="258"/>
-            <ac:grpSpMk id="2" creationId="{9A8BF762-96E7-E4ED-A165-8B06F924ECA4}"/>
-          </ac:grpSpMkLst>
-        </pc:grpChg>
-        <pc:grpChg chg="add del mod">
-          <ac:chgData name="Pethick, Matthew" userId="47b0bdf2-08b5-49f1-a741-b2d87ec64f81" providerId="ADAL" clId="{0767353F-D086-4090-8BF5-095E245E8D59}" dt="2025-01-07T14:47:11.022" v="11" actId="478"/>
-          <ac:grpSpMkLst>
-            <pc:docMk/>
-            <pc:sldMk cId="3565139277" sldId="258"/>
-            <ac:grpSpMk id="5" creationId="{12C2C34A-562C-0AD7-87FF-06D8BEDF3BEE}"/>
-          </ac:grpSpMkLst>
-        </pc:grpChg>
-        <pc:grpChg chg="mod">
-          <ac:chgData name="Pethick, Matthew" userId="47b0bdf2-08b5-49f1-a741-b2d87ec64f81" providerId="ADAL" clId="{0767353F-D086-4090-8BF5-095E245E8D59}" dt="2025-01-07T14:47:08.704" v="8" actId="571"/>
-          <ac:grpSpMkLst>
-            <pc:docMk/>
-            <pc:sldMk cId="3565139277" sldId="258"/>
-            <ac:grpSpMk id="6" creationId="{D0CFD027-BDE4-C1C4-6E37-CEC036D4E213}"/>
-          </ac:grpSpMkLst>
-        </pc:grpChg>
-        <pc:grpChg chg="mod">
-          <ac:chgData name="Pethick, Matthew" userId="47b0bdf2-08b5-49f1-a741-b2d87ec64f81" providerId="ADAL" clId="{0767353F-D086-4090-8BF5-095E245E8D59}" dt="2025-01-07T14:47:08.704" v="8" actId="571"/>
-          <ac:grpSpMkLst>
-            <pc:docMk/>
-            <pc:sldMk cId="3565139277" sldId="258"/>
-            <ac:grpSpMk id="9" creationId="{F31F7C04-A58E-1E32-8538-1F6D979E0A71}"/>
-          </ac:grpSpMkLst>
-        </pc:grpChg>
-        <pc:grpChg chg="mod">
-          <ac:chgData name="Pethick, Matthew" userId="47b0bdf2-08b5-49f1-a741-b2d87ec64f81" providerId="ADAL" clId="{0767353F-D086-4090-8BF5-095E245E8D59}" dt="2025-01-07T14:47:08.704" v="8" actId="571"/>
-          <ac:grpSpMkLst>
-            <pc:docMk/>
-            <pc:sldMk cId="3565139277" sldId="258"/>
-            <ac:grpSpMk id="10" creationId="{CF088A08-BA06-05C1-C89E-BBA875C6CC53}"/>
-          </ac:grpSpMkLst>
-        </pc:grpChg>
-        <pc:grpChg chg="mod">
-          <ac:chgData name="Pethick, Matthew" userId="47b0bdf2-08b5-49f1-a741-b2d87ec64f81" providerId="ADAL" clId="{0767353F-D086-4090-8BF5-095E245E8D59}" dt="2025-01-07T14:47:08.704" v="8" actId="571"/>
-          <ac:grpSpMkLst>
-            <pc:docMk/>
-            <pc:sldMk cId="3565139277" sldId="258"/>
-            <ac:grpSpMk id="11" creationId="{8DDEA01F-AEB1-9044-BA4E-2663319B06CE}"/>
-          </ac:grpSpMkLst>
-        </pc:grpChg>
-        <pc:grpChg chg="add mod">
-          <ac:chgData name="Pethick, Matthew" userId="47b0bdf2-08b5-49f1-a741-b2d87ec64f81" providerId="ADAL" clId="{0767353F-D086-4090-8BF5-095E245E8D59}" dt="2025-01-07T14:51:01.679" v="121" actId="1076"/>
-          <ac:grpSpMkLst>
-            <pc:docMk/>
-            <pc:sldMk cId="3565139277" sldId="258"/>
-            <ac:grpSpMk id="20" creationId="{3B537977-9098-E75E-BD8C-DC9CF847D02B}"/>
-          </ac:grpSpMkLst>
-        </pc:grpChg>
-        <pc:grpChg chg="mod topLvl">
-          <ac:chgData name="Pethick, Matthew" userId="47b0bdf2-08b5-49f1-a741-b2d87ec64f81" providerId="ADAL" clId="{0767353F-D086-4090-8BF5-095E245E8D59}" dt="2025-01-07T14:48:26.335" v="77" actId="164"/>
-          <ac:grpSpMkLst>
-            <pc:docMk/>
-            <pc:sldMk cId="3565139277" sldId="258"/>
-            <ac:grpSpMk id="44" creationId="{B2AD6D59-245E-B876-74A9-E9DC099F9372}"/>
-          </ac:grpSpMkLst>
-        </pc:grpChg>
-        <pc:grpChg chg="mod topLvl">
-          <ac:chgData name="Pethick, Matthew" userId="47b0bdf2-08b5-49f1-a741-b2d87ec64f81" providerId="ADAL" clId="{0767353F-D086-4090-8BF5-095E245E8D59}" dt="2025-01-07T14:48:26.335" v="77" actId="164"/>
-          <ac:grpSpMkLst>
-            <pc:docMk/>
-            <pc:sldMk cId="3565139277" sldId="258"/>
-            <ac:grpSpMk id="47" creationId="{6A969915-7478-54A0-E9E0-9FE2FB0BBA64}"/>
-          </ac:grpSpMkLst>
-        </pc:grpChg>
-        <pc:grpChg chg="mod topLvl">
-          <ac:chgData name="Pethick, Matthew" userId="47b0bdf2-08b5-49f1-a741-b2d87ec64f81" providerId="ADAL" clId="{0767353F-D086-4090-8BF5-095E245E8D59}" dt="2025-01-07T14:48:26.335" v="77" actId="164"/>
-          <ac:grpSpMkLst>
-            <pc:docMk/>
-            <pc:sldMk cId="3565139277" sldId="258"/>
-            <ac:grpSpMk id="50" creationId="{01F48E2A-7915-9C25-24B2-54FBF30B9761}"/>
-          </ac:grpSpMkLst>
-        </pc:grpChg>
-        <pc:grpChg chg="mod topLvl">
-          <ac:chgData name="Pethick, Matthew" userId="47b0bdf2-08b5-49f1-a741-b2d87ec64f81" providerId="ADAL" clId="{0767353F-D086-4090-8BF5-095E245E8D59}" dt="2025-01-07T14:48:26.335" v="77" actId="164"/>
-          <ac:grpSpMkLst>
-            <pc:docMk/>
-            <pc:sldMk cId="3565139277" sldId="258"/>
-            <ac:grpSpMk id="53" creationId="{6C376AA3-0B85-4412-8805-8C39C523C35C}"/>
-          </ac:grpSpMkLst>
-        </pc:grpChg>
-        <pc:picChg chg="mod">
-          <ac:chgData name="Pethick, Matthew" userId="47b0bdf2-08b5-49f1-a741-b2d87ec64f81" providerId="ADAL" clId="{0767353F-D086-4090-8BF5-095E245E8D59}" dt="2025-01-07T14:47:08.704" v="8" actId="571"/>
-          <ac:picMkLst>
-            <pc:docMk/>
-            <pc:sldMk cId="3565139277" sldId="258"/>
-            <ac:picMk id="12" creationId="{B69B3811-ED48-1EFD-7270-F817495ADC58}"/>
-          </ac:picMkLst>
-        </pc:picChg>
-        <pc:picChg chg="mod">
-          <ac:chgData name="Pethick, Matthew" userId="47b0bdf2-08b5-49f1-a741-b2d87ec64f81" providerId="ADAL" clId="{0767353F-D086-4090-8BF5-095E245E8D59}" dt="2025-01-07T14:47:08.704" v="8" actId="571"/>
-          <ac:picMkLst>
-            <pc:docMk/>
-            <pc:sldMk cId="3565139277" sldId="258"/>
-            <ac:picMk id="14" creationId="{805A7C92-F37A-0D83-B40E-9E1C75BCE389}"/>
-          </ac:picMkLst>
-        </pc:picChg>
-        <pc:picChg chg="mod">
-          <ac:chgData name="Pethick, Matthew" userId="47b0bdf2-08b5-49f1-a741-b2d87ec64f81" providerId="ADAL" clId="{0767353F-D086-4090-8BF5-095E245E8D59}" dt="2025-01-07T14:47:08.704" v="8" actId="571"/>
-          <ac:picMkLst>
-            <pc:docMk/>
-            <pc:sldMk cId="3565139277" sldId="258"/>
-            <ac:picMk id="16" creationId="{E9D06336-6405-F2A8-8427-18D1D5E9F45A}"/>
-          </ac:picMkLst>
-        </pc:picChg>
-        <pc:picChg chg="mod">
-          <ac:chgData name="Pethick, Matthew" userId="47b0bdf2-08b5-49f1-a741-b2d87ec64f81" providerId="ADAL" clId="{0767353F-D086-4090-8BF5-095E245E8D59}" dt="2025-01-07T14:47:08.704" v="8" actId="571"/>
-          <ac:picMkLst>
-            <pc:docMk/>
-            <pc:sldMk cId="3565139277" sldId="258"/>
-            <ac:picMk id="18" creationId="{8768984F-5674-963B-EB22-B2477D4ABFAD}"/>
-          </ac:picMkLst>
-        </pc:picChg>
-        <pc:picChg chg="add mod ord">
-          <ac:chgData name="Pethick, Matthew" userId="47b0bdf2-08b5-49f1-a741-b2d87ec64f81" providerId="ADAL" clId="{0767353F-D086-4090-8BF5-095E245E8D59}" dt="2025-01-07T14:51:41.424" v="152" actId="1076"/>
-          <ac:picMkLst>
-            <pc:docMk/>
-            <pc:sldMk cId="3565139277" sldId="258"/>
-            <ac:picMk id="23" creationId="{E8C38A18-587B-A7EC-E025-338F70FC0BB8}"/>
-          </ac:picMkLst>
-        </pc:picChg>
-        <pc:picChg chg="del">
-          <ac:chgData name="Pethick, Matthew" userId="47b0bdf2-08b5-49f1-a741-b2d87ec64f81" providerId="ADAL" clId="{0767353F-D086-4090-8BF5-095E245E8D59}" dt="2025-01-07T14:48:46.250" v="84" actId="478"/>
-          <ac:picMkLst>
-            <pc:docMk/>
-            <pc:sldMk cId="3565139277" sldId="258"/>
-            <ac:picMk id="32" creationId="{15FAA72B-A7EF-FD30-73F3-9F1857EE3CDF}"/>
-          </ac:picMkLst>
-        </pc:picChg>
-        <pc:picChg chg="mod">
-          <ac:chgData name="Pethick, Matthew" userId="47b0bdf2-08b5-49f1-a741-b2d87ec64f81" providerId="ADAL" clId="{0767353F-D086-4090-8BF5-095E245E8D59}" dt="2025-01-07T14:47:31.046" v="16" actId="165"/>
-          <ac:picMkLst>
-            <pc:docMk/>
-            <pc:sldMk cId="3565139277" sldId="258"/>
-            <ac:picMk id="45" creationId="{646DEA11-8BFC-6D40-2259-6E8A3DE0C0D7}"/>
-          </ac:picMkLst>
-        </pc:picChg>
-        <pc:picChg chg="mod">
-          <ac:chgData name="Pethick, Matthew" userId="47b0bdf2-08b5-49f1-a741-b2d87ec64f81" providerId="ADAL" clId="{0767353F-D086-4090-8BF5-095E245E8D59}" dt="2025-01-07T14:47:31.046" v="16" actId="165"/>
-          <ac:picMkLst>
-            <pc:docMk/>
-            <pc:sldMk cId="3565139277" sldId="258"/>
-            <ac:picMk id="48" creationId="{B3CCA50F-FEAA-D281-AB00-569587D8B939}"/>
-          </ac:picMkLst>
-        </pc:picChg>
-        <pc:picChg chg="mod">
-          <ac:chgData name="Pethick, Matthew" userId="47b0bdf2-08b5-49f1-a741-b2d87ec64f81" providerId="ADAL" clId="{0767353F-D086-4090-8BF5-095E245E8D59}" dt="2025-01-07T14:47:31.046" v="16" actId="165"/>
-          <ac:picMkLst>
-            <pc:docMk/>
-            <pc:sldMk cId="3565139277" sldId="258"/>
-            <ac:picMk id="51" creationId="{861AE186-B702-3549-4640-6BEE0485FBDA}"/>
-          </ac:picMkLst>
-        </pc:picChg>
-        <pc:picChg chg="mod">
-          <ac:chgData name="Pethick, Matthew" userId="47b0bdf2-08b5-49f1-a741-b2d87ec64f81" providerId="ADAL" clId="{0767353F-D086-4090-8BF5-095E245E8D59}" dt="2025-01-07T14:47:31.046" v="16" actId="165"/>
-          <ac:picMkLst>
-            <pc:docMk/>
-            <pc:sldMk cId="3565139277" sldId="258"/>
-            <ac:picMk id="54" creationId="{EA350AA1-2BEE-B634-6648-B414D723F374}"/>
-          </ac:picMkLst>
-        </pc:picChg>
-        <pc:cxnChg chg="mod">
-          <ac:chgData name="Pethick, Matthew" userId="47b0bdf2-08b5-49f1-a741-b2d87ec64f81" providerId="ADAL" clId="{0767353F-D086-4090-8BF5-095E245E8D59}" dt="2025-01-07T14:52:55.277" v="175" actId="14100"/>
-          <ac:cxnSpMkLst>
-            <pc:docMk/>
-            <pc:sldMk cId="3565139277" sldId="258"/>
-            <ac:cxnSpMk id="8" creationId="{638D73AF-69BC-455F-6463-13DF92E22A2D}"/>
-          </ac:cxnSpMkLst>
-        </pc:cxnChg>
-        <pc:cxnChg chg="mod">
-          <ac:chgData name="Pethick, Matthew" userId="47b0bdf2-08b5-49f1-a741-b2d87ec64f81" providerId="ADAL" clId="{0767353F-D086-4090-8BF5-095E245E8D59}" dt="2025-01-07T14:51:04.783" v="122" actId="14100"/>
-          <ac:cxnSpMkLst>
-            <pc:docMk/>
-            <pc:sldMk cId="3565139277" sldId="258"/>
-            <ac:cxnSpMk id="33" creationId="{E909D445-4F3E-D225-9E67-261728F594CF}"/>
-          </ac:cxnSpMkLst>
-        </pc:cxnChg>
-        <pc:cxnChg chg="mod">
-          <ac:chgData name="Pethick, Matthew" userId="47b0bdf2-08b5-49f1-a741-b2d87ec64f81" providerId="ADAL" clId="{0767353F-D086-4090-8BF5-095E245E8D59}" dt="2025-01-07T14:51:07.797" v="123" actId="14100"/>
-          <ac:cxnSpMkLst>
-            <pc:docMk/>
-            <pc:sldMk cId="3565139277" sldId="258"/>
-            <ac:cxnSpMk id="34" creationId="{6C777204-C710-BF18-235E-767E64798DC2}"/>
-          </ac:cxnSpMkLst>
-        </pc:cxnChg>
-        <pc:cxnChg chg="mod">
-          <ac:chgData name="Pethick, Matthew" userId="47b0bdf2-08b5-49f1-a741-b2d87ec64f81" providerId="ADAL" clId="{0767353F-D086-4090-8BF5-095E245E8D59}" dt="2025-01-07T14:51:13.436" v="125" actId="14100"/>
-          <ac:cxnSpMkLst>
-            <pc:docMk/>
-            <pc:sldMk cId="3565139277" sldId="258"/>
-            <ac:cxnSpMk id="35" creationId="{419F3888-7F57-F752-7FEF-4760145DC7F0}"/>
-          </ac:cxnSpMkLst>
-        </pc:cxnChg>
-        <pc:cxnChg chg="mod">
-          <ac:chgData name="Pethick, Matthew" userId="47b0bdf2-08b5-49f1-a741-b2d87ec64f81" providerId="ADAL" clId="{0767353F-D086-4090-8BF5-095E245E8D59}" dt="2025-01-07T14:53:38.047" v="192" actId="14100"/>
-          <ac:cxnSpMkLst>
-            <pc:docMk/>
-            <pc:sldMk cId="3565139277" sldId="258"/>
-            <ac:cxnSpMk id="39" creationId="{E5C55A6C-32D1-A12E-C2F6-7F7027B36251}"/>
-          </ac:cxnSpMkLst>
-        </pc:cxnChg>
-        <pc:cxnChg chg="mod">
-          <ac:chgData name="Pethick, Matthew" userId="47b0bdf2-08b5-49f1-a741-b2d87ec64f81" providerId="ADAL" clId="{0767353F-D086-4090-8BF5-095E245E8D59}" dt="2025-01-07T14:49:30.003" v="92" actId="14100"/>
-          <ac:cxnSpMkLst>
-            <pc:docMk/>
-            <pc:sldMk cId="3565139277" sldId="258"/>
-            <ac:cxnSpMk id="41" creationId="{21EFB058-F53E-0771-F1E2-DFA85ABEC78E}"/>
-          </ac:cxnSpMkLst>
-        </pc:cxnChg>
-        <pc:cxnChg chg="mod">
-          <ac:chgData name="Pethick, Matthew" userId="47b0bdf2-08b5-49f1-a741-b2d87ec64f81" providerId="ADAL" clId="{0767353F-D086-4090-8BF5-095E245E8D59}" dt="2025-01-07T14:52:32.927" v="170" actId="1037"/>
-          <ac:cxnSpMkLst>
-            <pc:docMk/>
-            <pc:sldMk cId="3565139277" sldId="258"/>
-            <ac:cxnSpMk id="42" creationId="{24A06D2E-9D0C-7355-1360-A4591E903CC8}"/>
-          </ac:cxnSpMkLst>
-        </pc:cxnChg>
-        <pc:cxnChg chg="mod">
-          <ac:chgData name="Pethick, Matthew" userId="47b0bdf2-08b5-49f1-a741-b2d87ec64f81" providerId="ADAL" clId="{0767353F-D086-4090-8BF5-095E245E8D59}" dt="2025-01-07T14:51:10.167" v="124" actId="14100"/>
-          <ac:cxnSpMkLst>
-            <pc:docMk/>
-            <pc:sldMk cId="3565139277" sldId="258"/>
-            <ac:cxnSpMk id="57" creationId="{57FC2AB1-DF34-5B77-C0A4-1D19EE6A677D}"/>
-          </ac:cxnSpMkLst>
-        </pc:cxnChg>
-        <pc:cxnChg chg="mod">
-          <ac:chgData name="Pethick, Matthew" userId="47b0bdf2-08b5-49f1-a741-b2d87ec64f81" providerId="ADAL" clId="{0767353F-D086-4090-8BF5-095E245E8D59}" dt="2025-01-07T14:51:16.235" v="126" actId="14100"/>
-          <ac:cxnSpMkLst>
-            <pc:docMk/>
-            <pc:sldMk cId="3565139277" sldId="258"/>
-            <ac:cxnSpMk id="58" creationId="{8483273F-2441-A393-FD61-31FECC7C634B}"/>
-          </ac:cxnSpMkLst>
-        </pc:cxnChg>
-      </pc:sldChg>
-      <pc:sldChg chg="new del">
-        <pc:chgData name="Pethick, Matthew" userId="47b0bdf2-08b5-49f1-a741-b2d87ec64f81" providerId="ADAL" clId="{0767353F-D086-4090-8BF5-095E245E8D59}" dt="2025-01-07T14:56:52.963" v="213" actId="47"/>
-        <pc:sldMkLst>
-          <pc:docMk/>
-          <pc:sldMk cId="1988458874" sldId="259"/>
-        </pc:sldMkLst>
-      </pc:sldChg>
-      <pc:sldChg chg="new del">
-        <pc:chgData name="Pethick, Matthew" userId="47b0bdf2-08b5-49f1-a741-b2d87ec64f81" providerId="ADAL" clId="{0767353F-D086-4090-8BF5-095E245E8D59}" dt="2025-01-07T14:56:48.890" v="211" actId="47"/>
-        <pc:sldMkLst>
-          <pc:docMk/>
-          <pc:sldMk cId="2909520080" sldId="259"/>
-        </pc:sldMkLst>
-      </pc:sldChg>
-      <pc:sldChg chg="delSp modSp new mod ord">
-        <pc:chgData name="Pethick, Matthew" userId="47b0bdf2-08b5-49f1-a741-b2d87ec64f81" providerId="ADAL" clId="{0767353F-D086-4090-8BF5-095E245E8D59}" dt="2025-01-07T14:57:04.711" v="235" actId="20577"/>
-        <pc:sldMkLst>
-          <pc:docMk/>
-          <pc:sldMk cId="4287347625" sldId="259"/>
-        </pc:sldMkLst>
-        <pc:spChg chg="mod">
-          <ac:chgData name="Pethick, Matthew" userId="47b0bdf2-08b5-49f1-a741-b2d87ec64f81" providerId="ADAL" clId="{0767353F-D086-4090-8BF5-095E245E8D59}" dt="2025-01-07T14:57:04.711" v="235" actId="20577"/>
-          <ac:spMkLst>
-            <pc:docMk/>
-            <pc:sldMk cId="4287347625" sldId="259"/>
-            <ac:spMk id="2" creationId="{2461966D-2631-C743-A140-7B0C74837A21}"/>
-          </ac:spMkLst>
-        </pc:spChg>
-        <pc:spChg chg="del">
-          <ac:chgData name="Pethick, Matthew" userId="47b0bdf2-08b5-49f1-a741-b2d87ec64f81" providerId="ADAL" clId="{0767353F-D086-4090-8BF5-095E245E8D59}" dt="2025-01-07T14:57:02.965" v="229" actId="478"/>
-          <ac:spMkLst>
-            <pc:docMk/>
-            <pc:sldMk cId="4287347625" sldId="259"/>
-            <ac:spMk id="3" creationId="{EC9E90FF-9272-9CFB-7D0B-7BFAA43732CF}"/>
-          </ac:spMkLst>
-        </pc:spChg>
-      </pc:sldChg>
-      <pc:sldChg chg="modSp mod">
-        <pc:chgData name="Pethick, Matthew" userId="47b0bdf2-08b5-49f1-a741-b2d87ec64f81" providerId="ADAL" clId="{0767353F-D086-4090-8BF5-095E245E8D59}" dt="2025-01-07T14:57:14.295" v="242" actId="20577"/>
-        <pc:sldMkLst>
-          <pc:docMk/>
-          <pc:sldMk cId="1555941035" sldId="260"/>
-        </pc:sldMkLst>
-        <pc:spChg chg="mod">
-          <ac:chgData name="Pethick, Matthew" userId="47b0bdf2-08b5-49f1-a741-b2d87ec64f81" providerId="ADAL" clId="{0767353F-D086-4090-8BF5-095E245E8D59}" dt="2025-01-07T14:57:14.295" v="242" actId="20577"/>
-          <ac:spMkLst>
-            <pc:docMk/>
-            <pc:sldMk cId="1555941035" sldId="260"/>
-            <ac:spMk id="2" creationId="{98B7F00E-C702-812A-6860-649B07CE9FFB}"/>
-          </ac:spMkLst>
-        </pc:spChg>
-      </pc:sldChg>
-    </pc:docChg>
-  </pc:docChgLst>
-  <pc:docChgLst>
-    <pc:chgData name="Pethick, Matthew" userId="47b0bdf2-08b5-49f1-a741-b2d87ec64f81" providerId="ADAL" clId="{4D0BF372-0143-4AE8-8B76-AB608A7C8084}"/>
-    <pc:docChg chg="undo custSel modSld">
-      <pc:chgData name="Pethick, Matthew" userId="47b0bdf2-08b5-49f1-a741-b2d87ec64f81" providerId="ADAL" clId="{4D0BF372-0143-4AE8-8B76-AB608A7C8084}" dt="2024-11-11T13:29:43.721" v="179" actId="12789"/>
-      <pc:docMkLst>
-        <pc:docMk/>
-      </pc:docMkLst>
-      <pc:sldChg chg="addSp delSp modSp mod">
-        <pc:chgData name="Pethick, Matthew" userId="47b0bdf2-08b5-49f1-a741-b2d87ec64f81" providerId="ADAL" clId="{4D0BF372-0143-4AE8-8B76-AB608A7C8084}" dt="2024-11-11T13:29:43.721" v="179" actId="12789"/>
-        <pc:sldMkLst>
-          <pc:docMk/>
-          <pc:sldMk cId="3712660401" sldId="257"/>
-        </pc:sldMkLst>
-        <pc:spChg chg="add del mod">
-          <ac:chgData name="Pethick, Matthew" userId="47b0bdf2-08b5-49f1-a741-b2d87ec64f81" providerId="ADAL" clId="{4D0BF372-0143-4AE8-8B76-AB608A7C8084}" dt="2024-11-11T13:06:06.357" v="102" actId="478"/>
-          <ac:spMkLst>
-            <pc:docMk/>
-            <pc:sldMk cId="3712660401" sldId="257"/>
-            <ac:spMk id="6" creationId="{BC1AFFD5-B2A8-CC9A-FE21-29B166D0C46D}"/>
-          </ac:spMkLst>
-        </pc:spChg>
-        <pc:spChg chg="add mod">
-          <ac:chgData name="Pethick, Matthew" userId="47b0bdf2-08b5-49f1-a741-b2d87ec64f81" providerId="ADAL" clId="{4D0BF372-0143-4AE8-8B76-AB608A7C8084}" dt="2024-11-11T13:14:56.195" v="135" actId="1035"/>
-          <ac:spMkLst>
-            <pc:docMk/>
-            <pc:sldMk cId="3712660401" sldId="257"/>
-            <ac:spMk id="7" creationId="{5A8ED71B-2C2A-05C8-E066-18E9A9AC05B9}"/>
-          </ac:spMkLst>
-        </pc:spChg>
-        <pc:spChg chg="add mod">
-          <ac:chgData name="Pethick, Matthew" userId="47b0bdf2-08b5-49f1-a741-b2d87ec64f81" providerId="ADAL" clId="{4D0BF372-0143-4AE8-8B76-AB608A7C8084}" dt="2024-11-11T13:29:29.439" v="177" actId="571"/>
-          <ac:spMkLst>
-            <pc:docMk/>
-            <pc:sldMk cId="3712660401" sldId="257"/>
-            <ac:spMk id="13" creationId="{007A81E1-BE80-8BB8-5F0F-6AC3B154DACF}"/>
-          </ac:spMkLst>
-        </pc:spChg>
-        <pc:spChg chg="mod">
-          <ac:chgData name="Pethick, Matthew" userId="47b0bdf2-08b5-49f1-a741-b2d87ec64f81" providerId="ADAL" clId="{4D0BF372-0143-4AE8-8B76-AB608A7C8084}" dt="2024-11-11T13:10:59.657" v="134" actId="20577"/>
-          <ac:spMkLst>
-            <pc:docMk/>
-            <pc:sldMk cId="3712660401" sldId="257"/>
-            <ac:spMk id="37" creationId="{E4A8F66B-7D32-4301-7B2E-222716E02861}"/>
-          </ac:spMkLst>
-        </pc:spChg>
-        <pc:spChg chg="mod ord">
-          <ac:chgData name="Pethick, Matthew" userId="47b0bdf2-08b5-49f1-a741-b2d87ec64f81" providerId="ADAL" clId="{4D0BF372-0143-4AE8-8B76-AB608A7C8084}" dt="2024-11-11T13:29:43.721" v="179" actId="12789"/>
-          <ac:spMkLst>
-            <pc:docMk/>
-            <pc:sldMk cId="3712660401" sldId="257"/>
-            <ac:spMk id="43" creationId="{62C57809-9881-2022-3565-9B7E6AF5C9B8}"/>
-          </ac:spMkLst>
-        </pc:spChg>
-        <pc:spChg chg="mod">
-          <ac:chgData name="Pethick, Matthew" userId="47b0bdf2-08b5-49f1-a741-b2d87ec64f81" providerId="ADAL" clId="{4D0BF372-0143-4AE8-8B76-AB608A7C8084}" dt="2024-11-11T13:06:20.067" v="112" actId="1038"/>
-          <ac:spMkLst>
-            <pc:docMk/>
-            <pc:sldMk cId="3712660401" sldId="257"/>
-            <ac:spMk id="56" creationId="{2C6DCEAB-90A7-F576-D7C2-5BA683AA77DC}"/>
-          </ac:spMkLst>
-        </pc:spChg>
-        <pc:grpChg chg="add mod">
-          <ac:chgData name="Pethick, Matthew" userId="47b0bdf2-08b5-49f1-a741-b2d87ec64f81" providerId="ADAL" clId="{4D0BF372-0143-4AE8-8B76-AB608A7C8084}" dt="2024-11-11T13:29:43.721" v="179" actId="12789"/>
-          <ac:grpSpMkLst>
-            <pc:docMk/>
-            <pc:sldMk cId="3712660401" sldId="257"/>
-            <ac:grpSpMk id="2" creationId="{21846AE4-D3AE-861F-A126-5904222E38C2}"/>
-          </ac:grpSpMkLst>
-        </pc:grpChg>
-        <pc:grpChg chg="mod">
-          <ac:chgData name="Pethick, Matthew" userId="47b0bdf2-08b5-49f1-a741-b2d87ec64f81" providerId="ADAL" clId="{4D0BF372-0143-4AE8-8B76-AB608A7C8084}" dt="2024-11-11T13:27:49.462" v="143" actId="164"/>
-          <ac:grpSpMkLst>
-            <pc:docMk/>
-            <pc:sldMk cId="3712660401" sldId="257"/>
-            <ac:grpSpMk id="44" creationId="{546BF22A-4081-4065-6382-5535B88F18B3}"/>
-          </ac:grpSpMkLst>
-        </pc:grpChg>
-        <pc:grpChg chg="mod">
-          <ac:chgData name="Pethick, Matthew" userId="47b0bdf2-08b5-49f1-a741-b2d87ec64f81" providerId="ADAL" clId="{4D0BF372-0143-4AE8-8B76-AB608A7C8084}" dt="2024-11-11T13:27:49.462" v="143" actId="164"/>
-          <ac:grpSpMkLst>
-            <pc:docMk/>
-            <pc:sldMk cId="3712660401" sldId="257"/>
-            <ac:grpSpMk id="47" creationId="{51E95FE4-C20B-3942-CFB0-E2EAF0C67BAF}"/>
-          </ac:grpSpMkLst>
-        </pc:grpChg>
-        <pc:grpChg chg="mod">
-          <ac:chgData name="Pethick, Matthew" userId="47b0bdf2-08b5-49f1-a741-b2d87ec64f81" providerId="ADAL" clId="{4D0BF372-0143-4AE8-8B76-AB608A7C8084}" dt="2024-11-11T13:27:49.462" v="143" actId="164"/>
-          <ac:grpSpMkLst>
-            <pc:docMk/>
-            <pc:sldMk cId="3712660401" sldId="257"/>
-            <ac:grpSpMk id="50" creationId="{B67CD042-4161-6A57-4273-D5825E61A143}"/>
-          </ac:grpSpMkLst>
-        </pc:grpChg>
-        <pc:grpChg chg="mod">
-          <ac:chgData name="Pethick, Matthew" userId="47b0bdf2-08b5-49f1-a741-b2d87ec64f81" providerId="ADAL" clId="{4D0BF372-0143-4AE8-8B76-AB608A7C8084}" dt="2024-11-11T13:27:49.462" v="143" actId="164"/>
-          <ac:grpSpMkLst>
-            <pc:docMk/>
-            <pc:sldMk cId="3712660401" sldId="257"/>
-            <ac:grpSpMk id="53" creationId="{9BE2784E-2B14-97F2-C676-6AA58F7B9EAB}"/>
-          </ac:grpSpMkLst>
-        </pc:grpChg>
-        <pc:picChg chg="mod">
-          <ac:chgData name="Pethick, Matthew" userId="47b0bdf2-08b5-49f1-a741-b2d87ec64f81" providerId="ADAL" clId="{4D0BF372-0143-4AE8-8B76-AB608A7C8084}" dt="2024-11-11T13:28:29.286" v="167" actId="1037"/>
-          <ac:picMkLst>
-            <pc:docMk/>
-            <pc:sldMk cId="3712660401" sldId="257"/>
-            <ac:picMk id="32" creationId="{1C567C94-DF8C-B444-7B7C-E8C4FCC25C8B}"/>
-          </ac:picMkLst>
-        </pc:picChg>
-        <pc:cxnChg chg="add mod">
-          <ac:chgData name="Pethick, Matthew" userId="47b0bdf2-08b5-49f1-a741-b2d87ec64f81" providerId="ADAL" clId="{4D0BF372-0143-4AE8-8B76-AB608A7C8084}" dt="2024-11-11T13:15:56.485" v="137" actId="208"/>
-          <ac:cxnSpMkLst>
-            <pc:docMk/>
-            <pc:sldMk cId="3712660401" sldId="257"/>
-            <ac:cxnSpMk id="8" creationId="{207D279B-ACFD-FB8A-02B4-C5E220D621D3}"/>
-          </ac:cxnSpMkLst>
-        </pc:cxnChg>
-        <pc:cxnChg chg="mod">
-          <ac:chgData name="Pethick, Matthew" userId="47b0bdf2-08b5-49f1-a741-b2d87ec64f81" providerId="ADAL" clId="{4D0BF372-0143-4AE8-8B76-AB608A7C8084}" dt="2024-11-11T13:28:42.882" v="168" actId="14100"/>
-          <ac:cxnSpMkLst>
-            <pc:docMk/>
-            <pc:sldMk cId="3712660401" sldId="257"/>
-            <ac:cxnSpMk id="35" creationId="{03399DFA-1B81-D2AB-DCCB-91B413D68FDD}"/>
-          </ac:cxnSpMkLst>
-        </pc:cxnChg>
-        <pc:cxnChg chg="mod">
-          <ac:chgData name="Pethick, Matthew" userId="47b0bdf2-08b5-49f1-a741-b2d87ec64f81" providerId="ADAL" clId="{4D0BF372-0143-4AE8-8B76-AB608A7C8084}" dt="2024-11-11T13:07:23.673" v="128" actId="14100"/>
-          <ac:cxnSpMkLst>
-            <pc:docMk/>
-            <pc:sldMk cId="3712660401" sldId="257"/>
-            <ac:cxnSpMk id="39" creationId="{7A271D3B-60A6-AE68-DD18-916178C23E31}"/>
-          </ac:cxnSpMkLst>
-        </pc:cxnChg>
-        <pc:cxnChg chg="mod">
-          <ac:chgData name="Pethick, Matthew" userId="47b0bdf2-08b5-49f1-a741-b2d87ec64f81" providerId="ADAL" clId="{4D0BF372-0143-4AE8-8B76-AB608A7C8084}" dt="2024-11-11T13:28:50.358" v="169" actId="14100"/>
-          <ac:cxnSpMkLst>
-            <pc:docMk/>
-            <pc:sldMk cId="3712660401" sldId="257"/>
-            <ac:cxnSpMk id="42" creationId="{3242EC64-5BB9-EF3E-A8A6-495DBA59D873}"/>
-          </ac:cxnSpMkLst>
-        </pc:cxnChg>
-        <pc:cxnChg chg="mod">
-          <ac:chgData name="Pethick, Matthew" userId="47b0bdf2-08b5-49f1-a741-b2d87ec64f81" providerId="ADAL" clId="{4D0BF372-0143-4AE8-8B76-AB608A7C8084}" dt="2024-11-11T13:29:43.721" v="179" actId="12789"/>
-          <ac:cxnSpMkLst>
-            <pc:docMk/>
-            <pc:sldMk cId="3712660401" sldId="257"/>
-            <ac:cxnSpMk id="58" creationId="{108DB30E-207D-964A-5CCE-64B4479EB74C}"/>
-          </ac:cxnSpMkLst>
-        </pc:cxnChg>
       </pc:sldChg>
     </pc:docChg>
   </pc:docChgLst>
@@ -22290,8 +21713,39 @@
                 <a:ea typeface="+mn-ea"/>
                 <a:cs typeface="Segoe UI" panose="020B0502040204020203" pitchFamily="34" charset="0"/>
               </a:rPr>
-              <a:t>Press any direction to start playing</a:t>
-            </a:r>
+              <a:t>Press any direction to </a:t>
+            </a:r>
+            <a:r>
+              <a:rPr kumimoji="0" lang="en-US" sz="2400" b="0" i="0" u="none" strike="noStrike" kern="1200" cap="none" spc="0" normalizeH="0" baseline="0" noProof="0">
+                <a:ln>
+                  <a:noFill/>
+                </a:ln>
+                <a:solidFill>
+                  <a:srgbClr val="000000"/>
+                </a:solidFill>
+                <a:effectLst/>
+                <a:uLnTx/>
+                <a:uFillTx/>
+                <a:latin typeface="Klavika Regular"/>
+                <a:ea typeface="+mn-ea"/>
+                <a:cs typeface="Segoe UI" panose="020B0502040204020203" pitchFamily="34" charset="0"/>
+              </a:rPr>
+              <a:t>start playing.</a:t>
+            </a:r>
+            <a:endParaRPr kumimoji="0" lang="en-US" sz="2400" b="0" i="0" u="none" strike="noStrike" kern="1200" cap="none" spc="0" normalizeH="0" baseline="0" noProof="0" dirty="0">
+              <a:ln>
+                <a:noFill/>
+              </a:ln>
+              <a:solidFill>
+                <a:srgbClr val="000000"/>
+              </a:solidFill>
+              <a:effectLst/>
+              <a:uLnTx/>
+              <a:uFillTx/>
+              <a:latin typeface="Klavika Regular"/>
+              <a:ea typeface="+mn-ea"/>
+              <a:cs typeface="Segoe UI" panose="020B0502040204020203" pitchFamily="34" charset="0"/>
+            </a:endParaRPr>
           </a:p>
           <a:p>
             <a:pPr marL="228600" marR="0" lvl="0" indent="-228600" algn="l" defTabSz="932742" rtl="0" eaLnBrk="1" fontAlgn="auto" latinLnBrk="0" hangingPunct="1">
@@ -23681,7 +23135,7 @@
           <a:p>
             <a:r>
               <a:rPr lang="en-GB" dirty="0"/>
-              <a:t>Boolean board</a:t>
+              <a:t>Boolean board                     (square directions)</a:t>
             </a:r>
           </a:p>
         </p:txBody>
@@ -23780,8 +23234,8 @@
         </p:nvCxnSpPr>
         <p:spPr>
           <a:xfrm flipV="1">
-            <a:off x="7810631" y="2344258"/>
-            <a:ext cx="2006469" cy="2170547"/>
+            <a:off x="7810631" y="2389267"/>
+            <a:ext cx="2006469" cy="2125538"/>
           </a:xfrm>
           <a:prstGeom prst="line">
             <a:avLst/>
@@ -24309,7 +23763,7 @@
                 <a:ea typeface="+mn-ea"/>
                 <a:cs typeface="Segoe UI" panose="020B0502040204020203" pitchFamily="34" charset="0"/>
               </a:rPr>
-              <a:t>Press any direction to start playing</a:t>
+              <a:t>Press any direction to start playing.</a:t>
             </a:r>
           </a:p>
           <a:p>
@@ -24486,7 +23940,7 @@
                 <a:ea typeface="+mn-ea"/>
                 <a:cs typeface="Segoe UI" panose="020B0502040204020203" pitchFamily="34" charset="0"/>
               </a:rPr>
-              <a:t>Use the reset switch to start over in the event of a win or lose screen</a:t>
+              <a:t>Use the reset switch to start over in the event of a win or lose screen.</a:t>
             </a:r>
           </a:p>
           <a:p>
@@ -24660,8 +24114,8 @@
         </p:nvSpPr>
         <p:spPr bwMode="auto">
           <a:xfrm>
-            <a:off x="9817101" y="2357087"/>
-            <a:ext cx="1022350" cy="738664"/>
+            <a:off x="9817101" y="2389267"/>
+            <a:ext cx="1022350" cy="706484"/>
           </a:xfrm>
           <a:prstGeom prst="rect">
             <a:avLst/>
@@ -25472,8 +24926,8 @@
         </p:nvCxnSpPr>
         <p:spPr>
           <a:xfrm flipV="1">
-            <a:off x="10633169" y="2357087"/>
-            <a:ext cx="206282" cy="2157718"/>
+            <a:off x="10633169" y="2389267"/>
+            <a:ext cx="206282" cy="2125538"/>
           </a:xfrm>
           <a:prstGeom prst="line">
             <a:avLst/>
@@ -25646,6 +25100,2091 @@
     <p:extLst>
       <p:ext uri="{BB962C8B-B14F-4D97-AF65-F5344CB8AC3E}">
         <p14:creationId xmlns:p14="http://schemas.microsoft.com/office/powerpoint/2010/main" val="3565139277"/>
+      </p:ext>
+    </p:extLst>
+  </p:cSld>
+  <p:clrMapOvr>
+    <a:masterClrMapping/>
+  </p:clrMapOvr>
+</p:sld>
+</file>
+
+<file path=ppt/slides/slide5.xml><?xml version="1.0" encoding="utf-8"?>
+<p:sld xmlns:a="http://schemas.openxmlformats.org/drawingml/2006/main" xmlns:r="http://schemas.openxmlformats.org/officeDocument/2006/relationships" xmlns:p="http://schemas.openxmlformats.org/presentationml/2006/main">
+  <p:cSld>
+    <p:spTree>
+      <p:nvGrpSpPr>
+        <p:cNvPr id="1" name="">
+          <a:extLst>
+            <a:ext uri="{FF2B5EF4-FFF2-40B4-BE49-F238E27FC236}">
+              <a16:creationId xmlns:a16="http://schemas.microsoft.com/office/drawing/2014/main" id="{4D519DC1-9441-9DA8-021C-E54336139699}"/>
+            </a:ext>
+          </a:extLst>
+        </p:cNvPr>
+        <p:cNvGrpSpPr/>
+        <p:nvPr/>
+      </p:nvGrpSpPr>
+      <p:grpSpPr>
+        <a:xfrm>
+          <a:off x="0" y="0"/>
+          <a:ext cx="0" cy="0"/>
+          <a:chOff x="0" y="0"/>
+          <a:chExt cx="0" cy="0"/>
+        </a:xfrm>
+      </p:grpSpPr>
+      <p:sp>
+        <p:nvSpPr>
+          <p:cNvPr id="2" name="Title 1">
+            <a:extLst>
+              <a:ext uri="{FF2B5EF4-FFF2-40B4-BE49-F238E27FC236}">
+                <a16:creationId xmlns:a16="http://schemas.microsoft.com/office/drawing/2014/main" id="{9E9FD204-7B79-4E03-CAF4-9962335A095A}"/>
+              </a:ext>
+            </a:extLst>
+          </p:cNvPr>
+          <p:cNvSpPr>
+            <a:spLocks noGrp="1"/>
+          </p:cNvSpPr>
+          <p:nvPr>
+            <p:ph type="title"/>
+          </p:nvPr>
+        </p:nvSpPr>
+        <p:spPr/>
+        <p:txBody>
+          <a:bodyPr/>
+          <a:lstStyle/>
+          <a:p>
+            <a:r>
+              <a:rPr lang="en-GB" dirty="0"/>
+              <a:t>Boolean board                     (diagonal directions)</a:t>
+            </a:r>
+          </a:p>
+        </p:txBody>
+      </p:sp>
+    </p:spTree>
+    <p:extLst>
+      <p:ext uri="{BB962C8B-B14F-4D97-AF65-F5344CB8AC3E}">
+        <p14:creationId xmlns:p14="http://schemas.microsoft.com/office/powerpoint/2010/main" val="1305687388"/>
+      </p:ext>
+    </p:extLst>
+  </p:cSld>
+  <p:clrMapOvr>
+    <a:masterClrMapping/>
+  </p:clrMapOvr>
+  <mc:AlternateContent xmlns:mc="http://schemas.openxmlformats.org/markup-compatibility/2006" xmlns:p14="http://schemas.microsoft.com/office/powerpoint/2010/main">
+    <mc:Choice Requires="p14">
+      <p:transition spd="med" p14:dur="700">
+        <p:fade/>
+      </p:transition>
+    </mc:Choice>
+    <mc:Fallback xmlns:p15="http://schemas.microsoft.com/office/powerpoint/2012/main" xmlns:a14="http://schemas.microsoft.com/office/drawing/2010/main" xmlns:a16="http://schemas.microsoft.com/office/drawing/2014/main" xmlns="">
+      <p:transition spd="med">
+        <p:fade/>
+      </p:transition>
+    </mc:Fallback>
+  </mc:AlternateContent>
+</p:sld>
+</file>
+
+<file path=ppt/slides/slide6.xml><?xml version="1.0" encoding="utf-8"?>
+<p:sld xmlns:a="http://schemas.openxmlformats.org/drawingml/2006/main" xmlns:r="http://schemas.openxmlformats.org/officeDocument/2006/relationships" xmlns:p="http://schemas.openxmlformats.org/presentationml/2006/main">
+  <p:cSld>
+    <p:spTree>
+      <p:nvGrpSpPr>
+        <p:cNvPr id="1" name="">
+          <a:extLst>
+            <a:ext uri="{FF2B5EF4-FFF2-40B4-BE49-F238E27FC236}">
+              <a16:creationId xmlns:a16="http://schemas.microsoft.com/office/drawing/2014/main" id="{BD90BB19-A17A-D708-1C51-810C2EDC8D8F}"/>
+            </a:ext>
+          </a:extLst>
+        </p:cNvPr>
+        <p:cNvGrpSpPr/>
+        <p:nvPr/>
+      </p:nvGrpSpPr>
+      <p:grpSpPr>
+        <a:xfrm>
+          <a:off x="0" y="0"/>
+          <a:ext cx="0" cy="0"/>
+          <a:chOff x="0" y="0"/>
+          <a:chExt cx="0" cy="0"/>
+        </a:xfrm>
+      </p:grpSpPr>
+      <p:pic>
+        <p:nvPicPr>
+          <p:cNvPr id="23" name="Picture 22">
+            <a:extLst>
+              <a:ext uri="{FF2B5EF4-FFF2-40B4-BE49-F238E27FC236}">
+                <a16:creationId xmlns:a16="http://schemas.microsoft.com/office/drawing/2014/main" id="{D3B28AC0-3565-442F-49AB-5A9C0CE02AE5}"/>
+              </a:ext>
+            </a:extLst>
+          </p:cNvPr>
+          <p:cNvPicPr>
+            <a:picLocks noChangeAspect="1"/>
+          </p:cNvPicPr>
+          <p:nvPr/>
+        </p:nvPicPr>
+        <p:blipFill>
+          <a:blip r:embed="rId2"/>
+          <a:stretch>
+            <a:fillRect/>
+          </a:stretch>
+        </p:blipFill>
+        <p:spPr>
+          <a:xfrm>
+            <a:off x="6376402" y="59504"/>
+            <a:ext cx="5501297" cy="4016820"/>
+          </a:xfrm>
+          <a:prstGeom prst="rect">
+            <a:avLst/>
+          </a:prstGeom>
+        </p:spPr>
+      </p:pic>
+      <p:cxnSp>
+        <p:nvCxnSpPr>
+          <p:cNvPr id="33" name="Straight Connector 32">
+            <a:extLst>
+              <a:ext uri="{FF2B5EF4-FFF2-40B4-BE49-F238E27FC236}">
+                <a16:creationId xmlns:a16="http://schemas.microsoft.com/office/drawing/2014/main" id="{AFD4298F-2A01-D560-320A-668FCBCFCDD7}"/>
+              </a:ext>
+            </a:extLst>
+          </p:cNvPr>
+          <p:cNvCxnSpPr>
+            <a:cxnSpLocks/>
+          </p:cNvCxnSpPr>
+          <p:nvPr/>
+        </p:nvCxnSpPr>
+        <p:spPr>
+          <a:xfrm flipV="1">
+            <a:off x="7810631" y="2389267"/>
+            <a:ext cx="2006469" cy="2125538"/>
+          </a:xfrm>
+          <a:prstGeom prst="line">
+            <a:avLst/>
+          </a:prstGeom>
+          <a:noFill/>
+          <a:ln w="9525" cap="flat" cmpd="sng" algn="ctr">
+            <a:solidFill>
+              <a:srgbClr val="ED1C24"/>
+            </a:solidFill>
+            <a:prstDash val="solid"/>
+            <a:headEnd type="none" w="lg" len="med"/>
+            <a:tailEnd type="none" w="lg" len="med"/>
+          </a:ln>
+          <a:effectLst/>
+        </p:spPr>
+      </p:cxnSp>
+      <p:cxnSp>
+        <p:nvCxnSpPr>
+          <p:cNvPr id="34" name="Straight Connector 33">
+            <a:extLst>
+              <a:ext uri="{FF2B5EF4-FFF2-40B4-BE49-F238E27FC236}">
+                <a16:creationId xmlns:a16="http://schemas.microsoft.com/office/drawing/2014/main" id="{7AAF0795-7AD0-ED2A-F4B5-E65C0710701A}"/>
+              </a:ext>
+            </a:extLst>
+          </p:cNvPr>
+          <p:cNvCxnSpPr>
+            <a:cxnSpLocks/>
+          </p:cNvCxnSpPr>
+          <p:nvPr/>
+        </p:nvCxnSpPr>
+        <p:spPr>
+          <a:xfrm flipV="1">
+            <a:off x="7810631" y="3089612"/>
+            <a:ext cx="2006469" cy="3589219"/>
+          </a:xfrm>
+          <a:prstGeom prst="line">
+            <a:avLst/>
+          </a:prstGeom>
+          <a:noFill/>
+          <a:ln w="9525" cap="flat" cmpd="sng" algn="ctr">
+            <a:solidFill>
+              <a:srgbClr val="ED1C24"/>
+            </a:solidFill>
+            <a:prstDash val="solid"/>
+            <a:headEnd type="none" w="lg" len="med"/>
+            <a:tailEnd type="none" w="lg" len="med"/>
+          </a:ln>
+          <a:effectLst/>
+        </p:spPr>
+      </p:cxnSp>
+      <p:sp>
+        <p:nvSpPr>
+          <p:cNvPr id="43" name="Rectangle 42">
+            <a:extLst>
+              <a:ext uri="{FF2B5EF4-FFF2-40B4-BE49-F238E27FC236}">
+                <a16:creationId xmlns:a16="http://schemas.microsoft.com/office/drawing/2014/main" id="{0DB89943-62FF-4441-2A90-8759A0C2443E}"/>
+              </a:ext>
+            </a:extLst>
+          </p:cNvPr>
+          <p:cNvSpPr/>
+          <p:nvPr/>
+        </p:nvSpPr>
+        <p:spPr bwMode="auto">
+          <a:xfrm>
+            <a:off x="7810631" y="4514807"/>
+            <a:ext cx="2822538" cy="2164024"/>
+          </a:xfrm>
+          <a:prstGeom prst="rect">
+            <a:avLst/>
+          </a:prstGeom>
+          <a:solidFill>
+            <a:srgbClr val="FFFFFF"/>
+          </a:solidFill>
+          <a:ln w="38100" cap="flat" cmpd="sng" algn="ctr">
+            <a:solidFill>
+              <a:srgbClr val="ED1C24"/>
+            </a:solidFill>
+            <a:prstDash val="solid"/>
+            <a:headEnd type="none" w="med" len="med"/>
+            <a:tailEnd type="none" w="med" len="med"/>
+          </a:ln>
+          <a:effectLst/>
+        </p:spPr>
+        <p:txBody>
+          <a:bodyPr rot="0" spcFirstLastPara="0" vertOverflow="overflow" horzOverflow="overflow" vert="horz" wrap="square" lIns="182880" tIns="146304" rIns="182880" bIns="146304" numCol="1" spcCol="0" rtlCol="0" fromWordArt="0" anchor="t" anchorCtr="0" forceAA="0" compatLnSpc="1">
+            <a:prstTxWarp prst="textNoShape">
+              <a:avLst/>
+            </a:prstTxWarp>
+            <a:noAutofit/>
+          </a:bodyPr>
+          <a:lstStyle/>
+          <a:p>
+            <a:pPr marL="0" marR="0" lvl="0" indent="0" defTabSz="932472" eaLnBrk="1" fontAlgn="base" latinLnBrk="0" hangingPunct="1">
+              <a:lnSpc>
+                <a:spcPct val="100000"/>
+              </a:lnSpc>
+              <a:spcBef>
+                <a:spcPct val="0"/>
+              </a:spcBef>
+              <a:spcAft>
+                <a:spcPct val="0"/>
+              </a:spcAft>
+              <a:buClrTx/>
+              <a:buSzTx/>
+              <a:buFontTx/>
+              <a:buNone/>
+              <a:tabLst/>
+              <a:defRPr/>
+            </a:pPr>
+            <a:endParaRPr kumimoji="0" lang="en-GB" sz="1800" b="0" i="0" u="none" strike="noStrike" kern="0" cap="none" spc="0" normalizeH="0" baseline="0" noProof="0" dirty="0" err="1">
+              <a:ln>
+                <a:noFill/>
+              </a:ln>
+              <a:gradFill>
+                <a:gsLst>
+                  <a:gs pos="0">
+                    <a:srgbClr val="FFFFFF"/>
+                  </a:gs>
+                  <a:gs pos="100000">
+                    <a:srgbClr val="FFFFFF"/>
+                  </a:gs>
+                </a:gsLst>
+                <a:lin ang="5400000" scaled="0"/>
+              </a:gradFill>
+              <a:effectLst/>
+              <a:uLnTx/>
+              <a:uFillTx/>
+              <a:latin typeface="Klavika Regular"/>
+              <a:ea typeface="Segoe UI" pitchFamily="34" charset="0"/>
+              <a:cs typeface="Segoe UI" pitchFamily="34" charset="0"/>
+            </a:endParaRPr>
+          </a:p>
+        </p:txBody>
+      </p:sp>
+      <p:cxnSp>
+        <p:nvCxnSpPr>
+          <p:cNvPr id="35" name="Straight Connector 34">
+            <a:extLst>
+              <a:ext uri="{FF2B5EF4-FFF2-40B4-BE49-F238E27FC236}">
+                <a16:creationId xmlns:a16="http://schemas.microsoft.com/office/drawing/2014/main" id="{DAF3DCF6-133B-AB66-AC0E-750B8D6654B9}"/>
+              </a:ext>
+            </a:extLst>
+          </p:cNvPr>
+          <p:cNvCxnSpPr>
+            <a:cxnSpLocks/>
+          </p:cNvCxnSpPr>
+          <p:nvPr/>
+        </p:nvCxnSpPr>
+        <p:spPr>
+          <a:xfrm flipV="1">
+            <a:off x="10633169" y="3095751"/>
+            <a:ext cx="206282" cy="3533649"/>
+          </a:xfrm>
+          <a:prstGeom prst="line">
+            <a:avLst/>
+          </a:prstGeom>
+          <a:noFill/>
+          <a:ln w="9525" cap="flat" cmpd="sng" algn="ctr">
+            <a:solidFill>
+              <a:srgbClr val="ED1C24"/>
+            </a:solidFill>
+            <a:prstDash val="solid"/>
+            <a:headEnd type="none" w="lg" len="med"/>
+            <a:tailEnd type="none" w="lg" len="med"/>
+          </a:ln>
+          <a:effectLst/>
+        </p:spPr>
+      </p:cxnSp>
+      <p:sp>
+        <p:nvSpPr>
+          <p:cNvPr id="36" name="Title 1">
+            <a:extLst>
+              <a:ext uri="{FF2B5EF4-FFF2-40B4-BE49-F238E27FC236}">
+                <a16:creationId xmlns:a16="http://schemas.microsoft.com/office/drawing/2014/main" id="{2F63F428-B53D-6909-FDD6-9C71796D8BF6}"/>
+              </a:ext>
+            </a:extLst>
+          </p:cNvPr>
+          <p:cNvSpPr txBox="1">
+            <a:spLocks/>
+          </p:cNvSpPr>
+          <p:nvPr/>
+        </p:nvSpPr>
+        <p:spPr>
+          <a:xfrm>
+            <a:off x="588263" y="591790"/>
+            <a:ext cx="11018520" cy="738664"/>
+          </a:xfrm>
+          <a:prstGeom prst="rect">
+            <a:avLst/>
+          </a:prstGeom>
+        </p:spPr>
+        <p:txBody>
+          <a:bodyPr vert="horz" wrap="square" lIns="0" tIns="0" rIns="0" bIns="0" rtlCol="0" anchor="t">
+            <a:spAutoFit/>
+          </a:bodyPr>
+          <a:lstStyle>
+            <a:lvl1pPr algn="l" defTabSz="932742" rtl="0" eaLnBrk="1" latinLnBrk="0" hangingPunct="1">
+              <a:lnSpc>
+                <a:spcPct val="100000"/>
+              </a:lnSpc>
+              <a:spcBef>
+                <a:spcPct val="0"/>
+              </a:spcBef>
+              <a:buNone/>
+              <a:defRPr lang="en-US" sz="2800" b="1" kern="1200" cap="none" spc="0" baseline="0" dirty="0" smtClean="0">
+                <a:ln w="3175">
+                  <a:noFill/>
+                </a:ln>
+                <a:solidFill>
+                  <a:schemeClr val="tx1"/>
+                </a:solidFill>
+                <a:effectLst/>
+                <a:latin typeface="+mj-lt"/>
+                <a:ea typeface="+mn-ea"/>
+                <a:cs typeface="Segoe UI" pitchFamily="34" charset="0"/>
+              </a:defRPr>
+            </a:lvl1pPr>
+          </a:lstStyle>
+          <a:p>
+            <a:pPr marL="0" marR="0" lvl="0" indent="0" algn="l" defTabSz="932742" rtl="0" eaLnBrk="1" fontAlgn="auto" latinLnBrk="0" hangingPunct="1">
+              <a:lnSpc>
+                <a:spcPct val="100000"/>
+              </a:lnSpc>
+              <a:spcBef>
+                <a:spcPct val="0"/>
+              </a:spcBef>
+              <a:spcAft>
+                <a:spcPts val="0"/>
+              </a:spcAft>
+              <a:buClrTx/>
+              <a:buSzTx/>
+              <a:buFontTx/>
+              <a:buNone/>
+              <a:tabLst/>
+              <a:defRPr/>
+            </a:pPr>
+            <a:r>
+              <a:rPr kumimoji="0" lang="en-GB" sz="4800" b="1" i="0" u="none" strike="noStrike" kern="1200" cap="none" spc="0" normalizeH="0" baseline="0" noProof="0" dirty="0" err="1">
+                <a:ln w="3175">
+                  <a:noFill/>
+                </a:ln>
+                <a:solidFill>
+                  <a:srgbClr val="000000"/>
+                </a:solidFill>
+                <a:effectLst/>
+                <a:uLnTx/>
+                <a:uFillTx/>
+                <a:latin typeface="Klavika Light"/>
+                <a:ea typeface="+mn-ea"/>
+                <a:cs typeface="Segoe UI" pitchFamily="34" charset="0"/>
+              </a:rPr>
+              <a:t>snake_game</a:t>
+            </a:r>
+            <a:r>
+              <a:rPr kumimoji="0" lang="en-GB" sz="4800" b="1" i="0" u="none" strike="noStrike" kern="1200" cap="none" spc="0" normalizeH="0" baseline="0" noProof="0" dirty="0">
+                <a:ln w="3175">
+                  <a:noFill/>
+                </a:ln>
+                <a:solidFill>
+                  <a:srgbClr val="000000"/>
+                </a:solidFill>
+                <a:effectLst/>
+                <a:uLnTx/>
+                <a:uFillTx/>
+                <a:latin typeface="Klavika Light"/>
+                <a:ea typeface="+mn-ea"/>
+                <a:cs typeface="Segoe UI" pitchFamily="34" charset="0"/>
+              </a:rPr>
+              <a:t> on FPGA</a:t>
+            </a:r>
+          </a:p>
+        </p:txBody>
+      </p:sp>
+      <p:sp>
+        <p:nvSpPr>
+          <p:cNvPr id="37" name="Content Placeholder 2">
+            <a:extLst>
+              <a:ext uri="{FF2B5EF4-FFF2-40B4-BE49-F238E27FC236}">
+                <a16:creationId xmlns:a16="http://schemas.microsoft.com/office/drawing/2014/main" id="{DDFF6493-A702-FB7E-7E3D-EA387DC84ED0}"/>
+              </a:ext>
+            </a:extLst>
+          </p:cNvPr>
+          <p:cNvSpPr txBox="1">
+            <a:spLocks/>
+          </p:cNvSpPr>
+          <p:nvPr/>
+        </p:nvSpPr>
+        <p:spPr>
+          <a:xfrm>
+            <a:off x="584200" y="1432111"/>
+            <a:ext cx="4944311" cy="4836927"/>
+          </a:xfrm>
+          <a:prstGeom prst="rect">
+            <a:avLst/>
+          </a:prstGeom>
+        </p:spPr>
+        <p:txBody>
+          <a:bodyPr vert="horz" wrap="square" lIns="0" tIns="0" rIns="0" bIns="0" rtlCol="0">
+            <a:noAutofit/>
+          </a:bodyPr>
+          <a:lstStyle>
+            <a:lvl1pPr marL="228600" marR="0" indent="-228600" algn="l" defTabSz="932742" rtl="0" eaLnBrk="1" fontAlgn="auto" latinLnBrk="0" hangingPunct="1">
+              <a:lnSpc>
+                <a:spcPct val="100000"/>
+              </a:lnSpc>
+              <a:spcBef>
+                <a:spcPts val="600"/>
+              </a:spcBef>
+              <a:spcAft>
+                <a:spcPts val="0"/>
+              </a:spcAft>
+              <a:buClr>
+                <a:schemeClr val="accent1"/>
+              </a:buClr>
+              <a:buSzPct val="90000"/>
+              <a:buFont typeface="Arial" panose="020B0604020202020204" pitchFamily="34" charset="0"/>
+              <a:buChar char="•"/>
+              <a:tabLst/>
+              <a:defRPr sz="1800" kern="1200" spc="0" baseline="0">
+                <a:solidFill>
+                  <a:schemeClr val="tx1"/>
+                </a:solidFill>
+                <a:latin typeface="+mn-lt"/>
+                <a:ea typeface="+mn-ea"/>
+                <a:cs typeface="Segoe UI" panose="020B0502040204020203" pitchFamily="34" charset="0"/>
+              </a:defRPr>
+            </a:lvl1pPr>
+            <a:lvl2pPr marL="457200" marR="0" indent="-228600" algn="l" defTabSz="932742" rtl="0" eaLnBrk="1" fontAlgn="auto" latinLnBrk="0" hangingPunct="1">
+              <a:lnSpc>
+                <a:spcPct val="100000"/>
+              </a:lnSpc>
+              <a:spcBef>
+                <a:spcPts val="300"/>
+              </a:spcBef>
+              <a:spcAft>
+                <a:spcPts val="0"/>
+              </a:spcAft>
+              <a:buClr>
+                <a:schemeClr val="accent1"/>
+              </a:buClr>
+              <a:buSzPct val="90000"/>
+              <a:buFont typeface="Arial" panose="020B0604020202020204" pitchFamily="34" charset="0"/>
+              <a:buChar char="•"/>
+              <a:tabLst/>
+              <a:defRPr sz="1600" kern="1200" spc="0" baseline="0">
+                <a:solidFill>
+                  <a:schemeClr val="tx1"/>
+                </a:solidFill>
+                <a:latin typeface="+mn-lt"/>
+                <a:ea typeface="+mn-ea"/>
+                <a:cs typeface="+mn-cs"/>
+              </a:defRPr>
+            </a:lvl2pPr>
+            <a:lvl3pPr marL="657225" marR="0" indent="-200025" algn="l" defTabSz="932742" rtl="0" eaLnBrk="1" fontAlgn="auto" latinLnBrk="0" hangingPunct="1">
+              <a:lnSpc>
+                <a:spcPct val="100000"/>
+              </a:lnSpc>
+              <a:spcBef>
+                <a:spcPts val="300"/>
+              </a:spcBef>
+              <a:spcAft>
+                <a:spcPts val="0"/>
+              </a:spcAft>
+              <a:buClr>
+                <a:schemeClr val="accent1"/>
+              </a:buClr>
+              <a:buSzPct val="90000"/>
+              <a:buFont typeface="Arial" panose="020B0604020202020204" pitchFamily="34" charset="0"/>
+              <a:buChar char="•"/>
+              <a:tabLst/>
+              <a:defRPr sz="1200" kern="1200" spc="0" baseline="0">
+                <a:solidFill>
+                  <a:schemeClr val="tx1"/>
+                </a:solidFill>
+                <a:latin typeface="+mn-lt"/>
+                <a:ea typeface="+mn-ea"/>
+                <a:cs typeface="+mn-cs"/>
+              </a:defRPr>
+            </a:lvl3pPr>
+            <a:lvl4pPr marL="842963" marR="0" indent="-180975" algn="l" defTabSz="932742" rtl="0" eaLnBrk="1" fontAlgn="auto" latinLnBrk="0" hangingPunct="1">
+              <a:lnSpc>
+                <a:spcPct val="100000"/>
+              </a:lnSpc>
+              <a:spcBef>
+                <a:spcPts val="300"/>
+              </a:spcBef>
+              <a:spcAft>
+                <a:spcPts val="0"/>
+              </a:spcAft>
+              <a:buClr>
+                <a:schemeClr val="accent1"/>
+              </a:buClr>
+              <a:buSzPct val="90000"/>
+              <a:buFont typeface="Arial" panose="020B0604020202020204" pitchFamily="34" charset="0"/>
+              <a:buChar char="•"/>
+              <a:tabLst/>
+              <a:defRPr sz="1100" kern="1200" spc="0" baseline="0">
+                <a:solidFill>
+                  <a:schemeClr val="tx1"/>
+                </a:solidFill>
+                <a:latin typeface="+mn-lt"/>
+                <a:ea typeface="+mn-ea"/>
+                <a:cs typeface="+mn-cs"/>
+              </a:defRPr>
+            </a:lvl4pPr>
+            <a:lvl5pPr marL="1023938" marR="0" indent="-168275" algn="l" defTabSz="932742" rtl="0" eaLnBrk="1" fontAlgn="auto" latinLnBrk="0" hangingPunct="1">
+              <a:lnSpc>
+                <a:spcPct val="100000"/>
+              </a:lnSpc>
+              <a:spcBef>
+                <a:spcPts val="300"/>
+              </a:spcBef>
+              <a:spcAft>
+                <a:spcPts val="0"/>
+              </a:spcAft>
+              <a:buClr>
+                <a:schemeClr val="accent1"/>
+              </a:buClr>
+              <a:buSzPct val="90000"/>
+              <a:buFont typeface="Arial" panose="020B0604020202020204" pitchFamily="34" charset="0"/>
+              <a:buChar char="•"/>
+              <a:tabLst/>
+              <a:defRPr sz="1100" kern="1200" spc="0" baseline="0">
+                <a:solidFill>
+                  <a:schemeClr val="tx1"/>
+                </a:solidFill>
+                <a:latin typeface="+mn-lt"/>
+                <a:ea typeface="+mn-ea"/>
+                <a:cs typeface="+mn-cs"/>
+              </a:defRPr>
+            </a:lvl5pPr>
+            <a:lvl6pPr marL="2565040" indent="-233186" algn="l" defTabSz="932742" rtl="0" eaLnBrk="1" latinLnBrk="0" hangingPunct="1">
+              <a:spcBef>
+                <a:spcPct val="20000"/>
+              </a:spcBef>
+              <a:buFont typeface="Arial" pitchFamily="34" charset="0"/>
+              <a:buChar char="•"/>
+              <a:defRPr sz="2000" kern="1200">
+                <a:solidFill>
+                  <a:schemeClr val="tx1"/>
+                </a:solidFill>
+                <a:latin typeface="+mn-lt"/>
+                <a:ea typeface="+mn-ea"/>
+                <a:cs typeface="+mn-cs"/>
+              </a:defRPr>
+            </a:lvl6pPr>
+            <a:lvl7pPr marL="3031412" indent="-233186" algn="l" defTabSz="932742" rtl="0" eaLnBrk="1" latinLnBrk="0" hangingPunct="1">
+              <a:spcBef>
+                <a:spcPct val="20000"/>
+              </a:spcBef>
+              <a:buFont typeface="Arial" pitchFamily="34" charset="0"/>
+              <a:buChar char="•"/>
+              <a:defRPr sz="2000" kern="1200">
+                <a:solidFill>
+                  <a:schemeClr val="tx1"/>
+                </a:solidFill>
+                <a:latin typeface="+mn-lt"/>
+                <a:ea typeface="+mn-ea"/>
+                <a:cs typeface="+mn-cs"/>
+              </a:defRPr>
+            </a:lvl7pPr>
+            <a:lvl8pPr marL="3497783" indent="-233186" algn="l" defTabSz="932742" rtl="0" eaLnBrk="1" latinLnBrk="0" hangingPunct="1">
+              <a:spcBef>
+                <a:spcPct val="20000"/>
+              </a:spcBef>
+              <a:buFont typeface="Arial" pitchFamily="34" charset="0"/>
+              <a:buChar char="•"/>
+              <a:defRPr sz="2000" kern="1200">
+                <a:solidFill>
+                  <a:schemeClr val="tx1"/>
+                </a:solidFill>
+                <a:latin typeface="+mn-lt"/>
+                <a:ea typeface="+mn-ea"/>
+                <a:cs typeface="+mn-cs"/>
+              </a:defRPr>
+            </a:lvl8pPr>
+            <a:lvl9pPr marL="3964155" indent="-233186" algn="l" defTabSz="932742" rtl="0" eaLnBrk="1" latinLnBrk="0" hangingPunct="1">
+              <a:spcBef>
+                <a:spcPct val="20000"/>
+              </a:spcBef>
+              <a:buFont typeface="Arial" pitchFamily="34" charset="0"/>
+              <a:buChar char="•"/>
+              <a:defRPr sz="2000" kern="1200">
+                <a:solidFill>
+                  <a:schemeClr val="tx1"/>
+                </a:solidFill>
+                <a:latin typeface="+mn-lt"/>
+                <a:ea typeface="+mn-ea"/>
+                <a:cs typeface="+mn-cs"/>
+              </a:defRPr>
+            </a:lvl9pPr>
+          </a:lstStyle>
+          <a:p>
+            <a:pPr marL="228600" marR="0" lvl="0" indent="-228600" algn="l" defTabSz="932742" rtl="0" eaLnBrk="1" fontAlgn="auto" latinLnBrk="0" hangingPunct="1">
+              <a:lnSpc>
+                <a:spcPct val="100000"/>
+              </a:lnSpc>
+              <a:spcBef>
+                <a:spcPts val="600"/>
+              </a:spcBef>
+              <a:spcAft>
+                <a:spcPts val="0"/>
+              </a:spcAft>
+              <a:buClr>
+                <a:srgbClr val="636466"/>
+              </a:buClr>
+              <a:buSzPct val="90000"/>
+              <a:buFont typeface="Arial" panose="020B0604020202020204" pitchFamily="34" charset="0"/>
+              <a:buChar char="•"/>
+              <a:tabLst/>
+              <a:defRPr/>
+            </a:pPr>
+            <a:r>
+              <a:rPr kumimoji="0" lang="en-US" sz="2400" b="0" i="0" u="none" strike="noStrike" kern="1200" cap="none" spc="0" normalizeH="0" baseline="0" noProof="0" dirty="0">
+                <a:ln>
+                  <a:noFill/>
+                </a:ln>
+                <a:solidFill>
+                  <a:srgbClr val="000000"/>
+                </a:solidFill>
+                <a:effectLst/>
+                <a:uLnTx/>
+                <a:uFillTx/>
+                <a:latin typeface="Klavika Regular"/>
+                <a:ea typeface="+mn-ea"/>
+                <a:cs typeface="Segoe UI" panose="020B0502040204020203" pitchFamily="34" charset="0"/>
+              </a:rPr>
+              <a:t>Press any direction to start playing.</a:t>
+            </a:r>
+          </a:p>
+          <a:p>
+            <a:pPr marL="228600" marR="0" lvl="0" indent="-228600" algn="l" defTabSz="932742" rtl="0" eaLnBrk="1" fontAlgn="auto" latinLnBrk="0" hangingPunct="1">
+              <a:lnSpc>
+                <a:spcPct val="100000"/>
+              </a:lnSpc>
+              <a:spcBef>
+                <a:spcPts val="600"/>
+              </a:spcBef>
+              <a:spcAft>
+                <a:spcPts val="0"/>
+              </a:spcAft>
+              <a:buClr>
+                <a:srgbClr val="636466"/>
+              </a:buClr>
+              <a:buSzPct val="90000"/>
+              <a:buFont typeface="Arial" panose="020B0604020202020204" pitchFamily="34" charset="0"/>
+              <a:buChar char="•"/>
+              <a:tabLst/>
+              <a:defRPr/>
+            </a:pPr>
+            <a:r>
+              <a:rPr kumimoji="0" lang="en-US" sz="2400" b="0" i="0" u="none" strike="noStrike" kern="1200" cap="none" spc="0" normalizeH="0" baseline="0" noProof="0" dirty="0">
+                <a:ln>
+                  <a:noFill/>
+                </a:ln>
+                <a:solidFill>
+                  <a:srgbClr val="000000"/>
+                </a:solidFill>
+                <a:effectLst/>
+                <a:uLnTx/>
+                <a:uFillTx/>
+                <a:latin typeface="Klavika Regular"/>
+                <a:ea typeface="+mn-ea"/>
+                <a:cs typeface="Segoe UI" panose="020B0502040204020203" pitchFamily="34" charset="0"/>
+              </a:rPr>
+              <a:t>Get to 10 points to win! </a:t>
+            </a:r>
+          </a:p>
+          <a:p>
+            <a:pPr>
+              <a:buClr>
+                <a:srgbClr val="636466"/>
+              </a:buClr>
+              <a:defRPr/>
+            </a:pPr>
+            <a:r>
+              <a:rPr kumimoji="0" lang="en-US" sz="2400" b="0" i="0" u="none" strike="noStrike" kern="1200" cap="none" spc="0" normalizeH="0" baseline="0" noProof="0" dirty="0">
+                <a:ln>
+                  <a:noFill/>
+                </a:ln>
+                <a:solidFill>
+                  <a:srgbClr val="000000"/>
+                </a:solidFill>
+                <a:effectLst/>
+                <a:uLnTx/>
+                <a:uFillTx/>
+                <a:latin typeface="Klavika Regular"/>
+                <a:ea typeface="+mn-ea"/>
+                <a:cs typeface="Segoe UI" panose="020B0502040204020203" pitchFamily="34" charset="0"/>
+              </a:rPr>
+              <a:t>Every time you score a point the snake becomes faster. This increase can be turned off using this switch.</a:t>
+            </a:r>
+          </a:p>
+          <a:p>
+            <a:pPr marL="228600" marR="0" lvl="0" indent="-228600" algn="l" defTabSz="932742" rtl="0" eaLnBrk="1" fontAlgn="auto" latinLnBrk="0" hangingPunct="1">
+              <a:lnSpc>
+                <a:spcPct val="100000"/>
+              </a:lnSpc>
+              <a:spcBef>
+                <a:spcPts val="600"/>
+              </a:spcBef>
+              <a:spcAft>
+                <a:spcPts val="0"/>
+              </a:spcAft>
+              <a:buClr>
+                <a:srgbClr val="636466"/>
+              </a:buClr>
+              <a:buSzPct val="90000"/>
+              <a:buFont typeface="Arial" panose="020B0604020202020204" pitchFamily="34" charset="0"/>
+              <a:buChar char="•"/>
+              <a:tabLst/>
+              <a:defRPr/>
+            </a:pPr>
+            <a:r>
+              <a:rPr kumimoji="0" lang="en-US" sz="2400" b="0" i="0" u="none" strike="noStrike" kern="1200" cap="none" spc="0" normalizeH="0" baseline="0" noProof="0" dirty="0">
+                <a:ln>
+                  <a:noFill/>
+                </a:ln>
+                <a:solidFill>
+                  <a:srgbClr val="000000"/>
+                </a:solidFill>
+                <a:effectLst/>
+                <a:uLnTx/>
+                <a:uFillTx/>
+                <a:latin typeface="Klavika Regular"/>
+                <a:ea typeface="+mn-ea"/>
+                <a:cs typeface="Segoe UI" panose="020B0502040204020203" pitchFamily="34" charset="0"/>
+              </a:rPr>
+              <a:t>Score is shown on the 7-Seg displays.</a:t>
+            </a:r>
+          </a:p>
+          <a:p>
+            <a:pPr marL="228600" marR="0" lvl="0" indent="-228600" algn="l" defTabSz="932742" rtl="0" eaLnBrk="1" fontAlgn="auto" latinLnBrk="0" hangingPunct="1">
+              <a:lnSpc>
+                <a:spcPct val="100000"/>
+              </a:lnSpc>
+              <a:spcBef>
+                <a:spcPts val="600"/>
+              </a:spcBef>
+              <a:spcAft>
+                <a:spcPts val="0"/>
+              </a:spcAft>
+              <a:buClr>
+                <a:srgbClr val="636466"/>
+              </a:buClr>
+              <a:buSzPct val="90000"/>
+              <a:buFont typeface="Arial" panose="020B0604020202020204" pitchFamily="34" charset="0"/>
+              <a:buChar char="•"/>
+              <a:tabLst/>
+              <a:defRPr/>
+            </a:pPr>
+            <a:r>
+              <a:rPr kumimoji="0" lang="en-US" sz="2400" b="0" i="0" u="none" strike="noStrike" kern="1200" cap="none" spc="0" normalizeH="0" baseline="0" noProof="0" dirty="0">
+                <a:ln>
+                  <a:noFill/>
+                </a:ln>
+                <a:solidFill>
+                  <a:srgbClr val="000000"/>
+                </a:solidFill>
+                <a:effectLst/>
+                <a:uLnTx/>
+                <a:uFillTx/>
+                <a:latin typeface="Klavika Regular"/>
+                <a:ea typeface="+mn-ea"/>
+                <a:cs typeface="Segoe UI" panose="020B0502040204020203" pitchFamily="34" charset="0"/>
+              </a:rPr>
+              <a:t>You lose if you touch an edge or eat part of yourself.</a:t>
+            </a:r>
+          </a:p>
+          <a:p>
+            <a:pPr marL="228600" marR="0" lvl="0" indent="-228600" algn="l" defTabSz="932742" rtl="0" eaLnBrk="1" fontAlgn="auto" latinLnBrk="0" hangingPunct="1">
+              <a:lnSpc>
+                <a:spcPct val="100000"/>
+              </a:lnSpc>
+              <a:spcBef>
+                <a:spcPts val="600"/>
+              </a:spcBef>
+              <a:spcAft>
+                <a:spcPts val="0"/>
+              </a:spcAft>
+              <a:buClr>
+                <a:srgbClr val="636466"/>
+              </a:buClr>
+              <a:buSzPct val="90000"/>
+              <a:buFont typeface="Arial" panose="020B0604020202020204" pitchFamily="34" charset="0"/>
+              <a:buChar char="•"/>
+              <a:tabLst/>
+              <a:defRPr/>
+            </a:pPr>
+            <a:r>
+              <a:rPr kumimoji="0" lang="en-US" sz="2400" b="0" i="0" u="none" strike="noStrike" kern="1200" cap="none" spc="0" normalizeH="0" baseline="0" noProof="0" dirty="0">
+                <a:ln>
+                  <a:noFill/>
+                </a:ln>
+                <a:solidFill>
+                  <a:srgbClr val="000000"/>
+                </a:solidFill>
+                <a:effectLst/>
+                <a:uLnTx/>
+                <a:uFillTx/>
+                <a:latin typeface="Klavika Regular"/>
+                <a:ea typeface="+mn-ea"/>
+                <a:cs typeface="Segoe UI" panose="020B0502040204020203" pitchFamily="34" charset="0"/>
+              </a:rPr>
+              <a:t>Use the reset switch to start over in the event of a win or lose screen.</a:t>
+            </a:r>
+          </a:p>
+          <a:p>
+            <a:pPr marL="228600" marR="0" lvl="0" indent="-228600" algn="l" defTabSz="932742" rtl="0" eaLnBrk="1" fontAlgn="auto" latinLnBrk="0" hangingPunct="1">
+              <a:lnSpc>
+                <a:spcPct val="100000"/>
+              </a:lnSpc>
+              <a:spcBef>
+                <a:spcPts val="600"/>
+              </a:spcBef>
+              <a:spcAft>
+                <a:spcPts val="0"/>
+              </a:spcAft>
+              <a:buClr>
+                <a:srgbClr val="636466"/>
+              </a:buClr>
+              <a:buSzPct val="90000"/>
+              <a:buFont typeface="Arial" panose="020B0604020202020204" pitchFamily="34" charset="0"/>
+              <a:buChar char="•"/>
+              <a:tabLst/>
+              <a:defRPr/>
+            </a:pPr>
+            <a:r>
+              <a:rPr kumimoji="0" lang="en-US" sz="2400" b="0" i="0" u="none" strike="noStrike" kern="1200" cap="none" spc="0" normalizeH="0" baseline="0" noProof="0" dirty="0">
+                <a:ln>
+                  <a:noFill/>
+                </a:ln>
+                <a:solidFill>
+                  <a:srgbClr val="000000"/>
+                </a:solidFill>
+                <a:effectLst/>
+                <a:uLnTx/>
+                <a:uFillTx/>
+                <a:latin typeface="Klavika Regular"/>
+                <a:ea typeface="+mn-ea"/>
+                <a:cs typeface="Segoe UI" panose="020B0502040204020203" pitchFamily="34" charset="0"/>
+              </a:rPr>
+              <a:t>The directions the press buttons control are shown to </a:t>
+            </a:r>
+            <a:r>
+              <a:rPr kumimoji="0" lang="en-US" sz="2400" b="0" i="0" u="none" strike="noStrike" kern="1200" cap="none" spc="0" normalizeH="0" baseline="0" noProof="0">
+                <a:ln>
+                  <a:noFill/>
+                </a:ln>
+                <a:solidFill>
+                  <a:srgbClr val="000000"/>
+                </a:solidFill>
+                <a:effectLst/>
+                <a:uLnTx/>
+                <a:uFillTx/>
+                <a:latin typeface="Klavika Regular"/>
+                <a:ea typeface="+mn-ea"/>
+                <a:cs typeface="Segoe UI" panose="020B0502040204020203" pitchFamily="34" charset="0"/>
+              </a:rPr>
+              <a:t>the right (hint</a:t>
+            </a:r>
+            <a:r>
+              <a:rPr kumimoji="0" lang="en-US" sz="2400" b="0" i="0" u="none" strike="noStrike" kern="1200" cap="none" spc="0" normalizeH="0" baseline="0" noProof="0" dirty="0">
+                <a:ln>
+                  <a:noFill/>
+                </a:ln>
+                <a:solidFill>
+                  <a:srgbClr val="000000"/>
+                </a:solidFill>
+                <a:effectLst/>
+                <a:uLnTx/>
+                <a:uFillTx/>
+                <a:latin typeface="Klavika Regular"/>
+                <a:ea typeface="+mn-ea"/>
+                <a:cs typeface="Segoe UI" panose="020B0502040204020203" pitchFamily="34" charset="0"/>
+              </a:rPr>
+              <a:t>: try using the board at a </a:t>
+            </a:r>
+            <a:r>
+              <a:rPr kumimoji="0" lang="en-US" sz="2400" b="0" i="0" u="none" strike="noStrike" kern="1200" cap="none" spc="0" normalizeH="0" baseline="0" noProof="0">
+                <a:ln>
+                  <a:noFill/>
+                </a:ln>
+                <a:solidFill>
+                  <a:srgbClr val="000000"/>
+                </a:solidFill>
+                <a:effectLst/>
+                <a:uLnTx/>
+                <a:uFillTx/>
+                <a:latin typeface="Klavika Regular"/>
+                <a:ea typeface="+mn-ea"/>
+                <a:cs typeface="Segoe UI" panose="020B0502040204020203" pitchFamily="34" charset="0"/>
+              </a:rPr>
+              <a:t>diagonal!).</a:t>
+            </a:r>
+            <a:endParaRPr kumimoji="0" lang="en-US" sz="2400" b="0" i="0" u="none" strike="noStrike" kern="1200" cap="none" spc="0" normalizeH="0" baseline="0" noProof="0" dirty="0">
+              <a:ln>
+                <a:noFill/>
+              </a:ln>
+              <a:solidFill>
+                <a:srgbClr val="000000"/>
+              </a:solidFill>
+              <a:effectLst/>
+              <a:uLnTx/>
+              <a:uFillTx/>
+              <a:latin typeface="Klavika Regular"/>
+              <a:ea typeface="+mn-ea"/>
+              <a:cs typeface="Segoe UI" panose="020B0502040204020203" pitchFamily="34" charset="0"/>
+            </a:endParaRPr>
+          </a:p>
+        </p:txBody>
+      </p:sp>
+      <p:sp>
+        <p:nvSpPr>
+          <p:cNvPr id="38" name="Rectangle 37">
+            <a:extLst>
+              <a:ext uri="{FF2B5EF4-FFF2-40B4-BE49-F238E27FC236}">
+                <a16:creationId xmlns:a16="http://schemas.microsoft.com/office/drawing/2014/main" id="{4E697DC4-9980-971D-19CF-E42E887FEAEC}"/>
+              </a:ext>
+            </a:extLst>
+          </p:cNvPr>
+          <p:cNvSpPr/>
+          <p:nvPr/>
+        </p:nvSpPr>
+        <p:spPr bwMode="auto">
+          <a:xfrm>
+            <a:off x="8420100" y="2653195"/>
+            <a:ext cx="1249962" cy="395951"/>
+          </a:xfrm>
+          <a:prstGeom prst="rect">
+            <a:avLst/>
+          </a:prstGeom>
+          <a:noFill/>
+          <a:ln w="38100" cap="flat" cmpd="sng" algn="ctr">
+            <a:solidFill>
+              <a:schemeClr val="accent2"/>
+            </a:solidFill>
+            <a:prstDash val="solid"/>
+            <a:headEnd type="none" w="med" len="med"/>
+            <a:tailEnd type="none" w="med" len="med"/>
+          </a:ln>
+          <a:effectLst/>
+        </p:spPr>
+        <p:txBody>
+          <a:bodyPr rot="0" spcFirstLastPara="0" vertOverflow="overflow" horzOverflow="overflow" vert="horz" wrap="square" lIns="182880" tIns="146304" rIns="182880" bIns="146304" numCol="1" spcCol="0" rtlCol="0" fromWordArt="0" anchor="t" anchorCtr="0" forceAA="0" compatLnSpc="1">
+            <a:prstTxWarp prst="textNoShape">
+              <a:avLst/>
+            </a:prstTxWarp>
+            <a:noAutofit/>
+          </a:bodyPr>
+          <a:lstStyle/>
+          <a:p>
+            <a:pPr marL="0" marR="0" lvl="0" indent="0" defTabSz="932472" eaLnBrk="1" fontAlgn="base" latinLnBrk="0" hangingPunct="1">
+              <a:lnSpc>
+                <a:spcPct val="100000"/>
+              </a:lnSpc>
+              <a:spcBef>
+                <a:spcPct val="0"/>
+              </a:spcBef>
+              <a:spcAft>
+                <a:spcPct val="0"/>
+              </a:spcAft>
+              <a:buClrTx/>
+              <a:buSzTx/>
+              <a:buFontTx/>
+              <a:buNone/>
+              <a:tabLst/>
+              <a:defRPr/>
+            </a:pPr>
+            <a:endParaRPr kumimoji="0" lang="en-GB" sz="1800" b="0" i="0" u="none" strike="noStrike" kern="0" cap="none" spc="0" normalizeH="0" baseline="0" noProof="0" dirty="0" err="1">
+              <a:ln>
+                <a:noFill/>
+              </a:ln>
+              <a:gradFill>
+                <a:gsLst>
+                  <a:gs pos="0">
+                    <a:srgbClr val="FFFFFF"/>
+                  </a:gs>
+                  <a:gs pos="100000">
+                    <a:srgbClr val="FFFFFF"/>
+                  </a:gs>
+                </a:gsLst>
+                <a:lin ang="5400000" scaled="0"/>
+              </a:gradFill>
+              <a:effectLst/>
+              <a:uLnTx/>
+              <a:uFillTx/>
+              <a:latin typeface="Klavika Regular"/>
+              <a:ea typeface="Segoe UI" pitchFamily="34" charset="0"/>
+              <a:cs typeface="Segoe UI" pitchFamily="34" charset="0"/>
+            </a:endParaRPr>
+          </a:p>
+        </p:txBody>
+      </p:sp>
+      <p:cxnSp>
+        <p:nvCxnSpPr>
+          <p:cNvPr id="39" name="Straight Arrow Connector 38">
+            <a:extLst>
+              <a:ext uri="{FF2B5EF4-FFF2-40B4-BE49-F238E27FC236}">
+                <a16:creationId xmlns:a16="http://schemas.microsoft.com/office/drawing/2014/main" id="{70D3193D-C74B-19B4-5264-CB25FE894F53}"/>
+              </a:ext>
+            </a:extLst>
+          </p:cNvPr>
+          <p:cNvCxnSpPr>
+            <a:cxnSpLocks/>
+            <a:endCxn id="38" idx="1"/>
+          </p:cNvCxnSpPr>
+          <p:nvPr/>
+        </p:nvCxnSpPr>
+        <p:spPr>
+          <a:xfrm flipV="1">
+            <a:off x="5480050" y="2851171"/>
+            <a:ext cx="2940050" cy="813581"/>
+          </a:xfrm>
+          <a:prstGeom prst="straightConnector1">
+            <a:avLst/>
+          </a:prstGeom>
+          <a:noFill/>
+          <a:ln w="12700" cap="flat" cmpd="sng" algn="ctr">
+            <a:solidFill>
+              <a:schemeClr val="accent2"/>
+            </a:solidFill>
+            <a:prstDash val="solid"/>
+            <a:headEnd type="none" w="lg" len="med"/>
+            <a:tailEnd type="triangle"/>
+          </a:ln>
+          <a:effectLst/>
+        </p:spPr>
+      </p:cxnSp>
+      <p:sp>
+        <p:nvSpPr>
+          <p:cNvPr id="40" name="Rectangle 39">
+            <a:extLst>
+              <a:ext uri="{FF2B5EF4-FFF2-40B4-BE49-F238E27FC236}">
+                <a16:creationId xmlns:a16="http://schemas.microsoft.com/office/drawing/2014/main" id="{B08F82EC-6A4A-502A-5F44-49D7CC542A86}"/>
+              </a:ext>
+            </a:extLst>
+          </p:cNvPr>
+          <p:cNvSpPr/>
+          <p:nvPr/>
+        </p:nvSpPr>
+        <p:spPr bwMode="auto">
+          <a:xfrm>
+            <a:off x="9817100" y="2389267"/>
+            <a:ext cx="1022351" cy="706484"/>
+          </a:xfrm>
+          <a:prstGeom prst="rect">
+            <a:avLst/>
+          </a:prstGeom>
+          <a:noFill/>
+          <a:ln w="38100" cap="flat" cmpd="sng" algn="ctr">
+            <a:solidFill>
+              <a:srgbClr val="ED1C24"/>
+            </a:solidFill>
+            <a:prstDash val="solid"/>
+            <a:headEnd type="none" w="med" len="med"/>
+            <a:tailEnd type="none" w="med" len="med"/>
+          </a:ln>
+          <a:effectLst/>
+        </p:spPr>
+        <p:txBody>
+          <a:bodyPr rot="0" spcFirstLastPara="0" vertOverflow="overflow" horzOverflow="overflow" vert="horz" wrap="square" lIns="182880" tIns="146304" rIns="182880" bIns="146304" numCol="1" spcCol="0" rtlCol="0" fromWordArt="0" anchor="t" anchorCtr="0" forceAA="0" compatLnSpc="1">
+            <a:prstTxWarp prst="textNoShape">
+              <a:avLst/>
+            </a:prstTxWarp>
+            <a:noAutofit/>
+          </a:bodyPr>
+          <a:lstStyle/>
+          <a:p>
+            <a:pPr marL="0" marR="0" lvl="0" indent="0" defTabSz="932472" eaLnBrk="1" fontAlgn="base" latinLnBrk="0" hangingPunct="1">
+              <a:lnSpc>
+                <a:spcPct val="100000"/>
+              </a:lnSpc>
+              <a:spcBef>
+                <a:spcPct val="0"/>
+              </a:spcBef>
+              <a:spcAft>
+                <a:spcPct val="0"/>
+              </a:spcAft>
+              <a:buClrTx/>
+              <a:buSzTx/>
+              <a:buFontTx/>
+              <a:buNone/>
+              <a:tabLst/>
+              <a:defRPr/>
+            </a:pPr>
+            <a:endParaRPr kumimoji="0" lang="en-GB" sz="1800" b="0" i="0" u="none" strike="noStrike" kern="0" cap="none" spc="0" normalizeH="0" baseline="0" noProof="0" dirty="0" err="1">
+              <a:ln>
+                <a:noFill/>
+              </a:ln>
+              <a:gradFill>
+                <a:gsLst>
+                  <a:gs pos="0">
+                    <a:srgbClr val="FFFFFF"/>
+                  </a:gs>
+                  <a:gs pos="100000">
+                    <a:srgbClr val="FFFFFF"/>
+                  </a:gs>
+                </a:gsLst>
+                <a:lin ang="5400000" scaled="0"/>
+              </a:gradFill>
+              <a:effectLst/>
+              <a:uLnTx/>
+              <a:uFillTx/>
+              <a:latin typeface="Klavika Regular"/>
+              <a:ea typeface="Segoe UI" pitchFamily="34" charset="0"/>
+              <a:cs typeface="Segoe UI" pitchFamily="34" charset="0"/>
+            </a:endParaRPr>
+          </a:p>
+        </p:txBody>
+      </p:sp>
+      <p:cxnSp>
+        <p:nvCxnSpPr>
+          <p:cNvPr id="41" name="Straight Arrow Connector 40">
+            <a:extLst>
+              <a:ext uri="{FF2B5EF4-FFF2-40B4-BE49-F238E27FC236}">
+                <a16:creationId xmlns:a16="http://schemas.microsoft.com/office/drawing/2014/main" id="{189E9605-95CC-C03D-54DF-3FFA020EBD7A}"/>
+              </a:ext>
+            </a:extLst>
+          </p:cNvPr>
+          <p:cNvCxnSpPr>
+            <a:cxnSpLocks/>
+          </p:cNvCxnSpPr>
+          <p:nvPr/>
+        </p:nvCxnSpPr>
+        <p:spPr>
+          <a:xfrm>
+            <a:off x="5323712" y="1644127"/>
+            <a:ext cx="4493388" cy="966536"/>
+          </a:xfrm>
+          <a:prstGeom prst="straightConnector1">
+            <a:avLst/>
+          </a:prstGeom>
+          <a:noFill/>
+          <a:ln w="12700" cap="flat" cmpd="sng" algn="ctr">
+            <a:solidFill>
+              <a:srgbClr val="ED1C24"/>
+            </a:solidFill>
+            <a:prstDash val="solid"/>
+            <a:headEnd type="none" w="lg" len="med"/>
+            <a:tailEnd type="triangle"/>
+          </a:ln>
+          <a:effectLst/>
+        </p:spPr>
+      </p:cxnSp>
+      <p:cxnSp>
+        <p:nvCxnSpPr>
+          <p:cNvPr id="42" name="Straight Arrow Connector 41">
+            <a:extLst>
+              <a:ext uri="{FF2B5EF4-FFF2-40B4-BE49-F238E27FC236}">
+                <a16:creationId xmlns:a16="http://schemas.microsoft.com/office/drawing/2014/main" id="{2EC894A0-3E4A-8C7B-E998-1F88A6E749A1}"/>
+              </a:ext>
+            </a:extLst>
+          </p:cNvPr>
+          <p:cNvCxnSpPr>
+            <a:cxnSpLocks/>
+            <a:endCxn id="56" idx="2"/>
+          </p:cNvCxnSpPr>
+          <p:nvPr/>
+        </p:nvCxnSpPr>
+        <p:spPr>
+          <a:xfrm flipV="1">
+            <a:off x="5283200" y="3936261"/>
+            <a:ext cx="5697315" cy="883389"/>
+          </a:xfrm>
+          <a:prstGeom prst="straightConnector1">
+            <a:avLst/>
+          </a:prstGeom>
+          <a:noFill/>
+          <a:ln w="12700" cap="flat" cmpd="sng" algn="ctr">
+            <a:solidFill>
+              <a:srgbClr val="00B050"/>
+            </a:solidFill>
+            <a:prstDash val="solid"/>
+            <a:headEnd type="none" w="lg" len="med"/>
+            <a:tailEnd type="triangle"/>
+          </a:ln>
+          <a:effectLst/>
+        </p:spPr>
+      </p:cxnSp>
+      <p:grpSp>
+        <p:nvGrpSpPr>
+          <p:cNvPr id="20" name="Group 19">
+            <a:extLst>
+              <a:ext uri="{FF2B5EF4-FFF2-40B4-BE49-F238E27FC236}">
+                <a16:creationId xmlns:a16="http://schemas.microsoft.com/office/drawing/2014/main" id="{F66ECD6F-A25D-1D45-0CCC-421416833F8A}"/>
+              </a:ext>
+            </a:extLst>
+          </p:cNvPr>
+          <p:cNvGrpSpPr/>
+          <p:nvPr/>
+        </p:nvGrpSpPr>
+        <p:grpSpPr>
+          <a:xfrm>
+            <a:off x="8066372" y="4609516"/>
+            <a:ext cx="2362720" cy="1978138"/>
+            <a:chOff x="6581726" y="4923554"/>
+            <a:chExt cx="2362720" cy="1978138"/>
+          </a:xfrm>
+        </p:grpSpPr>
+        <p:grpSp>
+          <p:nvGrpSpPr>
+            <p:cNvPr id="44" name="Group 43">
+              <a:extLst>
+                <a:ext uri="{FF2B5EF4-FFF2-40B4-BE49-F238E27FC236}">
+                  <a16:creationId xmlns:a16="http://schemas.microsoft.com/office/drawing/2014/main" id="{5EB021D1-F019-9C06-FA39-42B7D609026A}"/>
+                </a:ext>
+              </a:extLst>
+            </p:cNvPr>
+            <p:cNvGrpSpPr/>
+            <p:nvPr/>
+          </p:nvGrpSpPr>
+          <p:grpSpPr>
+            <a:xfrm>
+              <a:off x="6581726" y="4924229"/>
+              <a:ext cx="2362720" cy="1963069"/>
+              <a:chOff x="5329614" y="4956926"/>
+              <a:chExt cx="2362720" cy="1963069"/>
+            </a:xfrm>
+          </p:grpSpPr>
+          <p:pic>
+            <p:nvPicPr>
+              <p:cNvPr id="45" name="Graphic 44" descr="Chevron arrows with solid fill">
+                <a:extLst>
+                  <a:ext uri="{FF2B5EF4-FFF2-40B4-BE49-F238E27FC236}">
+                    <a16:creationId xmlns:a16="http://schemas.microsoft.com/office/drawing/2014/main" id="{24B119D6-72A9-3018-7A0B-A321F90894F8}"/>
+                  </a:ext>
+                </a:extLst>
+              </p:cNvPr>
+              <p:cNvPicPr>
+                <a:picLocks noChangeAspect="1"/>
+              </p:cNvPicPr>
+              <p:nvPr/>
+            </p:nvPicPr>
+            <p:blipFill>
+              <a:blip r:embed="rId3">
+                <a:extLst>
+                  <a:ext uri="{96DAC541-7B7A-43D3-8B79-37D633B846F1}">
+                    <asvg:svgBlip xmlns:asvg="http://schemas.microsoft.com/office/drawing/2016/SVG/main" r:embed="rId4"/>
+                  </a:ext>
+                </a:extLst>
+              </a:blip>
+              <a:stretch>
+                <a:fillRect/>
+              </a:stretch>
+            </p:blipFill>
+            <p:spPr>
+              <a:xfrm rot="10800000">
+                <a:off x="5329614" y="6005595"/>
+                <a:ext cx="914400" cy="914400"/>
+              </a:xfrm>
+              <a:prstGeom prst="rect">
+                <a:avLst/>
+              </a:prstGeom>
+            </p:spPr>
+          </p:pic>
+          <p:sp>
+            <p:nvSpPr>
+              <p:cNvPr id="46" name="Rectangle 45">
+                <a:extLst>
+                  <a:ext uri="{FF2B5EF4-FFF2-40B4-BE49-F238E27FC236}">
+                    <a16:creationId xmlns:a16="http://schemas.microsoft.com/office/drawing/2014/main" id="{0E83EB3C-D259-9D99-94A1-080973447169}"/>
+                  </a:ext>
+                </a:extLst>
+              </p:cNvPr>
+              <p:cNvSpPr/>
+              <p:nvPr/>
+            </p:nvSpPr>
+            <p:spPr bwMode="auto">
+              <a:xfrm>
+                <a:off x="6777933" y="4956926"/>
+                <a:ext cx="914401" cy="914401"/>
+              </a:xfrm>
+              <a:prstGeom prst="rect">
+                <a:avLst/>
+              </a:prstGeom>
+              <a:noFill/>
+              <a:ln w="38100" cap="flat" cmpd="sng" algn="ctr">
+                <a:solidFill>
+                  <a:srgbClr val="000000"/>
+                </a:solidFill>
+                <a:prstDash val="solid"/>
+                <a:headEnd type="none" w="med" len="med"/>
+                <a:tailEnd type="none" w="med" len="med"/>
+              </a:ln>
+              <a:effectLst/>
+            </p:spPr>
+            <p:txBody>
+              <a:bodyPr rot="0" spcFirstLastPara="0" vertOverflow="overflow" horzOverflow="overflow" vert="horz" wrap="square" lIns="182880" tIns="146304" rIns="182880" bIns="146304" numCol="1" spcCol="0" rtlCol="0" fromWordArt="0" anchor="t" anchorCtr="0" forceAA="0" compatLnSpc="1">
+                <a:prstTxWarp prst="textNoShape">
+                  <a:avLst/>
+                </a:prstTxWarp>
+                <a:noAutofit/>
+              </a:bodyPr>
+              <a:lstStyle/>
+              <a:p>
+                <a:pPr marL="0" marR="0" lvl="0" indent="0" defTabSz="932472" eaLnBrk="1" fontAlgn="base" latinLnBrk="0" hangingPunct="1">
+                  <a:lnSpc>
+                    <a:spcPct val="100000"/>
+                  </a:lnSpc>
+                  <a:spcBef>
+                    <a:spcPct val="0"/>
+                  </a:spcBef>
+                  <a:spcAft>
+                    <a:spcPct val="0"/>
+                  </a:spcAft>
+                  <a:buClrTx/>
+                  <a:buSzTx/>
+                  <a:buFontTx/>
+                  <a:buNone/>
+                  <a:tabLst/>
+                  <a:defRPr/>
+                </a:pPr>
+                <a:endParaRPr kumimoji="0" lang="en-GB" sz="1800" b="0" i="0" u="none" strike="noStrike" kern="0" cap="none" spc="0" normalizeH="0" baseline="0" noProof="0" dirty="0" err="1">
+                  <a:ln>
+                    <a:noFill/>
+                  </a:ln>
+                  <a:gradFill>
+                    <a:gsLst>
+                      <a:gs pos="0">
+                        <a:srgbClr val="FFFFFF"/>
+                      </a:gs>
+                      <a:gs pos="100000">
+                        <a:srgbClr val="FFFFFF"/>
+                      </a:gs>
+                    </a:gsLst>
+                    <a:lin ang="5400000" scaled="0"/>
+                  </a:gradFill>
+                  <a:effectLst/>
+                  <a:uLnTx/>
+                  <a:uFillTx/>
+                  <a:latin typeface="Klavika Regular"/>
+                  <a:ea typeface="Segoe UI" pitchFamily="34" charset="0"/>
+                  <a:cs typeface="Segoe UI" pitchFamily="34" charset="0"/>
+                </a:endParaRPr>
+              </a:p>
+            </p:txBody>
+          </p:sp>
+        </p:grpSp>
+        <p:grpSp>
+          <p:nvGrpSpPr>
+            <p:cNvPr id="47" name="Group 46">
+              <a:extLst>
+                <a:ext uri="{FF2B5EF4-FFF2-40B4-BE49-F238E27FC236}">
+                  <a16:creationId xmlns:a16="http://schemas.microsoft.com/office/drawing/2014/main" id="{EA169435-D74B-3264-E644-A89B5F287B4F}"/>
+                </a:ext>
+              </a:extLst>
+            </p:cNvPr>
+            <p:cNvGrpSpPr/>
+            <p:nvPr/>
+          </p:nvGrpSpPr>
+          <p:grpSpPr>
+            <a:xfrm rot="5400000">
+              <a:off x="6585302" y="4923554"/>
+              <a:ext cx="914401" cy="914401"/>
+              <a:chOff x="6777933" y="4956926"/>
+              <a:chExt cx="914401" cy="914401"/>
+            </a:xfrm>
+          </p:grpSpPr>
+          <p:pic>
+            <p:nvPicPr>
+              <p:cNvPr id="48" name="Graphic 47" descr="Chevron arrows with solid fill">
+                <a:extLst>
+                  <a:ext uri="{FF2B5EF4-FFF2-40B4-BE49-F238E27FC236}">
+                    <a16:creationId xmlns:a16="http://schemas.microsoft.com/office/drawing/2014/main" id="{DD299C8B-A6F1-C76F-E36B-8349216D3C23}"/>
+                  </a:ext>
+                </a:extLst>
+              </p:cNvPr>
+              <p:cNvPicPr>
+                <a:picLocks noChangeAspect="1"/>
+              </p:cNvPicPr>
+              <p:nvPr/>
+            </p:nvPicPr>
+            <p:blipFill>
+              <a:blip r:embed="rId3">
+                <a:extLst>
+                  <a:ext uri="{96DAC541-7B7A-43D3-8B79-37D633B846F1}">
+                    <asvg:svgBlip xmlns:asvg="http://schemas.microsoft.com/office/drawing/2016/SVG/main" r:embed="rId4"/>
+                  </a:ext>
+                </a:extLst>
+              </a:blip>
+              <a:stretch>
+                <a:fillRect/>
+              </a:stretch>
+            </p:blipFill>
+            <p:spPr>
+              <a:xfrm rot="10800000">
+                <a:off x="6777934" y="4956926"/>
+                <a:ext cx="914400" cy="914400"/>
+              </a:xfrm>
+              <a:prstGeom prst="rect">
+                <a:avLst/>
+              </a:prstGeom>
+            </p:spPr>
+          </p:pic>
+          <p:sp>
+            <p:nvSpPr>
+              <p:cNvPr id="49" name="Rectangle 48">
+                <a:extLst>
+                  <a:ext uri="{FF2B5EF4-FFF2-40B4-BE49-F238E27FC236}">
+                    <a16:creationId xmlns:a16="http://schemas.microsoft.com/office/drawing/2014/main" id="{350890BC-481B-EE06-739F-3905EB98AAB0}"/>
+                  </a:ext>
+                </a:extLst>
+              </p:cNvPr>
+              <p:cNvSpPr/>
+              <p:nvPr/>
+            </p:nvSpPr>
+            <p:spPr bwMode="auto">
+              <a:xfrm>
+                <a:off x="6777933" y="4956926"/>
+                <a:ext cx="914401" cy="914401"/>
+              </a:xfrm>
+              <a:prstGeom prst="rect">
+                <a:avLst/>
+              </a:prstGeom>
+              <a:noFill/>
+              <a:ln w="38100" cap="flat" cmpd="sng" algn="ctr">
+                <a:solidFill>
+                  <a:srgbClr val="000000"/>
+                </a:solidFill>
+                <a:prstDash val="solid"/>
+                <a:headEnd type="none" w="med" len="med"/>
+                <a:tailEnd type="none" w="med" len="med"/>
+              </a:ln>
+              <a:effectLst/>
+            </p:spPr>
+            <p:txBody>
+              <a:bodyPr rot="0" spcFirstLastPara="0" vertOverflow="overflow" horzOverflow="overflow" vert="horz" wrap="square" lIns="182880" tIns="146304" rIns="182880" bIns="146304" numCol="1" spcCol="0" rtlCol="0" fromWordArt="0" anchor="t" anchorCtr="0" forceAA="0" compatLnSpc="1">
+                <a:prstTxWarp prst="textNoShape">
+                  <a:avLst/>
+                </a:prstTxWarp>
+                <a:noAutofit/>
+              </a:bodyPr>
+              <a:lstStyle/>
+              <a:p>
+                <a:pPr marL="0" marR="0" lvl="0" indent="0" defTabSz="932472" eaLnBrk="1" fontAlgn="base" latinLnBrk="0" hangingPunct="1">
+                  <a:lnSpc>
+                    <a:spcPct val="100000"/>
+                  </a:lnSpc>
+                  <a:spcBef>
+                    <a:spcPct val="0"/>
+                  </a:spcBef>
+                  <a:spcAft>
+                    <a:spcPct val="0"/>
+                  </a:spcAft>
+                  <a:buClrTx/>
+                  <a:buSzTx/>
+                  <a:buFontTx/>
+                  <a:buNone/>
+                  <a:tabLst/>
+                  <a:defRPr/>
+                </a:pPr>
+                <a:endParaRPr kumimoji="0" lang="en-GB" sz="1800" b="0" i="0" u="none" strike="noStrike" kern="0" cap="none" spc="0" normalizeH="0" baseline="0" noProof="0" dirty="0" err="1">
+                  <a:ln>
+                    <a:noFill/>
+                  </a:ln>
+                  <a:gradFill>
+                    <a:gsLst>
+                      <a:gs pos="0">
+                        <a:srgbClr val="FFFFFF"/>
+                      </a:gs>
+                      <a:gs pos="100000">
+                        <a:srgbClr val="FFFFFF"/>
+                      </a:gs>
+                    </a:gsLst>
+                    <a:lin ang="5400000" scaled="0"/>
+                  </a:gradFill>
+                  <a:effectLst/>
+                  <a:uLnTx/>
+                  <a:uFillTx/>
+                  <a:latin typeface="Klavika Regular"/>
+                  <a:ea typeface="Segoe UI" pitchFamily="34" charset="0"/>
+                  <a:cs typeface="Segoe UI" pitchFamily="34" charset="0"/>
+                </a:endParaRPr>
+              </a:p>
+            </p:txBody>
+          </p:sp>
+        </p:grpSp>
+        <p:grpSp>
+          <p:nvGrpSpPr>
+            <p:cNvPr id="50" name="Group 49">
+              <a:extLst>
+                <a:ext uri="{FF2B5EF4-FFF2-40B4-BE49-F238E27FC236}">
+                  <a16:creationId xmlns:a16="http://schemas.microsoft.com/office/drawing/2014/main" id="{67583A04-10EA-5992-0B97-D15C869287D8}"/>
+                </a:ext>
+              </a:extLst>
+            </p:cNvPr>
+            <p:cNvGrpSpPr/>
+            <p:nvPr/>
+          </p:nvGrpSpPr>
+          <p:grpSpPr>
+            <a:xfrm rot="16200000">
+              <a:off x="7287145" y="5269793"/>
+              <a:ext cx="926481" cy="2337317"/>
+              <a:chOff x="6765853" y="4956926"/>
+              <a:chExt cx="926481" cy="2337317"/>
+            </a:xfrm>
+          </p:grpSpPr>
+          <p:pic>
+            <p:nvPicPr>
+              <p:cNvPr id="51" name="Graphic 50" descr="Chevron arrows with solid fill">
+                <a:extLst>
+                  <a:ext uri="{FF2B5EF4-FFF2-40B4-BE49-F238E27FC236}">
+                    <a16:creationId xmlns:a16="http://schemas.microsoft.com/office/drawing/2014/main" id="{29C89F94-FF45-F72A-63A5-85D919068519}"/>
+                  </a:ext>
+                </a:extLst>
+              </p:cNvPr>
+              <p:cNvPicPr>
+                <a:picLocks noChangeAspect="1"/>
+              </p:cNvPicPr>
+              <p:nvPr/>
+            </p:nvPicPr>
+            <p:blipFill>
+              <a:blip r:embed="rId3">
+                <a:extLst>
+                  <a:ext uri="{96DAC541-7B7A-43D3-8B79-37D633B846F1}">
+                    <asvg:svgBlip xmlns:asvg="http://schemas.microsoft.com/office/drawing/2016/SVG/main" r:embed="rId4"/>
+                  </a:ext>
+                </a:extLst>
+              </a:blip>
+              <a:stretch>
+                <a:fillRect/>
+              </a:stretch>
+            </p:blipFill>
+            <p:spPr>
+              <a:xfrm rot="10800000">
+                <a:off x="6765853" y="6379843"/>
+                <a:ext cx="914400" cy="914400"/>
+              </a:xfrm>
+              <a:prstGeom prst="rect">
+                <a:avLst/>
+              </a:prstGeom>
+            </p:spPr>
+          </p:pic>
+          <p:sp>
+            <p:nvSpPr>
+              <p:cNvPr id="52" name="Rectangle 51">
+                <a:extLst>
+                  <a:ext uri="{FF2B5EF4-FFF2-40B4-BE49-F238E27FC236}">
+                    <a16:creationId xmlns:a16="http://schemas.microsoft.com/office/drawing/2014/main" id="{D6AE6932-72E3-B0F0-ABB3-56BB4B1DE222}"/>
+                  </a:ext>
+                </a:extLst>
+              </p:cNvPr>
+              <p:cNvSpPr/>
+              <p:nvPr/>
+            </p:nvSpPr>
+            <p:spPr bwMode="auto">
+              <a:xfrm>
+                <a:off x="6777933" y="4956926"/>
+                <a:ext cx="914401" cy="914401"/>
+              </a:xfrm>
+              <a:prstGeom prst="rect">
+                <a:avLst/>
+              </a:prstGeom>
+              <a:noFill/>
+              <a:ln w="38100" cap="flat" cmpd="sng" algn="ctr">
+                <a:solidFill>
+                  <a:srgbClr val="000000"/>
+                </a:solidFill>
+                <a:prstDash val="solid"/>
+                <a:headEnd type="none" w="med" len="med"/>
+                <a:tailEnd type="none" w="med" len="med"/>
+              </a:ln>
+              <a:effectLst/>
+            </p:spPr>
+            <p:txBody>
+              <a:bodyPr rot="0" spcFirstLastPara="0" vertOverflow="overflow" horzOverflow="overflow" vert="horz" wrap="square" lIns="182880" tIns="146304" rIns="182880" bIns="146304" numCol="1" spcCol="0" rtlCol="0" fromWordArt="0" anchor="t" anchorCtr="0" forceAA="0" compatLnSpc="1">
+                <a:prstTxWarp prst="textNoShape">
+                  <a:avLst/>
+                </a:prstTxWarp>
+                <a:noAutofit/>
+              </a:bodyPr>
+              <a:lstStyle/>
+              <a:p>
+                <a:pPr marL="0" marR="0" lvl="0" indent="0" defTabSz="932472" eaLnBrk="1" fontAlgn="base" latinLnBrk="0" hangingPunct="1">
+                  <a:lnSpc>
+                    <a:spcPct val="100000"/>
+                  </a:lnSpc>
+                  <a:spcBef>
+                    <a:spcPct val="0"/>
+                  </a:spcBef>
+                  <a:spcAft>
+                    <a:spcPct val="0"/>
+                  </a:spcAft>
+                  <a:buClrTx/>
+                  <a:buSzTx/>
+                  <a:buFontTx/>
+                  <a:buNone/>
+                  <a:tabLst/>
+                  <a:defRPr/>
+                </a:pPr>
+                <a:endParaRPr kumimoji="0" lang="en-GB" sz="1800" b="0" i="0" u="none" strike="noStrike" kern="0" cap="none" spc="0" normalizeH="0" baseline="0" noProof="0" dirty="0" err="1">
+                  <a:ln>
+                    <a:noFill/>
+                  </a:ln>
+                  <a:gradFill>
+                    <a:gsLst>
+                      <a:gs pos="0">
+                        <a:srgbClr val="FFFFFF"/>
+                      </a:gs>
+                      <a:gs pos="100000">
+                        <a:srgbClr val="FFFFFF"/>
+                      </a:gs>
+                    </a:gsLst>
+                    <a:lin ang="5400000" scaled="0"/>
+                  </a:gradFill>
+                  <a:effectLst/>
+                  <a:uLnTx/>
+                  <a:uFillTx/>
+                  <a:latin typeface="Klavika Regular"/>
+                  <a:ea typeface="Segoe UI" pitchFamily="34" charset="0"/>
+                  <a:cs typeface="Segoe UI" pitchFamily="34" charset="0"/>
+                </a:endParaRPr>
+              </a:p>
+            </p:txBody>
+          </p:sp>
+        </p:grpSp>
+        <p:grpSp>
+          <p:nvGrpSpPr>
+            <p:cNvPr id="53" name="Group 52">
+              <a:extLst>
+                <a:ext uri="{FF2B5EF4-FFF2-40B4-BE49-F238E27FC236}">
+                  <a16:creationId xmlns:a16="http://schemas.microsoft.com/office/drawing/2014/main" id="{C7F98D0E-F6DE-C6A9-5BE1-5D0303DC62B0}"/>
+                </a:ext>
+              </a:extLst>
+            </p:cNvPr>
+            <p:cNvGrpSpPr/>
+            <p:nvPr/>
+          </p:nvGrpSpPr>
+          <p:grpSpPr>
+            <a:xfrm rot="10800000">
+              <a:off x="8008738" y="4930315"/>
+              <a:ext cx="935707" cy="1959649"/>
+              <a:chOff x="6777933" y="4956926"/>
+              <a:chExt cx="935707" cy="1959649"/>
+            </a:xfrm>
+          </p:grpSpPr>
+          <p:pic>
+            <p:nvPicPr>
+              <p:cNvPr id="54" name="Graphic 53" descr="Chevron arrows with solid fill">
+                <a:extLst>
+                  <a:ext uri="{FF2B5EF4-FFF2-40B4-BE49-F238E27FC236}">
+                    <a16:creationId xmlns:a16="http://schemas.microsoft.com/office/drawing/2014/main" id="{42357772-43D7-A8DF-2B49-3257CFB4EEAE}"/>
+                  </a:ext>
+                </a:extLst>
+              </p:cNvPr>
+              <p:cNvPicPr>
+                <a:picLocks noChangeAspect="1"/>
+              </p:cNvPicPr>
+              <p:nvPr/>
+            </p:nvPicPr>
+            <p:blipFill>
+              <a:blip r:embed="rId3">
+                <a:extLst>
+                  <a:ext uri="{96DAC541-7B7A-43D3-8B79-37D633B846F1}">
+                    <asvg:svgBlip xmlns:asvg="http://schemas.microsoft.com/office/drawing/2016/SVG/main" r:embed="rId4"/>
+                  </a:ext>
+                </a:extLst>
+              </a:blip>
+              <a:stretch>
+                <a:fillRect/>
+              </a:stretch>
+            </p:blipFill>
+            <p:spPr>
+              <a:xfrm rot="10800000">
+                <a:off x="6799240" y="6002175"/>
+                <a:ext cx="914400" cy="914400"/>
+              </a:xfrm>
+              <a:prstGeom prst="rect">
+                <a:avLst/>
+              </a:prstGeom>
+            </p:spPr>
+          </p:pic>
+          <p:sp>
+            <p:nvSpPr>
+              <p:cNvPr id="55" name="Rectangle 54">
+                <a:extLst>
+                  <a:ext uri="{FF2B5EF4-FFF2-40B4-BE49-F238E27FC236}">
+                    <a16:creationId xmlns:a16="http://schemas.microsoft.com/office/drawing/2014/main" id="{3ABE5B92-251A-A58B-23A4-500C47A1B6E5}"/>
+                  </a:ext>
+                </a:extLst>
+              </p:cNvPr>
+              <p:cNvSpPr/>
+              <p:nvPr/>
+            </p:nvSpPr>
+            <p:spPr bwMode="auto">
+              <a:xfrm>
+                <a:off x="6777933" y="4956926"/>
+                <a:ext cx="914401" cy="914401"/>
+              </a:xfrm>
+              <a:prstGeom prst="rect">
+                <a:avLst/>
+              </a:prstGeom>
+              <a:noFill/>
+              <a:ln w="38100" cap="flat" cmpd="sng" algn="ctr">
+                <a:solidFill>
+                  <a:srgbClr val="000000"/>
+                </a:solidFill>
+                <a:prstDash val="solid"/>
+                <a:headEnd type="none" w="med" len="med"/>
+                <a:tailEnd type="none" w="med" len="med"/>
+              </a:ln>
+              <a:effectLst/>
+            </p:spPr>
+            <p:txBody>
+              <a:bodyPr rot="0" spcFirstLastPara="0" vertOverflow="overflow" horzOverflow="overflow" vert="horz" wrap="square" lIns="182880" tIns="146304" rIns="182880" bIns="146304" numCol="1" spcCol="0" rtlCol="0" fromWordArt="0" anchor="t" anchorCtr="0" forceAA="0" compatLnSpc="1">
+                <a:prstTxWarp prst="textNoShape">
+                  <a:avLst/>
+                </a:prstTxWarp>
+                <a:noAutofit/>
+              </a:bodyPr>
+              <a:lstStyle/>
+              <a:p>
+                <a:pPr marL="0" marR="0" lvl="0" indent="0" defTabSz="932472" eaLnBrk="1" fontAlgn="base" latinLnBrk="0" hangingPunct="1">
+                  <a:lnSpc>
+                    <a:spcPct val="100000"/>
+                  </a:lnSpc>
+                  <a:spcBef>
+                    <a:spcPct val="0"/>
+                  </a:spcBef>
+                  <a:spcAft>
+                    <a:spcPct val="0"/>
+                  </a:spcAft>
+                  <a:buClrTx/>
+                  <a:buSzTx/>
+                  <a:buFontTx/>
+                  <a:buNone/>
+                  <a:tabLst/>
+                  <a:defRPr/>
+                </a:pPr>
+                <a:endParaRPr kumimoji="0" lang="en-GB" sz="1800" b="0" i="0" u="none" strike="noStrike" kern="0" cap="none" spc="0" normalizeH="0" baseline="0" noProof="0" dirty="0" err="1">
+                  <a:ln>
+                    <a:noFill/>
+                  </a:ln>
+                  <a:gradFill>
+                    <a:gsLst>
+                      <a:gs pos="0">
+                        <a:srgbClr val="FFFFFF"/>
+                      </a:gs>
+                      <a:gs pos="100000">
+                        <a:srgbClr val="FFFFFF"/>
+                      </a:gs>
+                    </a:gsLst>
+                    <a:lin ang="5400000" scaled="0"/>
+                  </a:gradFill>
+                  <a:effectLst/>
+                  <a:uLnTx/>
+                  <a:uFillTx/>
+                  <a:latin typeface="Klavika Regular"/>
+                  <a:ea typeface="Segoe UI" pitchFamily="34" charset="0"/>
+                  <a:cs typeface="Segoe UI" pitchFamily="34" charset="0"/>
+                </a:endParaRPr>
+              </a:p>
+            </p:txBody>
+          </p:sp>
+        </p:grpSp>
+      </p:grpSp>
+      <p:sp>
+        <p:nvSpPr>
+          <p:cNvPr id="56" name="Rectangle 55">
+            <a:extLst>
+              <a:ext uri="{FF2B5EF4-FFF2-40B4-BE49-F238E27FC236}">
+                <a16:creationId xmlns:a16="http://schemas.microsoft.com/office/drawing/2014/main" id="{5421477F-BF1D-374D-B085-41E1E79EE463}"/>
+              </a:ext>
+            </a:extLst>
+          </p:cNvPr>
+          <p:cNvSpPr/>
+          <p:nvPr/>
+        </p:nvSpPr>
+        <p:spPr bwMode="auto">
+          <a:xfrm>
+            <a:off x="10864851" y="3419426"/>
+            <a:ext cx="231327" cy="516835"/>
+          </a:xfrm>
+          <a:prstGeom prst="rect">
+            <a:avLst/>
+          </a:prstGeom>
+          <a:noFill/>
+          <a:ln w="38100" cap="flat" cmpd="sng" algn="ctr">
+            <a:solidFill>
+              <a:srgbClr val="00B050"/>
+            </a:solidFill>
+            <a:prstDash val="solid"/>
+            <a:headEnd type="none" w="med" len="med"/>
+            <a:tailEnd type="none" w="med" len="med"/>
+          </a:ln>
+          <a:effectLst/>
+        </p:spPr>
+        <p:txBody>
+          <a:bodyPr rot="0" spcFirstLastPara="0" vertOverflow="overflow" horzOverflow="overflow" vert="horz" wrap="square" lIns="182880" tIns="146304" rIns="182880" bIns="146304" numCol="1" spcCol="0" rtlCol="0" fromWordArt="0" anchor="t" anchorCtr="0" forceAA="0" compatLnSpc="1">
+            <a:prstTxWarp prst="textNoShape">
+              <a:avLst/>
+            </a:prstTxWarp>
+            <a:noAutofit/>
+          </a:bodyPr>
+          <a:lstStyle/>
+          <a:p>
+            <a:pPr marL="0" marR="0" lvl="0" indent="0" defTabSz="932472" eaLnBrk="1" fontAlgn="base" latinLnBrk="0" hangingPunct="1">
+              <a:lnSpc>
+                <a:spcPct val="100000"/>
+              </a:lnSpc>
+              <a:spcBef>
+                <a:spcPct val="0"/>
+              </a:spcBef>
+              <a:spcAft>
+                <a:spcPct val="0"/>
+              </a:spcAft>
+              <a:buClrTx/>
+              <a:buSzTx/>
+              <a:buFontTx/>
+              <a:buNone/>
+              <a:tabLst/>
+              <a:defRPr/>
+            </a:pPr>
+            <a:endParaRPr kumimoji="0" lang="en-GB" sz="1800" b="0" i="0" u="none" strike="noStrike" kern="0" cap="none" spc="0" normalizeH="0" baseline="0" noProof="0" dirty="0" err="1">
+              <a:ln>
+                <a:noFill/>
+              </a:ln>
+              <a:gradFill>
+                <a:gsLst>
+                  <a:gs pos="0">
+                    <a:srgbClr val="FFFFFF"/>
+                  </a:gs>
+                  <a:gs pos="100000">
+                    <a:srgbClr val="FFFFFF"/>
+                  </a:gs>
+                </a:gsLst>
+                <a:lin ang="5400000" scaled="0"/>
+              </a:gradFill>
+              <a:effectLst/>
+              <a:uLnTx/>
+              <a:uFillTx/>
+              <a:latin typeface="Klavika Regular"/>
+              <a:ea typeface="Segoe UI" pitchFamily="34" charset="0"/>
+              <a:cs typeface="Segoe UI" pitchFamily="34" charset="0"/>
+            </a:endParaRPr>
+          </a:p>
+        </p:txBody>
+      </p:sp>
+      <p:cxnSp>
+        <p:nvCxnSpPr>
+          <p:cNvPr id="57" name="Straight Connector 56">
+            <a:extLst>
+              <a:ext uri="{FF2B5EF4-FFF2-40B4-BE49-F238E27FC236}">
+                <a16:creationId xmlns:a16="http://schemas.microsoft.com/office/drawing/2014/main" id="{EC7D37F8-161D-28F6-63E9-0EE2752C8F27}"/>
+              </a:ext>
+            </a:extLst>
+          </p:cNvPr>
+          <p:cNvCxnSpPr>
+            <a:cxnSpLocks/>
+          </p:cNvCxnSpPr>
+          <p:nvPr/>
+        </p:nvCxnSpPr>
+        <p:spPr>
+          <a:xfrm flipV="1">
+            <a:off x="10633169" y="2389267"/>
+            <a:ext cx="206282" cy="2125538"/>
+          </a:xfrm>
+          <a:prstGeom prst="line">
+            <a:avLst/>
+          </a:prstGeom>
+          <a:noFill/>
+          <a:ln w="9525" cap="flat" cmpd="sng" algn="ctr">
+            <a:solidFill>
+              <a:srgbClr val="ED1C24"/>
+            </a:solidFill>
+            <a:prstDash val="solid"/>
+            <a:headEnd type="none" w="lg" len="med"/>
+            <a:tailEnd type="none" w="lg" len="med"/>
+          </a:ln>
+          <a:effectLst/>
+        </p:spPr>
+      </p:cxnSp>
+      <p:cxnSp>
+        <p:nvCxnSpPr>
+          <p:cNvPr id="58" name="Straight Arrow Connector 57">
+            <a:extLst>
+              <a:ext uri="{FF2B5EF4-FFF2-40B4-BE49-F238E27FC236}">
+                <a16:creationId xmlns:a16="http://schemas.microsoft.com/office/drawing/2014/main" id="{F9078187-70A7-CFBA-2394-FB0526853DA9}"/>
+              </a:ext>
+            </a:extLst>
+          </p:cNvPr>
+          <p:cNvCxnSpPr>
+            <a:cxnSpLocks/>
+            <a:endCxn id="43" idx="1"/>
+          </p:cNvCxnSpPr>
+          <p:nvPr/>
+        </p:nvCxnSpPr>
+        <p:spPr>
+          <a:xfrm flipV="1">
+            <a:off x="4972050" y="5596819"/>
+            <a:ext cx="2838581" cy="188031"/>
+          </a:xfrm>
+          <a:prstGeom prst="straightConnector1">
+            <a:avLst/>
+          </a:prstGeom>
+          <a:noFill/>
+          <a:ln w="12700" cap="flat" cmpd="sng" algn="ctr">
+            <a:solidFill>
+              <a:srgbClr val="ED1C24"/>
+            </a:solidFill>
+            <a:prstDash val="solid"/>
+            <a:headEnd type="none" w="lg" len="med"/>
+            <a:tailEnd type="triangle"/>
+          </a:ln>
+          <a:effectLst/>
+        </p:spPr>
+      </p:cxnSp>
+      <p:sp>
+        <p:nvSpPr>
+          <p:cNvPr id="7" name="Rectangle 6">
+            <a:extLst>
+              <a:ext uri="{FF2B5EF4-FFF2-40B4-BE49-F238E27FC236}">
+                <a16:creationId xmlns:a16="http://schemas.microsoft.com/office/drawing/2014/main" id="{BAC3E3CA-75D7-4F85-ABB0-3DAB32B3EAD0}"/>
+              </a:ext>
+            </a:extLst>
+          </p:cNvPr>
+          <p:cNvSpPr/>
+          <p:nvPr/>
+        </p:nvSpPr>
+        <p:spPr bwMode="auto">
+          <a:xfrm>
+            <a:off x="10601419" y="3415900"/>
+            <a:ext cx="231326" cy="516835"/>
+          </a:xfrm>
+          <a:prstGeom prst="rect">
+            <a:avLst/>
+          </a:prstGeom>
+          <a:noFill/>
+          <a:ln w="38100" cap="flat" cmpd="sng" algn="ctr">
+            <a:solidFill>
+              <a:srgbClr val="00B0F0"/>
+            </a:solidFill>
+            <a:prstDash val="solid"/>
+            <a:headEnd type="none" w="med" len="med"/>
+            <a:tailEnd type="none" w="med" len="med"/>
+          </a:ln>
+          <a:effectLst/>
+        </p:spPr>
+        <p:txBody>
+          <a:bodyPr rot="0" spcFirstLastPara="0" vertOverflow="overflow" horzOverflow="overflow" vert="horz" wrap="square" lIns="182880" tIns="146304" rIns="182880" bIns="146304" numCol="1" spcCol="0" rtlCol="0" fromWordArt="0" anchor="t" anchorCtr="0" forceAA="0" compatLnSpc="1">
+            <a:prstTxWarp prst="textNoShape">
+              <a:avLst/>
+            </a:prstTxWarp>
+            <a:noAutofit/>
+          </a:bodyPr>
+          <a:lstStyle/>
+          <a:p>
+            <a:pPr marL="0" marR="0" lvl="0" indent="0" defTabSz="932472" eaLnBrk="1" fontAlgn="base" latinLnBrk="0" hangingPunct="1">
+              <a:lnSpc>
+                <a:spcPct val="100000"/>
+              </a:lnSpc>
+              <a:spcBef>
+                <a:spcPct val="0"/>
+              </a:spcBef>
+              <a:spcAft>
+                <a:spcPct val="0"/>
+              </a:spcAft>
+              <a:buClrTx/>
+              <a:buSzTx/>
+              <a:buFontTx/>
+              <a:buNone/>
+              <a:tabLst/>
+              <a:defRPr/>
+            </a:pPr>
+            <a:endParaRPr kumimoji="0" lang="en-GB" sz="1800" b="0" i="0" u="none" strike="noStrike" kern="0" cap="none" spc="0" normalizeH="0" baseline="0" noProof="0" dirty="0" err="1">
+              <a:ln>
+                <a:noFill/>
+              </a:ln>
+              <a:gradFill>
+                <a:gsLst>
+                  <a:gs pos="0">
+                    <a:srgbClr val="FFFFFF"/>
+                  </a:gs>
+                  <a:gs pos="100000">
+                    <a:srgbClr val="FFFFFF"/>
+                  </a:gs>
+                </a:gsLst>
+                <a:lin ang="5400000" scaled="0"/>
+              </a:gradFill>
+              <a:effectLst/>
+              <a:uLnTx/>
+              <a:uFillTx/>
+              <a:latin typeface="Klavika Regular"/>
+              <a:ea typeface="Segoe UI" pitchFamily="34" charset="0"/>
+              <a:cs typeface="Segoe UI" pitchFamily="34" charset="0"/>
+            </a:endParaRPr>
+          </a:p>
+        </p:txBody>
+      </p:sp>
+      <p:cxnSp>
+        <p:nvCxnSpPr>
+          <p:cNvPr id="8" name="Straight Arrow Connector 7">
+            <a:extLst>
+              <a:ext uri="{FF2B5EF4-FFF2-40B4-BE49-F238E27FC236}">
+                <a16:creationId xmlns:a16="http://schemas.microsoft.com/office/drawing/2014/main" id="{1AD19CCC-1793-A6CF-EE67-E72A2E0FDA82}"/>
+              </a:ext>
+            </a:extLst>
+          </p:cNvPr>
+          <p:cNvCxnSpPr>
+            <a:cxnSpLocks/>
+            <a:endCxn id="7" idx="1"/>
+          </p:cNvCxnSpPr>
+          <p:nvPr/>
+        </p:nvCxnSpPr>
+        <p:spPr>
+          <a:xfrm>
+            <a:off x="5416550" y="2909367"/>
+            <a:ext cx="5184869" cy="764951"/>
+          </a:xfrm>
+          <a:prstGeom prst="straightConnector1">
+            <a:avLst/>
+          </a:prstGeom>
+          <a:noFill/>
+          <a:ln w="12700" cap="flat" cmpd="sng" algn="ctr">
+            <a:solidFill>
+              <a:srgbClr val="00B0F0"/>
+            </a:solidFill>
+            <a:prstDash val="solid"/>
+            <a:headEnd type="none" w="lg" len="med"/>
+            <a:tailEnd type="triangle"/>
+          </a:ln>
+          <a:effectLst/>
+        </p:spPr>
+      </p:cxnSp>
+    </p:spTree>
+    <p:extLst>
+      <p:ext uri="{BB962C8B-B14F-4D97-AF65-F5344CB8AC3E}">
+        <p14:creationId xmlns:p14="http://schemas.microsoft.com/office/powerpoint/2010/main" val="569035694"/>
       </p:ext>
     </p:extLst>
   </p:cSld>
@@ -26258,27 +27797,27 @@
 </file>
 
 <file path=customXml/item1.xml><?xml version="1.0" encoding="utf-8"?>
+<TemplafySlideTemplateConfiguration><![CDATA[{"slideVersion":1,"isValidatorEnabled":false,"isLocked":false,"elementsMetadata":[],"slideId":"637629098472101399","enableDocumentContentUpdater":true,"version":"2.0"}]]></TemplafySlideTemplateConfiguration>
+</file>
+
+<file path=customXml/item2.xml><?xml version="1.0" encoding="utf-8"?>
 <TemplafySlideFormConfiguration><![CDATA[{"formFields":[],"formDataEntries":[]}]]></TemplafySlideFormConfiguration>
 </file>
 
-<file path=customXml/item2.xml><?xml version="1.0" encoding="utf-8"?>
-<TemplafySlideTemplateConfiguration><![CDATA[{"slideVersion":1,"isValidatorEnabled":false,"isLocked":false,"elementsMetadata":[],"slideId":"637629098472101399","enableDocumentContentUpdater":true,"version":"2.0"}]]></TemplafySlideTemplateConfiguration>
-</file>
-
 <file path=customXml/itemProps1.xml><?xml version="1.0" encoding="utf-8"?>
-<ds:datastoreItem xmlns:ds="http://schemas.openxmlformats.org/officeDocument/2006/customXml" ds:itemID="{E4185C24-1447-4288-BCBB-7ABBF03479A8}">
+<ds:datastoreItem xmlns:ds="http://schemas.openxmlformats.org/officeDocument/2006/customXml" ds:itemID="{3A7B4B56-D0D2-4135-A66A-EEF2C62C4256}">
   <ds:schemaRefs/>
 </ds:datastoreItem>
 </file>
 
 <file path=customXml/itemProps2.xml><?xml version="1.0" encoding="utf-8"?>
-<ds:datastoreItem xmlns:ds="http://schemas.openxmlformats.org/officeDocument/2006/customXml" ds:itemID="{3A7B4B56-D0D2-4135-A66A-EEF2C62C4256}">
+<ds:datastoreItem xmlns:ds="http://schemas.openxmlformats.org/officeDocument/2006/customXml" ds:itemID="{E4185C24-1447-4288-BCBB-7ABBF03479A8}">
   <ds:schemaRefs/>
 </ds:datastoreItem>
 </file>
 
 <file path=docMetadata/LabelInfo.xml><?xml version="1.0" encoding="utf-8"?>
 <clbl:labelList xmlns:clbl="http://schemas.microsoft.com/office/2020/mipLabelMetadata">
-  <clbl:label id="{94523dde-f9d1-4aa7-80a9-c0900420d3c3}" enabled="1" method="Privileged" siteId="{3dd8961f-e488-4e60-8e11-a82d994e183d}" contentBits="0" removed="0"/>
+  <clbl:label id="{3dd8961f-e488-4e60-8e11-a82d994e183d}" enabled="0" method="" siteId="{3dd8961f-e488-4e60-8e11-a82d994e183d}" removed="1"/>
 </clbl:labelList>
 </file>
</xml_diff>

<commit_message>
Update usage guide to include external button variant
</commit_message>
<xml_diff>
--- a/usage_guide.pptx
+++ b/usage_guide.pptx
@@ -12,6 +12,8 @@
     <p:sldId id="258" r:id="rId8"/>
     <p:sldId id="261" r:id="rId9"/>
     <p:sldId id="262" r:id="rId10"/>
+    <p:sldId id="263" r:id="rId11"/>
+    <p:sldId id="264" r:id="rId12"/>
   </p:sldIdLst>
   <p:sldSz cx="12192000" cy="6858000"/>
   <p:notesSz cx="7010400" cy="9296400"/>
@@ -121,7 +123,7 @@
 <file path=ppt/revisionInfo.xml><?xml version="1.0" encoding="utf-8"?>
 <p1510:revInfo xmlns:a="http://schemas.openxmlformats.org/drawingml/2006/main" xmlns:r="http://schemas.openxmlformats.org/officeDocument/2006/relationships" xmlns:p1510="http://schemas.microsoft.com/office/powerpoint/2015/10/main">
   <p1510:revLst>
-    <p1510:client id="{0767353F-D086-4090-8BF5-095E245E8D59}" v="6" dt="2025-01-07T15:15:15.540"/>
+    <p1510:client id="{0767353F-D086-4090-8BF5-095E245E8D59}" v="21" dt="2025-01-08T12:13:05.747"/>
   </p1510:revLst>
 </p1510:revInfo>
 </file>
@@ -130,17 +132,167 @@
 <pc:chgInfo xmlns:a="http://schemas.openxmlformats.org/drawingml/2006/main" xmlns:r="http://schemas.openxmlformats.org/officeDocument/2006/relationships" xmlns:ac="http://schemas.microsoft.com/office/drawing/2013/main/command" xmlns:pc="http://schemas.microsoft.com/office/powerpoint/2013/main/command">
   <pc:docChgLst>
     <pc:chgData name="Pethick, Matthew" userId="47b0bdf2-08b5-49f1-a741-b2d87ec64f81" providerId="ADAL" clId="{0767353F-D086-4090-8BF5-095E245E8D59}"/>
-    <pc:docChg chg="modSld">
-      <pc:chgData name="Pethick, Matthew" userId="47b0bdf2-08b5-49f1-a741-b2d87ec64f81" providerId="ADAL" clId="{0767353F-D086-4090-8BF5-095E245E8D59}" dt="2025-01-07T16:04:41.915" v="3" actId="20577"/>
+    <pc:docChg chg="undo custSel addSld delSld modSld">
+      <pc:chgData name="Pethick, Matthew" userId="47b0bdf2-08b5-49f1-a741-b2d87ec64f81" providerId="ADAL" clId="{0767353F-D086-4090-8BF5-095E245E8D59}" dt="2025-01-08T12:19:06.741" v="380" actId="14100"/>
       <pc:docMkLst>
         <pc:docMk/>
       </pc:docMkLst>
-      <pc:sldChg chg="modSp mod">
-        <pc:chgData name="Pethick, Matthew" userId="47b0bdf2-08b5-49f1-a741-b2d87ec64f81" providerId="ADAL" clId="{0767353F-D086-4090-8BF5-095E245E8D59}" dt="2025-01-07T16:04:41.915" v="3" actId="20577"/>
+      <pc:sldChg chg="delSp modSp mod">
+        <pc:chgData name="Pethick, Matthew" userId="47b0bdf2-08b5-49f1-a741-b2d87ec64f81" providerId="ADAL" clId="{0767353F-D086-4090-8BF5-095E245E8D59}" dt="2025-01-08T12:12:32.309" v="219" actId="478"/>
+        <pc:sldMkLst>
+          <pc:docMk/>
+          <pc:sldMk cId="3712660401" sldId="257"/>
+        </pc:sldMkLst>
+        <pc:cxnChg chg="del mod">
+          <ac:chgData name="Pethick, Matthew" userId="47b0bdf2-08b5-49f1-a741-b2d87ec64f81" providerId="ADAL" clId="{0767353F-D086-4090-8BF5-095E245E8D59}" dt="2025-01-08T12:12:32.309" v="219" actId="478"/>
+          <ac:cxnSpMkLst>
+            <pc:docMk/>
+            <pc:sldMk cId="3712660401" sldId="257"/>
+            <ac:cxnSpMk id="58" creationId="{108DB30E-207D-964A-5CCE-64B4479EB74C}"/>
+          </ac:cxnSpMkLst>
+        </pc:cxnChg>
+      </pc:sldChg>
+      <pc:sldChg chg="delSp modSp mod">
+        <pc:chgData name="Pethick, Matthew" userId="47b0bdf2-08b5-49f1-a741-b2d87ec64f81" providerId="ADAL" clId="{0767353F-D086-4090-8BF5-095E245E8D59}" dt="2025-01-08T12:17:19.434" v="320" actId="14100"/>
+        <pc:sldMkLst>
+          <pc:docMk/>
+          <pc:sldMk cId="3565139277" sldId="258"/>
+        </pc:sldMkLst>
+        <pc:spChg chg="mod">
+          <ac:chgData name="Pethick, Matthew" userId="47b0bdf2-08b5-49f1-a741-b2d87ec64f81" providerId="ADAL" clId="{0767353F-D086-4090-8BF5-095E245E8D59}" dt="2025-01-08T12:12:38.934" v="221" actId="14100"/>
+          <ac:spMkLst>
+            <pc:docMk/>
+            <pc:sldMk cId="3565139277" sldId="258"/>
+            <ac:spMk id="43" creationId="{E0698CBD-B051-EBE0-F112-823091F7D199}"/>
+          </ac:spMkLst>
+        </pc:spChg>
+        <pc:cxnChg chg="mod">
+          <ac:chgData name="Pethick, Matthew" userId="47b0bdf2-08b5-49f1-a741-b2d87ec64f81" providerId="ADAL" clId="{0767353F-D086-4090-8BF5-095E245E8D59}" dt="2025-01-08T12:12:41.912" v="222" actId="14100"/>
+          <ac:cxnSpMkLst>
+            <pc:docMk/>
+            <pc:sldMk cId="3565139277" sldId="258"/>
+            <ac:cxnSpMk id="33" creationId="{E909D445-4F3E-D225-9E67-261728F594CF}"/>
+          </ac:cxnSpMkLst>
+        </pc:cxnChg>
+        <pc:cxnChg chg="mod">
+          <ac:chgData name="Pethick, Matthew" userId="47b0bdf2-08b5-49f1-a741-b2d87ec64f81" providerId="ADAL" clId="{0767353F-D086-4090-8BF5-095E245E8D59}" dt="2025-01-08T12:12:47.701" v="224" actId="14100"/>
+          <ac:cxnSpMkLst>
+            <pc:docMk/>
+            <pc:sldMk cId="3565139277" sldId="258"/>
+            <ac:cxnSpMk id="34" creationId="{6C777204-C710-BF18-235E-767E64798DC2}"/>
+          </ac:cxnSpMkLst>
+        </pc:cxnChg>
+        <pc:cxnChg chg="mod">
+          <ac:chgData name="Pethick, Matthew" userId="47b0bdf2-08b5-49f1-a741-b2d87ec64f81" providerId="ADAL" clId="{0767353F-D086-4090-8BF5-095E245E8D59}" dt="2025-01-08T12:14:51.402" v="310" actId="14100"/>
+          <ac:cxnSpMkLst>
+            <pc:docMk/>
+            <pc:sldMk cId="3565139277" sldId="258"/>
+            <ac:cxnSpMk id="35" creationId="{419F3888-7F57-F752-7FEF-4760145DC7F0}"/>
+          </ac:cxnSpMkLst>
+        </pc:cxnChg>
+        <pc:cxnChg chg="mod">
+          <ac:chgData name="Pethick, Matthew" userId="47b0bdf2-08b5-49f1-a741-b2d87ec64f81" providerId="ADAL" clId="{0767353F-D086-4090-8BF5-095E245E8D59}" dt="2025-01-08T12:17:19.434" v="320" actId="14100"/>
+          <ac:cxnSpMkLst>
+            <pc:docMk/>
+            <pc:sldMk cId="3565139277" sldId="258"/>
+            <ac:cxnSpMk id="42" creationId="{24A06D2E-9D0C-7355-1360-A4591E903CC8}"/>
+          </ac:cxnSpMkLst>
+        </pc:cxnChg>
+        <pc:cxnChg chg="mod">
+          <ac:chgData name="Pethick, Matthew" userId="47b0bdf2-08b5-49f1-a741-b2d87ec64f81" providerId="ADAL" clId="{0767353F-D086-4090-8BF5-095E245E8D59}" dt="2025-01-08T12:14:43.151" v="309" actId="14100"/>
+          <ac:cxnSpMkLst>
+            <pc:docMk/>
+            <pc:sldMk cId="3565139277" sldId="258"/>
+            <ac:cxnSpMk id="57" creationId="{57FC2AB1-DF34-5B77-C0A4-1D19EE6A677D}"/>
+          </ac:cxnSpMkLst>
+        </pc:cxnChg>
+        <pc:cxnChg chg="del mod">
+          <ac:chgData name="Pethick, Matthew" userId="47b0bdf2-08b5-49f1-a741-b2d87ec64f81" providerId="ADAL" clId="{0767353F-D086-4090-8BF5-095E245E8D59}" dt="2025-01-08T12:12:25.654" v="218" actId="478"/>
+          <ac:cxnSpMkLst>
+            <pc:docMk/>
+            <pc:sldMk cId="3565139277" sldId="258"/>
+            <ac:cxnSpMk id="58" creationId="{8483273F-2441-A393-FD61-31FECC7C634B}"/>
+          </ac:cxnSpMkLst>
+        </pc:cxnChg>
+      </pc:sldChg>
+      <pc:sldChg chg="addSp delSp modSp mod">
+        <pc:chgData name="Pethick, Matthew" userId="47b0bdf2-08b5-49f1-a741-b2d87ec64f81" providerId="ADAL" clId="{0767353F-D086-4090-8BF5-095E245E8D59}" dt="2025-01-08T12:17:07.311" v="318" actId="14100"/>
         <pc:sldMkLst>
           <pc:docMk/>
           <pc:sldMk cId="569035694" sldId="262"/>
         </pc:sldMkLst>
+        <pc:spChg chg="add del mod ord">
+          <ac:chgData name="Pethick, Matthew" userId="47b0bdf2-08b5-49f1-a741-b2d87ec64f81" providerId="ADAL" clId="{0767353F-D086-4090-8BF5-095E245E8D59}" dt="2025-01-08T12:14:11.641" v="303" actId="170"/>
+          <ac:spMkLst>
+            <pc:docMk/>
+            <pc:sldMk cId="569035694" sldId="262"/>
+            <ac:spMk id="4" creationId="{60EC5E56-87F1-C3A2-58C8-942CE7F1E0CC}"/>
+          </ac:spMkLst>
+        </pc:spChg>
+        <pc:spChg chg="add del mod">
+          <ac:chgData name="Pethick, Matthew" userId="47b0bdf2-08b5-49f1-a741-b2d87ec64f81" providerId="ADAL" clId="{0767353F-D086-4090-8BF5-095E245E8D59}" dt="2025-01-08T12:13:24.487" v="288" actId="478"/>
+          <ac:spMkLst>
+            <pc:docMk/>
+            <pc:sldMk cId="569035694" sldId="262"/>
+            <ac:spMk id="6" creationId="{60DC0BF2-8214-3ED9-733F-9FBE36CEC731}"/>
+          </ac:spMkLst>
+        </pc:spChg>
+        <pc:spChg chg="add del mod">
+          <ac:chgData name="Pethick, Matthew" userId="47b0bdf2-08b5-49f1-a741-b2d87ec64f81" providerId="ADAL" clId="{0767353F-D086-4090-8BF5-095E245E8D59}" dt="2025-01-08T12:13:26.534" v="289" actId="478"/>
+          <ac:spMkLst>
+            <pc:docMk/>
+            <pc:sldMk cId="569035694" sldId="262"/>
+            <ac:spMk id="9" creationId="{EC159251-5187-B0B9-3A6B-99CBE12182DB}"/>
+          </ac:spMkLst>
+        </pc:spChg>
+        <pc:spChg chg="mod">
+          <ac:chgData name="Pethick, Matthew" userId="47b0bdf2-08b5-49f1-a741-b2d87ec64f81" providerId="ADAL" clId="{0767353F-D086-4090-8BF5-095E245E8D59}" dt="2025-01-08T12:13:05.747" v="233"/>
+          <ac:spMkLst>
+            <pc:docMk/>
+            <pc:sldMk cId="569035694" sldId="262"/>
+            <ac:spMk id="16" creationId="{7E0F2369-154C-6EED-AAB7-DE4194217541}"/>
+          </ac:spMkLst>
+        </pc:spChg>
+        <pc:spChg chg="mod">
+          <ac:chgData name="Pethick, Matthew" userId="47b0bdf2-08b5-49f1-a741-b2d87ec64f81" providerId="ADAL" clId="{0767353F-D086-4090-8BF5-095E245E8D59}" dt="2025-01-08T12:13:05.747" v="233"/>
+          <ac:spMkLst>
+            <pc:docMk/>
+            <pc:sldMk cId="569035694" sldId="262"/>
+            <ac:spMk id="18" creationId="{289F056E-2D5A-26F0-05D4-E8799CF2B6EE}"/>
+          </ac:spMkLst>
+        </pc:spChg>
+        <pc:spChg chg="mod">
+          <ac:chgData name="Pethick, Matthew" userId="47b0bdf2-08b5-49f1-a741-b2d87ec64f81" providerId="ADAL" clId="{0767353F-D086-4090-8BF5-095E245E8D59}" dt="2025-01-08T12:13:05.747" v="233"/>
+          <ac:spMkLst>
+            <pc:docMk/>
+            <pc:sldMk cId="569035694" sldId="262"/>
+            <ac:spMk id="21" creationId="{17F896B8-F57B-BC7F-864A-216CB0D268A5}"/>
+          </ac:spMkLst>
+        </pc:spChg>
+        <pc:spChg chg="mod">
+          <ac:chgData name="Pethick, Matthew" userId="47b0bdf2-08b5-49f1-a741-b2d87ec64f81" providerId="ADAL" clId="{0767353F-D086-4090-8BF5-095E245E8D59}" dt="2025-01-08T12:13:05.747" v="233"/>
+          <ac:spMkLst>
+            <pc:docMk/>
+            <pc:sldMk cId="569035694" sldId="262"/>
+            <ac:spMk id="24" creationId="{EA30FC30-5124-59FE-FE56-11D50312E54A}"/>
+          </ac:spMkLst>
+        </pc:spChg>
+        <pc:spChg chg="add del mod">
+          <ac:chgData name="Pethick, Matthew" userId="47b0bdf2-08b5-49f1-a741-b2d87ec64f81" providerId="ADAL" clId="{0767353F-D086-4090-8BF5-095E245E8D59}" dt="2025-01-08T12:13:30.966" v="291" actId="478"/>
+          <ac:spMkLst>
+            <pc:docMk/>
+            <pc:sldMk cId="569035694" sldId="262"/>
+            <ac:spMk id="25" creationId="{6585D635-9482-E96C-EA33-67984ED89FF2}"/>
+          </ac:spMkLst>
+        </pc:spChg>
+        <pc:spChg chg="add del mod">
+          <ac:chgData name="Pethick, Matthew" userId="47b0bdf2-08b5-49f1-a741-b2d87ec64f81" providerId="ADAL" clId="{0767353F-D086-4090-8BF5-095E245E8D59}" dt="2025-01-08T12:13:28.488" v="290" actId="478"/>
+          <ac:spMkLst>
+            <pc:docMk/>
+            <pc:sldMk cId="569035694" sldId="262"/>
+            <ac:spMk id="27" creationId="{9B154893-926E-5DDE-502A-523CC52C6068}"/>
+          </ac:spMkLst>
+        </pc:spChg>
         <pc:spChg chg="mod">
           <ac:chgData name="Pethick, Matthew" userId="47b0bdf2-08b5-49f1-a741-b2d87ec64f81" providerId="ADAL" clId="{0767353F-D086-4090-8BF5-095E245E8D59}" dt="2025-01-07T16:04:41.915" v="3" actId="20577"/>
           <ac:spMkLst>
@@ -149,6 +301,563 @@
             <ac:spMk id="37" creationId="{DDFF6493-A702-FB7E-7E3D-EA387DC84ED0}"/>
           </ac:spMkLst>
         </pc:spChg>
+        <pc:spChg chg="del">
+          <ac:chgData name="Pethick, Matthew" userId="47b0bdf2-08b5-49f1-a741-b2d87ec64f81" providerId="ADAL" clId="{0767353F-D086-4090-8BF5-095E245E8D59}" dt="2025-01-08T12:13:01.846" v="228" actId="478"/>
+          <ac:spMkLst>
+            <pc:docMk/>
+            <pc:sldMk cId="569035694" sldId="262"/>
+            <ac:spMk id="43" creationId="{0DB89943-62FF-4441-2A90-8759A0C2443E}"/>
+          </ac:spMkLst>
+        </pc:spChg>
+        <pc:grpChg chg="add del mod">
+          <ac:chgData name="Pethick, Matthew" userId="47b0bdf2-08b5-49f1-a741-b2d87ec64f81" providerId="ADAL" clId="{0767353F-D086-4090-8BF5-095E245E8D59}" dt="2025-01-08T12:13:43.211" v="296" actId="478"/>
+          <ac:grpSpMkLst>
+            <pc:docMk/>
+            <pc:sldMk cId="569035694" sldId="262"/>
+            <ac:grpSpMk id="10" creationId="{ED0EA641-5C6C-61E0-590C-E5E63CF9A935}"/>
+          </ac:grpSpMkLst>
+        </pc:grpChg>
+        <pc:grpChg chg="mod">
+          <ac:chgData name="Pethick, Matthew" userId="47b0bdf2-08b5-49f1-a741-b2d87ec64f81" providerId="ADAL" clId="{0767353F-D086-4090-8BF5-095E245E8D59}" dt="2025-01-08T12:13:05.747" v="233"/>
+          <ac:grpSpMkLst>
+            <pc:docMk/>
+            <pc:sldMk cId="569035694" sldId="262"/>
+            <ac:grpSpMk id="11" creationId="{D37553B0-CAE4-FA69-852D-7B1BB178C814}"/>
+          </ac:grpSpMkLst>
+        </pc:grpChg>
+        <pc:grpChg chg="mod">
+          <ac:chgData name="Pethick, Matthew" userId="47b0bdf2-08b5-49f1-a741-b2d87ec64f81" providerId="ADAL" clId="{0767353F-D086-4090-8BF5-095E245E8D59}" dt="2025-01-08T12:13:05.747" v="233"/>
+          <ac:grpSpMkLst>
+            <pc:docMk/>
+            <pc:sldMk cId="569035694" sldId="262"/>
+            <ac:grpSpMk id="12" creationId="{3E16210E-3640-3671-4592-AC1B2BE786D5}"/>
+          </ac:grpSpMkLst>
+        </pc:grpChg>
+        <pc:grpChg chg="mod">
+          <ac:chgData name="Pethick, Matthew" userId="47b0bdf2-08b5-49f1-a741-b2d87ec64f81" providerId="ADAL" clId="{0767353F-D086-4090-8BF5-095E245E8D59}" dt="2025-01-08T12:13:05.747" v="233"/>
+          <ac:grpSpMkLst>
+            <pc:docMk/>
+            <pc:sldMk cId="569035694" sldId="262"/>
+            <ac:grpSpMk id="13" creationId="{09C4E7A7-D5F5-C402-FCD4-7A28C859A3F6}"/>
+          </ac:grpSpMkLst>
+        </pc:grpChg>
+        <pc:grpChg chg="mod">
+          <ac:chgData name="Pethick, Matthew" userId="47b0bdf2-08b5-49f1-a741-b2d87ec64f81" providerId="ADAL" clId="{0767353F-D086-4090-8BF5-095E245E8D59}" dt="2025-01-08T12:13:05.747" v="233"/>
+          <ac:grpSpMkLst>
+            <pc:docMk/>
+            <pc:sldMk cId="569035694" sldId="262"/>
+            <ac:grpSpMk id="14" creationId="{48DB4056-7F07-B233-4131-2041547C3D5C}"/>
+          </ac:grpSpMkLst>
+        </pc:grpChg>
+        <pc:grpChg chg="add del">
+          <ac:chgData name="Pethick, Matthew" userId="47b0bdf2-08b5-49f1-a741-b2d87ec64f81" providerId="ADAL" clId="{0767353F-D086-4090-8BF5-095E245E8D59}" dt="2025-01-08T12:13:00.618" v="227" actId="478"/>
+          <ac:grpSpMkLst>
+            <pc:docMk/>
+            <pc:sldMk cId="569035694" sldId="262"/>
+            <ac:grpSpMk id="20" creationId="{F66ECD6F-A25D-1D45-0CCC-421416833F8A}"/>
+          </ac:grpSpMkLst>
+        </pc:grpChg>
+        <pc:picChg chg="mod">
+          <ac:chgData name="Pethick, Matthew" userId="47b0bdf2-08b5-49f1-a741-b2d87ec64f81" providerId="ADAL" clId="{0767353F-D086-4090-8BF5-095E245E8D59}" dt="2025-01-08T12:13:05.747" v="233"/>
+          <ac:picMkLst>
+            <pc:docMk/>
+            <pc:sldMk cId="569035694" sldId="262"/>
+            <ac:picMk id="15" creationId="{C9CEDF86-7007-99C9-81C3-2CBB8F7D9ACF}"/>
+          </ac:picMkLst>
+        </pc:picChg>
+        <pc:picChg chg="mod">
+          <ac:chgData name="Pethick, Matthew" userId="47b0bdf2-08b5-49f1-a741-b2d87ec64f81" providerId="ADAL" clId="{0767353F-D086-4090-8BF5-095E245E8D59}" dt="2025-01-08T12:13:05.747" v="233"/>
+          <ac:picMkLst>
+            <pc:docMk/>
+            <pc:sldMk cId="569035694" sldId="262"/>
+            <ac:picMk id="17" creationId="{53B6835C-6961-55F0-3121-43988940693F}"/>
+          </ac:picMkLst>
+        </pc:picChg>
+        <pc:picChg chg="mod">
+          <ac:chgData name="Pethick, Matthew" userId="47b0bdf2-08b5-49f1-a741-b2d87ec64f81" providerId="ADAL" clId="{0767353F-D086-4090-8BF5-095E245E8D59}" dt="2025-01-08T12:13:05.747" v="233"/>
+          <ac:picMkLst>
+            <pc:docMk/>
+            <pc:sldMk cId="569035694" sldId="262"/>
+            <ac:picMk id="19" creationId="{DAF7CA40-9FD7-75E7-1847-F57F11DD1894}"/>
+          </ac:picMkLst>
+        </pc:picChg>
+        <pc:picChg chg="mod">
+          <ac:chgData name="Pethick, Matthew" userId="47b0bdf2-08b5-49f1-a741-b2d87ec64f81" providerId="ADAL" clId="{0767353F-D086-4090-8BF5-095E245E8D59}" dt="2025-01-08T12:13:05.747" v="233"/>
+          <ac:picMkLst>
+            <pc:docMk/>
+            <pc:sldMk cId="569035694" sldId="262"/>
+            <ac:picMk id="22" creationId="{F39D2F1C-86FB-C83F-5017-97649555E422}"/>
+          </ac:picMkLst>
+        </pc:picChg>
+        <pc:cxnChg chg="add mod">
+          <ac:chgData name="Pethick, Matthew" userId="47b0bdf2-08b5-49f1-a741-b2d87ec64f81" providerId="ADAL" clId="{0767353F-D086-4090-8BF5-095E245E8D59}" dt="2025-01-08T12:13:19.304" v="287" actId="1036"/>
+          <ac:cxnSpMkLst>
+            <pc:docMk/>
+            <pc:sldMk cId="569035694" sldId="262"/>
+            <ac:cxnSpMk id="2" creationId="{035062B9-A337-597F-35B9-046FA96D2CDE}"/>
+          </ac:cxnSpMkLst>
+        </pc:cxnChg>
+        <pc:cxnChg chg="add mod ord">
+          <ac:chgData name="Pethick, Matthew" userId="47b0bdf2-08b5-49f1-a741-b2d87ec64f81" providerId="ADAL" clId="{0767353F-D086-4090-8BF5-095E245E8D59}" dt="2025-01-08T12:13:59.900" v="300" actId="170"/>
+          <ac:cxnSpMkLst>
+            <pc:docMk/>
+            <pc:sldMk cId="569035694" sldId="262"/>
+            <ac:cxnSpMk id="3" creationId="{1509EDEA-4EBE-88A0-BC75-194A2D54FD33}"/>
+          </ac:cxnSpMkLst>
+        </pc:cxnChg>
+        <pc:cxnChg chg="add mod">
+          <ac:chgData name="Pethick, Matthew" userId="47b0bdf2-08b5-49f1-a741-b2d87ec64f81" providerId="ADAL" clId="{0767353F-D086-4090-8BF5-095E245E8D59}" dt="2025-01-08T12:15:05.998" v="311" actId="14100"/>
+          <ac:cxnSpMkLst>
+            <pc:docMk/>
+            <pc:sldMk cId="569035694" sldId="262"/>
+            <ac:cxnSpMk id="5" creationId="{7D7F7E29-B79B-01A2-692D-C5EB49220EAD}"/>
+          </ac:cxnSpMkLst>
+        </pc:cxnChg>
+        <pc:cxnChg chg="add mod">
+          <ac:chgData name="Pethick, Matthew" userId="47b0bdf2-08b5-49f1-a741-b2d87ec64f81" providerId="ADAL" clId="{0767353F-D086-4090-8BF5-095E245E8D59}" dt="2025-01-08T12:14:24.957" v="305" actId="14100"/>
+          <ac:cxnSpMkLst>
+            <pc:docMk/>
+            <pc:sldMk cId="569035694" sldId="262"/>
+            <ac:cxnSpMk id="26" creationId="{9B560D4E-6496-54D7-B1FD-0DA1828F036D}"/>
+          </ac:cxnSpMkLst>
+        </pc:cxnChg>
+        <pc:cxnChg chg="del">
+          <ac:chgData name="Pethick, Matthew" userId="47b0bdf2-08b5-49f1-a741-b2d87ec64f81" providerId="ADAL" clId="{0767353F-D086-4090-8BF5-095E245E8D59}" dt="2025-01-08T12:13:03.573" v="230" actId="478"/>
+          <ac:cxnSpMkLst>
+            <pc:docMk/>
+            <pc:sldMk cId="569035694" sldId="262"/>
+            <ac:cxnSpMk id="33" creationId="{AFD4298F-2A01-D560-320A-668FCBCFCDD7}"/>
+          </ac:cxnSpMkLst>
+        </pc:cxnChg>
+        <pc:cxnChg chg="del">
+          <ac:chgData name="Pethick, Matthew" userId="47b0bdf2-08b5-49f1-a741-b2d87ec64f81" providerId="ADAL" clId="{0767353F-D086-4090-8BF5-095E245E8D59}" dt="2025-01-08T12:13:02.678" v="229" actId="478"/>
+          <ac:cxnSpMkLst>
+            <pc:docMk/>
+            <pc:sldMk cId="569035694" sldId="262"/>
+            <ac:cxnSpMk id="34" creationId="{7AAF0795-7AD0-ED2A-F4B5-E65C0710701A}"/>
+          </ac:cxnSpMkLst>
+        </pc:cxnChg>
+        <pc:cxnChg chg="del">
+          <ac:chgData name="Pethick, Matthew" userId="47b0bdf2-08b5-49f1-a741-b2d87ec64f81" providerId="ADAL" clId="{0767353F-D086-4090-8BF5-095E245E8D59}" dt="2025-01-08T12:13:04.919" v="232" actId="478"/>
+          <ac:cxnSpMkLst>
+            <pc:docMk/>
+            <pc:sldMk cId="569035694" sldId="262"/>
+            <ac:cxnSpMk id="35" creationId="{DAF3DCF6-133B-AB66-AC0E-750B8D6654B9}"/>
+          </ac:cxnSpMkLst>
+        </pc:cxnChg>
+        <pc:cxnChg chg="mod">
+          <ac:chgData name="Pethick, Matthew" userId="47b0bdf2-08b5-49f1-a741-b2d87ec64f81" providerId="ADAL" clId="{0767353F-D086-4090-8BF5-095E245E8D59}" dt="2025-01-08T12:17:07.311" v="318" actId="14100"/>
+          <ac:cxnSpMkLst>
+            <pc:docMk/>
+            <pc:sldMk cId="569035694" sldId="262"/>
+            <ac:cxnSpMk id="42" creationId="{2EC894A0-3E4A-8C7B-E998-1F88A6E749A1}"/>
+          </ac:cxnSpMkLst>
+        </pc:cxnChg>
+        <pc:cxnChg chg="del">
+          <ac:chgData name="Pethick, Matthew" userId="47b0bdf2-08b5-49f1-a741-b2d87ec64f81" providerId="ADAL" clId="{0767353F-D086-4090-8BF5-095E245E8D59}" dt="2025-01-08T12:13:04.407" v="231" actId="478"/>
+          <ac:cxnSpMkLst>
+            <pc:docMk/>
+            <pc:sldMk cId="569035694" sldId="262"/>
+            <ac:cxnSpMk id="57" creationId="{EC7D37F8-161D-28F6-63E9-0EE2752C8F27}"/>
+          </ac:cxnSpMkLst>
+        </pc:cxnChg>
+        <pc:cxnChg chg="del mod">
+          <ac:chgData name="Pethick, Matthew" userId="47b0bdf2-08b5-49f1-a741-b2d87ec64f81" providerId="ADAL" clId="{0767353F-D086-4090-8BF5-095E245E8D59}" dt="2025-01-08T12:12:19.653" v="217" actId="478"/>
+          <ac:cxnSpMkLst>
+            <pc:docMk/>
+            <pc:sldMk cId="569035694" sldId="262"/>
+            <ac:cxnSpMk id="58" creationId="{F9078187-70A7-CFBA-2394-FB0526853DA9}"/>
+          </ac:cxnSpMkLst>
+        </pc:cxnChg>
+      </pc:sldChg>
+      <pc:sldChg chg="modSp add mod">
+        <pc:chgData name="Pethick, Matthew" userId="47b0bdf2-08b5-49f1-a741-b2d87ec64f81" providerId="ADAL" clId="{0767353F-D086-4090-8BF5-095E245E8D59}" dt="2025-01-08T12:05:03.314" v="26" actId="20577"/>
+        <pc:sldMkLst>
+          <pc:docMk/>
+          <pc:sldMk cId="101653462" sldId="263"/>
+        </pc:sldMkLst>
+        <pc:spChg chg="mod">
+          <ac:chgData name="Pethick, Matthew" userId="47b0bdf2-08b5-49f1-a741-b2d87ec64f81" providerId="ADAL" clId="{0767353F-D086-4090-8BF5-095E245E8D59}" dt="2025-01-08T12:05:03.314" v="26" actId="20577"/>
+          <ac:spMkLst>
+            <pc:docMk/>
+            <pc:sldMk cId="101653462" sldId="263"/>
+            <ac:spMk id="2" creationId="{1CF1B0CD-EC44-CD11-A1F2-B2900847844D}"/>
+          </ac:spMkLst>
+        </pc:spChg>
+      </pc:sldChg>
+      <pc:sldChg chg="addSp delSp modSp add mod">
+        <pc:chgData name="Pethick, Matthew" userId="47b0bdf2-08b5-49f1-a741-b2d87ec64f81" providerId="ADAL" clId="{0767353F-D086-4090-8BF5-095E245E8D59}" dt="2025-01-08T12:19:06.741" v="380" actId="14100"/>
+        <pc:sldMkLst>
+          <pc:docMk/>
+          <pc:sldMk cId="3340652098" sldId="264"/>
+        </pc:sldMkLst>
+        <pc:spChg chg="mod">
+          <ac:chgData name="Pethick, Matthew" userId="47b0bdf2-08b5-49f1-a741-b2d87ec64f81" providerId="ADAL" clId="{0767353F-D086-4090-8BF5-095E245E8D59}" dt="2025-01-08T12:10:52.322" v="195"/>
+          <ac:spMkLst>
+            <pc:docMk/>
+            <pc:sldMk cId="3340652098" sldId="264"/>
+            <ac:spMk id="17" creationId="{74A55072-79E3-8D30-3431-ECE0D688ED39}"/>
+          </ac:spMkLst>
+        </pc:spChg>
+        <pc:spChg chg="mod">
+          <ac:chgData name="Pethick, Matthew" userId="47b0bdf2-08b5-49f1-a741-b2d87ec64f81" providerId="ADAL" clId="{0767353F-D086-4090-8BF5-095E245E8D59}" dt="2025-01-08T12:10:52.322" v="195"/>
+          <ac:spMkLst>
+            <pc:docMk/>
+            <pc:sldMk cId="3340652098" sldId="264"/>
+            <ac:spMk id="18" creationId="{6F8994BB-CAB3-AF5C-DDE1-666F5EDBF6B2}"/>
+          </ac:spMkLst>
+        </pc:spChg>
+        <pc:spChg chg="mod">
+          <ac:chgData name="Pethick, Matthew" userId="47b0bdf2-08b5-49f1-a741-b2d87ec64f81" providerId="ADAL" clId="{0767353F-D086-4090-8BF5-095E245E8D59}" dt="2025-01-08T12:10:52.322" v="195"/>
+          <ac:spMkLst>
+            <pc:docMk/>
+            <pc:sldMk cId="3340652098" sldId="264"/>
+            <ac:spMk id="22" creationId="{EE3E8D97-FFBD-1592-7C0A-35EC4C64C382}"/>
+          </ac:spMkLst>
+        </pc:spChg>
+        <pc:spChg chg="mod">
+          <ac:chgData name="Pethick, Matthew" userId="47b0bdf2-08b5-49f1-a741-b2d87ec64f81" providerId="ADAL" clId="{0767353F-D086-4090-8BF5-095E245E8D59}" dt="2025-01-08T12:10:52.322" v="195"/>
+          <ac:spMkLst>
+            <pc:docMk/>
+            <pc:sldMk cId="3340652098" sldId="264"/>
+            <ac:spMk id="25" creationId="{22784332-2E6F-483B-A878-B8FCD7B23B3A}"/>
+          </ac:spMkLst>
+        </pc:spChg>
+        <pc:spChg chg="mod">
+          <ac:chgData name="Pethick, Matthew" userId="47b0bdf2-08b5-49f1-a741-b2d87ec64f81" providerId="ADAL" clId="{0767353F-D086-4090-8BF5-095E245E8D59}" dt="2025-01-08T12:06:39.841" v="63" actId="6549"/>
+          <ac:spMkLst>
+            <pc:docMk/>
+            <pc:sldMk cId="3340652098" sldId="264"/>
+            <ac:spMk id="37" creationId="{1D3D7F6D-C0C9-3F80-868E-7F5F81E53BA6}"/>
+          </ac:spMkLst>
+        </pc:spChg>
+        <pc:spChg chg="add del mod">
+          <ac:chgData name="Pethick, Matthew" userId="47b0bdf2-08b5-49f1-a741-b2d87ec64f81" providerId="ADAL" clId="{0767353F-D086-4090-8BF5-095E245E8D59}" dt="2025-01-08T12:18:39.888" v="375" actId="1076"/>
+          <ac:spMkLst>
+            <pc:docMk/>
+            <pc:sldMk cId="3340652098" sldId="264"/>
+            <ac:spMk id="40" creationId="{F096D59F-92DA-C078-349F-1853FC4793E0}"/>
+          </ac:spMkLst>
+        </pc:spChg>
+        <pc:spChg chg="mod">
+          <ac:chgData name="Pethick, Matthew" userId="47b0bdf2-08b5-49f1-a741-b2d87ec64f81" providerId="ADAL" clId="{0767353F-D086-4090-8BF5-095E245E8D59}" dt="2025-01-08T12:11:19.057" v="203" actId="14100"/>
+          <ac:spMkLst>
+            <pc:docMk/>
+            <pc:sldMk cId="3340652098" sldId="264"/>
+            <ac:spMk id="43" creationId="{B6E0D8EC-2EB1-DD50-E7FD-7D36E6467627}"/>
+          </ac:spMkLst>
+        </pc:spChg>
+        <pc:grpChg chg="add mod">
+          <ac:chgData name="Pethick, Matthew" userId="47b0bdf2-08b5-49f1-a741-b2d87ec64f81" providerId="ADAL" clId="{0767353F-D086-4090-8BF5-095E245E8D59}" dt="2025-01-08T12:11:09.173" v="200" actId="14100"/>
+          <ac:grpSpMkLst>
+            <pc:docMk/>
+            <pc:sldMk cId="3340652098" sldId="264"/>
+            <ac:grpSpMk id="11" creationId="{3539BB9F-C2B0-4A11-A8FB-6C83E118F289}"/>
+          </ac:grpSpMkLst>
+        </pc:grpChg>
+        <pc:grpChg chg="mod">
+          <ac:chgData name="Pethick, Matthew" userId="47b0bdf2-08b5-49f1-a741-b2d87ec64f81" providerId="ADAL" clId="{0767353F-D086-4090-8BF5-095E245E8D59}" dt="2025-01-08T12:10:52.322" v="195"/>
+          <ac:grpSpMkLst>
+            <pc:docMk/>
+            <pc:sldMk cId="3340652098" sldId="264"/>
+            <ac:grpSpMk id="12" creationId="{5EDB74A1-4C22-664C-EFCE-CAF78A867A00}"/>
+          </ac:grpSpMkLst>
+        </pc:grpChg>
+        <pc:grpChg chg="mod">
+          <ac:chgData name="Pethick, Matthew" userId="47b0bdf2-08b5-49f1-a741-b2d87ec64f81" providerId="ADAL" clId="{0767353F-D086-4090-8BF5-095E245E8D59}" dt="2025-01-08T12:10:52.322" v="195"/>
+          <ac:grpSpMkLst>
+            <pc:docMk/>
+            <pc:sldMk cId="3340652098" sldId="264"/>
+            <ac:grpSpMk id="13" creationId="{24C8CF12-7EFF-A09E-843E-9C2C0C58F680}"/>
+          </ac:grpSpMkLst>
+        </pc:grpChg>
+        <pc:grpChg chg="mod">
+          <ac:chgData name="Pethick, Matthew" userId="47b0bdf2-08b5-49f1-a741-b2d87ec64f81" providerId="ADAL" clId="{0767353F-D086-4090-8BF5-095E245E8D59}" dt="2025-01-08T12:10:52.322" v="195"/>
+          <ac:grpSpMkLst>
+            <pc:docMk/>
+            <pc:sldMk cId="3340652098" sldId="264"/>
+            <ac:grpSpMk id="14" creationId="{6EB787BD-3BDC-AB22-FF91-7A0135C37D7F}"/>
+          </ac:grpSpMkLst>
+        </pc:grpChg>
+        <pc:grpChg chg="mod">
+          <ac:chgData name="Pethick, Matthew" userId="47b0bdf2-08b5-49f1-a741-b2d87ec64f81" providerId="ADAL" clId="{0767353F-D086-4090-8BF5-095E245E8D59}" dt="2025-01-08T12:10:52.322" v="195"/>
+          <ac:grpSpMkLst>
+            <pc:docMk/>
+            <pc:sldMk cId="3340652098" sldId="264"/>
+            <ac:grpSpMk id="15" creationId="{631EFFAE-73F1-9F14-663B-9D33298C85AA}"/>
+          </ac:grpSpMkLst>
+        </pc:grpChg>
+        <pc:grpChg chg="del mod">
+          <ac:chgData name="Pethick, Matthew" userId="47b0bdf2-08b5-49f1-a741-b2d87ec64f81" providerId="ADAL" clId="{0767353F-D086-4090-8BF5-095E245E8D59}" dt="2025-01-08T12:07:48.139" v="83" actId="21"/>
+          <ac:grpSpMkLst>
+            <pc:docMk/>
+            <pc:sldMk cId="3340652098" sldId="264"/>
+            <ac:grpSpMk id="20" creationId="{6FDDC49A-336F-4714-E566-82CFD9A4A61F}"/>
+          </ac:grpSpMkLst>
+        </pc:grpChg>
+        <pc:picChg chg="add mod ord">
+          <ac:chgData name="Pethick, Matthew" userId="47b0bdf2-08b5-49f1-a741-b2d87ec64f81" providerId="ADAL" clId="{0767353F-D086-4090-8BF5-095E245E8D59}" dt="2025-01-08T12:06:34.275" v="57" actId="1076"/>
+          <ac:picMkLst>
+            <pc:docMk/>
+            <pc:sldMk cId="3340652098" sldId="264"/>
+            <ac:picMk id="4" creationId="{0A35F999-D7CE-ABB3-248C-93A8289ACF0B}"/>
+          </ac:picMkLst>
+        </pc:picChg>
+        <pc:picChg chg="add mod ord modCrop">
+          <ac:chgData name="Pethick, Matthew" userId="47b0bdf2-08b5-49f1-a741-b2d87ec64f81" providerId="ADAL" clId="{0767353F-D086-4090-8BF5-095E245E8D59}" dt="2025-01-08T12:18:34.607" v="374" actId="1038"/>
+          <ac:picMkLst>
+            <pc:docMk/>
+            <pc:sldMk cId="3340652098" sldId="264"/>
+            <ac:picMk id="6" creationId="{4F4D04D9-AAFB-650C-DE7A-91F95219EABA}"/>
+          </ac:picMkLst>
+        </pc:picChg>
+        <pc:picChg chg="mod">
+          <ac:chgData name="Pethick, Matthew" userId="47b0bdf2-08b5-49f1-a741-b2d87ec64f81" providerId="ADAL" clId="{0767353F-D086-4090-8BF5-095E245E8D59}" dt="2025-01-08T12:10:52.322" v="195"/>
+          <ac:picMkLst>
+            <pc:docMk/>
+            <pc:sldMk cId="3340652098" sldId="264"/>
+            <ac:picMk id="16" creationId="{59DBDC7A-EBEA-08F2-DCB7-DC956219D0B4}"/>
+          </ac:picMkLst>
+        </pc:picChg>
+        <pc:picChg chg="mod">
+          <ac:chgData name="Pethick, Matthew" userId="47b0bdf2-08b5-49f1-a741-b2d87ec64f81" providerId="ADAL" clId="{0767353F-D086-4090-8BF5-095E245E8D59}" dt="2025-01-08T12:10:52.322" v="195"/>
+          <ac:picMkLst>
+            <pc:docMk/>
+            <pc:sldMk cId="3340652098" sldId="264"/>
+            <ac:picMk id="19" creationId="{C6C2841B-D98A-B69F-E4AB-F4D3C7F492DC}"/>
+          </ac:picMkLst>
+        </pc:picChg>
+        <pc:picChg chg="mod">
+          <ac:chgData name="Pethick, Matthew" userId="47b0bdf2-08b5-49f1-a741-b2d87ec64f81" providerId="ADAL" clId="{0767353F-D086-4090-8BF5-095E245E8D59}" dt="2025-01-08T12:10:52.322" v="195"/>
+          <ac:picMkLst>
+            <pc:docMk/>
+            <pc:sldMk cId="3340652098" sldId="264"/>
+            <ac:picMk id="21" creationId="{11778CE0-9423-0631-E74C-6E6FF0A06EFA}"/>
+          </ac:picMkLst>
+        </pc:picChg>
+        <pc:picChg chg="mod">
+          <ac:chgData name="Pethick, Matthew" userId="47b0bdf2-08b5-49f1-a741-b2d87ec64f81" providerId="ADAL" clId="{0767353F-D086-4090-8BF5-095E245E8D59}" dt="2025-01-08T12:10:52.322" v="195"/>
+          <ac:picMkLst>
+            <pc:docMk/>
+            <pc:sldMk cId="3340652098" sldId="264"/>
+            <ac:picMk id="24" creationId="{6C51B74D-C407-6731-6AA7-A2B132B1826F}"/>
+          </ac:picMkLst>
+        </pc:picChg>
+        <pc:cxnChg chg="add del mod">
+          <ac:chgData name="Pethick, Matthew" userId="47b0bdf2-08b5-49f1-a741-b2d87ec64f81" providerId="ADAL" clId="{0767353F-D086-4090-8BF5-095E245E8D59}" dt="2025-01-08T12:19:03.659" v="379" actId="14100"/>
+          <ac:cxnSpMkLst>
+            <pc:docMk/>
+            <pc:sldMk cId="3340652098" sldId="264"/>
+            <ac:cxnSpMk id="33" creationId="{27B342F3-2CA1-0E1C-75DD-F2C237274BCF}"/>
+          </ac:cxnSpMkLst>
+        </pc:cxnChg>
+        <pc:cxnChg chg="add del mod">
+          <ac:chgData name="Pethick, Matthew" userId="47b0bdf2-08b5-49f1-a741-b2d87ec64f81" providerId="ADAL" clId="{0767353F-D086-4090-8BF5-095E245E8D59}" dt="2025-01-08T12:19:00.768" v="378" actId="14100"/>
+          <ac:cxnSpMkLst>
+            <pc:docMk/>
+            <pc:sldMk cId="3340652098" sldId="264"/>
+            <ac:cxnSpMk id="34" creationId="{BE3F9BF5-5C06-307E-F2E9-AE392C723AB5}"/>
+          </ac:cxnSpMkLst>
+        </pc:cxnChg>
+        <pc:cxnChg chg="add del mod">
+          <ac:chgData name="Pethick, Matthew" userId="47b0bdf2-08b5-49f1-a741-b2d87ec64f81" providerId="ADAL" clId="{0767353F-D086-4090-8BF5-095E245E8D59}" dt="2025-01-08T12:18:56.725" v="377" actId="14100"/>
+          <ac:cxnSpMkLst>
+            <pc:docMk/>
+            <pc:sldMk cId="3340652098" sldId="264"/>
+            <ac:cxnSpMk id="35" creationId="{6DA00DC9-A1C7-5E55-44B1-2440595DB605}"/>
+          </ac:cxnSpMkLst>
+        </pc:cxnChg>
+        <pc:cxnChg chg="mod">
+          <ac:chgData name="Pethick, Matthew" userId="47b0bdf2-08b5-49f1-a741-b2d87ec64f81" providerId="ADAL" clId="{0767353F-D086-4090-8BF5-095E245E8D59}" dt="2025-01-08T12:18:48.211" v="376" actId="14100"/>
+          <ac:cxnSpMkLst>
+            <pc:docMk/>
+            <pc:sldMk cId="3340652098" sldId="264"/>
+            <ac:cxnSpMk id="41" creationId="{7E3CF7C6-0F31-7531-32AE-902866485127}"/>
+          </ac:cxnSpMkLst>
+        </pc:cxnChg>
+        <pc:cxnChg chg="mod">
+          <ac:chgData name="Pethick, Matthew" userId="47b0bdf2-08b5-49f1-a741-b2d87ec64f81" providerId="ADAL" clId="{0767353F-D086-4090-8BF5-095E245E8D59}" dt="2025-01-08T12:17:02.275" v="317" actId="14100"/>
+          <ac:cxnSpMkLst>
+            <pc:docMk/>
+            <pc:sldMk cId="3340652098" sldId="264"/>
+            <ac:cxnSpMk id="42" creationId="{FF67BC13-2173-D227-7794-33C1CF44146E}"/>
+          </ac:cxnSpMkLst>
+        </pc:cxnChg>
+        <pc:cxnChg chg="add del mod">
+          <ac:chgData name="Pethick, Matthew" userId="47b0bdf2-08b5-49f1-a741-b2d87ec64f81" providerId="ADAL" clId="{0767353F-D086-4090-8BF5-095E245E8D59}" dt="2025-01-08T12:19:06.741" v="380" actId="14100"/>
+          <ac:cxnSpMkLst>
+            <pc:docMk/>
+            <pc:sldMk cId="3340652098" sldId="264"/>
+            <ac:cxnSpMk id="57" creationId="{4D79EC13-DF18-66EA-7A55-66440A1FF3CD}"/>
+          </ac:cxnSpMkLst>
+        </pc:cxnChg>
+        <pc:cxnChg chg="del mod">
+          <ac:chgData name="Pethick, Matthew" userId="47b0bdf2-08b5-49f1-a741-b2d87ec64f81" providerId="ADAL" clId="{0767353F-D086-4090-8BF5-095E245E8D59}" dt="2025-01-08T12:12:09.670" v="215" actId="478"/>
+          <ac:cxnSpMkLst>
+            <pc:docMk/>
+            <pc:sldMk cId="3340652098" sldId="264"/>
+            <ac:cxnSpMk id="58" creationId="{705FC74E-64D9-ECB0-B23D-74989DED1A06}"/>
+          </ac:cxnSpMkLst>
+        </pc:cxnChg>
+      </pc:sldChg>
+      <pc:sldChg chg="addSp delSp modSp new del mod">
+        <pc:chgData name="Pethick, Matthew" userId="47b0bdf2-08b5-49f1-a741-b2d87ec64f81" providerId="ADAL" clId="{0767353F-D086-4090-8BF5-095E245E8D59}" dt="2025-01-08T12:12:13.394" v="216" actId="2696"/>
+        <pc:sldMkLst>
+          <pc:docMk/>
+          <pc:sldMk cId="3509385241" sldId="265"/>
+        </pc:sldMkLst>
+        <pc:spChg chg="del">
+          <ac:chgData name="Pethick, Matthew" userId="47b0bdf2-08b5-49f1-a741-b2d87ec64f81" providerId="ADAL" clId="{0767353F-D086-4090-8BF5-095E245E8D59}" dt="2025-01-08T12:08:24.161" v="94" actId="478"/>
+          <ac:spMkLst>
+            <pc:docMk/>
+            <pc:sldMk cId="3509385241" sldId="265"/>
+            <ac:spMk id="2" creationId="{F10A2828-2F69-68E9-807D-4D13186CD4A7}"/>
+          </ac:spMkLst>
+        </pc:spChg>
+        <pc:spChg chg="del">
+          <ac:chgData name="Pethick, Matthew" userId="47b0bdf2-08b5-49f1-a741-b2d87ec64f81" providerId="ADAL" clId="{0767353F-D086-4090-8BF5-095E245E8D59}" dt="2025-01-08T12:08:23.233" v="93" actId="478"/>
+          <ac:spMkLst>
+            <pc:docMk/>
+            <pc:sldMk cId="3509385241" sldId="265"/>
+            <ac:spMk id="3" creationId="{3C72F15F-438C-CE5F-FCC1-67944AA1568D}"/>
+          </ac:spMkLst>
+        </pc:spChg>
+        <pc:spChg chg="mod topLvl">
+          <ac:chgData name="Pethick, Matthew" userId="47b0bdf2-08b5-49f1-a741-b2d87ec64f81" providerId="ADAL" clId="{0767353F-D086-4090-8BF5-095E245E8D59}" dt="2025-01-08T12:10:08.486" v="142" actId="1038"/>
+          <ac:spMkLst>
+            <pc:docMk/>
+            <pc:sldMk cId="3509385241" sldId="265"/>
+            <ac:spMk id="46" creationId="{9801DD92-9948-785C-5671-24460897EBFB}"/>
+          </ac:spMkLst>
+        </pc:spChg>
+        <pc:spChg chg="mod">
+          <ac:chgData name="Pethick, Matthew" userId="47b0bdf2-08b5-49f1-a741-b2d87ec64f81" providerId="ADAL" clId="{0767353F-D086-4090-8BF5-095E245E8D59}" dt="2025-01-08T12:08:00.185" v="87" actId="165"/>
+          <ac:spMkLst>
+            <pc:docMk/>
+            <pc:sldMk cId="3509385241" sldId="265"/>
+            <ac:spMk id="49" creationId="{9D64A6F3-8452-9597-174E-D6492EF0CBFC}"/>
+          </ac:spMkLst>
+        </pc:spChg>
+        <pc:spChg chg="mod topLvl">
+          <ac:chgData name="Pethick, Matthew" userId="47b0bdf2-08b5-49f1-a741-b2d87ec64f81" providerId="ADAL" clId="{0767353F-D086-4090-8BF5-095E245E8D59}" dt="2025-01-08T12:08:48.668" v="100" actId="164"/>
+          <ac:spMkLst>
+            <pc:docMk/>
+            <pc:sldMk cId="3509385241" sldId="265"/>
+            <ac:spMk id="52" creationId="{A21BA2F0-F1EB-D359-EE63-72FEFADD3F22}"/>
+          </ac:spMkLst>
+        </pc:spChg>
+        <pc:spChg chg="mod topLvl">
+          <ac:chgData name="Pethick, Matthew" userId="47b0bdf2-08b5-49f1-a741-b2d87ec64f81" providerId="ADAL" clId="{0767353F-D086-4090-8BF5-095E245E8D59}" dt="2025-01-08T12:09:00.530" v="106" actId="164"/>
+          <ac:spMkLst>
+            <pc:docMk/>
+            <pc:sldMk cId="3509385241" sldId="265"/>
+            <ac:spMk id="55" creationId="{CCAA9241-7A95-E4B2-1A97-9DB24C3DB58A}"/>
+          </ac:spMkLst>
+        </pc:spChg>
+        <pc:grpChg chg="add mod">
+          <ac:chgData name="Pethick, Matthew" userId="47b0bdf2-08b5-49f1-a741-b2d87ec64f81" providerId="ADAL" clId="{0767353F-D086-4090-8BF5-095E245E8D59}" dt="2025-01-08T12:10:48.533" v="194" actId="164"/>
+          <ac:grpSpMkLst>
+            <pc:docMk/>
+            <pc:sldMk cId="3509385241" sldId="265"/>
+            <ac:grpSpMk id="4" creationId="{58002617-56B8-7ECE-F418-EAD6367E5896}"/>
+          </ac:grpSpMkLst>
+        </pc:grpChg>
+        <pc:grpChg chg="add mod">
+          <ac:chgData name="Pethick, Matthew" userId="47b0bdf2-08b5-49f1-a741-b2d87ec64f81" providerId="ADAL" clId="{0767353F-D086-4090-8BF5-095E245E8D59}" dt="2025-01-08T12:10:48.533" v="194" actId="164"/>
+          <ac:grpSpMkLst>
+            <pc:docMk/>
+            <pc:sldMk cId="3509385241" sldId="265"/>
+            <ac:grpSpMk id="5" creationId="{96389F4B-E78C-50A1-0EB5-260C56712622}"/>
+          </ac:grpSpMkLst>
+        </pc:grpChg>
+        <pc:grpChg chg="add mod">
+          <ac:chgData name="Pethick, Matthew" userId="47b0bdf2-08b5-49f1-a741-b2d87ec64f81" providerId="ADAL" clId="{0767353F-D086-4090-8BF5-095E245E8D59}" dt="2025-01-08T12:10:48.533" v="194" actId="164"/>
+          <ac:grpSpMkLst>
+            <pc:docMk/>
+            <pc:sldMk cId="3509385241" sldId="265"/>
+            <ac:grpSpMk id="6" creationId="{57EA4253-C0F1-AF7D-4BF8-5908F46A95AC}"/>
+          </ac:grpSpMkLst>
+        </pc:grpChg>
+        <pc:grpChg chg="add mod">
+          <ac:chgData name="Pethick, Matthew" userId="47b0bdf2-08b5-49f1-a741-b2d87ec64f81" providerId="ADAL" clId="{0767353F-D086-4090-8BF5-095E245E8D59}" dt="2025-01-08T12:10:48.533" v="194" actId="164"/>
+          <ac:grpSpMkLst>
+            <pc:docMk/>
+            <pc:sldMk cId="3509385241" sldId="265"/>
+            <ac:grpSpMk id="7" creationId="{B1BD6AEA-3763-1D13-7ED9-93F8C1880D8E}"/>
+          </ac:grpSpMkLst>
+        </pc:grpChg>
+        <pc:grpChg chg="add del mod">
+          <ac:chgData name="Pethick, Matthew" userId="47b0bdf2-08b5-49f1-a741-b2d87ec64f81" providerId="ADAL" clId="{0767353F-D086-4090-8BF5-095E245E8D59}" dt="2025-01-08T12:08:00.185" v="87" actId="165"/>
+          <ac:grpSpMkLst>
+            <pc:docMk/>
+            <pc:sldMk cId="3509385241" sldId="265"/>
+            <ac:grpSpMk id="20" creationId="{6FDDC49A-336F-4714-E566-82CFD9A4A61F}"/>
+          </ac:grpSpMkLst>
+        </pc:grpChg>
+        <pc:grpChg chg="del mod topLvl">
+          <ac:chgData name="Pethick, Matthew" userId="47b0bdf2-08b5-49f1-a741-b2d87ec64f81" providerId="ADAL" clId="{0767353F-D086-4090-8BF5-095E245E8D59}" dt="2025-01-08T12:08:15.913" v="91" actId="165"/>
+          <ac:grpSpMkLst>
+            <pc:docMk/>
+            <pc:sldMk cId="3509385241" sldId="265"/>
+            <ac:grpSpMk id="44" creationId="{1BBFBBF4-4A39-FDCB-7491-BA63679D3458}"/>
+          </ac:grpSpMkLst>
+        </pc:grpChg>
+        <pc:grpChg chg="mod topLvl">
+          <ac:chgData name="Pethick, Matthew" userId="47b0bdf2-08b5-49f1-a741-b2d87ec64f81" providerId="ADAL" clId="{0767353F-D086-4090-8BF5-095E245E8D59}" dt="2025-01-08T12:10:48.533" v="194" actId="164"/>
+          <ac:grpSpMkLst>
+            <pc:docMk/>
+            <pc:sldMk cId="3509385241" sldId="265"/>
+            <ac:grpSpMk id="47" creationId="{A096F347-4F13-ADE5-0208-E69AA0381807}"/>
+          </ac:grpSpMkLst>
+        </pc:grpChg>
+        <pc:grpChg chg="del mod topLvl">
+          <ac:chgData name="Pethick, Matthew" userId="47b0bdf2-08b5-49f1-a741-b2d87ec64f81" providerId="ADAL" clId="{0767353F-D086-4090-8BF5-095E245E8D59}" dt="2025-01-08T12:08:45.654" v="99" actId="165"/>
+          <ac:grpSpMkLst>
+            <pc:docMk/>
+            <pc:sldMk cId="3509385241" sldId="265"/>
+            <ac:grpSpMk id="50" creationId="{FECF971D-FF00-4AFE-C6E7-733D4744E294}"/>
+          </ac:grpSpMkLst>
+        </pc:grpChg>
+        <pc:grpChg chg="del mod topLvl">
+          <ac:chgData name="Pethick, Matthew" userId="47b0bdf2-08b5-49f1-a741-b2d87ec64f81" providerId="ADAL" clId="{0767353F-D086-4090-8BF5-095E245E8D59}" dt="2025-01-08T12:08:20.200" v="92" actId="165"/>
+          <ac:grpSpMkLst>
+            <pc:docMk/>
+            <pc:sldMk cId="3509385241" sldId="265"/>
+            <ac:grpSpMk id="53" creationId="{D58676C3-050A-58E6-EDB1-FC17A919A262}"/>
+          </ac:grpSpMkLst>
+        </pc:grpChg>
+        <pc:picChg chg="mod topLvl">
+          <ac:chgData name="Pethick, Matthew" userId="47b0bdf2-08b5-49f1-a741-b2d87ec64f81" providerId="ADAL" clId="{0767353F-D086-4090-8BF5-095E245E8D59}" dt="2025-01-08T12:08:48.668" v="100" actId="164"/>
+          <ac:picMkLst>
+            <pc:docMk/>
+            <pc:sldMk cId="3509385241" sldId="265"/>
+            <ac:picMk id="45" creationId="{7DA66F84-0699-6801-DEC1-1E3D8DC37964}"/>
+          </ac:picMkLst>
+        </pc:picChg>
+        <pc:picChg chg="mod">
+          <ac:chgData name="Pethick, Matthew" userId="47b0bdf2-08b5-49f1-a741-b2d87ec64f81" providerId="ADAL" clId="{0767353F-D086-4090-8BF5-095E245E8D59}" dt="2025-01-08T12:08:00.185" v="87" actId="165"/>
+          <ac:picMkLst>
+            <pc:docMk/>
+            <pc:sldMk cId="3509385241" sldId="265"/>
+            <ac:picMk id="48" creationId="{2FDA3703-D050-08B7-A45E-4E6308842EB4}"/>
+          </ac:picMkLst>
+        </pc:picChg>
+        <pc:picChg chg="mod topLvl">
+          <ac:chgData name="Pethick, Matthew" userId="47b0bdf2-08b5-49f1-a741-b2d87ec64f81" providerId="ADAL" clId="{0767353F-D086-4090-8BF5-095E245E8D59}" dt="2025-01-08T12:09:00.530" v="106" actId="164"/>
+          <ac:picMkLst>
+            <pc:docMk/>
+            <pc:sldMk cId="3509385241" sldId="265"/>
+            <ac:picMk id="51" creationId="{9DC9E50C-9535-1307-E69D-1E080BA4B8DA}"/>
+          </ac:picMkLst>
+        </pc:picChg>
+        <pc:picChg chg="mod topLvl">
+          <ac:chgData name="Pethick, Matthew" userId="47b0bdf2-08b5-49f1-a741-b2d87ec64f81" providerId="ADAL" clId="{0767353F-D086-4090-8BF5-095E245E8D59}" dt="2025-01-08T12:08:28.881" v="95" actId="164"/>
+          <ac:picMkLst>
+            <pc:docMk/>
+            <pc:sldMk cId="3509385241" sldId="265"/>
+            <ac:picMk id="54" creationId="{9943F55E-F1F6-B974-17EA-0FA4D8F05B87}"/>
+          </ac:picMkLst>
+        </pc:picChg>
       </pc:sldChg>
     </pc:docChg>
   </pc:docChgLst>
@@ -304,7 +1013,7 @@
           <a:p>
             <a:fld id="{A7E04868-8344-4E8E-8E08-E924FD30BED3}" type="datetimeFigureOut">
               <a:rPr lang="en-GB" smtClean="0"/>
-              <a:t>07/01/2025</a:t>
+              <a:t>08/01/2025</a:t>
             </a:fld>
             <a:endParaRPr lang="en-GB"/>
           </a:p>
@@ -504,7 +1213,7 @@
           <a:p>
             <a:fld id="{A7E04868-8344-4E8E-8E08-E924FD30BED3}" type="datetimeFigureOut">
               <a:rPr lang="en-GB" smtClean="0"/>
-              <a:t>07/01/2025</a:t>
+              <a:t>08/01/2025</a:t>
             </a:fld>
             <a:endParaRPr lang="en-GB"/>
           </a:p>
@@ -714,7 +1423,7 @@
           <a:p>
             <a:fld id="{A7E04868-8344-4E8E-8E08-E924FD30BED3}" type="datetimeFigureOut">
               <a:rPr lang="en-GB" smtClean="0"/>
-              <a:t>07/01/2025</a:t>
+              <a:t>08/01/2025</a:t>
             </a:fld>
             <a:endParaRPr lang="en-GB"/>
           </a:p>
@@ -967,7 +1676,7 @@
         <p:fade/>
       </p:transition>
     </mc:Choice>
-    <mc:Fallback xmlns:p15="http://schemas.microsoft.com/office/powerpoint/2012/main" xmlns:a14="http://schemas.microsoft.com/office/drawing/2010/main" xmlns:a16="http://schemas.microsoft.com/office/drawing/2014/main" xmlns="">
+    <mc:Fallback xmlns="" xmlns:a16="http://schemas.microsoft.com/office/drawing/2014/main" xmlns:a14="http://schemas.microsoft.com/office/drawing/2010/main" xmlns:p15="http://schemas.microsoft.com/office/powerpoint/2012/main">
       <p:transition spd="med">
         <p:fade/>
       </p:transition>
@@ -1162,7 +1871,7 @@
         <p:fade/>
       </p:transition>
     </mc:Choice>
-    <mc:Fallback xmlns:p15="http://schemas.microsoft.com/office/powerpoint/2012/main" xmlns:a14="http://schemas.microsoft.com/office/drawing/2010/main" xmlns:a16="http://schemas.microsoft.com/office/drawing/2014/main" xmlns="">
+    <mc:Fallback xmlns="" xmlns:a16="http://schemas.microsoft.com/office/drawing/2014/main" xmlns:a14="http://schemas.microsoft.com/office/drawing/2010/main" xmlns:p15="http://schemas.microsoft.com/office/powerpoint/2012/main">
       <p:transition spd="med">
         <p:fade/>
       </p:transition>
@@ -1412,7 +2121,7 @@
         <p:fade/>
       </p:transition>
     </mc:Choice>
-    <mc:Fallback xmlns:a16="http://schemas.microsoft.com/office/drawing/2014/main" xmlns:a14="http://schemas.microsoft.com/office/drawing/2010/main" xmlns:p15="http://schemas.microsoft.com/office/powerpoint/2012/main" xmlns="">
+    <mc:Fallback xmlns="" xmlns:p15="http://schemas.microsoft.com/office/powerpoint/2012/main" xmlns:a14="http://schemas.microsoft.com/office/drawing/2010/main" xmlns:a16="http://schemas.microsoft.com/office/drawing/2014/main">
       <p:transition spd="med">
         <p:fade/>
       </p:transition>
@@ -2579,7 +3288,7 @@
           <a:p>
             <a:fld id="{A7E04868-8344-4E8E-8E08-E924FD30BED3}" type="datetimeFigureOut">
               <a:rPr lang="en-GB" smtClean="0"/>
-              <a:t>07/01/2025</a:t>
+              <a:t>08/01/2025</a:t>
             </a:fld>
             <a:endParaRPr lang="en-GB"/>
           </a:p>
@@ -9048,7 +9757,7 @@
           <a:p>
             <a:fld id="{A7E04868-8344-4E8E-8E08-E924FD30BED3}" type="datetimeFigureOut">
               <a:rPr lang="en-GB" smtClean="0"/>
-              <a:t>07/01/2025</a:t>
+              <a:t>08/01/2025</a:t>
             </a:fld>
             <a:endParaRPr lang="en-GB"/>
           </a:p>
@@ -15473,7 +16182,7 @@
         <p:fade/>
       </p:transition>
     </mc:Choice>
-    <mc:Fallback xmlns:p15="http://schemas.microsoft.com/office/powerpoint/2012/main" xmlns:a14="http://schemas.microsoft.com/office/drawing/2010/main" xmlns:a16="http://schemas.microsoft.com/office/drawing/2014/main" xmlns="">
+    <mc:Fallback xmlns="" xmlns:a16="http://schemas.microsoft.com/office/drawing/2014/main" xmlns:a14="http://schemas.microsoft.com/office/drawing/2010/main" xmlns:p15="http://schemas.microsoft.com/office/powerpoint/2012/main">
       <p:transition spd="med">
         <p:fade/>
       </p:transition>
@@ -16113,7 +16822,7 @@
           <a:p>
             <a:fld id="{A7E04868-8344-4E8E-8E08-E924FD30BED3}" type="datetimeFigureOut">
               <a:rPr lang="en-GB" smtClean="0"/>
-              <a:t>07/01/2025</a:t>
+              <a:t>08/01/2025</a:t>
             </a:fld>
             <a:endParaRPr lang="en-GB"/>
           </a:p>
@@ -17018,7 +17727,7 @@
           <a:p>
             <a:fld id="{A7E04868-8344-4E8E-8E08-E924FD30BED3}" type="datetimeFigureOut">
               <a:rPr lang="en-GB" smtClean="0"/>
-              <a:t>07/01/2025</a:t>
+              <a:t>08/01/2025</a:t>
             </a:fld>
             <a:endParaRPr lang="en-GB"/>
           </a:p>
@@ -17160,7 +17869,7 @@
           <a:p>
             <a:fld id="{A7E04868-8344-4E8E-8E08-E924FD30BED3}" type="datetimeFigureOut">
               <a:rPr lang="en-GB" smtClean="0"/>
-              <a:t>07/01/2025</a:t>
+              <a:t>08/01/2025</a:t>
             </a:fld>
             <a:endParaRPr lang="en-GB"/>
           </a:p>
@@ -17273,7 +17982,7 @@
           <a:p>
             <a:fld id="{A7E04868-8344-4E8E-8E08-E924FD30BED3}" type="datetimeFigureOut">
               <a:rPr lang="en-GB" smtClean="0"/>
-              <a:t>07/01/2025</a:t>
+              <a:t>08/01/2025</a:t>
             </a:fld>
             <a:endParaRPr lang="en-GB"/>
           </a:p>
@@ -17586,7 +18295,7 @@
           <a:p>
             <a:fld id="{A7E04868-8344-4E8E-8E08-E924FD30BED3}" type="datetimeFigureOut">
               <a:rPr lang="en-GB" smtClean="0"/>
-              <a:t>07/01/2025</a:t>
+              <a:t>08/01/2025</a:t>
             </a:fld>
             <a:endParaRPr lang="en-GB"/>
           </a:p>
@@ -17875,7 +18584,7 @@
           <a:p>
             <a:fld id="{A7E04868-8344-4E8E-8E08-E924FD30BED3}" type="datetimeFigureOut">
               <a:rPr lang="en-GB" smtClean="0"/>
-              <a:t>07/01/2025</a:t>
+              <a:t>08/01/2025</a:t>
             </a:fld>
             <a:endParaRPr lang="en-GB"/>
           </a:p>
@@ -18118,7 +18827,7 @@
           <a:p>
             <a:fld id="{A7E04868-8344-4E8E-8E08-E924FD30BED3}" type="datetimeFigureOut">
               <a:rPr lang="en-GB" smtClean="0"/>
-              <a:t>07/01/2025</a:t>
+              <a:t>08/01/2025</a:t>
             </a:fld>
             <a:endParaRPr lang="en-GB"/>
           </a:p>
@@ -21095,7 +21804,7 @@
         <p:fade/>
       </p:transition>
     </mc:Choice>
-    <mc:Fallback xmlns:p15="http://schemas.microsoft.com/office/powerpoint/2012/main" xmlns:a14="http://schemas.microsoft.com/office/drawing/2010/main" xmlns:a16="http://schemas.microsoft.com/office/drawing/2014/main" xmlns="">
+    <mc:Fallback xmlns="" xmlns:a16="http://schemas.microsoft.com/office/drawing/2014/main" xmlns:a14="http://schemas.microsoft.com/office/drawing/2010/main" xmlns:p15="http://schemas.microsoft.com/office/powerpoint/2012/main">
       <p:transition spd="med">
         <p:fade/>
       </p:transition>
@@ -22924,41 +23633,6 @@
           <a:effectLst/>
         </p:spPr>
       </p:cxnSp>
-      <p:cxnSp>
-        <p:nvCxnSpPr>
-          <p:cNvPr id="58" name="Straight Arrow Connector 57">
-            <a:extLst>
-              <a:ext uri="{FF2B5EF4-FFF2-40B4-BE49-F238E27FC236}">
-                <a16:creationId xmlns:a16="http://schemas.microsoft.com/office/drawing/2014/main" id="{108DB30E-207D-964A-5CCE-64B4479EB74C}"/>
-              </a:ext>
-            </a:extLst>
-          </p:cNvPr>
-          <p:cNvCxnSpPr>
-            <a:cxnSpLocks/>
-            <a:endCxn id="43" idx="1"/>
-          </p:cNvCxnSpPr>
-          <p:nvPr/>
-        </p:nvCxnSpPr>
-        <p:spPr>
-          <a:xfrm flipV="1">
-            <a:off x="4908833" y="5367729"/>
-            <a:ext cx="1527686" cy="357547"/>
-          </a:xfrm>
-          <a:prstGeom prst="straightConnector1">
-            <a:avLst/>
-          </a:prstGeom>
-          <a:noFill/>
-          <a:ln w="12700" cap="flat" cmpd="sng" algn="ctr">
-            <a:solidFill>
-              <a:srgbClr val="ED1C24"/>
-            </a:solidFill>
-            <a:prstDash val="solid"/>
-            <a:headEnd type="none" w="lg" len="med"/>
-            <a:tailEnd type="triangle"/>
-          </a:ln>
-          <a:effectLst/>
-        </p:spPr>
-      </p:cxnSp>
       <p:sp>
         <p:nvSpPr>
           <p:cNvPr id="7" name="Rectangle 6">
@@ -23156,7 +23830,7 @@
         <p:fade/>
       </p:transition>
     </mc:Choice>
-    <mc:Fallback xmlns:p15="http://schemas.microsoft.com/office/powerpoint/2012/main" xmlns:a14="http://schemas.microsoft.com/office/drawing/2010/main" xmlns:a16="http://schemas.microsoft.com/office/drawing/2014/main" xmlns="">
+    <mc:Fallback xmlns="" xmlns:a16="http://schemas.microsoft.com/office/drawing/2014/main" xmlns:a14="http://schemas.microsoft.com/office/drawing/2010/main" xmlns:p15="http://schemas.microsoft.com/office/powerpoint/2012/main">
       <p:transition spd="med">
         <p:fade/>
       </p:transition>
@@ -23234,8 +23908,8 @@
         </p:nvCxnSpPr>
         <p:spPr>
           <a:xfrm flipV="1">
-            <a:off x="7810631" y="2389267"/>
-            <a:ext cx="2006469" cy="2125538"/>
+            <a:off x="7912100" y="2389267"/>
+            <a:ext cx="1905000" cy="2125538"/>
           </a:xfrm>
           <a:prstGeom prst="line">
             <a:avLst/>
@@ -23268,8 +23942,8 @@
         </p:nvCxnSpPr>
         <p:spPr>
           <a:xfrm flipV="1">
-            <a:off x="7810631" y="3089612"/>
-            <a:ext cx="2006469" cy="3589219"/>
+            <a:off x="7912100" y="3089612"/>
+            <a:ext cx="1905000" cy="3589219"/>
           </a:xfrm>
           <a:prstGeom prst="line">
             <a:avLst/>
@@ -23300,8 +23974,8 @@
         </p:nvSpPr>
         <p:spPr bwMode="auto">
           <a:xfrm>
-            <a:off x="7810631" y="4514807"/>
-            <a:ext cx="2822538" cy="2164024"/>
+            <a:off x="7912100" y="4514807"/>
+            <a:ext cx="2689320" cy="2164024"/>
           </a:xfrm>
           <a:prstGeom prst="rect">
             <a:avLst/>
@@ -23386,8 +24060,8 @@
         </p:nvCxnSpPr>
         <p:spPr>
           <a:xfrm flipV="1">
-            <a:off x="10633169" y="3095751"/>
-            <a:ext cx="206282" cy="3533649"/>
+            <a:off x="10601419" y="3095751"/>
+            <a:ext cx="238032" cy="3583080"/>
           </a:xfrm>
           <a:prstGeom prst="line">
             <a:avLst/>
@@ -24233,8 +24907,8 @@
         </p:nvCxnSpPr>
         <p:spPr>
           <a:xfrm flipV="1">
-            <a:off x="5283200" y="3936261"/>
-            <a:ext cx="5697315" cy="883389"/>
+            <a:off x="5323712" y="3936261"/>
+            <a:ext cx="5656803" cy="963399"/>
           </a:xfrm>
           <a:prstGeom prst="straightConnector1">
             <a:avLst/>
@@ -24926,8 +25600,8 @@
         </p:nvCxnSpPr>
         <p:spPr>
           <a:xfrm flipV="1">
-            <a:off x="10633169" y="2389267"/>
-            <a:ext cx="206282" cy="2125538"/>
+            <a:off x="10601419" y="2389267"/>
+            <a:ext cx="238032" cy="2125538"/>
           </a:xfrm>
           <a:prstGeom prst="line">
             <a:avLst/>
@@ -24940,41 +25614,6 @@
             <a:prstDash val="solid"/>
             <a:headEnd type="none" w="lg" len="med"/>
             <a:tailEnd type="none" w="lg" len="med"/>
-          </a:ln>
-          <a:effectLst/>
-        </p:spPr>
-      </p:cxnSp>
-      <p:cxnSp>
-        <p:nvCxnSpPr>
-          <p:cNvPr id="58" name="Straight Arrow Connector 57">
-            <a:extLst>
-              <a:ext uri="{FF2B5EF4-FFF2-40B4-BE49-F238E27FC236}">
-                <a16:creationId xmlns:a16="http://schemas.microsoft.com/office/drawing/2014/main" id="{8483273F-2441-A393-FD61-31FECC7C634B}"/>
-              </a:ext>
-            </a:extLst>
-          </p:cNvPr>
-          <p:cNvCxnSpPr>
-            <a:cxnSpLocks/>
-            <a:endCxn id="43" idx="1"/>
-          </p:cNvCxnSpPr>
-          <p:nvPr/>
-        </p:nvCxnSpPr>
-        <p:spPr>
-          <a:xfrm flipV="1">
-            <a:off x="4953000" y="5596819"/>
-            <a:ext cx="2857631" cy="294709"/>
-          </a:xfrm>
-          <a:prstGeom prst="straightConnector1">
-            <a:avLst/>
-          </a:prstGeom>
-          <a:noFill/>
-          <a:ln w="12700" cap="flat" cmpd="sng" algn="ctr">
-            <a:solidFill>
-              <a:srgbClr val="ED1C24"/>
-            </a:solidFill>
-            <a:prstDash val="solid"/>
-            <a:headEnd type="none" w="lg" len="med"/>
-            <a:tailEnd type="triangle"/>
           </a:ln>
           <a:effectLst/>
         </p:spPr>
@@ -25176,7 +25815,7 @@
         <p:fade/>
       </p:transition>
     </mc:Choice>
-    <mc:Fallback xmlns:p15="http://schemas.microsoft.com/office/powerpoint/2012/main" xmlns:a14="http://schemas.microsoft.com/office/drawing/2010/main" xmlns:a16="http://schemas.microsoft.com/office/drawing/2014/main" xmlns="">
+    <mc:Fallback xmlns="" xmlns:a16="http://schemas.microsoft.com/office/drawing/2014/main" xmlns:a14="http://schemas.microsoft.com/office/drawing/2010/main" xmlns:p15="http://schemas.microsoft.com/office/powerpoint/2012/main">
       <p:transition spd="med">
         <p:fade/>
       </p:transition>
@@ -25240,10 +25879,10 @@
       </p:pic>
       <p:cxnSp>
         <p:nvCxnSpPr>
-          <p:cNvPr id="33" name="Straight Connector 32">
-            <a:extLst>
-              <a:ext uri="{FF2B5EF4-FFF2-40B4-BE49-F238E27FC236}">
-                <a16:creationId xmlns:a16="http://schemas.microsoft.com/office/drawing/2014/main" id="{AFD4298F-2A01-D560-320A-668FCBCFCDD7}"/>
+          <p:cNvPr id="3" name="Straight Connector 2">
+            <a:extLst>
+              <a:ext uri="{FF2B5EF4-FFF2-40B4-BE49-F238E27FC236}">
+                <a16:creationId xmlns:a16="http://schemas.microsoft.com/office/drawing/2014/main" id="{1509EDEA-4EBE-88A0-BC75-194A2D54FD33}"/>
               </a:ext>
             </a:extLst>
           </p:cNvPr>
@@ -25254,42 +25893,8 @@
         </p:nvCxnSpPr>
         <p:spPr>
           <a:xfrm flipV="1">
-            <a:off x="7810631" y="2389267"/>
-            <a:ext cx="2006469" cy="2125538"/>
-          </a:xfrm>
-          <a:prstGeom prst="line">
-            <a:avLst/>
-          </a:prstGeom>
-          <a:noFill/>
-          <a:ln w="9525" cap="flat" cmpd="sng" algn="ctr">
-            <a:solidFill>
-              <a:srgbClr val="ED1C24"/>
-            </a:solidFill>
-            <a:prstDash val="solid"/>
-            <a:headEnd type="none" w="lg" len="med"/>
-            <a:tailEnd type="none" w="lg" len="med"/>
-          </a:ln>
-          <a:effectLst/>
-        </p:spPr>
-      </p:cxnSp>
-      <p:cxnSp>
-        <p:nvCxnSpPr>
-          <p:cNvPr id="34" name="Straight Connector 33">
-            <a:extLst>
-              <a:ext uri="{FF2B5EF4-FFF2-40B4-BE49-F238E27FC236}">
-                <a16:creationId xmlns:a16="http://schemas.microsoft.com/office/drawing/2014/main" id="{7AAF0795-7AD0-ED2A-F4B5-E65C0710701A}"/>
-              </a:ext>
-            </a:extLst>
-          </p:cNvPr>
-          <p:cNvCxnSpPr>
-            <a:cxnSpLocks/>
-          </p:cNvCxnSpPr>
-          <p:nvPr/>
-        </p:nvCxnSpPr>
-        <p:spPr>
-          <a:xfrm flipV="1">
-            <a:off x="7810631" y="3089612"/>
-            <a:ext cx="2006469" cy="3589219"/>
+            <a:off x="7912100" y="3089612"/>
+            <a:ext cx="1905000" cy="3589219"/>
           </a:xfrm>
           <a:prstGeom prst="line">
             <a:avLst/>
@@ -25308,10 +25913,10 @@
       </p:cxnSp>
       <p:sp>
         <p:nvSpPr>
-          <p:cNvPr id="43" name="Rectangle 42">
-            <a:extLst>
-              <a:ext uri="{FF2B5EF4-FFF2-40B4-BE49-F238E27FC236}">
-                <a16:creationId xmlns:a16="http://schemas.microsoft.com/office/drawing/2014/main" id="{0DB89943-62FF-4441-2A90-8759A0C2443E}"/>
+          <p:cNvPr id="4" name="Rectangle 3">
+            <a:extLst>
+              <a:ext uri="{FF2B5EF4-FFF2-40B4-BE49-F238E27FC236}">
+                <a16:creationId xmlns:a16="http://schemas.microsoft.com/office/drawing/2014/main" id="{60EC5E56-87F1-C3A2-58C8-942CE7F1E0CC}"/>
               </a:ext>
             </a:extLst>
           </p:cNvPr>
@@ -25320,8 +25925,8 @@
         </p:nvSpPr>
         <p:spPr bwMode="auto">
           <a:xfrm>
-            <a:off x="7810631" y="4514807"/>
-            <a:ext cx="2822538" cy="2164024"/>
+            <a:off x="7912100" y="4514807"/>
+            <a:ext cx="2689320" cy="2164024"/>
           </a:xfrm>
           <a:prstGeom prst="rect">
             <a:avLst/>
@@ -25390,40 +25995,6 @@
           </a:p>
         </p:txBody>
       </p:sp>
-      <p:cxnSp>
-        <p:nvCxnSpPr>
-          <p:cNvPr id="35" name="Straight Connector 34">
-            <a:extLst>
-              <a:ext uri="{FF2B5EF4-FFF2-40B4-BE49-F238E27FC236}">
-                <a16:creationId xmlns:a16="http://schemas.microsoft.com/office/drawing/2014/main" id="{DAF3DCF6-133B-AB66-AC0E-750B8D6654B9}"/>
-              </a:ext>
-            </a:extLst>
-          </p:cNvPr>
-          <p:cNvCxnSpPr>
-            <a:cxnSpLocks/>
-          </p:cNvCxnSpPr>
-          <p:nvPr/>
-        </p:nvCxnSpPr>
-        <p:spPr>
-          <a:xfrm flipV="1">
-            <a:off x="10633169" y="3095751"/>
-            <a:ext cx="206282" cy="3533649"/>
-          </a:xfrm>
-          <a:prstGeom prst="line">
-            <a:avLst/>
-          </a:prstGeom>
-          <a:noFill/>
-          <a:ln w="9525" cap="flat" cmpd="sng" algn="ctr">
-            <a:solidFill>
-              <a:srgbClr val="ED1C24"/>
-            </a:solidFill>
-            <a:prstDash val="solid"/>
-            <a:headEnd type="none" w="lg" len="med"/>
-            <a:tailEnd type="none" w="lg" len="med"/>
-          </a:ln>
-          <a:effectLst/>
-        </p:spPr>
-      </p:cxnSp>
       <p:sp>
         <p:nvSpPr>
           <p:cNvPr id="36" name="Title 1">
@@ -25998,73 +26569,8 @@
                 <a:ea typeface="+mn-ea"/>
                 <a:cs typeface="Segoe UI" panose="020B0502040204020203" pitchFamily="34" charset="0"/>
               </a:rPr>
-              <a:t>The directions the press buttons control are shown to </a:t>
-            </a:r>
-            <a:r>
-              <a:rPr kumimoji="0" lang="en-US" sz="2400" b="0" i="0" u="none" strike="noStrike" kern="1200" cap="none" spc="0" normalizeH="0" baseline="0" noProof="0">
-                <a:ln>
-                  <a:noFill/>
-                </a:ln>
-                <a:solidFill>
-                  <a:srgbClr val="000000"/>
-                </a:solidFill>
-                <a:effectLst/>
-                <a:uLnTx/>
-                <a:uFillTx/>
-                <a:latin typeface="Klavika Regular"/>
-                <a:ea typeface="+mn-ea"/>
-                <a:cs typeface="Segoe UI" panose="020B0502040204020203" pitchFamily="34" charset="0"/>
-              </a:rPr>
-              <a:t>the right (hint</a:t>
-            </a:r>
-            <a:r>
-              <a:rPr kumimoji="0" lang="en-US" sz="2400" b="0" i="0" u="none" strike="noStrike" kern="1200" cap="none" spc="0" normalizeH="0" baseline="0" noProof="0" dirty="0">
-                <a:ln>
-                  <a:noFill/>
-                </a:ln>
-                <a:solidFill>
-                  <a:srgbClr val="000000"/>
-                </a:solidFill>
-                <a:effectLst/>
-                <a:uLnTx/>
-                <a:uFillTx/>
-                <a:latin typeface="Klavika Regular"/>
-                <a:ea typeface="+mn-ea"/>
-                <a:cs typeface="Segoe UI" panose="020B0502040204020203" pitchFamily="34" charset="0"/>
-              </a:rPr>
-              <a:t>: try using the board at a </a:t>
-            </a:r>
-            <a:r>
-              <a:rPr kumimoji="0" lang="en-US" sz="2400" b="0" i="0" u="none" strike="noStrike" kern="1200" cap="none" spc="0" normalizeH="0" baseline="0" noProof="0">
-                <a:ln>
-                  <a:noFill/>
-                </a:ln>
-                <a:solidFill>
-                  <a:srgbClr val="000000"/>
-                </a:solidFill>
-                <a:effectLst/>
-                <a:uLnTx/>
-                <a:uFillTx/>
-                <a:latin typeface="Klavika Regular"/>
-                <a:ea typeface="+mn-ea"/>
-                <a:cs typeface="Segoe UI" panose="020B0502040204020203" pitchFamily="34" charset="0"/>
-              </a:rPr>
-              <a:t>diagonal!).</a:t>
-            </a:r>
-            <a:endParaRPr kumimoji="0" lang="en-US" sz="2400" b="0" i="0" u="none" strike="noStrike" kern="1200" cap="none" spc="0" normalizeH="0" baseline="0" noProof="0" dirty="0">
-              <a:ln>
-                <a:noFill/>
-              </a:ln>
-              <a:solidFill>
-                <a:srgbClr val="000000"/>
-              </a:solidFill>
-              <a:effectLst/>
-              <a:uLnTx/>
-              <a:uFillTx/>
-              <a:latin typeface="Klavika Regular"/>
-              <a:ea typeface="+mn-ea"/>
-              <a:cs typeface="Segoe UI" panose="020B0502040204020203" pitchFamily="34" charset="0"/>
-            </a:endParaRPr>
+              <a:t>The directions the press buttons control are shown to the right (hint: try using the board at a diagonal!).</a:t>
+            </a:r>
           </a:p>
         </p:txBody>
       </p:sp>
@@ -26318,8 +26824,8 @@
         </p:nvCxnSpPr>
         <p:spPr>
           <a:xfrm flipV="1">
-            <a:off x="5283200" y="3936261"/>
-            <a:ext cx="5697315" cy="883389"/>
+            <a:off x="5323712" y="3936261"/>
+            <a:ext cx="5656803" cy="948159"/>
           </a:xfrm>
           <a:prstGeom prst="straightConnector1">
             <a:avLst/>
@@ -26995,75 +27501,6 @@
           </a:p>
         </p:txBody>
       </p:sp>
-      <p:cxnSp>
-        <p:nvCxnSpPr>
-          <p:cNvPr id="57" name="Straight Connector 56">
-            <a:extLst>
-              <a:ext uri="{FF2B5EF4-FFF2-40B4-BE49-F238E27FC236}">
-                <a16:creationId xmlns:a16="http://schemas.microsoft.com/office/drawing/2014/main" id="{EC7D37F8-161D-28F6-63E9-0EE2752C8F27}"/>
-              </a:ext>
-            </a:extLst>
-          </p:cNvPr>
-          <p:cNvCxnSpPr>
-            <a:cxnSpLocks/>
-          </p:cNvCxnSpPr>
-          <p:nvPr/>
-        </p:nvCxnSpPr>
-        <p:spPr>
-          <a:xfrm flipV="1">
-            <a:off x="10633169" y="2389267"/>
-            <a:ext cx="206282" cy="2125538"/>
-          </a:xfrm>
-          <a:prstGeom prst="line">
-            <a:avLst/>
-          </a:prstGeom>
-          <a:noFill/>
-          <a:ln w="9525" cap="flat" cmpd="sng" algn="ctr">
-            <a:solidFill>
-              <a:srgbClr val="ED1C24"/>
-            </a:solidFill>
-            <a:prstDash val="solid"/>
-            <a:headEnd type="none" w="lg" len="med"/>
-            <a:tailEnd type="none" w="lg" len="med"/>
-          </a:ln>
-          <a:effectLst/>
-        </p:spPr>
-      </p:cxnSp>
-      <p:cxnSp>
-        <p:nvCxnSpPr>
-          <p:cNvPr id="58" name="Straight Arrow Connector 57">
-            <a:extLst>
-              <a:ext uri="{FF2B5EF4-FFF2-40B4-BE49-F238E27FC236}">
-                <a16:creationId xmlns:a16="http://schemas.microsoft.com/office/drawing/2014/main" id="{F9078187-70A7-CFBA-2394-FB0526853DA9}"/>
-              </a:ext>
-            </a:extLst>
-          </p:cNvPr>
-          <p:cNvCxnSpPr>
-            <a:cxnSpLocks/>
-            <a:endCxn id="43" idx="1"/>
-          </p:cNvCxnSpPr>
-          <p:nvPr/>
-        </p:nvCxnSpPr>
-        <p:spPr>
-          <a:xfrm flipV="1">
-            <a:off x="4972050" y="5596819"/>
-            <a:ext cx="2838581" cy="188031"/>
-          </a:xfrm>
-          <a:prstGeom prst="straightConnector1">
-            <a:avLst/>
-          </a:prstGeom>
-          <a:noFill/>
-          <a:ln w="12700" cap="flat" cmpd="sng" algn="ctr">
-            <a:solidFill>
-              <a:srgbClr val="ED1C24"/>
-            </a:solidFill>
-            <a:prstDash val="solid"/>
-            <a:headEnd type="none" w="lg" len="med"/>
-            <a:tailEnd type="triangle"/>
-          </a:ln>
-          <a:effectLst/>
-        </p:spPr>
-      </p:cxnSp>
       <p:sp>
         <p:nvSpPr>
           <p:cNvPr id="7" name="Rectangle 6">
@@ -27181,10 +27618,2133 @@
           <a:effectLst/>
         </p:spPr>
       </p:cxnSp>
+      <p:cxnSp>
+        <p:nvCxnSpPr>
+          <p:cNvPr id="2" name="Straight Connector 1">
+            <a:extLst>
+              <a:ext uri="{FF2B5EF4-FFF2-40B4-BE49-F238E27FC236}">
+                <a16:creationId xmlns:a16="http://schemas.microsoft.com/office/drawing/2014/main" id="{035062B9-A337-597F-35B9-046FA96D2CDE}"/>
+              </a:ext>
+            </a:extLst>
+          </p:cNvPr>
+          <p:cNvCxnSpPr>
+            <a:cxnSpLocks/>
+          </p:cNvCxnSpPr>
+          <p:nvPr/>
+        </p:nvCxnSpPr>
+        <p:spPr>
+          <a:xfrm flipV="1">
+            <a:off x="7912100" y="2389267"/>
+            <a:ext cx="1905000" cy="2125538"/>
+          </a:xfrm>
+          <a:prstGeom prst="line">
+            <a:avLst/>
+          </a:prstGeom>
+          <a:noFill/>
+          <a:ln w="9525" cap="flat" cmpd="sng" algn="ctr">
+            <a:solidFill>
+              <a:srgbClr val="ED1C24"/>
+            </a:solidFill>
+            <a:prstDash val="solid"/>
+            <a:headEnd type="none" w="lg" len="med"/>
+            <a:tailEnd type="none" w="lg" len="med"/>
+          </a:ln>
+          <a:effectLst/>
+        </p:spPr>
+      </p:cxnSp>
+      <p:cxnSp>
+        <p:nvCxnSpPr>
+          <p:cNvPr id="5" name="Straight Connector 4">
+            <a:extLst>
+              <a:ext uri="{FF2B5EF4-FFF2-40B4-BE49-F238E27FC236}">
+                <a16:creationId xmlns:a16="http://schemas.microsoft.com/office/drawing/2014/main" id="{7D7F7E29-B79B-01A2-692D-C5EB49220EAD}"/>
+              </a:ext>
+            </a:extLst>
+          </p:cNvPr>
+          <p:cNvCxnSpPr>
+            <a:cxnSpLocks/>
+          </p:cNvCxnSpPr>
+          <p:nvPr/>
+        </p:nvCxnSpPr>
+        <p:spPr>
+          <a:xfrm flipV="1">
+            <a:off x="10601419" y="3095751"/>
+            <a:ext cx="238032" cy="3583080"/>
+          </a:xfrm>
+          <a:prstGeom prst="line">
+            <a:avLst/>
+          </a:prstGeom>
+          <a:noFill/>
+          <a:ln w="9525" cap="flat" cmpd="sng" algn="ctr">
+            <a:solidFill>
+              <a:srgbClr val="ED1C24"/>
+            </a:solidFill>
+            <a:prstDash val="solid"/>
+            <a:headEnd type="none" w="lg" len="med"/>
+            <a:tailEnd type="none" w="lg" len="med"/>
+          </a:ln>
+          <a:effectLst/>
+        </p:spPr>
+      </p:cxnSp>
+      <p:cxnSp>
+        <p:nvCxnSpPr>
+          <p:cNvPr id="26" name="Straight Connector 25">
+            <a:extLst>
+              <a:ext uri="{FF2B5EF4-FFF2-40B4-BE49-F238E27FC236}">
+                <a16:creationId xmlns:a16="http://schemas.microsoft.com/office/drawing/2014/main" id="{9B560D4E-6496-54D7-B1FD-0DA1828F036D}"/>
+              </a:ext>
+            </a:extLst>
+          </p:cNvPr>
+          <p:cNvCxnSpPr>
+            <a:cxnSpLocks/>
+          </p:cNvCxnSpPr>
+          <p:nvPr/>
+        </p:nvCxnSpPr>
+        <p:spPr>
+          <a:xfrm flipV="1">
+            <a:off x="10601419" y="2389267"/>
+            <a:ext cx="238032" cy="2125538"/>
+          </a:xfrm>
+          <a:prstGeom prst="line">
+            <a:avLst/>
+          </a:prstGeom>
+          <a:noFill/>
+          <a:ln w="9525" cap="flat" cmpd="sng" algn="ctr">
+            <a:solidFill>
+              <a:srgbClr val="ED1C24"/>
+            </a:solidFill>
+            <a:prstDash val="solid"/>
+            <a:headEnd type="none" w="lg" len="med"/>
+            <a:tailEnd type="none" w="lg" len="med"/>
+          </a:ln>
+          <a:effectLst/>
+        </p:spPr>
+      </p:cxnSp>
     </p:spTree>
     <p:extLst>
       <p:ext uri="{BB962C8B-B14F-4D97-AF65-F5344CB8AC3E}">
         <p14:creationId xmlns:p14="http://schemas.microsoft.com/office/powerpoint/2010/main" val="569035694"/>
+      </p:ext>
+    </p:extLst>
+  </p:cSld>
+  <p:clrMapOvr>
+    <a:masterClrMapping/>
+  </p:clrMapOvr>
+</p:sld>
+</file>
+
+<file path=ppt/slides/slide7.xml><?xml version="1.0" encoding="utf-8"?>
+<p:sld xmlns:a="http://schemas.openxmlformats.org/drawingml/2006/main" xmlns:r="http://schemas.openxmlformats.org/officeDocument/2006/relationships" xmlns:p="http://schemas.openxmlformats.org/presentationml/2006/main">
+  <p:cSld>
+    <p:spTree>
+      <p:nvGrpSpPr>
+        <p:cNvPr id="1" name="">
+          <a:extLst>
+            <a:ext uri="{FF2B5EF4-FFF2-40B4-BE49-F238E27FC236}">
+              <a16:creationId xmlns:a16="http://schemas.microsoft.com/office/drawing/2014/main" id="{7C22AEED-C76C-C3AE-6F32-C9176853A90E}"/>
+            </a:ext>
+          </a:extLst>
+        </p:cNvPr>
+        <p:cNvGrpSpPr/>
+        <p:nvPr/>
+      </p:nvGrpSpPr>
+      <p:grpSpPr>
+        <a:xfrm>
+          <a:off x="0" y="0"/>
+          <a:ext cx="0" cy="0"/>
+          <a:chOff x="0" y="0"/>
+          <a:chExt cx="0" cy="0"/>
+        </a:xfrm>
+      </p:grpSpPr>
+      <p:sp>
+        <p:nvSpPr>
+          <p:cNvPr id="2" name="Title 1">
+            <a:extLst>
+              <a:ext uri="{FF2B5EF4-FFF2-40B4-BE49-F238E27FC236}">
+                <a16:creationId xmlns:a16="http://schemas.microsoft.com/office/drawing/2014/main" id="{1CF1B0CD-EC44-CD11-A1F2-B2900847844D}"/>
+              </a:ext>
+            </a:extLst>
+          </p:cNvPr>
+          <p:cNvSpPr>
+            <a:spLocks noGrp="1"/>
+          </p:cNvSpPr>
+          <p:nvPr>
+            <p:ph type="title"/>
+          </p:nvPr>
+        </p:nvSpPr>
+        <p:spPr/>
+        <p:txBody>
+          <a:bodyPr/>
+          <a:lstStyle/>
+          <a:p>
+            <a:r>
+              <a:rPr lang="en-GB" dirty="0"/>
+              <a:t>Boolean board                     (external button board)</a:t>
+            </a:r>
+          </a:p>
+        </p:txBody>
+      </p:sp>
+    </p:spTree>
+    <p:extLst>
+      <p:ext uri="{BB962C8B-B14F-4D97-AF65-F5344CB8AC3E}">
+        <p14:creationId xmlns:p14="http://schemas.microsoft.com/office/powerpoint/2010/main" val="101653462"/>
+      </p:ext>
+    </p:extLst>
+  </p:cSld>
+  <p:clrMapOvr>
+    <a:masterClrMapping/>
+  </p:clrMapOvr>
+  <mc:AlternateContent xmlns:mc="http://schemas.openxmlformats.org/markup-compatibility/2006" xmlns:p14="http://schemas.microsoft.com/office/powerpoint/2010/main">
+    <mc:Choice Requires="p14">
+      <p:transition spd="med" p14:dur="700">
+        <p:fade/>
+      </p:transition>
+    </mc:Choice>
+    <mc:Fallback xmlns="" xmlns:a16="http://schemas.microsoft.com/office/drawing/2014/main" xmlns:a14="http://schemas.microsoft.com/office/drawing/2010/main" xmlns:p15="http://schemas.microsoft.com/office/powerpoint/2012/main">
+      <p:transition spd="med">
+        <p:fade/>
+      </p:transition>
+    </mc:Fallback>
+  </mc:AlternateContent>
+</p:sld>
+</file>
+
+<file path=ppt/slides/slide8.xml><?xml version="1.0" encoding="utf-8"?>
+<p:sld xmlns:a="http://schemas.openxmlformats.org/drawingml/2006/main" xmlns:r="http://schemas.openxmlformats.org/officeDocument/2006/relationships" xmlns:p="http://schemas.openxmlformats.org/presentationml/2006/main">
+  <p:cSld>
+    <p:spTree>
+      <p:nvGrpSpPr>
+        <p:cNvPr id="1" name="">
+          <a:extLst>
+            <a:ext uri="{FF2B5EF4-FFF2-40B4-BE49-F238E27FC236}">
+              <a16:creationId xmlns:a16="http://schemas.microsoft.com/office/drawing/2014/main" id="{46F1BF53-3D39-B15C-1645-E36271AF24F8}"/>
+            </a:ext>
+          </a:extLst>
+        </p:cNvPr>
+        <p:cNvGrpSpPr/>
+        <p:nvPr/>
+      </p:nvGrpSpPr>
+      <p:grpSpPr>
+        <a:xfrm>
+          <a:off x="0" y="0"/>
+          <a:ext cx="0" cy="0"/>
+          <a:chOff x="0" y="0"/>
+          <a:chExt cx="0" cy="0"/>
+        </a:xfrm>
+      </p:grpSpPr>
+      <p:pic>
+        <p:nvPicPr>
+          <p:cNvPr id="6" name="Picture 5" descr="A close-up of a board with various components&#10;&#10;Description automatically generated">
+            <a:extLst>
+              <a:ext uri="{FF2B5EF4-FFF2-40B4-BE49-F238E27FC236}">
+                <a16:creationId xmlns:a16="http://schemas.microsoft.com/office/drawing/2014/main" id="{4F4D04D9-AAFB-650C-DE7A-91F95219EABA}"/>
+              </a:ext>
+            </a:extLst>
+          </p:cNvPr>
+          <p:cNvPicPr>
+            <a:picLocks noChangeAspect="1"/>
+          </p:cNvPicPr>
+          <p:nvPr/>
+        </p:nvPicPr>
+        <p:blipFill>
+          <a:blip r:embed="rId2">
+            <a:extLst>
+              <a:ext uri="{28A0092B-C50C-407E-A947-70E740481C1C}">
+                <a14:useLocalDpi xmlns:a14="http://schemas.microsoft.com/office/drawing/2010/main" val="0"/>
+              </a:ext>
+            </a:extLst>
+          </a:blip>
+          <a:srcRect t="7838" b="1485"/>
+          <a:stretch/>
+        </p:blipFill>
+        <p:spPr>
+          <a:xfrm>
+            <a:off x="5783207" y="4541448"/>
+            <a:ext cx="3212329" cy="2183889"/>
+          </a:xfrm>
+          <a:prstGeom prst="rect">
+            <a:avLst/>
+          </a:prstGeom>
+        </p:spPr>
+      </p:pic>
+      <p:pic>
+        <p:nvPicPr>
+          <p:cNvPr id="23" name="Picture 22">
+            <a:extLst>
+              <a:ext uri="{FF2B5EF4-FFF2-40B4-BE49-F238E27FC236}">
+                <a16:creationId xmlns:a16="http://schemas.microsoft.com/office/drawing/2014/main" id="{1D2B4F0F-724E-408D-EB73-8F68C69960AA}"/>
+              </a:ext>
+            </a:extLst>
+          </p:cNvPr>
+          <p:cNvPicPr>
+            <a:picLocks noChangeAspect="1"/>
+          </p:cNvPicPr>
+          <p:nvPr/>
+        </p:nvPicPr>
+        <p:blipFill>
+          <a:blip r:embed="rId3"/>
+          <a:stretch>
+            <a:fillRect/>
+          </a:stretch>
+        </p:blipFill>
+        <p:spPr>
+          <a:xfrm>
+            <a:off x="6376402" y="59504"/>
+            <a:ext cx="5501297" cy="4016820"/>
+          </a:xfrm>
+          <a:prstGeom prst="rect">
+            <a:avLst/>
+          </a:prstGeom>
+        </p:spPr>
+      </p:pic>
+      <p:cxnSp>
+        <p:nvCxnSpPr>
+          <p:cNvPr id="33" name="Straight Connector 32">
+            <a:extLst>
+              <a:ext uri="{FF2B5EF4-FFF2-40B4-BE49-F238E27FC236}">
+                <a16:creationId xmlns:a16="http://schemas.microsoft.com/office/drawing/2014/main" id="{27B342F3-2CA1-0E1C-75DD-F2C237274BCF}"/>
+              </a:ext>
+            </a:extLst>
+          </p:cNvPr>
+          <p:cNvCxnSpPr>
+            <a:cxnSpLocks/>
+          </p:cNvCxnSpPr>
+          <p:nvPr/>
+        </p:nvCxnSpPr>
+        <p:spPr>
+          <a:xfrm>
+            <a:off x="8682391" y="6202414"/>
+            <a:ext cx="2951106" cy="523032"/>
+          </a:xfrm>
+          <a:prstGeom prst="line">
+            <a:avLst/>
+          </a:prstGeom>
+          <a:noFill/>
+          <a:ln w="9525" cap="flat" cmpd="sng" algn="ctr">
+            <a:solidFill>
+              <a:srgbClr val="ED1C24"/>
+            </a:solidFill>
+            <a:prstDash val="solid"/>
+            <a:headEnd type="none" w="lg" len="med"/>
+            <a:tailEnd type="none" w="lg" len="med"/>
+          </a:ln>
+          <a:effectLst/>
+        </p:spPr>
+      </p:cxnSp>
+      <p:cxnSp>
+        <p:nvCxnSpPr>
+          <p:cNvPr id="34" name="Straight Connector 33">
+            <a:extLst>
+              <a:ext uri="{FF2B5EF4-FFF2-40B4-BE49-F238E27FC236}">
+                <a16:creationId xmlns:a16="http://schemas.microsoft.com/office/drawing/2014/main" id="{BE3F9BF5-5C06-307E-F2E9-AE392C723AB5}"/>
+              </a:ext>
+            </a:extLst>
+          </p:cNvPr>
+          <p:cNvCxnSpPr>
+            <a:cxnSpLocks/>
+          </p:cNvCxnSpPr>
+          <p:nvPr/>
+        </p:nvCxnSpPr>
+        <p:spPr>
+          <a:xfrm flipV="1">
+            <a:off x="8682391" y="4529257"/>
+            <a:ext cx="2926996" cy="961770"/>
+          </a:xfrm>
+          <a:prstGeom prst="line">
+            <a:avLst/>
+          </a:prstGeom>
+          <a:noFill/>
+          <a:ln w="9525" cap="flat" cmpd="sng" algn="ctr">
+            <a:solidFill>
+              <a:srgbClr val="ED1C24"/>
+            </a:solidFill>
+            <a:prstDash val="solid"/>
+            <a:headEnd type="none" w="lg" len="med"/>
+            <a:tailEnd type="none" w="lg" len="med"/>
+          </a:ln>
+          <a:effectLst/>
+        </p:spPr>
+      </p:cxnSp>
+      <p:sp>
+        <p:nvSpPr>
+          <p:cNvPr id="43" name="Rectangle 42">
+            <a:extLst>
+              <a:ext uri="{FF2B5EF4-FFF2-40B4-BE49-F238E27FC236}">
+                <a16:creationId xmlns:a16="http://schemas.microsoft.com/office/drawing/2014/main" id="{B6E0D8EC-2EB1-DD50-E7FD-7D36E6467627}"/>
+              </a:ext>
+            </a:extLst>
+          </p:cNvPr>
+          <p:cNvSpPr/>
+          <p:nvPr/>
+        </p:nvSpPr>
+        <p:spPr bwMode="auto">
+          <a:xfrm>
+            <a:off x="9369462" y="4535407"/>
+            <a:ext cx="2237321" cy="2183889"/>
+          </a:xfrm>
+          <a:prstGeom prst="rect">
+            <a:avLst/>
+          </a:prstGeom>
+          <a:solidFill>
+            <a:srgbClr val="FFFFFF"/>
+          </a:solidFill>
+          <a:ln w="38100" cap="flat" cmpd="sng" algn="ctr">
+            <a:solidFill>
+              <a:srgbClr val="ED1C24"/>
+            </a:solidFill>
+            <a:prstDash val="solid"/>
+            <a:headEnd type="none" w="med" len="med"/>
+            <a:tailEnd type="none" w="med" len="med"/>
+          </a:ln>
+          <a:effectLst/>
+        </p:spPr>
+        <p:txBody>
+          <a:bodyPr rot="0" spcFirstLastPara="0" vertOverflow="overflow" horzOverflow="overflow" vert="horz" wrap="square" lIns="182880" tIns="146304" rIns="182880" bIns="146304" numCol="1" spcCol="0" rtlCol="0" fromWordArt="0" anchor="t" anchorCtr="0" forceAA="0" compatLnSpc="1">
+            <a:prstTxWarp prst="textNoShape">
+              <a:avLst/>
+            </a:prstTxWarp>
+            <a:noAutofit/>
+          </a:bodyPr>
+          <a:lstStyle/>
+          <a:p>
+            <a:pPr marL="0" marR="0" lvl="0" indent="0" defTabSz="932472" eaLnBrk="1" fontAlgn="base" latinLnBrk="0" hangingPunct="1">
+              <a:lnSpc>
+                <a:spcPct val="100000"/>
+              </a:lnSpc>
+              <a:spcBef>
+                <a:spcPct val="0"/>
+              </a:spcBef>
+              <a:spcAft>
+                <a:spcPct val="0"/>
+              </a:spcAft>
+              <a:buClrTx/>
+              <a:buSzTx/>
+              <a:buFontTx/>
+              <a:buNone/>
+              <a:tabLst/>
+              <a:defRPr/>
+            </a:pPr>
+            <a:endParaRPr kumimoji="0" lang="en-GB" sz="1800" b="0" i="0" u="none" strike="noStrike" kern="0" cap="none" spc="0" normalizeH="0" baseline="0" noProof="0" dirty="0" err="1">
+              <a:ln>
+                <a:noFill/>
+              </a:ln>
+              <a:gradFill>
+                <a:gsLst>
+                  <a:gs pos="0">
+                    <a:srgbClr val="FFFFFF"/>
+                  </a:gs>
+                  <a:gs pos="100000">
+                    <a:srgbClr val="FFFFFF"/>
+                  </a:gs>
+                </a:gsLst>
+                <a:lin ang="5400000" scaled="0"/>
+              </a:gradFill>
+              <a:effectLst/>
+              <a:uLnTx/>
+              <a:uFillTx/>
+              <a:latin typeface="Klavika Regular"/>
+              <a:ea typeface="Segoe UI" pitchFamily="34" charset="0"/>
+              <a:cs typeface="Segoe UI" pitchFamily="34" charset="0"/>
+            </a:endParaRPr>
+          </a:p>
+        </p:txBody>
+      </p:sp>
+      <p:cxnSp>
+        <p:nvCxnSpPr>
+          <p:cNvPr id="35" name="Straight Connector 34">
+            <a:extLst>
+              <a:ext uri="{FF2B5EF4-FFF2-40B4-BE49-F238E27FC236}">
+                <a16:creationId xmlns:a16="http://schemas.microsoft.com/office/drawing/2014/main" id="{6DA00DC9-A1C7-5E55-44B1-2440595DB605}"/>
+              </a:ext>
+            </a:extLst>
+          </p:cNvPr>
+          <p:cNvCxnSpPr>
+            <a:cxnSpLocks/>
+          </p:cNvCxnSpPr>
+          <p:nvPr/>
+        </p:nvCxnSpPr>
+        <p:spPr>
+          <a:xfrm flipV="1">
+            <a:off x="8015894" y="4529257"/>
+            <a:ext cx="1387525" cy="966564"/>
+          </a:xfrm>
+          <a:prstGeom prst="line">
+            <a:avLst/>
+          </a:prstGeom>
+          <a:noFill/>
+          <a:ln w="9525" cap="flat" cmpd="sng" algn="ctr">
+            <a:solidFill>
+              <a:srgbClr val="ED1C24"/>
+            </a:solidFill>
+            <a:prstDash val="solid"/>
+            <a:headEnd type="none" w="lg" len="med"/>
+            <a:tailEnd type="none" w="lg" len="med"/>
+          </a:ln>
+          <a:effectLst/>
+        </p:spPr>
+      </p:cxnSp>
+      <p:sp>
+        <p:nvSpPr>
+          <p:cNvPr id="36" name="Title 1">
+            <a:extLst>
+              <a:ext uri="{FF2B5EF4-FFF2-40B4-BE49-F238E27FC236}">
+                <a16:creationId xmlns:a16="http://schemas.microsoft.com/office/drawing/2014/main" id="{754ACEE6-9D2E-A33E-D6BD-9C2932455987}"/>
+              </a:ext>
+            </a:extLst>
+          </p:cNvPr>
+          <p:cNvSpPr txBox="1">
+            <a:spLocks/>
+          </p:cNvSpPr>
+          <p:nvPr/>
+        </p:nvSpPr>
+        <p:spPr>
+          <a:xfrm>
+            <a:off x="588263" y="591790"/>
+            <a:ext cx="11018520" cy="738664"/>
+          </a:xfrm>
+          <a:prstGeom prst="rect">
+            <a:avLst/>
+          </a:prstGeom>
+        </p:spPr>
+        <p:txBody>
+          <a:bodyPr vert="horz" wrap="square" lIns="0" tIns="0" rIns="0" bIns="0" rtlCol="0" anchor="t">
+            <a:spAutoFit/>
+          </a:bodyPr>
+          <a:lstStyle>
+            <a:lvl1pPr algn="l" defTabSz="932742" rtl="0" eaLnBrk="1" latinLnBrk="0" hangingPunct="1">
+              <a:lnSpc>
+                <a:spcPct val="100000"/>
+              </a:lnSpc>
+              <a:spcBef>
+                <a:spcPct val="0"/>
+              </a:spcBef>
+              <a:buNone/>
+              <a:defRPr lang="en-US" sz="2800" b="1" kern="1200" cap="none" spc="0" baseline="0" dirty="0" smtClean="0">
+                <a:ln w="3175">
+                  <a:noFill/>
+                </a:ln>
+                <a:solidFill>
+                  <a:schemeClr val="tx1"/>
+                </a:solidFill>
+                <a:effectLst/>
+                <a:latin typeface="+mj-lt"/>
+                <a:ea typeface="+mn-ea"/>
+                <a:cs typeface="Segoe UI" pitchFamily="34" charset="0"/>
+              </a:defRPr>
+            </a:lvl1pPr>
+          </a:lstStyle>
+          <a:p>
+            <a:pPr marL="0" marR="0" lvl="0" indent="0" algn="l" defTabSz="932742" rtl="0" eaLnBrk="1" fontAlgn="auto" latinLnBrk="0" hangingPunct="1">
+              <a:lnSpc>
+                <a:spcPct val="100000"/>
+              </a:lnSpc>
+              <a:spcBef>
+                <a:spcPct val="0"/>
+              </a:spcBef>
+              <a:spcAft>
+                <a:spcPts val="0"/>
+              </a:spcAft>
+              <a:buClrTx/>
+              <a:buSzTx/>
+              <a:buFontTx/>
+              <a:buNone/>
+              <a:tabLst/>
+              <a:defRPr/>
+            </a:pPr>
+            <a:r>
+              <a:rPr kumimoji="0" lang="en-GB" sz="4800" b="1" i="0" u="none" strike="noStrike" kern="1200" cap="none" spc="0" normalizeH="0" baseline="0" noProof="0" dirty="0" err="1">
+                <a:ln w="3175">
+                  <a:noFill/>
+                </a:ln>
+                <a:solidFill>
+                  <a:srgbClr val="000000"/>
+                </a:solidFill>
+                <a:effectLst/>
+                <a:uLnTx/>
+                <a:uFillTx/>
+                <a:latin typeface="Klavika Light"/>
+                <a:ea typeface="+mn-ea"/>
+                <a:cs typeface="Segoe UI" pitchFamily="34" charset="0"/>
+              </a:rPr>
+              <a:t>snake_game</a:t>
+            </a:r>
+            <a:r>
+              <a:rPr kumimoji="0" lang="en-GB" sz="4800" b="1" i="0" u="none" strike="noStrike" kern="1200" cap="none" spc="0" normalizeH="0" baseline="0" noProof="0" dirty="0">
+                <a:ln w="3175">
+                  <a:noFill/>
+                </a:ln>
+                <a:solidFill>
+                  <a:srgbClr val="000000"/>
+                </a:solidFill>
+                <a:effectLst/>
+                <a:uLnTx/>
+                <a:uFillTx/>
+                <a:latin typeface="Klavika Light"/>
+                <a:ea typeface="+mn-ea"/>
+                <a:cs typeface="Segoe UI" pitchFamily="34" charset="0"/>
+              </a:rPr>
+              <a:t> on FPGA</a:t>
+            </a:r>
+          </a:p>
+        </p:txBody>
+      </p:sp>
+      <p:sp>
+        <p:nvSpPr>
+          <p:cNvPr id="37" name="Content Placeholder 2">
+            <a:extLst>
+              <a:ext uri="{FF2B5EF4-FFF2-40B4-BE49-F238E27FC236}">
+                <a16:creationId xmlns:a16="http://schemas.microsoft.com/office/drawing/2014/main" id="{1D3D7F6D-C0C9-3F80-868E-7F5F81E53BA6}"/>
+              </a:ext>
+            </a:extLst>
+          </p:cNvPr>
+          <p:cNvSpPr txBox="1">
+            <a:spLocks/>
+          </p:cNvSpPr>
+          <p:nvPr/>
+        </p:nvSpPr>
+        <p:spPr>
+          <a:xfrm>
+            <a:off x="584200" y="1432111"/>
+            <a:ext cx="4944311" cy="4836927"/>
+          </a:xfrm>
+          <a:prstGeom prst="rect">
+            <a:avLst/>
+          </a:prstGeom>
+        </p:spPr>
+        <p:txBody>
+          <a:bodyPr vert="horz" wrap="square" lIns="0" tIns="0" rIns="0" bIns="0" rtlCol="0">
+            <a:noAutofit/>
+          </a:bodyPr>
+          <a:lstStyle>
+            <a:lvl1pPr marL="228600" marR="0" indent="-228600" algn="l" defTabSz="932742" rtl="0" eaLnBrk="1" fontAlgn="auto" latinLnBrk="0" hangingPunct="1">
+              <a:lnSpc>
+                <a:spcPct val="100000"/>
+              </a:lnSpc>
+              <a:spcBef>
+                <a:spcPts val="600"/>
+              </a:spcBef>
+              <a:spcAft>
+                <a:spcPts val="0"/>
+              </a:spcAft>
+              <a:buClr>
+                <a:schemeClr val="accent1"/>
+              </a:buClr>
+              <a:buSzPct val="90000"/>
+              <a:buFont typeface="Arial" panose="020B0604020202020204" pitchFamily="34" charset="0"/>
+              <a:buChar char="•"/>
+              <a:tabLst/>
+              <a:defRPr sz="1800" kern="1200" spc="0" baseline="0">
+                <a:solidFill>
+                  <a:schemeClr val="tx1"/>
+                </a:solidFill>
+                <a:latin typeface="+mn-lt"/>
+                <a:ea typeface="+mn-ea"/>
+                <a:cs typeface="Segoe UI" panose="020B0502040204020203" pitchFamily="34" charset="0"/>
+              </a:defRPr>
+            </a:lvl1pPr>
+            <a:lvl2pPr marL="457200" marR="0" indent="-228600" algn="l" defTabSz="932742" rtl="0" eaLnBrk="1" fontAlgn="auto" latinLnBrk="0" hangingPunct="1">
+              <a:lnSpc>
+                <a:spcPct val="100000"/>
+              </a:lnSpc>
+              <a:spcBef>
+                <a:spcPts val="300"/>
+              </a:spcBef>
+              <a:spcAft>
+                <a:spcPts val="0"/>
+              </a:spcAft>
+              <a:buClr>
+                <a:schemeClr val="accent1"/>
+              </a:buClr>
+              <a:buSzPct val="90000"/>
+              <a:buFont typeface="Arial" panose="020B0604020202020204" pitchFamily="34" charset="0"/>
+              <a:buChar char="•"/>
+              <a:tabLst/>
+              <a:defRPr sz="1600" kern="1200" spc="0" baseline="0">
+                <a:solidFill>
+                  <a:schemeClr val="tx1"/>
+                </a:solidFill>
+                <a:latin typeface="+mn-lt"/>
+                <a:ea typeface="+mn-ea"/>
+                <a:cs typeface="+mn-cs"/>
+              </a:defRPr>
+            </a:lvl2pPr>
+            <a:lvl3pPr marL="657225" marR="0" indent="-200025" algn="l" defTabSz="932742" rtl="0" eaLnBrk="1" fontAlgn="auto" latinLnBrk="0" hangingPunct="1">
+              <a:lnSpc>
+                <a:spcPct val="100000"/>
+              </a:lnSpc>
+              <a:spcBef>
+                <a:spcPts val="300"/>
+              </a:spcBef>
+              <a:spcAft>
+                <a:spcPts val="0"/>
+              </a:spcAft>
+              <a:buClr>
+                <a:schemeClr val="accent1"/>
+              </a:buClr>
+              <a:buSzPct val="90000"/>
+              <a:buFont typeface="Arial" panose="020B0604020202020204" pitchFamily="34" charset="0"/>
+              <a:buChar char="•"/>
+              <a:tabLst/>
+              <a:defRPr sz="1200" kern="1200" spc="0" baseline="0">
+                <a:solidFill>
+                  <a:schemeClr val="tx1"/>
+                </a:solidFill>
+                <a:latin typeface="+mn-lt"/>
+                <a:ea typeface="+mn-ea"/>
+                <a:cs typeface="+mn-cs"/>
+              </a:defRPr>
+            </a:lvl3pPr>
+            <a:lvl4pPr marL="842963" marR="0" indent="-180975" algn="l" defTabSz="932742" rtl="0" eaLnBrk="1" fontAlgn="auto" latinLnBrk="0" hangingPunct="1">
+              <a:lnSpc>
+                <a:spcPct val="100000"/>
+              </a:lnSpc>
+              <a:spcBef>
+                <a:spcPts val="300"/>
+              </a:spcBef>
+              <a:spcAft>
+                <a:spcPts val="0"/>
+              </a:spcAft>
+              <a:buClr>
+                <a:schemeClr val="accent1"/>
+              </a:buClr>
+              <a:buSzPct val="90000"/>
+              <a:buFont typeface="Arial" panose="020B0604020202020204" pitchFamily="34" charset="0"/>
+              <a:buChar char="•"/>
+              <a:tabLst/>
+              <a:defRPr sz="1100" kern="1200" spc="0" baseline="0">
+                <a:solidFill>
+                  <a:schemeClr val="tx1"/>
+                </a:solidFill>
+                <a:latin typeface="+mn-lt"/>
+                <a:ea typeface="+mn-ea"/>
+                <a:cs typeface="+mn-cs"/>
+              </a:defRPr>
+            </a:lvl4pPr>
+            <a:lvl5pPr marL="1023938" marR="0" indent="-168275" algn="l" defTabSz="932742" rtl="0" eaLnBrk="1" fontAlgn="auto" latinLnBrk="0" hangingPunct="1">
+              <a:lnSpc>
+                <a:spcPct val="100000"/>
+              </a:lnSpc>
+              <a:spcBef>
+                <a:spcPts val="300"/>
+              </a:spcBef>
+              <a:spcAft>
+                <a:spcPts val="0"/>
+              </a:spcAft>
+              <a:buClr>
+                <a:schemeClr val="accent1"/>
+              </a:buClr>
+              <a:buSzPct val="90000"/>
+              <a:buFont typeface="Arial" panose="020B0604020202020204" pitchFamily="34" charset="0"/>
+              <a:buChar char="•"/>
+              <a:tabLst/>
+              <a:defRPr sz="1100" kern="1200" spc="0" baseline="0">
+                <a:solidFill>
+                  <a:schemeClr val="tx1"/>
+                </a:solidFill>
+                <a:latin typeface="+mn-lt"/>
+                <a:ea typeface="+mn-ea"/>
+                <a:cs typeface="+mn-cs"/>
+              </a:defRPr>
+            </a:lvl5pPr>
+            <a:lvl6pPr marL="2565040" indent="-233186" algn="l" defTabSz="932742" rtl="0" eaLnBrk="1" latinLnBrk="0" hangingPunct="1">
+              <a:spcBef>
+                <a:spcPct val="20000"/>
+              </a:spcBef>
+              <a:buFont typeface="Arial" pitchFamily="34" charset="0"/>
+              <a:buChar char="•"/>
+              <a:defRPr sz="2000" kern="1200">
+                <a:solidFill>
+                  <a:schemeClr val="tx1"/>
+                </a:solidFill>
+                <a:latin typeface="+mn-lt"/>
+                <a:ea typeface="+mn-ea"/>
+                <a:cs typeface="+mn-cs"/>
+              </a:defRPr>
+            </a:lvl6pPr>
+            <a:lvl7pPr marL="3031412" indent="-233186" algn="l" defTabSz="932742" rtl="0" eaLnBrk="1" latinLnBrk="0" hangingPunct="1">
+              <a:spcBef>
+                <a:spcPct val="20000"/>
+              </a:spcBef>
+              <a:buFont typeface="Arial" pitchFamily="34" charset="0"/>
+              <a:buChar char="•"/>
+              <a:defRPr sz="2000" kern="1200">
+                <a:solidFill>
+                  <a:schemeClr val="tx1"/>
+                </a:solidFill>
+                <a:latin typeface="+mn-lt"/>
+                <a:ea typeface="+mn-ea"/>
+                <a:cs typeface="+mn-cs"/>
+              </a:defRPr>
+            </a:lvl7pPr>
+            <a:lvl8pPr marL="3497783" indent="-233186" algn="l" defTabSz="932742" rtl="0" eaLnBrk="1" latinLnBrk="0" hangingPunct="1">
+              <a:spcBef>
+                <a:spcPct val="20000"/>
+              </a:spcBef>
+              <a:buFont typeface="Arial" pitchFamily="34" charset="0"/>
+              <a:buChar char="•"/>
+              <a:defRPr sz="2000" kern="1200">
+                <a:solidFill>
+                  <a:schemeClr val="tx1"/>
+                </a:solidFill>
+                <a:latin typeface="+mn-lt"/>
+                <a:ea typeface="+mn-ea"/>
+                <a:cs typeface="+mn-cs"/>
+              </a:defRPr>
+            </a:lvl8pPr>
+            <a:lvl9pPr marL="3964155" indent="-233186" algn="l" defTabSz="932742" rtl="0" eaLnBrk="1" latinLnBrk="0" hangingPunct="1">
+              <a:spcBef>
+                <a:spcPct val="20000"/>
+              </a:spcBef>
+              <a:buFont typeface="Arial" pitchFamily="34" charset="0"/>
+              <a:buChar char="•"/>
+              <a:defRPr sz="2000" kern="1200">
+                <a:solidFill>
+                  <a:schemeClr val="tx1"/>
+                </a:solidFill>
+                <a:latin typeface="+mn-lt"/>
+                <a:ea typeface="+mn-ea"/>
+                <a:cs typeface="+mn-cs"/>
+              </a:defRPr>
+            </a:lvl9pPr>
+          </a:lstStyle>
+          <a:p>
+            <a:pPr marL="228600" marR="0" lvl="0" indent="-228600" algn="l" defTabSz="932742" rtl="0" eaLnBrk="1" fontAlgn="auto" latinLnBrk="0" hangingPunct="1">
+              <a:lnSpc>
+                <a:spcPct val="100000"/>
+              </a:lnSpc>
+              <a:spcBef>
+                <a:spcPts val="600"/>
+              </a:spcBef>
+              <a:spcAft>
+                <a:spcPts val="0"/>
+              </a:spcAft>
+              <a:buClr>
+                <a:srgbClr val="636466"/>
+              </a:buClr>
+              <a:buSzPct val="90000"/>
+              <a:buFont typeface="Arial" panose="020B0604020202020204" pitchFamily="34" charset="0"/>
+              <a:buChar char="•"/>
+              <a:tabLst/>
+              <a:defRPr/>
+            </a:pPr>
+            <a:r>
+              <a:rPr kumimoji="0" lang="en-US" sz="2400" b="0" i="0" u="none" strike="noStrike" kern="1200" cap="none" spc="0" normalizeH="0" baseline="0" noProof="0" dirty="0">
+                <a:ln>
+                  <a:noFill/>
+                </a:ln>
+                <a:solidFill>
+                  <a:srgbClr val="000000"/>
+                </a:solidFill>
+                <a:effectLst/>
+                <a:uLnTx/>
+                <a:uFillTx/>
+                <a:latin typeface="Klavika Regular"/>
+                <a:ea typeface="+mn-ea"/>
+                <a:cs typeface="Segoe UI" panose="020B0502040204020203" pitchFamily="34" charset="0"/>
+              </a:rPr>
+              <a:t>Press any direction to start playing.</a:t>
+            </a:r>
+          </a:p>
+          <a:p>
+            <a:pPr marL="228600" marR="0" lvl="0" indent="-228600" algn="l" defTabSz="932742" rtl="0" eaLnBrk="1" fontAlgn="auto" latinLnBrk="0" hangingPunct="1">
+              <a:lnSpc>
+                <a:spcPct val="100000"/>
+              </a:lnSpc>
+              <a:spcBef>
+                <a:spcPts val="600"/>
+              </a:spcBef>
+              <a:spcAft>
+                <a:spcPts val="0"/>
+              </a:spcAft>
+              <a:buClr>
+                <a:srgbClr val="636466"/>
+              </a:buClr>
+              <a:buSzPct val="90000"/>
+              <a:buFont typeface="Arial" panose="020B0604020202020204" pitchFamily="34" charset="0"/>
+              <a:buChar char="•"/>
+              <a:tabLst/>
+              <a:defRPr/>
+            </a:pPr>
+            <a:r>
+              <a:rPr kumimoji="0" lang="en-US" sz="2400" b="0" i="0" u="none" strike="noStrike" kern="1200" cap="none" spc="0" normalizeH="0" baseline="0" noProof="0" dirty="0">
+                <a:ln>
+                  <a:noFill/>
+                </a:ln>
+                <a:solidFill>
+                  <a:srgbClr val="000000"/>
+                </a:solidFill>
+                <a:effectLst/>
+                <a:uLnTx/>
+                <a:uFillTx/>
+                <a:latin typeface="Klavika Regular"/>
+                <a:ea typeface="+mn-ea"/>
+                <a:cs typeface="Segoe UI" panose="020B0502040204020203" pitchFamily="34" charset="0"/>
+              </a:rPr>
+              <a:t>Get to 10 points to win! </a:t>
+            </a:r>
+          </a:p>
+          <a:p>
+            <a:pPr>
+              <a:buClr>
+                <a:srgbClr val="636466"/>
+              </a:buClr>
+              <a:defRPr/>
+            </a:pPr>
+            <a:r>
+              <a:rPr kumimoji="0" lang="en-US" sz="2400" b="0" i="0" u="none" strike="noStrike" kern="1200" cap="none" spc="0" normalizeH="0" baseline="0" noProof="0" dirty="0">
+                <a:ln>
+                  <a:noFill/>
+                </a:ln>
+                <a:solidFill>
+                  <a:srgbClr val="000000"/>
+                </a:solidFill>
+                <a:effectLst/>
+                <a:uLnTx/>
+                <a:uFillTx/>
+                <a:latin typeface="Klavika Regular"/>
+                <a:ea typeface="+mn-ea"/>
+                <a:cs typeface="Segoe UI" panose="020B0502040204020203" pitchFamily="34" charset="0"/>
+              </a:rPr>
+              <a:t>Every time you score a point the snake becomes faster. This increase can be turned off using this switch.</a:t>
+            </a:r>
+          </a:p>
+          <a:p>
+            <a:pPr marL="228600" marR="0" lvl="0" indent="-228600" algn="l" defTabSz="932742" rtl="0" eaLnBrk="1" fontAlgn="auto" latinLnBrk="0" hangingPunct="1">
+              <a:lnSpc>
+                <a:spcPct val="100000"/>
+              </a:lnSpc>
+              <a:spcBef>
+                <a:spcPts val="600"/>
+              </a:spcBef>
+              <a:spcAft>
+                <a:spcPts val="0"/>
+              </a:spcAft>
+              <a:buClr>
+                <a:srgbClr val="636466"/>
+              </a:buClr>
+              <a:buSzPct val="90000"/>
+              <a:buFont typeface="Arial" panose="020B0604020202020204" pitchFamily="34" charset="0"/>
+              <a:buChar char="•"/>
+              <a:tabLst/>
+              <a:defRPr/>
+            </a:pPr>
+            <a:r>
+              <a:rPr kumimoji="0" lang="en-US" sz="2400" b="0" i="0" u="none" strike="noStrike" kern="1200" cap="none" spc="0" normalizeH="0" baseline="0" noProof="0" dirty="0">
+                <a:ln>
+                  <a:noFill/>
+                </a:ln>
+                <a:solidFill>
+                  <a:srgbClr val="000000"/>
+                </a:solidFill>
+                <a:effectLst/>
+                <a:uLnTx/>
+                <a:uFillTx/>
+                <a:latin typeface="Klavika Regular"/>
+                <a:ea typeface="+mn-ea"/>
+                <a:cs typeface="Segoe UI" panose="020B0502040204020203" pitchFamily="34" charset="0"/>
+              </a:rPr>
+              <a:t>Score is shown on the 7-Seg displays.</a:t>
+            </a:r>
+          </a:p>
+          <a:p>
+            <a:pPr marL="228600" marR="0" lvl="0" indent="-228600" algn="l" defTabSz="932742" rtl="0" eaLnBrk="1" fontAlgn="auto" latinLnBrk="0" hangingPunct="1">
+              <a:lnSpc>
+                <a:spcPct val="100000"/>
+              </a:lnSpc>
+              <a:spcBef>
+                <a:spcPts val="600"/>
+              </a:spcBef>
+              <a:spcAft>
+                <a:spcPts val="0"/>
+              </a:spcAft>
+              <a:buClr>
+                <a:srgbClr val="636466"/>
+              </a:buClr>
+              <a:buSzPct val="90000"/>
+              <a:buFont typeface="Arial" panose="020B0604020202020204" pitchFamily="34" charset="0"/>
+              <a:buChar char="•"/>
+              <a:tabLst/>
+              <a:defRPr/>
+            </a:pPr>
+            <a:r>
+              <a:rPr kumimoji="0" lang="en-US" sz="2400" b="0" i="0" u="none" strike="noStrike" kern="1200" cap="none" spc="0" normalizeH="0" baseline="0" noProof="0" dirty="0">
+                <a:ln>
+                  <a:noFill/>
+                </a:ln>
+                <a:solidFill>
+                  <a:srgbClr val="000000"/>
+                </a:solidFill>
+                <a:effectLst/>
+                <a:uLnTx/>
+                <a:uFillTx/>
+                <a:latin typeface="Klavika Regular"/>
+                <a:ea typeface="+mn-ea"/>
+                <a:cs typeface="Segoe UI" panose="020B0502040204020203" pitchFamily="34" charset="0"/>
+              </a:rPr>
+              <a:t>You lose if you touch an edge or eat part of yourself.</a:t>
+            </a:r>
+          </a:p>
+          <a:p>
+            <a:pPr marL="228600" marR="0" lvl="0" indent="-228600" algn="l" defTabSz="932742" rtl="0" eaLnBrk="1" fontAlgn="auto" latinLnBrk="0" hangingPunct="1">
+              <a:lnSpc>
+                <a:spcPct val="100000"/>
+              </a:lnSpc>
+              <a:spcBef>
+                <a:spcPts val="600"/>
+              </a:spcBef>
+              <a:spcAft>
+                <a:spcPts val="0"/>
+              </a:spcAft>
+              <a:buClr>
+                <a:srgbClr val="636466"/>
+              </a:buClr>
+              <a:buSzPct val="90000"/>
+              <a:buFont typeface="Arial" panose="020B0604020202020204" pitchFamily="34" charset="0"/>
+              <a:buChar char="•"/>
+              <a:tabLst/>
+              <a:defRPr/>
+            </a:pPr>
+            <a:r>
+              <a:rPr kumimoji="0" lang="en-US" sz="2400" b="0" i="0" u="none" strike="noStrike" kern="1200" cap="none" spc="0" normalizeH="0" baseline="0" noProof="0" dirty="0">
+                <a:ln>
+                  <a:noFill/>
+                </a:ln>
+                <a:solidFill>
+                  <a:srgbClr val="000000"/>
+                </a:solidFill>
+                <a:effectLst/>
+                <a:uLnTx/>
+                <a:uFillTx/>
+                <a:latin typeface="Klavika Regular"/>
+                <a:ea typeface="+mn-ea"/>
+                <a:cs typeface="Segoe UI" panose="020B0502040204020203" pitchFamily="34" charset="0"/>
+              </a:rPr>
+              <a:t>Use the reset switch to start over in the event of a win or lose screen.</a:t>
+            </a:r>
+          </a:p>
+          <a:p>
+            <a:pPr marL="228600" marR="0" lvl="0" indent="-228600" algn="l" defTabSz="932742" rtl="0" eaLnBrk="1" fontAlgn="auto" latinLnBrk="0" hangingPunct="1">
+              <a:lnSpc>
+                <a:spcPct val="100000"/>
+              </a:lnSpc>
+              <a:spcBef>
+                <a:spcPts val="600"/>
+              </a:spcBef>
+              <a:spcAft>
+                <a:spcPts val="0"/>
+              </a:spcAft>
+              <a:buClr>
+                <a:srgbClr val="636466"/>
+              </a:buClr>
+              <a:buSzPct val="90000"/>
+              <a:buFont typeface="Arial" panose="020B0604020202020204" pitchFamily="34" charset="0"/>
+              <a:buChar char="•"/>
+              <a:tabLst/>
+              <a:defRPr/>
+            </a:pPr>
+            <a:r>
+              <a:rPr kumimoji="0" lang="en-US" sz="2400" b="0" i="0" u="none" strike="noStrike" kern="1200" cap="none" spc="0" normalizeH="0" baseline="0" noProof="0" dirty="0">
+                <a:ln>
+                  <a:noFill/>
+                </a:ln>
+                <a:solidFill>
+                  <a:srgbClr val="000000"/>
+                </a:solidFill>
+                <a:effectLst/>
+                <a:uLnTx/>
+                <a:uFillTx/>
+                <a:latin typeface="Klavika Regular"/>
+                <a:ea typeface="+mn-ea"/>
+                <a:cs typeface="Segoe UI" panose="020B0502040204020203" pitchFamily="34" charset="0"/>
+              </a:rPr>
+              <a:t>The directions the press buttons control are shown to the right.</a:t>
+            </a:r>
+          </a:p>
+        </p:txBody>
+      </p:sp>
+      <p:sp>
+        <p:nvSpPr>
+          <p:cNvPr id="38" name="Rectangle 37">
+            <a:extLst>
+              <a:ext uri="{FF2B5EF4-FFF2-40B4-BE49-F238E27FC236}">
+                <a16:creationId xmlns:a16="http://schemas.microsoft.com/office/drawing/2014/main" id="{CC4ED663-216E-40C0-D267-0E97BC5F1E98}"/>
+              </a:ext>
+            </a:extLst>
+          </p:cNvPr>
+          <p:cNvSpPr/>
+          <p:nvPr/>
+        </p:nvSpPr>
+        <p:spPr bwMode="auto">
+          <a:xfrm>
+            <a:off x="8420100" y="2653195"/>
+            <a:ext cx="1249962" cy="395951"/>
+          </a:xfrm>
+          <a:prstGeom prst="rect">
+            <a:avLst/>
+          </a:prstGeom>
+          <a:noFill/>
+          <a:ln w="38100" cap="flat" cmpd="sng" algn="ctr">
+            <a:solidFill>
+              <a:schemeClr val="accent2"/>
+            </a:solidFill>
+            <a:prstDash val="solid"/>
+            <a:headEnd type="none" w="med" len="med"/>
+            <a:tailEnd type="none" w="med" len="med"/>
+          </a:ln>
+          <a:effectLst/>
+        </p:spPr>
+        <p:txBody>
+          <a:bodyPr rot="0" spcFirstLastPara="0" vertOverflow="overflow" horzOverflow="overflow" vert="horz" wrap="square" lIns="182880" tIns="146304" rIns="182880" bIns="146304" numCol="1" spcCol="0" rtlCol="0" fromWordArt="0" anchor="t" anchorCtr="0" forceAA="0" compatLnSpc="1">
+            <a:prstTxWarp prst="textNoShape">
+              <a:avLst/>
+            </a:prstTxWarp>
+            <a:noAutofit/>
+          </a:bodyPr>
+          <a:lstStyle/>
+          <a:p>
+            <a:pPr marL="0" marR="0" lvl="0" indent="0" defTabSz="932472" eaLnBrk="1" fontAlgn="base" latinLnBrk="0" hangingPunct="1">
+              <a:lnSpc>
+                <a:spcPct val="100000"/>
+              </a:lnSpc>
+              <a:spcBef>
+                <a:spcPct val="0"/>
+              </a:spcBef>
+              <a:spcAft>
+                <a:spcPct val="0"/>
+              </a:spcAft>
+              <a:buClrTx/>
+              <a:buSzTx/>
+              <a:buFontTx/>
+              <a:buNone/>
+              <a:tabLst/>
+              <a:defRPr/>
+            </a:pPr>
+            <a:endParaRPr kumimoji="0" lang="en-GB" sz="1800" b="0" i="0" u="none" strike="noStrike" kern="0" cap="none" spc="0" normalizeH="0" baseline="0" noProof="0" dirty="0" err="1">
+              <a:ln>
+                <a:noFill/>
+              </a:ln>
+              <a:gradFill>
+                <a:gsLst>
+                  <a:gs pos="0">
+                    <a:srgbClr val="FFFFFF"/>
+                  </a:gs>
+                  <a:gs pos="100000">
+                    <a:srgbClr val="FFFFFF"/>
+                  </a:gs>
+                </a:gsLst>
+                <a:lin ang="5400000" scaled="0"/>
+              </a:gradFill>
+              <a:effectLst/>
+              <a:uLnTx/>
+              <a:uFillTx/>
+              <a:latin typeface="Klavika Regular"/>
+              <a:ea typeface="Segoe UI" pitchFamily="34" charset="0"/>
+              <a:cs typeface="Segoe UI" pitchFamily="34" charset="0"/>
+            </a:endParaRPr>
+          </a:p>
+        </p:txBody>
+      </p:sp>
+      <p:cxnSp>
+        <p:nvCxnSpPr>
+          <p:cNvPr id="39" name="Straight Arrow Connector 38">
+            <a:extLst>
+              <a:ext uri="{FF2B5EF4-FFF2-40B4-BE49-F238E27FC236}">
+                <a16:creationId xmlns:a16="http://schemas.microsoft.com/office/drawing/2014/main" id="{4CB575E1-C4E3-3687-DAA3-1846AF3C6D05}"/>
+              </a:ext>
+            </a:extLst>
+          </p:cNvPr>
+          <p:cNvCxnSpPr>
+            <a:cxnSpLocks/>
+            <a:endCxn id="38" idx="1"/>
+          </p:cNvCxnSpPr>
+          <p:nvPr/>
+        </p:nvCxnSpPr>
+        <p:spPr>
+          <a:xfrm flipV="1">
+            <a:off x="5480050" y="2851171"/>
+            <a:ext cx="2940050" cy="813581"/>
+          </a:xfrm>
+          <a:prstGeom prst="straightConnector1">
+            <a:avLst/>
+          </a:prstGeom>
+          <a:noFill/>
+          <a:ln w="12700" cap="flat" cmpd="sng" algn="ctr">
+            <a:solidFill>
+              <a:schemeClr val="accent2"/>
+            </a:solidFill>
+            <a:prstDash val="solid"/>
+            <a:headEnd type="none" w="lg" len="med"/>
+            <a:tailEnd type="triangle"/>
+          </a:ln>
+          <a:effectLst/>
+        </p:spPr>
+      </p:cxnSp>
+      <p:sp>
+        <p:nvSpPr>
+          <p:cNvPr id="40" name="Rectangle 39">
+            <a:extLst>
+              <a:ext uri="{FF2B5EF4-FFF2-40B4-BE49-F238E27FC236}">
+                <a16:creationId xmlns:a16="http://schemas.microsoft.com/office/drawing/2014/main" id="{F096D59F-92DA-C078-349F-1853FC4793E0}"/>
+              </a:ext>
+            </a:extLst>
+          </p:cNvPr>
+          <p:cNvSpPr/>
+          <p:nvPr/>
+        </p:nvSpPr>
+        <p:spPr bwMode="auto">
+          <a:xfrm>
+            <a:off x="8005581" y="5495930"/>
+            <a:ext cx="676810" cy="706484"/>
+          </a:xfrm>
+          <a:prstGeom prst="rect">
+            <a:avLst/>
+          </a:prstGeom>
+          <a:noFill/>
+          <a:ln w="38100" cap="flat" cmpd="sng" algn="ctr">
+            <a:solidFill>
+              <a:srgbClr val="ED1C24"/>
+            </a:solidFill>
+            <a:prstDash val="solid"/>
+            <a:headEnd type="none" w="med" len="med"/>
+            <a:tailEnd type="none" w="med" len="med"/>
+          </a:ln>
+          <a:effectLst/>
+        </p:spPr>
+        <p:txBody>
+          <a:bodyPr rot="0" spcFirstLastPara="0" vertOverflow="overflow" horzOverflow="overflow" vert="horz" wrap="square" lIns="182880" tIns="146304" rIns="182880" bIns="146304" numCol="1" spcCol="0" rtlCol="0" fromWordArt="0" anchor="t" anchorCtr="0" forceAA="0" compatLnSpc="1">
+            <a:prstTxWarp prst="textNoShape">
+              <a:avLst/>
+            </a:prstTxWarp>
+            <a:noAutofit/>
+          </a:bodyPr>
+          <a:lstStyle/>
+          <a:p>
+            <a:pPr marL="0" marR="0" lvl="0" indent="0" defTabSz="932472" eaLnBrk="1" fontAlgn="base" latinLnBrk="0" hangingPunct="1">
+              <a:lnSpc>
+                <a:spcPct val="100000"/>
+              </a:lnSpc>
+              <a:spcBef>
+                <a:spcPct val="0"/>
+              </a:spcBef>
+              <a:spcAft>
+                <a:spcPct val="0"/>
+              </a:spcAft>
+              <a:buClrTx/>
+              <a:buSzTx/>
+              <a:buFontTx/>
+              <a:buNone/>
+              <a:tabLst/>
+              <a:defRPr/>
+            </a:pPr>
+            <a:endParaRPr kumimoji="0" lang="en-GB" sz="1800" b="0" i="0" u="none" strike="noStrike" kern="0" cap="none" spc="0" normalizeH="0" baseline="0" noProof="0" dirty="0" err="1">
+              <a:ln>
+                <a:noFill/>
+              </a:ln>
+              <a:gradFill>
+                <a:gsLst>
+                  <a:gs pos="0">
+                    <a:srgbClr val="FFFFFF"/>
+                  </a:gs>
+                  <a:gs pos="100000">
+                    <a:srgbClr val="FFFFFF"/>
+                  </a:gs>
+                </a:gsLst>
+                <a:lin ang="5400000" scaled="0"/>
+              </a:gradFill>
+              <a:effectLst/>
+              <a:uLnTx/>
+              <a:uFillTx/>
+              <a:latin typeface="Klavika Regular"/>
+              <a:ea typeface="Segoe UI" pitchFamily="34" charset="0"/>
+              <a:cs typeface="Segoe UI" pitchFamily="34" charset="0"/>
+            </a:endParaRPr>
+          </a:p>
+        </p:txBody>
+      </p:sp>
+      <p:cxnSp>
+        <p:nvCxnSpPr>
+          <p:cNvPr id="41" name="Straight Arrow Connector 40">
+            <a:extLst>
+              <a:ext uri="{FF2B5EF4-FFF2-40B4-BE49-F238E27FC236}">
+                <a16:creationId xmlns:a16="http://schemas.microsoft.com/office/drawing/2014/main" id="{7E3CF7C6-0F31-7531-32AE-902866485127}"/>
+              </a:ext>
+            </a:extLst>
+          </p:cNvPr>
+          <p:cNvCxnSpPr>
+            <a:cxnSpLocks/>
+            <a:endCxn id="40" idx="1"/>
+          </p:cNvCxnSpPr>
+          <p:nvPr/>
+        </p:nvCxnSpPr>
+        <p:spPr>
+          <a:xfrm>
+            <a:off x="4839923" y="1795578"/>
+            <a:ext cx="3165658" cy="4053594"/>
+          </a:xfrm>
+          <a:prstGeom prst="straightConnector1">
+            <a:avLst/>
+          </a:prstGeom>
+          <a:noFill/>
+          <a:ln w="12700" cap="flat" cmpd="sng" algn="ctr">
+            <a:solidFill>
+              <a:srgbClr val="ED1C24"/>
+            </a:solidFill>
+            <a:prstDash val="solid"/>
+            <a:headEnd type="none" w="lg" len="med"/>
+            <a:tailEnd type="triangle"/>
+          </a:ln>
+          <a:effectLst/>
+        </p:spPr>
+      </p:cxnSp>
+      <p:cxnSp>
+        <p:nvCxnSpPr>
+          <p:cNvPr id="42" name="Straight Arrow Connector 41">
+            <a:extLst>
+              <a:ext uri="{FF2B5EF4-FFF2-40B4-BE49-F238E27FC236}">
+                <a16:creationId xmlns:a16="http://schemas.microsoft.com/office/drawing/2014/main" id="{FF67BC13-2173-D227-7794-33C1CF44146E}"/>
+              </a:ext>
+            </a:extLst>
+          </p:cNvPr>
+          <p:cNvCxnSpPr>
+            <a:cxnSpLocks/>
+            <a:endCxn id="56" idx="2"/>
+          </p:cNvCxnSpPr>
+          <p:nvPr/>
+        </p:nvCxnSpPr>
+        <p:spPr>
+          <a:xfrm flipV="1">
+            <a:off x="5323712" y="3936261"/>
+            <a:ext cx="5656803" cy="963399"/>
+          </a:xfrm>
+          <a:prstGeom prst="straightConnector1">
+            <a:avLst/>
+          </a:prstGeom>
+          <a:noFill/>
+          <a:ln w="12700" cap="flat" cmpd="sng" algn="ctr">
+            <a:solidFill>
+              <a:srgbClr val="00B050"/>
+            </a:solidFill>
+            <a:prstDash val="solid"/>
+            <a:headEnd type="none" w="lg" len="med"/>
+            <a:tailEnd type="triangle"/>
+          </a:ln>
+          <a:effectLst/>
+        </p:spPr>
+      </p:cxnSp>
+      <p:sp>
+        <p:nvSpPr>
+          <p:cNvPr id="56" name="Rectangle 55">
+            <a:extLst>
+              <a:ext uri="{FF2B5EF4-FFF2-40B4-BE49-F238E27FC236}">
+                <a16:creationId xmlns:a16="http://schemas.microsoft.com/office/drawing/2014/main" id="{53BA41BA-A927-7B12-E19C-B3C3CE1FD3FC}"/>
+              </a:ext>
+            </a:extLst>
+          </p:cNvPr>
+          <p:cNvSpPr/>
+          <p:nvPr/>
+        </p:nvSpPr>
+        <p:spPr bwMode="auto">
+          <a:xfrm>
+            <a:off x="10864851" y="3419426"/>
+            <a:ext cx="231327" cy="516835"/>
+          </a:xfrm>
+          <a:prstGeom prst="rect">
+            <a:avLst/>
+          </a:prstGeom>
+          <a:noFill/>
+          <a:ln w="38100" cap="flat" cmpd="sng" algn="ctr">
+            <a:solidFill>
+              <a:srgbClr val="00B050"/>
+            </a:solidFill>
+            <a:prstDash val="solid"/>
+            <a:headEnd type="none" w="med" len="med"/>
+            <a:tailEnd type="none" w="med" len="med"/>
+          </a:ln>
+          <a:effectLst/>
+        </p:spPr>
+        <p:txBody>
+          <a:bodyPr rot="0" spcFirstLastPara="0" vertOverflow="overflow" horzOverflow="overflow" vert="horz" wrap="square" lIns="182880" tIns="146304" rIns="182880" bIns="146304" numCol="1" spcCol="0" rtlCol="0" fromWordArt="0" anchor="t" anchorCtr="0" forceAA="0" compatLnSpc="1">
+            <a:prstTxWarp prst="textNoShape">
+              <a:avLst/>
+            </a:prstTxWarp>
+            <a:noAutofit/>
+          </a:bodyPr>
+          <a:lstStyle/>
+          <a:p>
+            <a:pPr marL="0" marR="0" lvl="0" indent="0" defTabSz="932472" eaLnBrk="1" fontAlgn="base" latinLnBrk="0" hangingPunct="1">
+              <a:lnSpc>
+                <a:spcPct val="100000"/>
+              </a:lnSpc>
+              <a:spcBef>
+                <a:spcPct val="0"/>
+              </a:spcBef>
+              <a:spcAft>
+                <a:spcPct val="0"/>
+              </a:spcAft>
+              <a:buClrTx/>
+              <a:buSzTx/>
+              <a:buFontTx/>
+              <a:buNone/>
+              <a:tabLst/>
+              <a:defRPr/>
+            </a:pPr>
+            <a:endParaRPr kumimoji="0" lang="en-GB" sz="1800" b="0" i="0" u="none" strike="noStrike" kern="0" cap="none" spc="0" normalizeH="0" baseline="0" noProof="0" dirty="0" err="1">
+              <a:ln>
+                <a:noFill/>
+              </a:ln>
+              <a:gradFill>
+                <a:gsLst>
+                  <a:gs pos="0">
+                    <a:srgbClr val="FFFFFF"/>
+                  </a:gs>
+                  <a:gs pos="100000">
+                    <a:srgbClr val="FFFFFF"/>
+                  </a:gs>
+                </a:gsLst>
+                <a:lin ang="5400000" scaled="0"/>
+              </a:gradFill>
+              <a:effectLst/>
+              <a:uLnTx/>
+              <a:uFillTx/>
+              <a:latin typeface="Klavika Regular"/>
+              <a:ea typeface="Segoe UI" pitchFamily="34" charset="0"/>
+              <a:cs typeface="Segoe UI" pitchFamily="34" charset="0"/>
+            </a:endParaRPr>
+          </a:p>
+        </p:txBody>
+      </p:sp>
+      <p:cxnSp>
+        <p:nvCxnSpPr>
+          <p:cNvPr id="57" name="Straight Connector 56">
+            <a:extLst>
+              <a:ext uri="{FF2B5EF4-FFF2-40B4-BE49-F238E27FC236}">
+                <a16:creationId xmlns:a16="http://schemas.microsoft.com/office/drawing/2014/main" id="{4D79EC13-DF18-66EA-7A55-66440A1FF3CD}"/>
+              </a:ext>
+            </a:extLst>
+          </p:cNvPr>
+          <p:cNvCxnSpPr>
+            <a:cxnSpLocks/>
+          </p:cNvCxnSpPr>
+          <p:nvPr/>
+        </p:nvCxnSpPr>
+        <p:spPr>
+          <a:xfrm>
+            <a:off x="8005581" y="6207208"/>
+            <a:ext cx="1363881" cy="532690"/>
+          </a:xfrm>
+          <a:prstGeom prst="line">
+            <a:avLst/>
+          </a:prstGeom>
+          <a:noFill/>
+          <a:ln w="9525" cap="flat" cmpd="sng" algn="ctr">
+            <a:solidFill>
+              <a:srgbClr val="ED1C24"/>
+            </a:solidFill>
+            <a:prstDash val="solid"/>
+            <a:headEnd type="none" w="lg" len="med"/>
+            <a:tailEnd type="none" w="lg" len="med"/>
+          </a:ln>
+          <a:effectLst/>
+        </p:spPr>
+      </p:cxnSp>
+      <p:sp>
+        <p:nvSpPr>
+          <p:cNvPr id="7" name="Rectangle 6">
+            <a:extLst>
+              <a:ext uri="{FF2B5EF4-FFF2-40B4-BE49-F238E27FC236}">
+                <a16:creationId xmlns:a16="http://schemas.microsoft.com/office/drawing/2014/main" id="{F8309951-AC40-5670-6000-E53DFB9E176B}"/>
+              </a:ext>
+            </a:extLst>
+          </p:cNvPr>
+          <p:cNvSpPr/>
+          <p:nvPr/>
+        </p:nvSpPr>
+        <p:spPr bwMode="auto">
+          <a:xfrm>
+            <a:off x="10601419" y="3415900"/>
+            <a:ext cx="231326" cy="516835"/>
+          </a:xfrm>
+          <a:prstGeom prst="rect">
+            <a:avLst/>
+          </a:prstGeom>
+          <a:noFill/>
+          <a:ln w="38100" cap="flat" cmpd="sng" algn="ctr">
+            <a:solidFill>
+              <a:srgbClr val="00B0F0"/>
+            </a:solidFill>
+            <a:prstDash val="solid"/>
+            <a:headEnd type="none" w="med" len="med"/>
+            <a:tailEnd type="none" w="med" len="med"/>
+          </a:ln>
+          <a:effectLst/>
+        </p:spPr>
+        <p:txBody>
+          <a:bodyPr rot="0" spcFirstLastPara="0" vertOverflow="overflow" horzOverflow="overflow" vert="horz" wrap="square" lIns="182880" tIns="146304" rIns="182880" bIns="146304" numCol="1" spcCol="0" rtlCol="0" fromWordArt="0" anchor="t" anchorCtr="0" forceAA="0" compatLnSpc="1">
+            <a:prstTxWarp prst="textNoShape">
+              <a:avLst/>
+            </a:prstTxWarp>
+            <a:noAutofit/>
+          </a:bodyPr>
+          <a:lstStyle/>
+          <a:p>
+            <a:pPr marL="0" marR="0" lvl="0" indent="0" defTabSz="932472" eaLnBrk="1" fontAlgn="base" latinLnBrk="0" hangingPunct="1">
+              <a:lnSpc>
+                <a:spcPct val="100000"/>
+              </a:lnSpc>
+              <a:spcBef>
+                <a:spcPct val="0"/>
+              </a:spcBef>
+              <a:spcAft>
+                <a:spcPct val="0"/>
+              </a:spcAft>
+              <a:buClrTx/>
+              <a:buSzTx/>
+              <a:buFontTx/>
+              <a:buNone/>
+              <a:tabLst/>
+              <a:defRPr/>
+            </a:pPr>
+            <a:endParaRPr kumimoji="0" lang="en-GB" sz="1800" b="0" i="0" u="none" strike="noStrike" kern="0" cap="none" spc="0" normalizeH="0" baseline="0" noProof="0" dirty="0" err="1">
+              <a:ln>
+                <a:noFill/>
+              </a:ln>
+              <a:gradFill>
+                <a:gsLst>
+                  <a:gs pos="0">
+                    <a:srgbClr val="FFFFFF"/>
+                  </a:gs>
+                  <a:gs pos="100000">
+                    <a:srgbClr val="FFFFFF"/>
+                  </a:gs>
+                </a:gsLst>
+                <a:lin ang="5400000" scaled="0"/>
+              </a:gradFill>
+              <a:effectLst/>
+              <a:uLnTx/>
+              <a:uFillTx/>
+              <a:latin typeface="Klavika Regular"/>
+              <a:ea typeface="Segoe UI" pitchFamily="34" charset="0"/>
+              <a:cs typeface="Segoe UI" pitchFamily="34" charset="0"/>
+            </a:endParaRPr>
+          </a:p>
+        </p:txBody>
+      </p:sp>
+      <p:cxnSp>
+        <p:nvCxnSpPr>
+          <p:cNvPr id="8" name="Straight Arrow Connector 7">
+            <a:extLst>
+              <a:ext uri="{FF2B5EF4-FFF2-40B4-BE49-F238E27FC236}">
+                <a16:creationId xmlns:a16="http://schemas.microsoft.com/office/drawing/2014/main" id="{5FD05726-417E-7395-9901-C43D72980F4E}"/>
+              </a:ext>
+            </a:extLst>
+          </p:cNvPr>
+          <p:cNvCxnSpPr>
+            <a:cxnSpLocks/>
+            <a:endCxn id="7" idx="1"/>
+          </p:cNvCxnSpPr>
+          <p:nvPr/>
+        </p:nvCxnSpPr>
+        <p:spPr>
+          <a:xfrm>
+            <a:off x="5416550" y="2909367"/>
+            <a:ext cx="5184869" cy="764951"/>
+          </a:xfrm>
+          <a:prstGeom prst="straightConnector1">
+            <a:avLst/>
+          </a:prstGeom>
+          <a:noFill/>
+          <a:ln w="12700" cap="flat" cmpd="sng" algn="ctr">
+            <a:solidFill>
+              <a:srgbClr val="00B0F0"/>
+            </a:solidFill>
+            <a:prstDash val="solid"/>
+            <a:headEnd type="none" w="lg" len="med"/>
+            <a:tailEnd type="triangle"/>
+          </a:ln>
+          <a:effectLst/>
+        </p:spPr>
+      </p:cxnSp>
+      <p:grpSp>
+        <p:nvGrpSpPr>
+          <p:cNvPr id="11" name="Group 10">
+            <a:extLst>
+              <a:ext uri="{FF2B5EF4-FFF2-40B4-BE49-F238E27FC236}">
+                <a16:creationId xmlns:a16="http://schemas.microsoft.com/office/drawing/2014/main" id="{3539BB9F-C2B0-4A11-A8FB-6C83E118F289}"/>
+              </a:ext>
+            </a:extLst>
+          </p:cNvPr>
+          <p:cNvGrpSpPr/>
+          <p:nvPr/>
+        </p:nvGrpSpPr>
+        <p:grpSpPr>
+          <a:xfrm>
+            <a:off x="9463912" y="4616765"/>
+            <a:ext cx="2061337" cy="2033238"/>
+            <a:chOff x="5375306" y="2467410"/>
+            <a:chExt cx="2831188" cy="2809712"/>
+          </a:xfrm>
+        </p:grpSpPr>
+        <p:grpSp>
+          <p:nvGrpSpPr>
+            <p:cNvPr id="12" name="Group 11">
+              <a:extLst>
+                <a:ext uri="{FF2B5EF4-FFF2-40B4-BE49-F238E27FC236}">
+                  <a16:creationId xmlns:a16="http://schemas.microsoft.com/office/drawing/2014/main" id="{5EDB74A1-4C22-664C-EFCE-CAF78A867A00}"/>
+                </a:ext>
+              </a:extLst>
+            </p:cNvPr>
+            <p:cNvGrpSpPr/>
+            <p:nvPr/>
+          </p:nvGrpSpPr>
+          <p:grpSpPr>
+            <a:xfrm rot="5400000">
+              <a:off x="6334954" y="2467410"/>
+              <a:ext cx="914401" cy="914401"/>
+              <a:chOff x="6777933" y="4956926"/>
+              <a:chExt cx="914401" cy="914401"/>
+            </a:xfrm>
+          </p:grpSpPr>
+          <p:pic>
+            <p:nvPicPr>
+              <p:cNvPr id="24" name="Graphic 23" descr="Chevron arrows with solid fill">
+                <a:extLst>
+                  <a:ext uri="{FF2B5EF4-FFF2-40B4-BE49-F238E27FC236}">
+                    <a16:creationId xmlns:a16="http://schemas.microsoft.com/office/drawing/2014/main" id="{6C51B74D-C407-6731-6AA7-A2B132B1826F}"/>
+                  </a:ext>
+                </a:extLst>
+              </p:cNvPr>
+              <p:cNvPicPr>
+                <a:picLocks noChangeAspect="1"/>
+              </p:cNvPicPr>
+              <p:nvPr/>
+            </p:nvPicPr>
+            <p:blipFill>
+              <a:blip r:embed="rId4">
+                <a:extLst>
+                  <a:ext uri="{96DAC541-7B7A-43D3-8B79-37D633B846F1}">
+                    <asvg:svgBlip xmlns:asvg="http://schemas.microsoft.com/office/drawing/2016/SVG/main" r:embed="rId5"/>
+                  </a:ext>
+                </a:extLst>
+              </a:blip>
+              <a:stretch>
+                <a:fillRect/>
+              </a:stretch>
+            </p:blipFill>
+            <p:spPr>
+              <a:xfrm rot="10800000">
+                <a:off x="6777934" y="4956926"/>
+                <a:ext cx="914400" cy="914400"/>
+              </a:xfrm>
+              <a:prstGeom prst="rect">
+                <a:avLst/>
+              </a:prstGeom>
+            </p:spPr>
+          </p:pic>
+          <p:sp>
+            <p:nvSpPr>
+              <p:cNvPr id="25" name="Rectangle 24">
+                <a:extLst>
+                  <a:ext uri="{FF2B5EF4-FFF2-40B4-BE49-F238E27FC236}">
+                    <a16:creationId xmlns:a16="http://schemas.microsoft.com/office/drawing/2014/main" id="{22784332-2E6F-483B-A878-B8FCD7B23B3A}"/>
+                  </a:ext>
+                </a:extLst>
+              </p:cNvPr>
+              <p:cNvSpPr/>
+              <p:nvPr/>
+            </p:nvSpPr>
+            <p:spPr bwMode="auto">
+              <a:xfrm>
+                <a:off x="6777933" y="4956926"/>
+                <a:ext cx="914401" cy="914401"/>
+              </a:xfrm>
+              <a:prstGeom prst="rect">
+                <a:avLst/>
+              </a:prstGeom>
+              <a:noFill/>
+              <a:ln w="38100" cap="flat" cmpd="sng" algn="ctr">
+                <a:solidFill>
+                  <a:srgbClr val="000000"/>
+                </a:solidFill>
+                <a:prstDash val="solid"/>
+                <a:headEnd type="none" w="med" len="med"/>
+                <a:tailEnd type="none" w="med" len="med"/>
+              </a:ln>
+              <a:effectLst/>
+            </p:spPr>
+            <p:txBody>
+              <a:bodyPr rot="0" spcFirstLastPara="0" vertOverflow="overflow" horzOverflow="overflow" vert="horz" wrap="square" lIns="182880" tIns="146304" rIns="182880" bIns="146304" numCol="1" spcCol="0" rtlCol="0" fromWordArt="0" anchor="t" anchorCtr="0" forceAA="0" compatLnSpc="1">
+                <a:prstTxWarp prst="textNoShape">
+                  <a:avLst/>
+                </a:prstTxWarp>
+                <a:noAutofit/>
+              </a:bodyPr>
+              <a:lstStyle/>
+              <a:p>
+                <a:pPr marL="0" marR="0" lvl="0" indent="0" defTabSz="932472" eaLnBrk="1" fontAlgn="base" latinLnBrk="0" hangingPunct="1">
+                  <a:lnSpc>
+                    <a:spcPct val="100000"/>
+                  </a:lnSpc>
+                  <a:spcBef>
+                    <a:spcPct val="0"/>
+                  </a:spcBef>
+                  <a:spcAft>
+                    <a:spcPct val="0"/>
+                  </a:spcAft>
+                  <a:buClrTx/>
+                  <a:buSzTx/>
+                  <a:buFontTx/>
+                  <a:buNone/>
+                  <a:tabLst/>
+                  <a:defRPr/>
+                </a:pPr>
+                <a:endParaRPr kumimoji="0" lang="en-GB" sz="1800" b="0" i="0" u="none" strike="noStrike" kern="0" cap="none" spc="0" normalizeH="0" baseline="0" noProof="0" dirty="0" err="1">
+                  <a:ln>
+                    <a:noFill/>
+                  </a:ln>
+                  <a:gradFill>
+                    <a:gsLst>
+                      <a:gs pos="0">
+                        <a:srgbClr val="FFFFFF"/>
+                      </a:gs>
+                      <a:gs pos="100000">
+                        <a:srgbClr val="FFFFFF"/>
+                      </a:gs>
+                    </a:gsLst>
+                    <a:lin ang="5400000" scaled="0"/>
+                  </a:gradFill>
+                  <a:effectLst/>
+                  <a:uLnTx/>
+                  <a:uFillTx/>
+                  <a:latin typeface="Klavika Regular"/>
+                  <a:ea typeface="Segoe UI" pitchFamily="34" charset="0"/>
+                  <a:cs typeface="Segoe UI" pitchFamily="34" charset="0"/>
+                </a:endParaRPr>
+              </a:p>
+            </p:txBody>
+          </p:sp>
+        </p:grpSp>
+        <p:grpSp>
+          <p:nvGrpSpPr>
+            <p:cNvPr id="13" name="Group 12">
+              <a:extLst>
+                <a:ext uri="{FF2B5EF4-FFF2-40B4-BE49-F238E27FC236}">
+                  <a16:creationId xmlns:a16="http://schemas.microsoft.com/office/drawing/2014/main" id="{24C8CF12-7EFF-A09E-843E-9C2C0C58F680}"/>
+                </a:ext>
+              </a:extLst>
+            </p:cNvPr>
+            <p:cNvGrpSpPr/>
+            <p:nvPr/>
+          </p:nvGrpSpPr>
+          <p:grpSpPr>
+            <a:xfrm>
+              <a:off x="5375306" y="3412774"/>
+              <a:ext cx="914402" cy="916714"/>
+              <a:chOff x="6864780" y="4114474"/>
+              <a:chExt cx="914402" cy="916714"/>
+            </a:xfrm>
+          </p:grpSpPr>
+          <p:pic>
+            <p:nvPicPr>
+              <p:cNvPr id="21" name="Graphic 20" descr="Chevron arrows with solid fill">
+                <a:extLst>
+                  <a:ext uri="{FF2B5EF4-FFF2-40B4-BE49-F238E27FC236}">
+                    <a16:creationId xmlns:a16="http://schemas.microsoft.com/office/drawing/2014/main" id="{11778CE0-9423-0631-E74C-6E6FF0A06EFA}"/>
+                  </a:ext>
+                </a:extLst>
+              </p:cNvPr>
+              <p:cNvPicPr>
+                <a:picLocks noChangeAspect="1"/>
+              </p:cNvPicPr>
+              <p:nvPr/>
+            </p:nvPicPr>
+            <p:blipFill>
+              <a:blip r:embed="rId4">
+                <a:extLst>
+                  <a:ext uri="{96DAC541-7B7A-43D3-8B79-37D633B846F1}">
+                    <asvg:svgBlip xmlns:asvg="http://schemas.microsoft.com/office/drawing/2016/SVG/main" r:embed="rId5"/>
+                  </a:ext>
+                </a:extLst>
+              </a:blip>
+              <a:stretch>
+                <a:fillRect/>
+              </a:stretch>
+            </p:blipFill>
+            <p:spPr>
+              <a:xfrm rot="10800000">
+                <a:off x="6864780" y="4114474"/>
+                <a:ext cx="914400" cy="914400"/>
+              </a:xfrm>
+              <a:prstGeom prst="rect">
+                <a:avLst/>
+              </a:prstGeom>
+            </p:spPr>
+          </p:pic>
+          <p:sp>
+            <p:nvSpPr>
+              <p:cNvPr id="22" name="Rectangle 21">
+                <a:extLst>
+                  <a:ext uri="{FF2B5EF4-FFF2-40B4-BE49-F238E27FC236}">
+                    <a16:creationId xmlns:a16="http://schemas.microsoft.com/office/drawing/2014/main" id="{EE3E8D97-FFBD-1592-7C0A-35EC4C64C382}"/>
+                  </a:ext>
+                </a:extLst>
+              </p:cNvPr>
+              <p:cNvSpPr/>
+              <p:nvPr/>
+            </p:nvSpPr>
+            <p:spPr bwMode="auto">
+              <a:xfrm rot="16200000">
+                <a:off x="6864781" y="4116787"/>
+                <a:ext cx="914401" cy="914401"/>
+              </a:xfrm>
+              <a:prstGeom prst="rect">
+                <a:avLst/>
+              </a:prstGeom>
+              <a:noFill/>
+              <a:ln w="38100" cap="flat" cmpd="sng" algn="ctr">
+                <a:solidFill>
+                  <a:srgbClr val="000000"/>
+                </a:solidFill>
+                <a:prstDash val="solid"/>
+                <a:headEnd type="none" w="med" len="med"/>
+                <a:tailEnd type="none" w="med" len="med"/>
+              </a:ln>
+              <a:effectLst/>
+            </p:spPr>
+            <p:txBody>
+              <a:bodyPr rot="0" spcFirstLastPara="0" vertOverflow="overflow" horzOverflow="overflow" vert="horz" wrap="square" lIns="182880" tIns="146304" rIns="182880" bIns="146304" numCol="1" spcCol="0" rtlCol="0" fromWordArt="0" anchor="t" anchorCtr="0" forceAA="0" compatLnSpc="1">
+                <a:prstTxWarp prst="textNoShape">
+                  <a:avLst/>
+                </a:prstTxWarp>
+                <a:noAutofit/>
+              </a:bodyPr>
+              <a:lstStyle/>
+              <a:p>
+                <a:pPr marL="0" marR="0" lvl="0" indent="0" defTabSz="932472" eaLnBrk="1" fontAlgn="base" latinLnBrk="0" hangingPunct="1">
+                  <a:lnSpc>
+                    <a:spcPct val="100000"/>
+                  </a:lnSpc>
+                  <a:spcBef>
+                    <a:spcPct val="0"/>
+                  </a:spcBef>
+                  <a:spcAft>
+                    <a:spcPct val="0"/>
+                  </a:spcAft>
+                  <a:buClrTx/>
+                  <a:buSzTx/>
+                  <a:buFontTx/>
+                  <a:buNone/>
+                  <a:tabLst/>
+                  <a:defRPr/>
+                </a:pPr>
+                <a:endParaRPr kumimoji="0" lang="en-GB" sz="1800" b="0" i="0" u="none" strike="noStrike" kern="0" cap="none" spc="0" normalizeH="0" baseline="0" noProof="0" dirty="0" err="1">
+                  <a:ln>
+                    <a:noFill/>
+                  </a:ln>
+                  <a:gradFill>
+                    <a:gsLst>
+                      <a:gs pos="0">
+                        <a:srgbClr val="FFFFFF"/>
+                      </a:gs>
+                      <a:gs pos="100000">
+                        <a:srgbClr val="FFFFFF"/>
+                      </a:gs>
+                    </a:gsLst>
+                    <a:lin ang="5400000" scaled="0"/>
+                  </a:gradFill>
+                  <a:effectLst/>
+                  <a:uLnTx/>
+                  <a:uFillTx/>
+                  <a:latin typeface="Klavika Regular"/>
+                  <a:ea typeface="Segoe UI" pitchFamily="34" charset="0"/>
+                  <a:cs typeface="Segoe UI" pitchFamily="34" charset="0"/>
+                </a:endParaRPr>
+              </a:p>
+            </p:txBody>
+          </p:sp>
+        </p:grpSp>
+        <p:grpSp>
+          <p:nvGrpSpPr>
+            <p:cNvPr id="14" name="Group 13">
+              <a:extLst>
+                <a:ext uri="{FF2B5EF4-FFF2-40B4-BE49-F238E27FC236}">
+                  <a16:creationId xmlns:a16="http://schemas.microsoft.com/office/drawing/2014/main" id="{6EB787BD-3BDC-AB22-FF91-7A0135C37D7F}"/>
+                </a:ext>
+              </a:extLst>
+            </p:cNvPr>
+            <p:cNvGrpSpPr/>
+            <p:nvPr/>
+          </p:nvGrpSpPr>
+          <p:grpSpPr>
+            <a:xfrm>
+              <a:off x="7277929" y="3415507"/>
+              <a:ext cx="928565" cy="927629"/>
+              <a:chOff x="8291792" y="3058662"/>
+              <a:chExt cx="928565" cy="927629"/>
+            </a:xfrm>
+          </p:grpSpPr>
+          <p:sp>
+            <p:nvSpPr>
+              <p:cNvPr id="18" name="Rectangle 17">
+                <a:extLst>
+                  <a:ext uri="{FF2B5EF4-FFF2-40B4-BE49-F238E27FC236}">
+                    <a16:creationId xmlns:a16="http://schemas.microsoft.com/office/drawing/2014/main" id="{6F8994BB-CAB3-AF5C-DDE1-666F5EDBF6B2}"/>
+                  </a:ext>
+                </a:extLst>
+              </p:cNvPr>
+              <p:cNvSpPr/>
+              <p:nvPr/>
+            </p:nvSpPr>
+            <p:spPr bwMode="auto">
+              <a:xfrm>
+                <a:off x="8305956" y="3058662"/>
+                <a:ext cx="914401" cy="914401"/>
+              </a:xfrm>
+              <a:prstGeom prst="rect">
+                <a:avLst/>
+              </a:prstGeom>
+              <a:noFill/>
+              <a:ln w="38100" cap="flat" cmpd="sng" algn="ctr">
+                <a:solidFill>
+                  <a:srgbClr val="000000"/>
+                </a:solidFill>
+                <a:prstDash val="solid"/>
+                <a:headEnd type="none" w="med" len="med"/>
+                <a:tailEnd type="none" w="med" len="med"/>
+              </a:ln>
+              <a:effectLst/>
+            </p:spPr>
+            <p:txBody>
+              <a:bodyPr rot="0" spcFirstLastPara="0" vertOverflow="overflow" horzOverflow="overflow" vert="horz" wrap="square" lIns="182880" tIns="146304" rIns="182880" bIns="146304" numCol="1" spcCol="0" rtlCol="0" fromWordArt="0" anchor="t" anchorCtr="0" forceAA="0" compatLnSpc="1">
+                <a:prstTxWarp prst="textNoShape">
+                  <a:avLst/>
+                </a:prstTxWarp>
+                <a:noAutofit/>
+              </a:bodyPr>
+              <a:lstStyle/>
+              <a:p>
+                <a:pPr marL="0" marR="0" lvl="0" indent="0" defTabSz="932472" eaLnBrk="1" fontAlgn="base" latinLnBrk="0" hangingPunct="1">
+                  <a:lnSpc>
+                    <a:spcPct val="100000"/>
+                  </a:lnSpc>
+                  <a:spcBef>
+                    <a:spcPct val="0"/>
+                  </a:spcBef>
+                  <a:spcAft>
+                    <a:spcPct val="0"/>
+                  </a:spcAft>
+                  <a:buClrTx/>
+                  <a:buSzTx/>
+                  <a:buFontTx/>
+                  <a:buNone/>
+                  <a:tabLst/>
+                  <a:defRPr/>
+                </a:pPr>
+                <a:endParaRPr kumimoji="0" lang="en-GB" sz="1800" b="0" i="0" u="none" strike="noStrike" kern="0" cap="none" spc="0" normalizeH="0" baseline="0" noProof="0" dirty="0" err="1">
+                  <a:ln>
+                    <a:noFill/>
+                  </a:ln>
+                  <a:gradFill>
+                    <a:gsLst>
+                      <a:gs pos="0">
+                        <a:srgbClr val="FFFFFF"/>
+                      </a:gs>
+                      <a:gs pos="100000">
+                        <a:srgbClr val="FFFFFF"/>
+                      </a:gs>
+                    </a:gsLst>
+                    <a:lin ang="5400000" scaled="0"/>
+                  </a:gradFill>
+                  <a:effectLst/>
+                  <a:uLnTx/>
+                  <a:uFillTx/>
+                  <a:latin typeface="Klavika Regular"/>
+                  <a:ea typeface="Segoe UI" pitchFamily="34" charset="0"/>
+                  <a:cs typeface="Segoe UI" pitchFamily="34" charset="0"/>
+                </a:endParaRPr>
+              </a:p>
+            </p:txBody>
+          </p:sp>
+          <p:pic>
+            <p:nvPicPr>
+              <p:cNvPr id="19" name="Graphic 18" descr="Chevron arrows with solid fill">
+                <a:extLst>
+                  <a:ext uri="{FF2B5EF4-FFF2-40B4-BE49-F238E27FC236}">
+                    <a16:creationId xmlns:a16="http://schemas.microsoft.com/office/drawing/2014/main" id="{C6C2841B-D98A-B69F-E4AB-F4D3C7F492DC}"/>
+                  </a:ext>
+                </a:extLst>
+              </p:cNvPr>
+              <p:cNvPicPr>
+                <a:picLocks noChangeAspect="1"/>
+              </p:cNvPicPr>
+              <p:nvPr/>
+            </p:nvPicPr>
+            <p:blipFill>
+              <a:blip r:embed="rId4">
+                <a:extLst>
+                  <a:ext uri="{96DAC541-7B7A-43D3-8B79-37D633B846F1}">
+                    <asvg:svgBlip xmlns:asvg="http://schemas.microsoft.com/office/drawing/2016/SVG/main" r:embed="rId5"/>
+                  </a:ext>
+                </a:extLst>
+              </a:blip>
+              <a:stretch>
+                <a:fillRect/>
+              </a:stretch>
+            </p:blipFill>
+            <p:spPr>
+              <a:xfrm>
+                <a:off x="8291792" y="3071891"/>
+                <a:ext cx="914400" cy="914400"/>
+              </a:xfrm>
+              <a:prstGeom prst="rect">
+                <a:avLst/>
+              </a:prstGeom>
+            </p:spPr>
+          </p:pic>
+        </p:grpSp>
+        <p:grpSp>
+          <p:nvGrpSpPr>
+            <p:cNvPr id="15" name="Group 14">
+              <a:extLst>
+                <a:ext uri="{FF2B5EF4-FFF2-40B4-BE49-F238E27FC236}">
+                  <a16:creationId xmlns:a16="http://schemas.microsoft.com/office/drawing/2014/main" id="{631EFFAE-73F1-9F14-663B-9D33298C85AA}"/>
+                </a:ext>
+              </a:extLst>
+            </p:cNvPr>
+            <p:cNvGrpSpPr/>
+            <p:nvPr/>
+          </p:nvGrpSpPr>
+          <p:grpSpPr>
+            <a:xfrm>
+              <a:off x="6334952" y="4350993"/>
+              <a:ext cx="914401" cy="926129"/>
+              <a:chOff x="8313098" y="4117139"/>
+              <a:chExt cx="914401" cy="926129"/>
+            </a:xfrm>
+          </p:grpSpPr>
+          <p:pic>
+            <p:nvPicPr>
+              <p:cNvPr id="16" name="Graphic 15" descr="Chevron arrows with solid fill">
+                <a:extLst>
+                  <a:ext uri="{FF2B5EF4-FFF2-40B4-BE49-F238E27FC236}">
+                    <a16:creationId xmlns:a16="http://schemas.microsoft.com/office/drawing/2014/main" id="{59DBDC7A-EBEA-08F2-DCB7-DC956219D0B4}"/>
+                  </a:ext>
+                </a:extLst>
+              </p:cNvPr>
+              <p:cNvPicPr>
+                <a:picLocks noChangeAspect="1"/>
+              </p:cNvPicPr>
+              <p:nvPr/>
+            </p:nvPicPr>
+            <p:blipFill>
+              <a:blip r:embed="rId4">
+                <a:extLst>
+                  <a:ext uri="{96DAC541-7B7A-43D3-8B79-37D633B846F1}">
+                    <asvg:svgBlip xmlns:asvg="http://schemas.microsoft.com/office/drawing/2016/SVG/main" r:embed="rId5"/>
+                  </a:ext>
+                </a:extLst>
+              </a:blip>
+              <a:stretch>
+                <a:fillRect/>
+              </a:stretch>
+            </p:blipFill>
+            <p:spPr>
+              <a:xfrm rot="5400000">
+                <a:off x="8313098" y="4128868"/>
+                <a:ext cx="914400" cy="914400"/>
+              </a:xfrm>
+              <a:prstGeom prst="rect">
+                <a:avLst/>
+              </a:prstGeom>
+            </p:spPr>
+          </p:pic>
+          <p:sp>
+            <p:nvSpPr>
+              <p:cNvPr id="17" name="Rectangle 16">
+                <a:extLst>
+                  <a:ext uri="{FF2B5EF4-FFF2-40B4-BE49-F238E27FC236}">
+                    <a16:creationId xmlns:a16="http://schemas.microsoft.com/office/drawing/2014/main" id="{74A55072-79E3-8D30-3431-ECE0D688ED39}"/>
+                  </a:ext>
+                </a:extLst>
+              </p:cNvPr>
+              <p:cNvSpPr/>
+              <p:nvPr/>
+            </p:nvSpPr>
+            <p:spPr bwMode="auto">
+              <a:xfrm rot="10800000">
+                <a:off x="8313098" y="4117139"/>
+                <a:ext cx="914401" cy="914401"/>
+              </a:xfrm>
+              <a:prstGeom prst="rect">
+                <a:avLst/>
+              </a:prstGeom>
+              <a:noFill/>
+              <a:ln w="38100" cap="flat" cmpd="sng" algn="ctr">
+                <a:solidFill>
+                  <a:srgbClr val="000000"/>
+                </a:solidFill>
+                <a:prstDash val="solid"/>
+                <a:headEnd type="none" w="med" len="med"/>
+                <a:tailEnd type="none" w="med" len="med"/>
+              </a:ln>
+              <a:effectLst/>
+            </p:spPr>
+            <p:txBody>
+              <a:bodyPr rot="0" spcFirstLastPara="0" vertOverflow="overflow" horzOverflow="overflow" vert="horz" wrap="square" lIns="182880" tIns="146304" rIns="182880" bIns="146304" numCol="1" spcCol="0" rtlCol="0" fromWordArt="0" anchor="t" anchorCtr="0" forceAA="0" compatLnSpc="1">
+                <a:prstTxWarp prst="textNoShape">
+                  <a:avLst/>
+                </a:prstTxWarp>
+                <a:noAutofit/>
+              </a:bodyPr>
+              <a:lstStyle/>
+              <a:p>
+                <a:pPr marL="0" marR="0" lvl="0" indent="0" defTabSz="932472" eaLnBrk="1" fontAlgn="base" latinLnBrk="0" hangingPunct="1">
+                  <a:lnSpc>
+                    <a:spcPct val="100000"/>
+                  </a:lnSpc>
+                  <a:spcBef>
+                    <a:spcPct val="0"/>
+                  </a:spcBef>
+                  <a:spcAft>
+                    <a:spcPct val="0"/>
+                  </a:spcAft>
+                  <a:buClrTx/>
+                  <a:buSzTx/>
+                  <a:buFontTx/>
+                  <a:buNone/>
+                  <a:tabLst/>
+                  <a:defRPr/>
+                </a:pPr>
+                <a:endParaRPr kumimoji="0" lang="en-GB" sz="1800" b="0" i="0" u="none" strike="noStrike" kern="0" cap="none" spc="0" normalizeH="0" baseline="0" noProof="0" dirty="0" err="1">
+                  <a:ln>
+                    <a:noFill/>
+                  </a:ln>
+                  <a:gradFill>
+                    <a:gsLst>
+                      <a:gs pos="0">
+                        <a:srgbClr val="FFFFFF"/>
+                      </a:gs>
+                      <a:gs pos="100000">
+                        <a:srgbClr val="FFFFFF"/>
+                      </a:gs>
+                    </a:gsLst>
+                    <a:lin ang="5400000" scaled="0"/>
+                  </a:gradFill>
+                  <a:effectLst/>
+                  <a:uLnTx/>
+                  <a:uFillTx/>
+                  <a:latin typeface="Klavika Regular"/>
+                  <a:ea typeface="Segoe UI" pitchFamily="34" charset="0"/>
+                  <a:cs typeface="Segoe UI" pitchFamily="34" charset="0"/>
+                </a:endParaRPr>
+              </a:p>
+            </p:txBody>
+          </p:sp>
+        </p:grpSp>
+      </p:grpSp>
+    </p:spTree>
+    <p:extLst>
+      <p:ext uri="{BB962C8B-B14F-4D97-AF65-F5344CB8AC3E}">
+        <p14:creationId xmlns:p14="http://schemas.microsoft.com/office/powerpoint/2010/main" val="3340652098"/>
       </p:ext>
     </p:extLst>
   </p:cSld>
@@ -27797,21 +30357,21 @@
 </file>
 
 <file path=customXml/item1.xml><?xml version="1.0" encoding="utf-8"?>
+<TemplafySlideFormConfiguration><![CDATA[{"formFields":[],"formDataEntries":[]}]]></TemplafySlideFormConfiguration>
+</file>
+
+<file path=customXml/item2.xml><?xml version="1.0" encoding="utf-8"?>
 <TemplafySlideTemplateConfiguration><![CDATA[{"slideVersion":1,"isValidatorEnabled":false,"isLocked":false,"elementsMetadata":[],"slideId":"637629098472101399","enableDocumentContentUpdater":true,"version":"2.0"}]]></TemplafySlideTemplateConfiguration>
 </file>
 
-<file path=customXml/item2.xml><?xml version="1.0" encoding="utf-8"?>
-<TemplafySlideFormConfiguration><![CDATA[{"formFields":[],"formDataEntries":[]}]]></TemplafySlideFormConfiguration>
-</file>
-
 <file path=customXml/itemProps1.xml><?xml version="1.0" encoding="utf-8"?>
-<ds:datastoreItem xmlns:ds="http://schemas.openxmlformats.org/officeDocument/2006/customXml" ds:itemID="{3A7B4B56-D0D2-4135-A66A-EEF2C62C4256}">
+<ds:datastoreItem xmlns:ds="http://schemas.openxmlformats.org/officeDocument/2006/customXml" ds:itemID="{E4185C24-1447-4288-BCBB-7ABBF03479A8}">
   <ds:schemaRefs/>
 </ds:datastoreItem>
 </file>
 
 <file path=customXml/itemProps2.xml><?xml version="1.0" encoding="utf-8"?>
-<ds:datastoreItem xmlns:ds="http://schemas.openxmlformats.org/officeDocument/2006/customXml" ds:itemID="{E4185C24-1447-4288-BCBB-7ABBF03479A8}">
+<ds:datastoreItem xmlns:ds="http://schemas.openxmlformats.org/officeDocument/2006/customXml" ds:itemID="{3A7B4B56-D0D2-4135-A66A-EEF2C62C4256}">
   <ds:schemaRefs/>
 </ds:datastoreItem>
 </file>

</xml_diff>